<commit_message>
Fleshing out modeling section; adding refs for forecast and astsa packages
</commit_message>
<xml_diff>
--- a/Prioli_Final_Proj.pptx
+++ b/Prioli_Final_Proj.pptx
@@ -5,7 +5,7 @@
     <p:sldMasterId id="2147483726" r:id="rId1"/>
   </p:sldMasterIdLst>
   <p:notesMasterIdLst>
-    <p:notesMasterId r:id="rId18"/>
+    <p:notesMasterId r:id="rId17"/>
   </p:notesMasterIdLst>
   <p:sldIdLst>
     <p:sldId id="256" r:id="rId2"/>
@@ -15,15 +15,14 @@
     <p:sldId id="260" r:id="rId6"/>
     <p:sldId id="272" r:id="rId7"/>
     <p:sldId id="286" r:id="rId8"/>
-    <p:sldId id="285" r:id="rId9"/>
-    <p:sldId id="267" r:id="rId10"/>
-    <p:sldId id="268" r:id="rId11"/>
-    <p:sldId id="277" r:id="rId12"/>
-    <p:sldId id="279" r:id="rId13"/>
-    <p:sldId id="280" r:id="rId14"/>
-    <p:sldId id="281" r:id="rId15"/>
-    <p:sldId id="262" r:id="rId16"/>
-    <p:sldId id="261" r:id="rId17"/>
+    <p:sldId id="267" r:id="rId9"/>
+    <p:sldId id="268" r:id="rId10"/>
+    <p:sldId id="277" r:id="rId11"/>
+    <p:sldId id="279" r:id="rId12"/>
+    <p:sldId id="280" r:id="rId13"/>
+    <p:sldId id="281" r:id="rId14"/>
+    <p:sldId id="262" r:id="rId15"/>
+    <p:sldId id="261" r:id="rId16"/>
   </p:sldIdLst>
   <p:sldSz cx="12192000" cy="6858000"/>
   <p:notesSz cx="6858000" cy="9144000"/>
@@ -223,7 +222,7 @@
           <a:p>
             <a:fld id="{4EE169DE-67F4-4753-9B1C-F1A309C78068}" type="datetimeFigureOut">
               <a:rPr lang="en-US" smtClean="0"/>
-              <a:t>4/27/2019</a:t>
+              <a:t>4/29/2019</a:t>
             </a:fld>
             <a:endParaRPr lang="en-US"/>
           </a:p>
@@ -690,7 +689,7 @@
           <a:p>
             <a:fld id="{CF647BC4-379F-449B-8ACB-1D0356C51E22}" type="datetimeFigureOut">
               <a:rPr lang="en-US" smtClean="0"/>
-              <a:t>4/27/2019</a:t>
+              <a:t>4/29/2019</a:t>
             </a:fld>
             <a:endParaRPr lang="en-US"/>
           </a:p>
@@ -880,7 +879,7 @@
           <a:p>
             <a:fld id="{CF647BC4-379F-449B-8ACB-1D0356C51E22}" type="datetimeFigureOut">
               <a:rPr lang="en-US" smtClean="0"/>
-              <a:t>4/27/2019</a:t>
+              <a:t>4/29/2019</a:t>
             </a:fld>
             <a:endParaRPr lang="en-US"/>
           </a:p>
@@ -1060,7 +1059,7 @@
           <a:p>
             <a:fld id="{CF647BC4-379F-449B-8ACB-1D0356C51E22}" type="datetimeFigureOut">
               <a:rPr lang="en-US" smtClean="0"/>
-              <a:t>4/27/2019</a:t>
+              <a:t>4/29/2019</a:t>
             </a:fld>
             <a:endParaRPr lang="en-US"/>
           </a:p>
@@ -1251,7 +1250,7 @@
           <a:p>
             <a:fld id="{CF647BC4-379F-449B-8ACB-1D0356C51E22}" type="datetimeFigureOut">
               <a:rPr lang="en-US" smtClean="0"/>
-              <a:t>4/27/2019</a:t>
+              <a:t>4/29/2019</a:t>
             </a:fld>
             <a:endParaRPr lang="en-US"/>
           </a:p>
@@ -1507,7 +1506,7 @@
           <a:p>
             <a:fld id="{CF647BC4-379F-449B-8ACB-1D0356C51E22}" type="datetimeFigureOut">
               <a:rPr lang="en-US" smtClean="0"/>
-              <a:t>4/27/2019</a:t>
+              <a:t>4/29/2019</a:t>
             </a:fld>
             <a:endParaRPr lang="en-US"/>
           </a:p>
@@ -1795,7 +1794,7 @@
           <a:p>
             <a:fld id="{CF647BC4-379F-449B-8ACB-1D0356C51E22}" type="datetimeFigureOut">
               <a:rPr lang="en-US" smtClean="0"/>
-              <a:t>4/27/2019</a:t>
+              <a:t>4/29/2019</a:t>
             </a:fld>
             <a:endParaRPr lang="en-US"/>
           </a:p>
@@ -2233,7 +2232,7 @@
           <a:p>
             <a:fld id="{CF647BC4-379F-449B-8ACB-1D0356C51E22}" type="datetimeFigureOut">
               <a:rPr lang="en-US" smtClean="0"/>
-              <a:t>4/27/2019</a:t>
+              <a:t>4/29/2019</a:t>
             </a:fld>
             <a:endParaRPr lang="en-US"/>
           </a:p>
@@ -2351,7 +2350,7 @@
           <a:p>
             <a:fld id="{CF647BC4-379F-449B-8ACB-1D0356C51E22}" type="datetimeFigureOut">
               <a:rPr lang="en-US" smtClean="0"/>
-              <a:t>4/27/2019</a:t>
+              <a:t>4/29/2019</a:t>
             </a:fld>
             <a:endParaRPr lang="en-US"/>
           </a:p>
@@ -2446,7 +2445,7 @@
           <a:p>
             <a:fld id="{CF647BC4-379F-449B-8ACB-1D0356C51E22}" type="datetimeFigureOut">
               <a:rPr lang="en-US" smtClean="0"/>
-              <a:t>4/27/2019</a:t>
+              <a:t>4/29/2019</a:t>
             </a:fld>
             <a:endParaRPr lang="en-US"/>
           </a:p>
@@ -2802,7 +2801,7 @@
           <a:p>
             <a:fld id="{CF647BC4-379F-449B-8ACB-1D0356C51E22}" type="datetimeFigureOut">
               <a:rPr lang="en-US" smtClean="0"/>
-              <a:t>4/27/2019</a:t>
+              <a:t>4/29/2019</a:t>
             </a:fld>
             <a:endParaRPr lang="en-US"/>
           </a:p>
@@ -3118,7 +3117,7 @@
           <a:p>
             <a:fld id="{CF647BC4-379F-449B-8ACB-1D0356C51E22}" type="datetimeFigureOut">
               <a:rPr lang="en-US" smtClean="0"/>
-              <a:t>4/27/2019</a:t>
+              <a:t>4/29/2019</a:t>
             </a:fld>
             <a:endParaRPr lang="en-US"/>
           </a:p>
@@ -3350,7 +3349,7 @@
             <a:fld id="{CF647BC4-379F-449B-8ACB-1D0356C51E22}" type="datetimeFigureOut">
               <a:rPr lang="en-US" smtClean="0"/>
               <a:pPr/>
-              <a:t>4/27/2019</a:t>
+              <a:t>4/29/2019</a:t>
             </a:fld>
             <a:endParaRPr lang="en-US"/>
           </a:p>
@@ -3815,9 +3814,7 @@
           </p:nvPr>
         </p:nvSpPr>
         <p:spPr>
-          <a:solidFill>
-            <a:srgbClr val="FFFF00"/>
-          </a:solidFill>
+          <a:noFill/>
         </p:spPr>
         <p:txBody>
           <a:bodyPr/>
@@ -3825,7 +3822,14 @@
           <a:p>
             <a:r>
               <a:rPr lang="en-US" sz="5000" b="1" dirty="0"/>
-              <a:t>Comparing World Quality of Life Measures:  Nonparametric vs. Parametric Approaches</a:t>
+              <a:t>Disposable Income, Debt, and Savings:</a:t>
+            </a:r>
+            <a:br>
+              <a:rPr lang="en-US" sz="5000" b="1" dirty="0"/>
+            </a:br>
+            <a:r>
+              <a:rPr lang="en-US" sz="5000" b="1" dirty="0"/>
+              <a:t>Q1 1980 – Q3 2018</a:t>
             </a:r>
           </a:p>
         </p:txBody>
@@ -3931,7 +3935,7 @@
           <p:cNvPr id="2" name="Title 1">
             <a:extLst>
               <a:ext uri="{FF2B5EF4-FFF2-40B4-BE49-F238E27FC236}">
-                <a16:creationId xmlns:a16="http://schemas.microsoft.com/office/drawing/2014/main" id="{B7383051-138B-4DB9-9ABB-C3BBE79305E8}"/>
+                <a16:creationId xmlns:a16="http://schemas.microsoft.com/office/drawing/2014/main" id="{9C375C1D-A60F-47D9-82DB-79EDD0A16512}"/>
               </a:ext>
             </a:extLst>
           </p:cNvPr>
@@ -3949,17 +3953,17 @@
           <a:p>
             <a:r>
               <a:rPr lang="en-US" dirty="0"/>
-              <a:t>ANALYSES PERFORMED</a:t>
-            </a:r>
-          </a:p>
-        </p:txBody>
-      </p:sp>
-      <p:sp>
-        <p:nvSpPr>
-          <p:cNvPr id="5" name="Content Placeholder 4">
+              <a:t>HEADING</a:t>
+            </a:r>
+          </a:p>
+        </p:txBody>
+      </p:sp>
+      <p:sp>
+        <p:nvSpPr>
+          <p:cNvPr id="6" name="Content Placeholder 5">
             <a:extLst>
               <a:ext uri="{FF2B5EF4-FFF2-40B4-BE49-F238E27FC236}">
-                <a16:creationId xmlns:a16="http://schemas.microsoft.com/office/drawing/2014/main" id="{C7017BFE-98B3-41BF-AE7C-E6B268B9A67C}"/>
+                <a16:creationId xmlns:a16="http://schemas.microsoft.com/office/drawing/2014/main" id="{61C50387-F220-4361-AD1C-FE49784D7C6B}"/>
               </a:ext>
             </a:extLst>
           </p:cNvPr>
@@ -3972,17 +3976,1448 @@
         </p:nvSpPr>
         <p:spPr/>
         <p:txBody>
-          <a:bodyPr/>
+          <a:bodyPr>
+            <a:normAutofit/>
+          </a:bodyPr>
           <a:lstStyle/>
           <a:p>
-            <a:endParaRPr lang="en-US"/>
+            <a:r>
+              <a:rPr lang="en-US" sz="2400" dirty="0"/>
+              <a:t>Text and code block</a:t>
+            </a:r>
+          </a:p>
+          <a:p>
+            <a:endParaRPr lang="en-US" sz="2400" dirty="0"/>
+          </a:p>
+        </p:txBody>
+      </p:sp>
+      <p:sp>
+        <p:nvSpPr>
+          <p:cNvPr id="4" name="TextBox 3">
+            <a:extLst>
+              <a:ext uri="{FF2B5EF4-FFF2-40B4-BE49-F238E27FC236}">
+                <a16:creationId xmlns:a16="http://schemas.microsoft.com/office/drawing/2014/main" id="{588AEC9F-2322-44D6-BB54-A567E4AA8A51}"/>
+              </a:ext>
+            </a:extLst>
+          </p:cNvPr>
+          <p:cNvSpPr txBox="1"/>
+          <p:nvPr/>
+        </p:nvSpPr>
+        <p:spPr>
+          <a:xfrm>
+            <a:off x="1131359" y="2661083"/>
+            <a:ext cx="6402328" cy="3785652"/>
+          </a:xfrm>
+          <a:prstGeom prst="rect">
+            <a:avLst/>
+          </a:prstGeom>
+          <a:solidFill>
+            <a:srgbClr val="404040"/>
+          </a:solidFill>
+          <a:ln>
+            <a:solidFill>
+              <a:schemeClr val="tx1"/>
+            </a:solidFill>
+          </a:ln>
+        </p:spPr>
+        <p:txBody>
+          <a:bodyPr wrap="square" rtlCol="0">
+            <a:spAutoFit/>
+          </a:bodyPr>
+          <a:lstStyle/>
+          <a:p>
+            <a:r>
+              <a:rPr lang="en-US" sz="1200" dirty="0">
+                <a:solidFill>
+                  <a:schemeClr val="bg1"/>
+                </a:solidFill>
+                <a:latin typeface="Lucida Console" panose="020B0609040504020204" pitchFamily="49" charset="0"/>
+              </a:rPr>
+              <a:t>n </a:t>
+            </a:r>
+            <a:r>
+              <a:rPr lang="en-US" sz="1200" dirty="0">
+                <a:solidFill>
+                  <a:schemeClr val="accent1"/>
+                </a:solidFill>
+                <a:latin typeface="Lucida Console" panose="020B0609040504020204" pitchFamily="49" charset="0"/>
+              </a:rPr>
+              <a:t>&lt;-</a:t>
+            </a:r>
+            <a:r>
+              <a:rPr lang="en-US" sz="1200" dirty="0">
+                <a:solidFill>
+                  <a:schemeClr val="bg1"/>
+                </a:solidFill>
+                <a:latin typeface="Lucida Console" panose="020B0609040504020204" pitchFamily="49" charset="0"/>
+              </a:rPr>
+              <a:t> length</a:t>
+            </a:r>
+            <a:r>
+              <a:rPr lang="en-US" sz="1200" dirty="0">
+                <a:solidFill>
+                  <a:schemeClr val="accent1"/>
+                </a:solidFill>
+                <a:latin typeface="Lucida Console" panose="020B0609040504020204" pitchFamily="49" charset="0"/>
+              </a:rPr>
+              <a:t>(</a:t>
+            </a:r>
+            <a:r>
+              <a:rPr lang="en-US" sz="1200" dirty="0" err="1">
+                <a:solidFill>
+                  <a:schemeClr val="bg1"/>
+                </a:solidFill>
+                <a:latin typeface="Lucida Console" panose="020B0609040504020204" pitchFamily="49" charset="0"/>
+              </a:rPr>
+              <a:t>alldata</a:t>
+            </a:r>
+            <a:r>
+              <a:rPr lang="en-US" sz="1200" dirty="0" err="1">
+                <a:solidFill>
+                  <a:schemeClr val="accent1"/>
+                </a:solidFill>
+                <a:latin typeface="Lucida Console" panose="020B0609040504020204" pitchFamily="49" charset="0"/>
+              </a:rPr>
+              <a:t>$</a:t>
+            </a:r>
+            <a:r>
+              <a:rPr lang="en-US" sz="1200" dirty="0" err="1">
+                <a:solidFill>
+                  <a:schemeClr val="bg1"/>
+                </a:solidFill>
+                <a:latin typeface="Lucida Console" panose="020B0609040504020204" pitchFamily="49" charset="0"/>
+              </a:rPr>
+              <a:t>HDIindex</a:t>
+            </a:r>
+            <a:r>
+              <a:rPr lang="en-US" sz="1200" dirty="0">
+                <a:solidFill>
+                  <a:schemeClr val="accent1"/>
+                </a:solidFill>
+                <a:latin typeface="Lucida Console" panose="020B0609040504020204" pitchFamily="49" charset="0"/>
+              </a:rPr>
+              <a:t>)</a:t>
+            </a:r>
+          </a:p>
+          <a:p>
+            <a:r>
+              <a:rPr lang="en-US" sz="1200" dirty="0" err="1">
+                <a:solidFill>
+                  <a:schemeClr val="bg1"/>
+                </a:solidFill>
+                <a:latin typeface="Lucida Console" panose="020B0609040504020204" pitchFamily="49" charset="0"/>
+              </a:rPr>
+              <a:t>nBS</a:t>
+            </a:r>
+            <a:r>
+              <a:rPr lang="en-US" sz="1200" dirty="0">
+                <a:solidFill>
+                  <a:schemeClr val="bg1"/>
+                </a:solidFill>
+                <a:latin typeface="Lucida Console" panose="020B0609040504020204" pitchFamily="49" charset="0"/>
+              </a:rPr>
+              <a:t> </a:t>
+            </a:r>
+            <a:r>
+              <a:rPr lang="en-US" sz="1200" dirty="0">
+                <a:solidFill>
+                  <a:schemeClr val="accent1"/>
+                </a:solidFill>
+                <a:latin typeface="Lucida Console" panose="020B0609040504020204" pitchFamily="49" charset="0"/>
+              </a:rPr>
+              <a:t>&lt;-</a:t>
+            </a:r>
+            <a:r>
+              <a:rPr lang="en-US" sz="1200" dirty="0">
+                <a:solidFill>
+                  <a:schemeClr val="bg1"/>
+                </a:solidFill>
+                <a:latin typeface="Lucida Console" panose="020B0609040504020204" pitchFamily="49" charset="0"/>
+              </a:rPr>
+              <a:t> </a:t>
+            </a:r>
+            <a:r>
+              <a:rPr lang="en-US" sz="1200" dirty="0">
+                <a:solidFill>
+                  <a:schemeClr val="accent3"/>
+                </a:solidFill>
+                <a:latin typeface="Lucida Console" panose="020B0609040504020204" pitchFamily="49" charset="0"/>
+              </a:rPr>
+              <a:t>1000</a:t>
+            </a:r>
+          </a:p>
+          <a:p>
+            <a:r>
+              <a:rPr lang="en-US" sz="1200" dirty="0" err="1">
+                <a:solidFill>
+                  <a:schemeClr val="bg1"/>
+                </a:solidFill>
+                <a:latin typeface="Lucida Console" panose="020B0609040504020204" pitchFamily="49" charset="0"/>
+              </a:rPr>
+              <a:t>set.seed</a:t>
+            </a:r>
+            <a:r>
+              <a:rPr lang="en-US" sz="1200" dirty="0">
+                <a:solidFill>
+                  <a:schemeClr val="accent1"/>
+                </a:solidFill>
+                <a:latin typeface="Lucida Console" panose="020B0609040504020204" pitchFamily="49" charset="0"/>
+              </a:rPr>
+              <a:t>(</a:t>
+            </a:r>
+            <a:r>
+              <a:rPr lang="en-US" sz="1200" dirty="0">
+                <a:solidFill>
+                  <a:schemeClr val="accent3"/>
+                </a:solidFill>
+                <a:latin typeface="Lucida Console" panose="020B0609040504020204" pitchFamily="49" charset="0"/>
+              </a:rPr>
+              <a:t>19811221</a:t>
+            </a:r>
+            <a:r>
+              <a:rPr lang="en-US" sz="1200" dirty="0">
+                <a:solidFill>
+                  <a:schemeClr val="accent1"/>
+                </a:solidFill>
+                <a:latin typeface="Lucida Console" panose="020B0609040504020204" pitchFamily="49" charset="0"/>
+              </a:rPr>
+              <a:t>)</a:t>
+            </a:r>
+          </a:p>
+          <a:p>
+            <a:endParaRPr lang="en-US" sz="1200" dirty="0">
+              <a:solidFill>
+                <a:schemeClr val="bg1"/>
+              </a:solidFill>
+              <a:latin typeface="Lucida Console" panose="020B0609040504020204" pitchFamily="49" charset="0"/>
+            </a:endParaRPr>
+          </a:p>
+          <a:p>
+            <a:r>
+              <a:rPr lang="en-US" sz="1200" dirty="0" err="1">
+                <a:solidFill>
+                  <a:schemeClr val="bg1"/>
+                </a:solidFill>
+                <a:latin typeface="Lucida Console" panose="020B0609040504020204" pitchFamily="49" charset="0"/>
+              </a:rPr>
+              <a:t>BSout</a:t>
+            </a:r>
+            <a:r>
+              <a:rPr lang="en-US" sz="1200" dirty="0">
+                <a:solidFill>
+                  <a:schemeClr val="bg1"/>
+                </a:solidFill>
+                <a:latin typeface="Lucida Console" panose="020B0609040504020204" pitchFamily="49" charset="0"/>
+              </a:rPr>
+              <a:t> </a:t>
+            </a:r>
+            <a:r>
+              <a:rPr lang="en-US" sz="1200" dirty="0">
+                <a:solidFill>
+                  <a:schemeClr val="accent1"/>
+                </a:solidFill>
+                <a:latin typeface="Lucida Console" panose="020B0609040504020204" pitchFamily="49" charset="0"/>
+              </a:rPr>
+              <a:t>&lt;-</a:t>
+            </a:r>
+            <a:r>
+              <a:rPr lang="en-US" sz="1200" dirty="0">
+                <a:solidFill>
+                  <a:schemeClr val="bg1"/>
+                </a:solidFill>
+                <a:latin typeface="Lucida Console" panose="020B0609040504020204" pitchFamily="49" charset="0"/>
+              </a:rPr>
+              <a:t> </a:t>
+            </a:r>
+            <a:r>
+              <a:rPr lang="en-US" sz="1200" dirty="0" err="1">
+                <a:solidFill>
+                  <a:schemeClr val="bg1"/>
+                </a:solidFill>
+                <a:latin typeface="Lucida Console" panose="020B0609040504020204" pitchFamily="49" charset="0"/>
+              </a:rPr>
+              <a:t>tibble</a:t>
+            </a:r>
+            <a:r>
+              <a:rPr lang="en-US" sz="1200" dirty="0">
+                <a:solidFill>
+                  <a:schemeClr val="accent1"/>
+                </a:solidFill>
+                <a:latin typeface="Lucida Console" panose="020B0609040504020204" pitchFamily="49" charset="0"/>
+              </a:rPr>
+              <a:t>(</a:t>
+            </a:r>
+            <a:r>
+              <a:rPr lang="en-US" sz="1200" dirty="0" err="1">
+                <a:solidFill>
+                  <a:schemeClr val="bg1"/>
+                </a:solidFill>
+                <a:latin typeface="Lucida Console" panose="020B0609040504020204" pitchFamily="49" charset="0"/>
+              </a:rPr>
+              <a:t>BSmean</a:t>
+            </a:r>
+            <a:r>
+              <a:rPr lang="en-US" sz="1200" dirty="0">
+                <a:solidFill>
+                  <a:schemeClr val="accent1"/>
+                </a:solidFill>
+                <a:latin typeface="Lucida Console" panose="020B0609040504020204" pitchFamily="49" charset="0"/>
+              </a:rPr>
+              <a:t> =</a:t>
+            </a:r>
+            <a:r>
+              <a:rPr lang="en-US" sz="1200" dirty="0">
+                <a:solidFill>
+                  <a:schemeClr val="bg1"/>
+                </a:solidFill>
+                <a:latin typeface="Lucida Console" panose="020B0609040504020204" pitchFamily="49" charset="0"/>
+              </a:rPr>
+              <a:t> numeric</a:t>
+            </a:r>
+            <a:r>
+              <a:rPr lang="en-US" sz="1200" dirty="0">
+                <a:solidFill>
+                  <a:schemeClr val="accent1"/>
+                </a:solidFill>
+                <a:latin typeface="Lucida Console" panose="020B0609040504020204" pitchFamily="49" charset="0"/>
+              </a:rPr>
+              <a:t>())</a:t>
+            </a:r>
+          </a:p>
+          <a:p>
+            <a:endParaRPr lang="en-US" sz="1200" dirty="0">
+              <a:solidFill>
+                <a:schemeClr val="bg1"/>
+              </a:solidFill>
+              <a:latin typeface="Lucida Console" panose="020B0609040504020204" pitchFamily="49" charset="0"/>
+            </a:endParaRPr>
+          </a:p>
+          <a:p>
+            <a:r>
+              <a:rPr lang="en-US" sz="1200" dirty="0">
+                <a:solidFill>
+                  <a:srgbClr val="E0B0F6"/>
+                </a:solidFill>
+                <a:latin typeface="Lucida Console" panose="020B0609040504020204" pitchFamily="49" charset="0"/>
+              </a:rPr>
+              <a:t>for</a:t>
+            </a:r>
+            <a:r>
+              <a:rPr lang="en-US" sz="1200" dirty="0">
+                <a:solidFill>
+                  <a:schemeClr val="accent1"/>
+                </a:solidFill>
+                <a:latin typeface="Lucida Console" panose="020B0609040504020204" pitchFamily="49" charset="0"/>
+              </a:rPr>
+              <a:t>(</a:t>
+            </a:r>
+            <a:r>
+              <a:rPr lang="en-US" sz="1200" dirty="0">
+                <a:solidFill>
+                  <a:schemeClr val="bg1"/>
+                </a:solidFill>
+                <a:latin typeface="Lucida Console" panose="020B0609040504020204" pitchFamily="49" charset="0"/>
+              </a:rPr>
+              <a:t>bs </a:t>
+            </a:r>
+            <a:r>
+              <a:rPr lang="en-US" sz="1200" dirty="0">
+                <a:solidFill>
+                  <a:srgbClr val="E0B0F6"/>
+                </a:solidFill>
+                <a:latin typeface="Lucida Console" panose="020B0609040504020204" pitchFamily="49" charset="0"/>
+              </a:rPr>
+              <a:t>in</a:t>
+            </a:r>
+            <a:r>
+              <a:rPr lang="en-US" sz="1200" dirty="0">
+                <a:solidFill>
+                  <a:schemeClr val="bg1"/>
+                </a:solidFill>
+                <a:latin typeface="Lucida Console" panose="020B0609040504020204" pitchFamily="49" charset="0"/>
+              </a:rPr>
+              <a:t> </a:t>
+            </a:r>
+            <a:r>
+              <a:rPr lang="en-US" sz="1200" dirty="0">
+                <a:solidFill>
+                  <a:schemeClr val="accent3"/>
+                </a:solidFill>
+                <a:latin typeface="Lucida Console" panose="020B0609040504020204" pitchFamily="49" charset="0"/>
+              </a:rPr>
+              <a:t>1</a:t>
+            </a:r>
+            <a:r>
+              <a:rPr lang="en-US" sz="1200" dirty="0">
+                <a:solidFill>
+                  <a:schemeClr val="accent1"/>
+                </a:solidFill>
+                <a:latin typeface="Lucida Console" panose="020B0609040504020204" pitchFamily="49" charset="0"/>
+              </a:rPr>
+              <a:t>:</a:t>
+            </a:r>
+            <a:r>
+              <a:rPr lang="en-US" sz="1200" dirty="0">
+                <a:solidFill>
+                  <a:schemeClr val="bg1"/>
+                </a:solidFill>
+                <a:latin typeface="Lucida Console" panose="020B0609040504020204" pitchFamily="49" charset="0"/>
+              </a:rPr>
+              <a:t>nBS</a:t>
+            </a:r>
+            <a:r>
+              <a:rPr lang="en-US" sz="1200" dirty="0">
+                <a:solidFill>
+                  <a:schemeClr val="accent1"/>
+                </a:solidFill>
+                <a:latin typeface="Lucida Console" panose="020B0609040504020204" pitchFamily="49" charset="0"/>
+              </a:rPr>
+              <a:t>){</a:t>
+            </a:r>
+          </a:p>
+          <a:p>
+            <a:r>
+              <a:rPr lang="en-US" sz="1200" dirty="0">
+                <a:solidFill>
+                  <a:schemeClr val="bg1"/>
+                </a:solidFill>
+                <a:latin typeface="Lucida Console" panose="020B0609040504020204" pitchFamily="49" charset="0"/>
+              </a:rPr>
+              <a:t>  </a:t>
+            </a:r>
+            <a:r>
+              <a:rPr lang="en-US" sz="1200" dirty="0" err="1">
+                <a:solidFill>
+                  <a:schemeClr val="bg1"/>
+                </a:solidFill>
+                <a:latin typeface="Lucida Console" panose="020B0609040504020204" pitchFamily="49" charset="0"/>
+              </a:rPr>
+              <a:t>bsHDIindex</a:t>
+            </a:r>
+            <a:r>
+              <a:rPr lang="en-US" sz="1200" dirty="0">
+                <a:solidFill>
+                  <a:schemeClr val="bg1"/>
+                </a:solidFill>
+                <a:latin typeface="Lucida Console" panose="020B0609040504020204" pitchFamily="49" charset="0"/>
+              </a:rPr>
+              <a:t> </a:t>
+            </a:r>
+            <a:r>
+              <a:rPr lang="en-US" sz="1200" dirty="0">
+                <a:solidFill>
+                  <a:schemeClr val="accent1"/>
+                </a:solidFill>
+                <a:latin typeface="Lucida Console" panose="020B0609040504020204" pitchFamily="49" charset="0"/>
+              </a:rPr>
+              <a:t>&lt;-</a:t>
+            </a:r>
+            <a:r>
+              <a:rPr lang="en-US" sz="1200" dirty="0">
+                <a:solidFill>
+                  <a:schemeClr val="bg1"/>
+                </a:solidFill>
+                <a:latin typeface="Lucida Console" panose="020B0609040504020204" pitchFamily="49" charset="0"/>
+              </a:rPr>
+              <a:t> sample</a:t>
+            </a:r>
+            <a:r>
+              <a:rPr lang="en-US" sz="1200" dirty="0">
+                <a:solidFill>
+                  <a:schemeClr val="accent1"/>
+                </a:solidFill>
+                <a:latin typeface="Lucida Console" panose="020B0609040504020204" pitchFamily="49" charset="0"/>
+              </a:rPr>
+              <a:t>(</a:t>
+            </a:r>
+            <a:r>
+              <a:rPr lang="en-US" sz="1200" dirty="0" err="1">
+                <a:solidFill>
+                  <a:schemeClr val="bg1"/>
+                </a:solidFill>
+                <a:latin typeface="Lucida Console" panose="020B0609040504020204" pitchFamily="49" charset="0"/>
+              </a:rPr>
+              <a:t>alldata</a:t>
+            </a:r>
+            <a:r>
+              <a:rPr lang="en-US" sz="1200" dirty="0" err="1">
+                <a:solidFill>
+                  <a:schemeClr val="accent1"/>
+                </a:solidFill>
+                <a:latin typeface="Lucida Console" panose="020B0609040504020204" pitchFamily="49" charset="0"/>
+              </a:rPr>
+              <a:t>$</a:t>
+            </a:r>
+            <a:r>
+              <a:rPr lang="en-US" sz="1200" dirty="0" err="1">
+                <a:solidFill>
+                  <a:schemeClr val="bg1"/>
+                </a:solidFill>
+                <a:latin typeface="Lucida Console" panose="020B0609040504020204" pitchFamily="49" charset="0"/>
+              </a:rPr>
+              <a:t>HDIindex</a:t>
+            </a:r>
+            <a:r>
+              <a:rPr lang="en-US" sz="1200" dirty="0">
+                <a:solidFill>
+                  <a:schemeClr val="bg1"/>
+                </a:solidFill>
+                <a:latin typeface="Lucida Console" panose="020B0609040504020204" pitchFamily="49" charset="0"/>
+              </a:rPr>
+              <a:t>, n, replace </a:t>
+            </a:r>
+            <a:r>
+              <a:rPr lang="en-US" sz="1200" dirty="0">
+                <a:solidFill>
+                  <a:schemeClr val="accent1"/>
+                </a:solidFill>
+                <a:latin typeface="Lucida Console" panose="020B0609040504020204" pitchFamily="49" charset="0"/>
+              </a:rPr>
+              <a:t>=</a:t>
+            </a:r>
+            <a:r>
+              <a:rPr lang="en-US" sz="1200" dirty="0">
+                <a:solidFill>
+                  <a:schemeClr val="bg1"/>
+                </a:solidFill>
+                <a:latin typeface="Lucida Console" panose="020B0609040504020204" pitchFamily="49" charset="0"/>
+              </a:rPr>
+              <a:t> </a:t>
+            </a:r>
+            <a:r>
+              <a:rPr lang="en-US" sz="1200" dirty="0">
+                <a:solidFill>
+                  <a:schemeClr val="accent3"/>
+                </a:solidFill>
+                <a:latin typeface="Lucida Console" panose="020B0609040504020204" pitchFamily="49" charset="0"/>
+              </a:rPr>
+              <a:t>TRUE</a:t>
+            </a:r>
+            <a:r>
+              <a:rPr lang="en-US" sz="1200" dirty="0">
+                <a:solidFill>
+                  <a:schemeClr val="accent1"/>
+                </a:solidFill>
+                <a:latin typeface="Lucida Console" panose="020B0609040504020204" pitchFamily="49" charset="0"/>
+              </a:rPr>
+              <a:t>)</a:t>
+            </a:r>
+          </a:p>
+          <a:p>
+            <a:r>
+              <a:rPr lang="en-US" sz="1200" dirty="0">
+                <a:solidFill>
+                  <a:schemeClr val="bg1"/>
+                </a:solidFill>
+                <a:latin typeface="Lucida Console" panose="020B0609040504020204" pitchFamily="49" charset="0"/>
+              </a:rPr>
+              <a:t>  </a:t>
+            </a:r>
+            <a:r>
+              <a:rPr lang="en-US" sz="1200" dirty="0" err="1">
+                <a:solidFill>
+                  <a:schemeClr val="bg1"/>
+                </a:solidFill>
+                <a:latin typeface="Lucida Console" panose="020B0609040504020204" pitchFamily="49" charset="0"/>
+              </a:rPr>
+              <a:t>BSout</a:t>
+            </a:r>
+            <a:r>
+              <a:rPr lang="en-US" sz="1200" dirty="0">
+                <a:solidFill>
+                  <a:schemeClr val="accent1"/>
+                </a:solidFill>
+                <a:latin typeface="Lucida Console" panose="020B0609040504020204" pitchFamily="49" charset="0"/>
+              </a:rPr>
+              <a:t>[</a:t>
+            </a:r>
+            <a:r>
+              <a:rPr lang="en-US" sz="1200" dirty="0">
+                <a:solidFill>
+                  <a:schemeClr val="bg1"/>
+                </a:solidFill>
+                <a:latin typeface="Lucida Console" panose="020B0609040504020204" pitchFamily="49" charset="0"/>
+              </a:rPr>
+              <a:t>bs, </a:t>
+            </a:r>
+            <a:r>
+              <a:rPr lang="en-US" sz="1200" dirty="0">
+                <a:solidFill>
+                  <a:schemeClr val="accent3"/>
+                </a:solidFill>
+                <a:latin typeface="Lucida Console" panose="020B0609040504020204" pitchFamily="49" charset="0"/>
+              </a:rPr>
+              <a:t>1</a:t>
+            </a:r>
+            <a:r>
+              <a:rPr lang="en-US" sz="1200" dirty="0">
+                <a:solidFill>
+                  <a:schemeClr val="accent1"/>
+                </a:solidFill>
+                <a:latin typeface="Lucida Console" panose="020B0609040504020204" pitchFamily="49" charset="0"/>
+              </a:rPr>
+              <a:t>] &lt;-</a:t>
+            </a:r>
+            <a:r>
+              <a:rPr lang="en-US" sz="1200" dirty="0">
+                <a:solidFill>
+                  <a:schemeClr val="bg1"/>
+                </a:solidFill>
+                <a:latin typeface="Lucida Console" panose="020B0609040504020204" pitchFamily="49" charset="0"/>
+              </a:rPr>
+              <a:t> mean</a:t>
+            </a:r>
+            <a:r>
+              <a:rPr lang="en-US" sz="1200" dirty="0">
+                <a:solidFill>
+                  <a:schemeClr val="accent1"/>
+                </a:solidFill>
+                <a:latin typeface="Lucida Console" panose="020B0609040504020204" pitchFamily="49" charset="0"/>
+              </a:rPr>
+              <a:t>(</a:t>
+            </a:r>
+            <a:r>
+              <a:rPr lang="en-US" sz="1200" dirty="0" err="1">
+                <a:solidFill>
+                  <a:schemeClr val="bg1"/>
+                </a:solidFill>
+                <a:latin typeface="Lucida Console" panose="020B0609040504020204" pitchFamily="49" charset="0"/>
+              </a:rPr>
+              <a:t>bsHDIindex</a:t>
+            </a:r>
+            <a:r>
+              <a:rPr lang="en-US" sz="1200" dirty="0">
+                <a:solidFill>
+                  <a:schemeClr val="accent1"/>
+                </a:solidFill>
+                <a:latin typeface="Lucida Console" panose="020B0609040504020204" pitchFamily="49" charset="0"/>
+              </a:rPr>
+              <a:t>)</a:t>
+            </a:r>
+          </a:p>
+          <a:p>
+            <a:r>
+              <a:rPr lang="en-US" sz="1200" dirty="0">
+                <a:solidFill>
+                  <a:schemeClr val="accent1"/>
+                </a:solidFill>
+                <a:latin typeface="Lucida Console" panose="020B0609040504020204" pitchFamily="49" charset="0"/>
+              </a:rPr>
+              <a:t>}</a:t>
+            </a:r>
+          </a:p>
+          <a:p>
+            <a:endParaRPr lang="en-US" sz="1200" dirty="0">
+              <a:solidFill>
+                <a:schemeClr val="bg1"/>
+              </a:solidFill>
+              <a:latin typeface="Lucida Console" panose="020B0609040504020204" pitchFamily="49" charset="0"/>
+            </a:endParaRPr>
+          </a:p>
+          <a:p>
+            <a:r>
+              <a:rPr lang="en-US" sz="1200" dirty="0" err="1">
+                <a:solidFill>
+                  <a:schemeClr val="bg1"/>
+                </a:solidFill>
+                <a:latin typeface="Lucida Console" panose="020B0609040504020204" pitchFamily="49" charset="0"/>
+              </a:rPr>
+              <a:t>meanCI_BS</a:t>
+            </a:r>
+            <a:r>
+              <a:rPr lang="en-US" sz="1200" dirty="0">
+                <a:solidFill>
+                  <a:schemeClr val="bg1"/>
+                </a:solidFill>
+                <a:latin typeface="Lucida Console" panose="020B0609040504020204" pitchFamily="49" charset="0"/>
+              </a:rPr>
+              <a:t> </a:t>
+            </a:r>
+            <a:r>
+              <a:rPr lang="en-US" sz="1200" dirty="0">
+                <a:solidFill>
+                  <a:schemeClr val="accent1"/>
+                </a:solidFill>
+                <a:latin typeface="Lucida Console" panose="020B0609040504020204" pitchFamily="49" charset="0"/>
+              </a:rPr>
+              <a:t>&lt;-</a:t>
+            </a:r>
+            <a:r>
+              <a:rPr lang="en-US" sz="1200" dirty="0">
+                <a:solidFill>
+                  <a:schemeClr val="bg1"/>
+                </a:solidFill>
+                <a:latin typeface="Lucida Console" panose="020B0609040504020204" pitchFamily="49" charset="0"/>
+              </a:rPr>
+              <a:t> </a:t>
+            </a:r>
+            <a:r>
+              <a:rPr lang="en-US" sz="1200" dirty="0" err="1">
+                <a:solidFill>
+                  <a:schemeClr val="bg1"/>
+                </a:solidFill>
+                <a:latin typeface="Lucida Console" panose="020B0609040504020204" pitchFamily="49" charset="0"/>
+              </a:rPr>
+              <a:t>tibble</a:t>
+            </a:r>
+            <a:r>
+              <a:rPr lang="en-US" sz="1200" dirty="0">
+                <a:solidFill>
+                  <a:schemeClr val="accent1"/>
+                </a:solidFill>
+                <a:latin typeface="Lucida Console" panose="020B0609040504020204" pitchFamily="49" charset="0"/>
+              </a:rPr>
+              <a:t>(</a:t>
+            </a:r>
+            <a:r>
+              <a:rPr lang="en-US" sz="1200" dirty="0" err="1">
+                <a:solidFill>
+                  <a:schemeClr val="bg1"/>
+                </a:solidFill>
+                <a:latin typeface="Lucida Console" panose="020B0609040504020204" pitchFamily="49" charset="0"/>
+              </a:rPr>
+              <a:t>CI_low</a:t>
+            </a:r>
+            <a:r>
+              <a:rPr lang="en-US" sz="1200" dirty="0">
+                <a:solidFill>
+                  <a:schemeClr val="bg1"/>
+                </a:solidFill>
+                <a:latin typeface="Lucida Console" panose="020B0609040504020204" pitchFamily="49" charset="0"/>
+              </a:rPr>
+              <a:t> </a:t>
+            </a:r>
+            <a:r>
+              <a:rPr lang="en-US" sz="1200" dirty="0">
+                <a:solidFill>
+                  <a:schemeClr val="accent1"/>
+                </a:solidFill>
+                <a:latin typeface="Lucida Console" panose="020B0609040504020204" pitchFamily="49" charset="0"/>
+              </a:rPr>
+              <a:t>=</a:t>
+            </a:r>
+            <a:r>
+              <a:rPr lang="en-US" sz="1200" dirty="0">
+                <a:solidFill>
+                  <a:schemeClr val="bg1"/>
+                </a:solidFill>
+                <a:latin typeface="Lucida Console" panose="020B0609040504020204" pitchFamily="49" charset="0"/>
+              </a:rPr>
+              <a:t> numeric</a:t>
+            </a:r>
+            <a:r>
+              <a:rPr lang="en-US" sz="1200" dirty="0">
+                <a:solidFill>
+                  <a:schemeClr val="accent1"/>
+                </a:solidFill>
+                <a:latin typeface="Lucida Console" panose="020B0609040504020204" pitchFamily="49" charset="0"/>
+              </a:rPr>
+              <a:t>()</a:t>
+            </a:r>
+            <a:r>
+              <a:rPr lang="en-US" sz="1200" dirty="0">
+                <a:solidFill>
+                  <a:schemeClr val="bg1"/>
+                </a:solidFill>
+                <a:latin typeface="Lucida Console" panose="020B0609040504020204" pitchFamily="49" charset="0"/>
+              </a:rPr>
+              <a:t>,</a:t>
+            </a:r>
+          </a:p>
+          <a:p>
+            <a:r>
+              <a:rPr lang="en-US" sz="1200" dirty="0">
+                <a:solidFill>
+                  <a:schemeClr val="bg1"/>
+                </a:solidFill>
+                <a:latin typeface="Lucida Console" panose="020B0609040504020204" pitchFamily="49" charset="0"/>
+              </a:rPr>
+              <a:t>                    </a:t>
+            </a:r>
+            <a:r>
+              <a:rPr lang="en-US" sz="1200" dirty="0" err="1">
+                <a:solidFill>
+                  <a:schemeClr val="bg1"/>
+                </a:solidFill>
+                <a:latin typeface="Lucida Console" panose="020B0609040504020204" pitchFamily="49" charset="0"/>
+              </a:rPr>
+              <a:t>CI_high</a:t>
+            </a:r>
+            <a:r>
+              <a:rPr lang="en-US" sz="1200" dirty="0">
+                <a:solidFill>
+                  <a:schemeClr val="bg1"/>
+                </a:solidFill>
+                <a:latin typeface="Lucida Console" panose="020B0609040504020204" pitchFamily="49" charset="0"/>
+              </a:rPr>
+              <a:t> </a:t>
+            </a:r>
+            <a:r>
+              <a:rPr lang="en-US" sz="1200" dirty="0">
+                <a:solidFill>
+                  <a:schemeClr val="accent1"/>
+                </a:solidFill>
+                <a:latin typeface="Lucida Console" panose="020B0609040504020204" pitchFamily="49" charset="0"/>
+              </a:rPr>
+              <a:t>=</a:t>
+            </a:r>
+            <a:r>
+              <a:rPr lang="en-US" sz="1200" dirty="0">
+                <a:solidFill>
+                  <a:schemeClr val="bg1"/>
+                </a:solidFill>
+                <a:latin typeface="Lucida Console" panose="020B0609040504020204" pitchFamily="49" charset="0"/>
+              </a:rPr>
+              <a:t> numeric</a:t>
+            </a:r>
+            <a:r>
+              <a:rPr lang="en-US" sz="1200" dirty="0">
+                <a:solidFill>
+                  <a:schemeClr val="accent1"/>
+                </a:solidFill>
+                <a:latin typeface="Lucida Console" panose="020B0609040504020204" pitchFamily="49" charset="0"/>
+              </a:rPr>
+              <a:t>()</a:t>
+            </a:r>
+            <a:r>
+              <a:rPr lang="en-US" sz="1200" dirty="0">
+                <a:solidFill>
+                  <a:schemeClr val="bg1"/>
+                </a:solidFill>
+                <a:latin typeface="Lucida Console" panose="020B0609040504020204" pitchFamily="49" charset="0"/>
+              </a:rPr>
+              <a:t>,</a:t>
+            </a:r>
+          </a:p>
+          <a:p>
+            <a:r>
+              <a:rPr lang="en-US" sz="1200" dirty="0">
+                <a:solidFill>
+                  <a:schemeClr val="bg1"/>
+                </a:solidFill>
+                <a:latin typeface="Lucida Console" panose="020B0609040504020204" pitchFamily="49" charset="0"/>
+              </a:rPr>
+              <a:t>                    width </a:t>
+            </a:r>
+            <a:r>
+              <a:rPr lang="en-US" sz="1200" dirty="0">
+                <a:solidFill>
+                  <a:schemeClr val="accent1"/>
+                </a:solidFill>
+                <a:latin typeface="Lucida Console" panose="020B0609040504020204" pitchFamily="49" charset="0"/>
+              </a:rPr>
+              <a:t>=</a:t>
+            </a:r>
+            <a:r>
+              <a:rPr lang="en-US" sz="1200" dirty="0">
+                <a:solidFill>
+                  <a:schemeClr val="bg1"/>
+                </a:solidFill>
+                <a:latin typeface="Lucida Console" panose="020B0609040504020204" pitchFamily="49" charset="0"/>
+              </a:rPr>
+              <a:t> numeric</a:t>
+            </a:r>
+            <a:r>
+              <a:rPr lang="en-US" sz="1200" dirty="0">
+                <a:solidFill>
+                  <a:schemeClr val="accent1"/>
+                </a:solidFill>
+                <a:latin typeface="Lucida Console" panose="020B0609040504020204" pitchFamily="49" charset="0"/>
+              </a:rPr>
+              <a:t>())</a:t>
+            </a:r>
+          </a:p>
+          <a:p>
+            <a:endParaRPr lang="en-US" sz="1200" dirty="0">
+              <a:solidFill>
+                <a:schemeClr val="bg1"/>
+              </a:solidFill>
+              <a:latin typeface="Lucida Console" panose="020B0609040504020204" pitchFamily="49" charset="0"/>
+            </a:endParaRPr>
+          </a:p>
+          <a:p>
+            <a:r>
+              <a:rPr lang="en-US" sz="1200" dirty="0" err="1">
+                <a:solidFill>
+                  <a:schemeClr val="bg1"/>
+                </a:solidFill>
+                <a:latin typeface="Lucida Console" panose="020B0609040504020204" pitchFamily="49" charset="0"/>
+              </a:rPr>
+              <a:t>meanCI_BS</a:t>
+            </a:r>
+            <a:r>
+              <a:rPr lang="en-US" sz="1200" dirty="0">
+                <a:solidFill>
+                  <a:schemeClr val="accent1"/>
+                </a:solidFill>
+                <a:latin typeface="Lucida Console" panose="020B0609040504020204" pitchFamily="49" charset="0"/>
+              </a:rPr>
+              <a:t>[</a:t>
+            </a:r>
+            <a:r>
+              <a:rPr lang="en-US" sz="1200" dirty="0">
+                <a:solidFill>
+                  <a:schemeClr val="accent3"/>
+                </a:solidFill>
+                <a:latin typeface="Lucida Console" panose="020B0609040504020204" pitchFamily="49" charset="0"/>
+              </a:rPr>
+              <a:t>1</a:t>
+            </a:r>
+            <a:r>
+              <a:rPr lang="en-US" sz="1200" dirty="0">
+                <a:solidFill>
+                  <a:schemeClr val="bg1"/>
+                </a:solidFill>
+                <a:latin typeface="Lucida Console" panose="020B0609040504020204" pitchFamily="49" charset="0"/>
+              </a:rPr>
+              <a:t>, </a:t>
+            </a:r>
+            <a:r>
+              <a:rPr lang="en-US" sz="1200" dirty="0">
+                <a:solidFill>
+                  <a:schemeClr val="accent3"/>
+                </a:solidFill>
+                <a:latin typeface="Lucida Console" panose="020B0609040504020204" pitchFamily="49" charset="0"/>
+              </a:rPr>
+              <a:t>1</a:t>
+            </a:r>
+            <a:r>
+              <a:rPr lang="en-US" sz="1200" dirty="0">
+                <a:solidFill>
+                  <a:schemeClr val="accent1"/>
+                </a:solidFill>
+                <a:latin typeface="Lucida Console" panose="020B0609040504020204" pitchFamily="49" charset="0"/>
+              </a:rPr>
+              <a:t>] &lt;-</a:t>
+            </a:r>
+            <a:r>
+              <a:rPr lang="en-US" sz="1200" dirty="0">
+                <a:solidFill>
+                  <a:schemeClr val="bg1"/>
+                </a:solidFill>
+                <a:latin typeface="Lucida Console" panose="020B0609040504020204" pitchFamily="49" charset="0"/>
+              </a:rPr>
+              <a:t> round</a:t>
+            </a:r>
+            <a:r>
+              <a:rPr lang="en-US" sz="1200" dirty="0">
+                <a:solidFill>
+                  <a:schemeClr val="accent1"/>
+                </a:solidFill>
+                <a:latin typeface="Lucida Console" panose="020B0609040504020204" pitchFamily="49" charset="0"/>
+              </a:rPr>
+              <a:t>(</a:t>
+            </a:r>
+            <a:r>
+              <a:rPr lang="en-US" sz="1200" dirty="0">
+                <a:solidFill>
+                  <a:schemeClr val="bg1"/>
+                </a:solidFill>
+                <a:latin typeface="Lucida Console" panose="020B0609040504020204" pitchFamily="49" charset="0"/>
+              </a:rPr>
+              <a:t>quantile</a:t>
+            </a:r>
+            <a:r>
+              <a:rPr lang="en-US" sz="1200" dirty="0">
+                <a:solidFill>
+                  <a:schemeClr val="accent1"/>
+                </a:solidFill>
+                <a:latin typeface="Lucida Console" panose="020B0609040504020204" pitchFamily="49" charset="0"/>
+              </a:rPr>
+              <a:t>(</a:t>
+            </a:r>
+            <a:r>
+              <a:rPr lang="en-US" sz="1200" dirty="0" err="1">
+                <a:solidFill>
+                  <a:schemeClr val="bg1"/>
+                </a:solidFill>
+                <a:latin typeface="Lucida Console" panose="020B0609040504020204" pitchFamily="49" charset="0"/>
+              </a:rPr>
+              <a:t>BSout</a:t>
+            </a:r>
+            <a:r>
+              <a:rPr lang="en-US" sz="1200" dirty="0" err="1">
+                <a:solidFill>
+                  <a:schemeClr val="accent1"/>
+                </a:solidFill>
+                <a:latin typeface="Lucida Console" panose="020B0609040504020204" pitchFamily="49" charset="0"/>
+              </a:rPr>
+              <a:t>$</a:t>
+            </a:r>
+            <a:r>
+              <a:rPr lang="en-US" sz="1200" dirty="0" err="1">
+                <a:solidFill>
+                  <a:schemeClr val="bg1"/>
+                </a:solidFill>
+                <a:latin typeface="Lucida Console" panose="020B0609040504020204" pitchFamily="49" charset="0"/>
+              </a:rPr>
+              <a:t>BSmean</a:t>
+            </a:r>
+            <a:r>
+              <a:rPr lang="en-US" sz="1200" dirty="0">
+                <a:solidFill>
+                  <a:schemeClr val="bg1"/>
+                </a:solidFill>
+                <a:latin typeface="Lucida Console" panose="020B0609040504020204" pitchFamily="49" charset="0"/>
+              </a:rPr>
+              <a:t>, </a:t>
+            </a:r>
+            <a:r>
+              <a:rPr lang="en-US" sz="1200" dirty="0">
+                <a:solidFill>
+                  <a:schemeClr val="accent3"/>
+                </a:solidFill>
+                <a:latin typeface="Lucida Console" panose="020B0609040504020204" pitchFamily="49" charset="0"/>
+              </a:rPr>
+              <a:t>0.025</a:t>
+            </a:r>
+            <a:r>
+              <a:rPr lang="en-US" sz="1200" dirty="0">
+                <a:solidFill>
+                  <a:schemeClr val="accent1"/>
+                </a:solidFill>
+                <a:latin typeface="Lucida Console" panose="020B0609040504020204" pitchFamily="49" charset="0"/>
+              </a:rPr>
+              <a:t>)</a:t>
+            </a:r>
+            <a:r>
+              <a:rPr lang="en-US" sz="1200" dirty="0">
+                <a:solidFill>
+                  <a:schemeClr val="bg1"/>
+                </a:solidFill>
+                <a:latin typeface="Lucida Console" panose="020B0609040504020204" pitchFamily="49" charset="0"/>
+              </a:rPr>
+              <a:t>, digits </a:t>
+            </a:r>
+            <a:r>
+              <a:rPr lang="en-US" sz="1200" dirty="0">
+                <a:solidFill>
+                  <a:schemeClr val="accent1"/>
+                </a:solidFill>
+                <a:latin typeface="Lucida Console" panose="020B0609040504020204" pitchFamily="49" charset="0"/>
+              </a:rPr>
+              <a:t>=</a:t>
+            </a:r>
+            <a:r>
+              <a:rPr lang="en-US" sz="1200" dirty="0">
+                <a:solidFill>
+                  <a:schemeClr val="bg1"/>
+                </a:solidFill>
+                <a:latin typeface="Lucida Console" panose="020B0609040504020204" pitchFamily="49" charset="0"/>
+              </a:rPr>
+              <a:t> </a:t>
+            </a:r>
+            <a:r>
+              <a:rPr lang="en-US" sz="1200" dirty="0">
+                <a:solidFill>
+                  <a:schemeClr val="accent3"/>
+                </a:solidFill>
+                <a:latin typeface="Lucida Console" panose="020B0609040504020204" pitchFamily="49" charset="0"/>
+              </a:rPr>
+              <a:t>4</a:t>
+            </a:r>
+            <a:r>
+              <a:rPr lang="en-US" sz="1200" dirty="0">
+                <a:solidFill>
+                  <a:schemeClr val="accent1"/>
+                </a:solidFill>
+                <a:latin typeface="Lucida Console" panose="020B0609040504020204" pitchFamily="49" charset="0"/>
+              </a:rPr>
+              <a:t>)</a:t>
+            </a:r>
+          </a:p>
+          <a:p>
+            <a:r>
+              <a:rPr lang="en-US" sz="1200" dirty="0" err="1">
+                <a:solidFill>
+                  <a:schemeClr val="bg1"/>
+                </a:solidFill>
+                <a:latin typeface="Lucida Console" panose="020B0609040504020204" pitchFamily="49" charset="0"/>
+              </a:rPr>
+              <a:t>meanCI_BS</a:t>
+            </a:r>
+            <a:r>
+              <a:rPr lang="en-US" sz="1200" dirty="0">
+                <a:solidFill>
+                  <a:schemeClr val="accent1"/>
+                </a:solidFill>
+                <a:latin typeface="Lucida Console" panose="020B0609040504020204" pitchFamily="49" charset="0"/>
+              </a:rPr>
+              <a:t>[</a:t>
+            </a:r>
+            <a:r>
+              <a:rPr lang="en-US" sz="1200" dirty="0">
+                <a:solidFill>
+                  <a:schemeClr val="accent3"/>
+                </a:solidFill>
+                <a:latin typeface="Lucida Console" panose="020B0609040504020204" pitchFamily="49" charset="0"/>
+              </a:rPr>
+              <a:t>1</a:t>
+            </a:r>
+            <a:r>
+              <a:rPr lang="en-US" sz="1200" dirty="0">
+                <a:solidFill>
+                  <a:schemeClr val="bg1"/>
+                </a:solidFill>
+                <a:latin typeface="Lucida Console" panose="020B0609040504020204" pitchFamily="49" charset="0"/>
+              </a:rPr>
+              <a:t>, </a:t>
+            </a:r>
+            <a:r>
+              <a:rPr lang="en-US" sz="1200" dirty="0">
+                <a:solidFill>
+                  <a:schemeClr val="accent3"/>
+                </a:solidFill>
+                <a:latin typeface="Lucida Console" panose="020B0609040504020204" pitchFamily="49" charset="0"/>
+              </a:rPr>
+              <a:t>2</a:t>
+            </a:r>
+            <a:r>
+              <a:rPr lang="en-US" sz="1200" dirty="0">
+                <a:solidFill>
+                  <a:schemeClr val="accent1"/>
+                </a:solidFill>
+                <a:latin typeface="Lucida Console" panose="020B0609040504020204" pitchFamily="49" charset="0"/>
+              </a:rPr>
+              <a:t>] &lt;-</a:t>
+            </a:r>
+            <a:r>
+              <a:rPr lang="en-US" sz="1200" dirty="0">
+                <a:solidFill>
+                  <a:schemeClr val="bg1"/>
+                </a:solidFill>
+                <a:latin typeface="Lucida Console" panose="020B0609040504020204" pitchFamily="49" charset="0"/>
+              </a:rPr>
+              <a:t> round</a:t>
+            </a:r>
+            <a:r>
+              <a:rPr lang="en-US" sz="1200" dirty="0">
+                <a:solidFill>
+                  <a:schemeClr val="accent1"/>
+                </a:solidFill>
+                <a:latin typeface="Lucida Console" panose="020B0609040504020204" pitchFamily="49" charset="0"/>
+              </a:rPr>
+              <a:t>(</a:t>
+            </a:r>
+            <a:r>
+              <a:rPr lang="en-US" sz="1200" dirty="0">
+                <a:solidFill>
+                  <a:schemeClr val="bg1"/>
+                </a:solidFill>
+                <a:latin typeface="Lucida Console" panose="020B0609040504020204" pitchFamily="49" charset="0"/>
+              </a:rPr>
+              <a:t>quantile</a:t>
+            </a:r>
+            <a:r>
+              <a:rPr lang="en-US" sz="1200" dirty="0">
+                <a:solidFill>
+                  <a:schemeClr val="accent1"/>
+                </a:solidFill>
+                <a:latin typeface="Lucida Console" panose="020B0609040504020204" pitchFamily="49" charset="0"/>
+              </a:rPr>
+              <a:t>(</a:t>
+            </a:r>
+            <a:r>
+              <a:rPr lang="en-US" sz="1200" dirty="0" err="1">
+                <a:solidFill>
+                  <a:schemeClr val="bg1"/>
+                </a:solidFill>
+                <a:latin typeface="Lucida Console" panose="020B0609040504020204" pitchFamily="49" charset="0"/>
+              </a:rPr>
+              <a:t>BSout</a:t>
+            </a:r>
+            <a:r>
+              <a:rPr lang="en-US" sz="1200" dirty="0" err="1">
+                <a:solidFill>
+                  <a:schemeClr val="accent1"/>
+                </a:solidFill>
+                <a:latin typeface="Lucida Console" panose="020B0609040504020204" pitchFamily="49" charset="0"/>
+              </a:rPr>
+              <a:t>$</a:t>
+            </a:r>
+            <a:r>
+              <a:rPr lang="en-US" sz="1200" dirty="0" err="1">
+                <a:solidFill>
+                  <a:schemeClr val="bg1"/>
+                </a:solidFill>
+                <a:latin typeface="Lucida Console" panose="020B0609040504020204" pitchFamily="49" charset="0"/>
+              </a:rPr>
+              <a:t>BSmean</a:t>
+            </a:r>
+            <a:r>
+              <a:rPr lang="en-US" sz="1200" dirty="0">
+                <a:solidFill>
+                  <a:schemeClr val="bg1"/>
+                </a:solidFill>
+                <a:latin typeface="Lucida Console" panose="020B0609040504020204" pitchFamily="49" charset="0"/>
+              </a:rPr>
+              <a:t>, </a:t>
+            </a:r>
+            <a:r>
+              <a:rPr lang="en-US" sz="1200" dirty="0">
+                <a:solidFill>
+                  <a:schemeClr val="accent3"/>
+                </a:solidFill>
+                <a:latin typeface="Lucida Console" panose="020B0609040504020204" pitchFamily="49" charset="0"/>
+              </a:rPr>
+              <a:t>0.975</a:t>
+            </a:r>
+            <a:r>
+              <a:rPr lang="en-US" sz="1200" dirty="0">
+                <a:solidFill>
+                  <a:schemeClr val="accent1"/>
+                </a:solidFill>
+                <a:latin typeface="Lucida Console" panose="020B0609040504020204" pitchFamily="49" charset="0"/>
+              </a:rPr>
+              <a:t>)</a:t>
+            </a:r>
+            <a:r>
+              <a:rPr lang="en-US" sz="1200" dirty="0">
+                <a:solidFill>
+                  <a:schemeClr val="bg1"/>
+                </a:solidFill>
+                <a:latin typeface="Lucida Console" panose="020B0609040504020204" pitchFamily="49" charset="0"/>
+              </a:rPr>
+              <a:t>, digits </a:t>
+            </a:r>
+            <a:r>
+              <a:rPr lang="en-US" sz="1200" dirty="0">
+                <a:solidFill>
+                  <a:schemeClr val="accent1"/>
+                </a:solidFill>
+                <a:latin typeface="Lucida Console" panose="020B0609040504020204" pitchFamily="49" charset="0"/>
+              </a:rPr>
+              <a:t>=</a:t>
+            </a:r>
+            <a:r>
+              <a:rPr lang="en-US" sz="1200" dirty="0">
+                <a:solidFill>
+                  <a:schemeClr val="bg1"/>
+                </a:solidFill>
+                <a:latin typeface="Lucida Console" panose="020B0609040504020204" pitchFamily="49" charset="0"/>
+              </a:rPr>
+              <a:t> </a:t>
+            </a:r>
+            <a:r>
+              <a:rPr lang="en-US" sz="1200" dirty="0">
+                <a:solidFill>
+                  <a:schemeClr val="accent3"/>
+                </a:solidFill>
+                <a:latin typeface="Lucida Console" panose="020B0609040504020204" pitchFamily="49" charset="0"/>
+              </a:rPr>
+              <a:t>4</a:t>
+            </a:r>
+            <a:r>
+              <a:rPr lang="en-US" sz="1200" dirty="0">
+                <a:solidFill>
+                  <a:schemeClr val="accent1"/>
+                </a:solidFill>
+                <a:latin typeface="Lucida Console" panose="020B0609040504020204" pitchFamily="49" charset="0"/>
+              </a:rPr>
+              <a:t>)</a:t>
+            </a:r>
+          </a:p>
+          <a:p>
+            <a:r>
+              <a:rPr lang="en-US" sz="1200" dirty="0" err="1">
+                <a:solidFill>
+                  <a:schemeClr val="bg1"/>
+                </a:solidFill>
+                <a:latin typeface="Lucida Console" panose="020B0609040504020204" pitchFamily="49" charset="0"/>
+              </a:rPr>
+              <a:t>meanCI_BS</a:t>
+            </a:r>
+            <a:r>
+              <a:rPr lang="en-US" sz="1200" dirty="0" err="1">
+                <a:solidFill>
+                  <a:schemeClr val="accent1"/>
+                </a:solidFill>
+                <a:latin typeface="Lucida Console" panose="020B0609040504020204" pitchFamily="49" charset="0"/>
+              </a:rPr>
+              <a:t>$</a:t>
+            </a:r>
+            <a:r>
+              <a:rPr lang="en-US" sz="1200" dirty="0" err="1">
+                <a:solidFill>
+                  <a:schemeClr val="bg1"/>
+                </a:solidFill>
+                <a:latin typeface="Lucida Console" panose="020B0609040504020204" pitchFamily="49" charset="0"/>
+              </a:rPr>
+              <a:t>width</a:t>
+            </a:r>
+            <a:r>
+              <a:rPr lang="en-US" sz="1200" dirty="0">
+                <a:solidFill>
+                  <a:schemeClr val="bg1"/>
+                </a:solidFill>
+                <a:latin typeface="Lucida Console" panose="020B0609040504020204" pitchFamily="49" charset="0"/>
+              </a:rPr>
+              <a:t> </a:t>
+            </a:r>
+            <a:r>
+              <a:rPr lang="en-US" sz="1200" dirty="0">
+                <a:solidFill>
+                  <a:schemeClr val="accent1"/>
+                </a:solidFill>
+                <a:latin typeface="Lucida Console" panose="020B0609040504020204" pitchFamily="49" charset="0"/>
+              </a:rPr>
+              <a:t>=</a:t>
+            </a:r>
+            <a:r>
+              <a:rPr lang="en-US" sz="1200" dirty="0">
+                <a:solidFill>
+                  <a:schemeClr val="bg1"/>
+                </a:solidFill>
+                <a:latin typeface="Lucida Console" panose="020B0609040504020204" pitchFamily="49" charset="0"/>
+              </a:rPr>
+              <a:t> </a:t>
+            </a:r>
+            <a:r>
+              <a:rPr lang="en-US" sz="1200" dirty="0" err="1">
+                <a:solidFill>
+                  <a:schemeClr val="bg1"/>
+                </a:solidFill>
+                <a:latin typeface="Lucida Console" panose="020B0609040504020204" pitchFamily="49" charset="0"/>
+              </a:rPr>
+              <a:t>meanCI_BS</a:t>
+            </a:r>
+            <a:r>
+              <a:rPr lang="en-US" sz="1200" dirty="0" err="1">
+                <a:solidFill>
+                  <a:schemeClr val="accent1"/>
+                </a:solidFill>
+                <a:latin typeface="Lucida Console" panose="020B0609040504020204" pitchFamily="49" charset="0"/>
+              </a:rPr>
+              <a:t>$</a:t>
+            </a:r>
+            <a:r>
+              <a:rPr lang="en-US" sz="1200" dirty="0" err="1">
+                <a:solidFill>
+                  <a:schemeClr val="bg1"/>
+                </a:solidFill>
+                <a:latin typeface="Lucida Console" panose="020B0609040504020204" pitchFamily="49" charset="0"/>
+              </a:rPr>
+              <a:t>CI_high</a:t>
+            </a:r>
+            <a:r>
+              <a:rPr lang="en-US" sz="1200" dirty="0">
+                <a:solidFill>
+                  <a:schemeClr val="bg1"/>
+                </a:solidFill>
+                <a:latin typeface="Lucida Console" panose="020B0609040504020204" pitchFamily="49" charset="0"/>
+              </a:rPr>
+              <a:t> </a:t>
+            </a:r>
+            <a:r>
+              <a:rPr lang="en-US" sz="1200" dirty="0">
+                <a:solidFill>
+                  <a:schemeClr val="accent1"/>
+                </a:solidFill>
+                <a:latin typeface="Lucida Console" panose="020B0609040504020204" pitchFamily="49" charset="0"/>
+              </a:rPr>
+              <a:t>-</a:t>
+            </a:r>
+            <a:r>
+              <a:rPr lang="en-US" sz="1200" dirty="0">
+                <a:solidFill>
+                  <a:schemeClr val="bg1"/>
+                </a:solidFill>
+                <a:latin typeface="Lucida Console" panose="020B0609040504020204" pitchFamily="49" charset="0"/>
+              </a:rPr>
+              <a:t> </a:t>
+            </a:r>
+            <a:r>
+              <a:rPr lang="en-US" sz="1200" dirty="0" err="1">
+                <a:solidFill>
+                  <a:schemeClr val="bg1"/>
+                </a:solidFill>
+                <a:latin typeface="Lucida Console" panose="020B0609040504020204" pitchFamily="49" charset="0"/>
+              </a:rPr>
+              <a:t>meanCI_BS</a:t>
+            </a:r>
+            <a:r>
+              <a:rPr lang="en-US" sz="1200" dirty="0" err="1">
+                <a:solidFill>
+                  <a:schemeClr val="accent1"/>
+                </a:solidFill>
+                <a:latin typeface="Lucida Console" panose="020B0609040504020204" pitchFamily="49" charset="0"/>
+              </a:rPr>
+              <a:t>$</a:t>
+            </a:r>
+            <a:r>
+              <a:rPr lang="en-US" sz="1200" dirty="0" err="1">
+                <a:solidFill>
+                  <a:schemeClr val="bg1"/>
+                </a:solidFill>
+                <a:latin typeface="Lucida Console" panose="020B0609040504020204" pitchFamily="49" charset="0"/>
+              </a:rPr>
+              <a:t>CI_low</a:t>
+            </a:r>
+            <a:endParaRPr lang="en-US" sz="1200" dirty="0">
+              <a:solidFill>
+                <a:schemeClr val="bg1"/>
+              </a:solidFill>
+              <a:latin typeface="Lucida Console" panose="020B0609040504020204" pitchFamily="49" charset="0"/>
+            </a:endParaRPr>
+          </a:p>
+          <a:p>
+            <a:endParaRPr lang="en-US" sz="1200" dirty="0">
+              <a:solidFill>
+                <a:schemeClr val="bg1"/>
+              </a:solidFill>
+              <a:latin typeface="Lucida Console" panose="020B0609040504020204" pitchFamily="49" charset="0"/>
+            </a:endParaRPr>
+          </a:p>
+          <a:p>
+            <a:r>
+              <a:rPr lang="en-US" sz="1200" dirty="0">
+                <a:solidFill>
+                  <a:schemeClr val="bg1"/>
+                </a:solidFill>
+                <a:latin typeface="Lucida Console" panose="020B0609040504020204" pitchFamily="49" charset="0"/>
+              </a:rPr>
+              <a:t>analysis1_nonpara </a:t>
+            </a:r>
+            <a:r>
+              <a:rPr lang="en-US" sz="1200" dirty="0">
+                <a:solidFill>
+                  <a:schemeClr val="accent1"/>
+                </a:solidFill>
+                <a:latin typeface="Lucida Console" panose="020B0609040504020204" pitchFamily="49" charset="0"/>
+              </a:rPr>
+              <a:t>&lt;-</a:t>
+            </a:r>
+            <a:r>
+              <a:rPr lang="en-US" sz="1200" dirty="0">
+                <a:solidFill>
+                  <a:schemeClr val="bg1"/>
+                </a:solidFill>
+                <a:latin typeface="Lucida Console" panose="020B0609040504020204" pitchFamily="49" charset="0"/>
+              </a:rPr>
+              <a:t> </a:t>
+            </a:r>
+            <a:r>
+              <a:rPr lang="en-US" sz="1200" dirty="0" err="1">
+                <a:solidFill>
+                  <a:schemeClr val="bg1"/>
+                </a:solidFill>
+                <a:latin typeface="Lucida Console" panose="020B0609040504020204" pitchFamily="49" charset="0"/>
+              </a:rPr>
+              <a:t>meanCI_BS</a:t>
+            </a:r>
+            <a:endParaRPr lang="en-US" sz="1200" dirty="0">
+              <a:solidFill>
+                <a:schemeClr val="accent1"/>
+              </a:solidFill>
+              <a:latin typeface="Lucida Console" panose="020B0609040504020204" pitchFamily="49" charset="0"/>
+            </a:endParaRPr>
           </a:p>
         </p:txBody>
       </p:sp>
     </p:spTree>
     <p:extLst>
       <p:ext uri="{BB962C8B-B14F-4D97-AF65-F5344CB8AC3E}">
-        <p14:creationId xmlns:p14="http://schemas.microsoft.com/office/powerpoint/2010/main" val="2107817399"/>
+        <p14:creationId xmlns:p14="http://schemas.microsoft.com/office/powerpoint/2010/main" val="1107126729"/>
       </p:ext>
     </p:extLst>
   </p:cSld>
@@ -4014,7 +5449,7 @@
           <p:cNvPr id="2" name="Title 1">
             <a:extLst>
               <a:ext uri="{FF2B5EF4-FFF2-40B4-BE49-F238E27FC236}">
-                <a16:creationId xmlns:a16="http://schemas.microsoft.com/office/drawing/2014/main" id="{9C375C1D-A60F-47D9-82DB-79EDD0A16512}"/>
+                <a16:creationId xmlns:a16="http://schemas.microsoft.com/office/drawing/2014/main" id="{F7038F4E-C17C-476A-A8D5-BB1DF1332FAB}"/>
               </a:ext>
             </a:extLst>
           </p:cNvPr>
@@ -4032,17 +5467,17 @@
           <a:p>
             <a:r>
               <a:rPr lang="en-US" dirty="0"/>
-              <a:t>HEADING</a:t>
-            </a:r>
-          </a:p>
-        </p:txBody>
-      </p:sp>
-      <p:sp>
-        <p:nvSpPr>
-          <p:cNvPr id="6" name="Content Placeholder 5">
+              <a:t>DISCUSSION</a:t>
+            </a:r>
+          </a:p>
+        </p:txBody>
+      </p:sp>
+      <p:sp>
+        <p:nvSpPr>
+          <p:cNvPr id="3" name="Content Placeholder 2">
             <a:extLst>
               <a:ext uri="{FF2B5EF4-FFF2-40B4-BE49-F238E27FC236}">
-                <a16:creationId xmlns:a16="http://schemas.microsoft.com/office/drawing/2014/main" id="{61C50387-F220-4361-AD1C-FE49784D7C6B}"/>
+                <a16:creationId xmlns:a16="http://schemas.microsoft.com/office/drawing/2014/main" id="{22E7DCC7-2736-4166-86E2-FBBC23519826}"/>
               </a:ext>
             </a:extLst>
           </p:cNvPr>
@@ -4055,1448 +5490,23 @@
         </p:nvSpPr>
         <p:spPr/>
         <p:txBody>
-          <a:bodyPr>
-            <a:normAutofit/>
-          </a:bodyPr>
+          <a:bodyPr/>
           <a:lstStyle/>
           <a:p>
             <a:r>
-              <a:rPr lang="en-US" sz="2400" dirty="0"/>
-              <a:t>Text and code block</a:t>
-            </a:r>
-          </a:p>
-          <a:p>
-            <a:endParaRPr lang="en-US" sz="2400" dirty="0"/>
-          </a:p>
-        </p:txBody>
-      </p:sp>
-      <p:sp>
-        <p:nvSpPr>
-          <p:cNvPr id="4" name="TextBox 3">
-            <a:extLst>
-              <a:ext uri="{FF2B5EF4-FFF2-40B4-BE49-F238E27FC236}">
-                <a16:creationId xmlns:a16="http://schemas.microsoft.com/office/drawing/2014/main" id="{588AEC9F-2322-44D6-BB54-A567E4AA8A51}"/>
-              </a:ext>
-            </a:extLst>
-          </p:cNvPr>
-          <p:cNvSpPr txBox="1"/>
-          <p:nvPr/>
-        </p:nvSpPr>
-        <p:spPr>
-          <a:xfrm>
-            <a:off x="1131359" y="2661083"/>
-            <a:ext cx="6402328" cy="3785652"/>
-          </a:xfrm>
-          <a:prstGeom prst="rect">
-            <a:avLst/>
-          </a:prstGeom>
-          <a:solidFill>
-            <a:srgbClr val="404040"/>
-          </a:solidFill>
-          <a:ln>
-            <a:solidFill>
-              <a:schemeClr val="tx1"/>
-            </a:solidFill>
-          </a:ln>
-        </p:spPr>
-        <p:txBody>
-          <a:bodyPr wrap="square" rtlCol="0">
-            <a:spAutoFit/>
-          </a:bodyPr>
-          <a:lstStyle/>
-          <a:p>
-            <a:r>
-              <a:rPr lang="en-US" sz="1200" dirty="0">
-                <a:solidFill>
-                  <a:schemeClr val="bg1"/>
-                </a:solidFill>
-                <a:latin typeface="Lucida Console" panose="020B0609040504020204" pitchFamily="49" charset="0"/>
-              </a:rPr>
-              <a:t>n </a:t>
-            </a:r>
-            <a:r>
-              <a:rPr lang="en-US" sz="1200" dirty="0">
-                <a:solidFill>
-                  <a:schemeClr val="accent1"/>
-                </a:solidFill>
-                <a:latin typeface="Lucida Console" panose="020B0609040504020204" pitchFamily="49" charset="0"/>
-              </a:rPr>
-              <a:t>&lt;-</a:t>
-            </a:r>
-            <a:r>
-              <a:rPr lang="en-US" sz="1200" dirty="0">
-                <a:solidFill>
-                  <a:schemeClr val="bg1"/>
-                </a:solidFill>
-                <a:latin typeface="Lucida Console" panose="020B0609040504020204" pitchFamily="49" charset="0"/>
-              </a:rPr>
-              <a:t> length</a:t>
-            </a:r>
-            <a:r>
-              <a:rPr lang="en-US" sz="1200" dirty="0">
-                <a:solidFill>
-                  <a:schemeClr val="accent1"/>
-                </a:solidFill>
-                <a:latin typeface="Lucida Console" panose="020B0609040504020204" pitchFamily="49" charset="0"/>
-              </a:rPr>
-              <a:t>(</a:t>
-            </a:r>
-            <a:r>
-              <a:rPr lang="en-US" sz="1200" dirty="0" err="1">
-                <a:solidFill>
-                  <a:schemeClr val="bg1"/>
-                </a:solidFill>
-                <a:latin typeface="Lucida Console" panose="020B0609040504020204" pitchFamily="49" charset="0"/>
-              </a:rPr>
-              <a:t>alldata</a:t>
-            </a:r>
-            <a:r>
-              <a:rPr lang="en-US" sz="1200" dirty="0" err="1">
-                <a:solidFill>
-                  <a:schemeClr val="accent1"/>
-                </a:solidFill>
-                <a:latin typeface="Lucida Console" panose="020B0609040504020204" pitchFamily="49" charset="0"/>
-              </a:rPr>
-              <a:t>$</a:t>
-            </a:r>
-            <a:r>
-              <a:rPr lang="en-US" sz="1200" dirty="0" err="1">
-                <a:solidFill>
-                  <a:schemeClr val="bg1"/>
-                </a:solidFill>
-                <a:latin typeface="Lucida Console" panose="020B0609040504020204" pitchFamily="49" charset="0"/>
-              </a:rPr>
-              <a:t>HDIindex</a:t>
-            </a:r>
-            <a:r>
-              <a:rPr lang="en-US" sz="1200" dirty="0">
-                <a:solidFill>
-                  <a:schemeClr val="accent1"/>
-                </a:solidFill>
-                <a:latin typeface="Lucida Console" panose="020B0609040504020204" pitchFamily="49" charset="0"/>
-              </a:rPr>
-              <a:t>)</a:t>
-            </a:r>
-          </a:p>
-          <a:p>
-            <a:r>
-              <a:rPr lang="en-US" sz="1200" dirty="0" err="1">
-                <a:solidFill>
-                  <a:schemeClr val="bg1"/>
-                </a:solidFill>
-                <a:latin typeface="Lucida Console" panose="020B0609040504020204" pitchFamily="49" charset="0"/>
-              </a:rPr>
-              <a:t>nBS</a:t>
-            </a:r>
-            <a:r>
-              <a:rPr lang="en-US" sz="1200" dirty="0">
-                <a:solidFill>
-                  <a:schemeClr val="bg1"/>
-                </a:solidFill>
-                <a:latin typeface="Lucida Console" panose="020B0609040504020204" pitchFamily="49" charset="0"/>
-              </a:rPr>
-              <a:t> </a:t>
-            </a:r>
-            <a:r>
-              <a:rPr lang="en-US" sz="1200" dirty="0">
-                <a:solidFill>
-                  <a:schemeClr val="accent1"/>
-                </a:solidFill>
-                <a:latin typeface="Lucida Console" panose="020B0609040504020204" pitchFamily="49" charset="0"/>
-              </a:rPr>
-              <a:t>&lt;-</a:t>
-            </a:r>
-            <a:r>
-              <a:rPr lang="en-US" sz="1200" dirty="0">
-                <a:solidFill>
-                  <a:schemeClr val="bg1"/>
-                </a:solidFill>
-                <a:latin typeface="Lucida Console" panose="020B0609040504020204" pitchFamily="49" charset="0"/>
-              </a:rPr>
-              <a:t> </a:t>
-            </a:r>
-            <a:r>
-              <a:rPr lang="en-US" sz="1200" dirty="0">
-                <a:solidFill>
-                  <a:schemeClr val="accent3"/>
-                </a:solidFill>
-                <a:latin typeface="Lucida Console" panose="020B0609040504020204" pitchFamily="49" charset="0"/>
-              </a:rPr>
-              <a:t>1000</a:t>
-            </a:r>
-          </a:p>
-          <a:p>
-            <a:r>
-              <a:rPr lang="en-US" sz="1200" dirty="0" err="1">
-                <a:solidFill>
-                  <a:schemeClr val="bg1"/>
-                </a:solidFill>
-                <a:latin typeface="Lucida Console" panose="020B0609040504020204" pitchFamily="49" charset="0"/>
-              </a:rPr>
-              <a:t>set.seed</a:t>
-            </a:r>
-            <a:r>
-              <a:rPr lang="en-US" sz="1200" dirty="0">
-                <a:solidFill>
-                  <a:schemeClr val="accent1"/>
-                </a:solidFill>
-                <a:latin typeface="Lucida Console" panose="020B0609040504020204" pitchFamily="49" charset="0"/>
-              </a:rPr>
-              <a:t>(</a:t>
-            </a:r>
-            <a:r>
-              <a:rPr lang="en-US" sz="1200" dirty="0">
-                <a:solidFill>
-                  <a:schemeClr val="accent3"/>
-                </a:solidFill>
-                <a:latin typeface="Lucida Console" panose="020B0609040504020204" pitchFamily="49" charset="0"/>
-              </a:rPr>
-              <a:t>19811221</a:t>
-            </a:r>
-            <a:r>
-              <a:rPr lang="en-US" sz="1200" dirty="0">
-                <a:solidFill>
-                  <a:schemeClr val="accent1"/>
-                </a:solidFill>
-                <a:latin typeface="Lucida Console" panose="020B0609040504020204" pitchFamily="49" charset="0"/>
-              </a:rPr>
-              <a:t>)</a:t>
-            </a:r>
-          </a:p>
-          <a:p>
-            <a:endParaRPr lang="en-US" sz="1200" dirty="0">
-              <a:solidFill>
-                <a:schemeClr val="bg1"/>
-              </a:solidFill>
-              <a:latin typeface="Lucida Console" panose="020B0609040504020204" pitchFamily="49" charset="0"/>
-            </a:endParaRPr>
-          </a:p>
-          <a:p>
-            <a:r>
-              <a:rPr lang="en-US" sz="1200" dirty="0" err="1">
-                <a:solidFill>
-                  <a:schemeClr val="bg1"/>
-                </a:solidFill>
-                <a:latin typeface="Lucida Console" panose="020B0609040504020204" pitchFamily="49" charset="0"/>
-              </a:rPr>
-              <a:t>BSout</a:t>
-            </a:r>
-            <a:r>
-              <a:rPr lang="en-US" sz="1200" dirty="0">
-                <a:solidFill>
-                  <a:schemeClr val="bg1"/>
-                </a:solidFill>
-                <a:latin typeface="Lucida Console" panose="020B0609040504020204" pitchFamily="49" charset="0"/>
-              </a:rPr>
-              <a:t> </a:t>
-            </a:r>
-            <a:r>
-              <a:rPr lang="en-US" sz="1200" dirty="0">
-                <a:solidFill>
-                  <a:schemeClr val="accent1"/>
-                </a:solidFill>
-                <a:latin typeface="Lucida Console" panose="020B0609040504020204" pitchFamily="49" charset="0"/>
-              </a:rPr>
-              <a:t>&lt;-</a:t>
-            </a:r>
-            <a:r>
-              <a:rPr lang="en-US" sz="1200" dirty="0">
-                <a:solidFill>
-                  <a:schemeClr val="bg1"/>
-                </a:solidFill>
-                <a:latin typeface="Lucida Console" panose="020B0609040504020204" pitchFamily="49" charset="0"/>
-              </a:rPr>
-              <a:t> </a:t>
-            </a:r>
-            <a:r>
-              <a:rPr lang="en-US" sz="1200" dirty="0" err="1">
-                <a:solidFill>
-                  <a:schemeClr val="bg1"/>
-                </a:solidFill>
-                <a:latin typeface="Lucida Console" panose="020B0609040504020204" pitchFamily="49" charset="0"/>
-              </a:rPr>
-              <a:t>tibble</a:t>
-            </a:r>
-            <a:r>
-              <a:rPr lang="en-US" sz="1200" dirty="0">
-                <a:solidFill>
-                  <a:schemeClr val="accent1"/>
-                </a:solidFill>
-                <a:latin typeface="Lucida Console" panose="020B0609040504020204" pitchFamily="49" charset="0"/>
-              </a:rPr>
-              <a:t>(</a:t>
-            </a:r>
-            <a:r>
-              <a:rPr lang="en-US" sz="1200" dirty="0" err="1">
-                <a:solidFill>
-                  <a:schemeClr val="bg1"/>
-                </a:solidFill>
-                <a:latin typeface="Lucida Console" panose="020B0609040504020204" pitchFamily="49" charset="0"/>
-              </a:rPr>
-              <a:t>BSmean</a:t>
-            </a:r>
-            <a:r>
-              <a:rPr lang="en-US" sz="1200" dirty="0">
-                <a:solidFill>
-                  <a:schemeClr val="accent1"/>
-                </a:solidFill>
-                <a:latin typeface="Lucida Console" panose="020B0609040504020204" pitchFamily="49" charset="0"/>
-              </a:rPr>
-              <a:t> =</a:t>
-            </a:r>
-            <a:r>
-              <a:rPr lang="en-US" sz="1200" dirty="0">
-                <a:solidFill>
-                  <a:schemeClr val="bg1"/>
-                </a:solidFill>
-                <a:latin typeface="Lucida Console" panose="020B0609040504020204" pitchFamily="49" charset="0"/>
-              </a:rPr>
-              <a:t> numeric</a:t>
-            </a:r>
-            <a:r>
-              <a:rPr lang="en-US" sz="1200" dirty="0">
-                <a:solidFill>
-                  <a:schemeClr val="accent1"/>
-                </a:solidFill>
-                <a:latin typeface="Lucida Console" panose="020B0609040504020204" pitchFamily="49" charset="0"/>
-              </a:rPr>
-              <a:t>())</a:t>
-            </a:r>
-          </a:p>
-          <a:p>
-            <a:endParaRPr lang="en-US" sz="1200" dirty="0">
-              <a:solidFill>
-                <a:schemeClr val="bg1"/>
-              </a:solidFill>
-              <a:latin typeface="Lucida Console" panose="020B0609040504020204" pitchFamily="49" charset="0"/>
-            </a:endParaRPr>
-          </a:p>
-          <a:p>
-            <a:r>
-              <a:rPr lang="en-US" sz="1200" dirty="0">
-                <a:solidFill>
-                  <a:srgbClr val="E0B0F6"/>
-                </a:solidFill>
-                <a:latin typeface="Lucida Console" panose="020B0609040504020204" pitchFamily="49" charset="0"/>
-              </a:rPr>
-              <a:t>for</a:t>
-            </a:r>
-            <a:r>
-              <a:rPr lang="en-US" sz="1200" dirty="0">
-                <a:solidFill>
-                  <a:schemeClr val="accent1"/>
-                </a:solidFill>
-                <a:latin typeface="Lucida Console" panose="020B0609040504020204" pitchFamily="49" charset="0"/>
-              </a:rPr>
-              <a:t>(</a:t>
-            </a:r>
-            <a:r>
-              <a:rPr lang="en-US" sz="1200" dirty="0">
-                <a:solidFill>
-                  <a:schemeClr val="bg1"/>
-                </a:solidFill>
-                <a:latin typeface="Lucida Console" panose="020B0609040504020204" pitchFamily="49" charset="0"/>
-              </a:rPr>
-              <a:t>bs </a:t>
-            </a:r>
-            <a:r>
-              <a:rPr lang="en-US" sz="1200" dirty="0">
-                <a:solidFill>
-                  <a:srgbClr val="E0B0F6"/>
-                </a:solidFill>
-                <a:latin typeface="Lucida Console" panose="020B0609040504020204" pitchFamily="49" charset="0"/>
-              </a:rPr>
-              <a:t>in</a:t>
-            </a:r>
-            <a:r>
-              <a:rPr lang="en-US" sz="1200" dirty="0">
-                <a:solidFill>
-                  <a:schemeClr val="bg1"/>
-                </a:solidFill>
-                <a:latin typeface="Lucida Console" panose="020B0609040504020204" pitchFamily="49" charset="0"/>
-              </a:rPr>
-              <a:t> </a:t>
-            </a:r>
-            <a:r>
-              <a:rPr lang="en-US" sz="1200" dirty="0">
-                <a:solidFill>
-                  <a:schemeClr val="accent3"/>
-                </a:solidFill>
-                <a:latin typeface="Lucida Console" panose="020B0609040504020204" pitchFamily="49" charset="0"/>
-              </a:rPr>
-              <a:t>1</a:t>
-            </a:r>
-            <a:r>
-              <a:rPr lang="en-US" sz="1200" dirty="0">
-                <a:solidFill>
-                  <a:schemeClr val="accent1"/>
-                </a:solidFill>
-                <a:latin typeface="Lucida Console" panose="020B0609040504020204" pitchFamily="49" charset="0"/>
-              </a:rPr>
-              <a:t>:</a:t>
-            </a:r>
-            <a:r>
-              <a:rPr lang="en-US" sz="1200" dirty="0">
-                <a:solidFill>
-                  <a:schemeClr val="bg1"/>
-                </a:solidFill>
-                <a:latin typeface="Lucida Console" panose="020B0609040504020204" pitchFamily="49" charset="0"/>
-              </a:rPr>
-              <a:t>nBS</a:t>
-            </a:r>
-            <a:r>
-              <a:rPr lang="en-US" sz="1200" dirty="0">
-                <a:solidFill>
-                  <a:schemeClr val="accent1"/>
-                </a:solidFill>
-                <a:latin typeface="Lucida Console" panose="020B0609040504020204" pitchFamily="49" charset="0"/>
-              </a:rPr>
-              <a:t>){</a:t>
-            </a:r>
-          </a:p>
-          <a:p>
-            <a:r>
-              <a:rPr lang="en-US" sz="1200" dirty="0">
-                <a:solidFill>
-                  <a:schemeClr val="bg1"/>
-                </a:solidFill>
-                <a:latin typeface="Lucida Console" panose="020B0609040504020204" pitchFamily="49" charset="0"/>
-              </a:rPr>
-              <a:t>  </a:t>
-            </a:r>
-            <a:r>
-              <a:rPr lang="en-US" sz="1200" dirty="0" err="1">
-                <a:solidFill>
-                  <a:schemeClr val="bg1"/>
-                </a:solidFill>
-                <a:latin typeface="Lucida Console" panose="020B0609040504020204" pitchFamily="49" charset="0"/>
-              </a:rPr>
-              <a:t>bsHDIindex</a:t>
-            </a:r>
-            <a:r>
-              <a:rPr lang="en-US" sz="1200" dirty="0">
-                <a:solidFill>
-                  <a:schemeClr val="bg1"/>
-                </a:solidFill>
-                <a:latin typeface="Lucida Console" panose="020B0609040504020204" pitchFamily="49" charset="0"/>
-              </a:rPr>
-              <a:t> </a:t>
-            </a:r>
-            <a:r>
-              <a:rPr lang="en-US" sz="1200" dirty="0">
-                <a:solidFill>
-                  <a:schemeClr val="accent1"/>
-                </a:solidFill>
-                <a:latin typeface="Lucida Console" panose="020B0609040504020204" pitchFamily="49" charset="0"/>
-              </a:rPr>
-              <a:t>&lt;-</a:t>
-            </a:r>
-            <a:r>
-              <a:rPr lang="en-US" sz="1200" dirty="0">
-                <a:solidFill>
-                  <a:schemeClr val="bg1"/>
-                </a:solidFill>
-                <a:latin typeface="Lucida Console" panose="020B0609040504020204" pitchFamily="49" charset="0"/>
-              </a:rPr>
-              <a:t> sample</a:t>
-            </a:r>
-            <a:r>
-              <a:rPr lang="en-US" sz="1200" dirty="0">
-                <a:solidFill>
-                  <a:schemeClr val="accent1"/>
-                </a:solidFill>
-                <a:latin typeface="Lucida Console" panose="020B0609040504020204" pitchFamily="49" charset="0"/>
-              </a:rPr>
-              <a:t>(</a:t>
-            </a:r>
-            <a:r>
-              <a:rPr lang="en-US" sz="1200" dirty="0" err="1">
-                <a:solidFill>
-                  <a:schemeClr val="bg1"/>
-                </a:solidFill>
-                <a:latin typeface="Lucida Console" panose="020B0609040504020204" pitchFamily="49" charset="0"/>
-              </a:rPr>
-              <a:t>alldata</a:t>
-            </a:r>
-            <a:r>
-              <a:rPr lang="en-US" sz="1200" dirty="0" err="1">
-                <a:solidFill>
-                  <a:schemeClr val="accent1"/>
-                </a:solidFill>
-                <a:latin typeface="Lucida Console" panose="020B0609040504020204" pitchFamily="49" charset="0"/>
-              </a:rPr>
-              <a:t>$</a:t>
-            </a:r>
-            <a:r>
-              <a:rPr lang="en-US" sz="1200" dirty="0" err="1">
-                <a:solidFill>
-                  <a:schemeClr val="bg1"/>
-                </a:solidFill>
-                <a:latin typeface="Lucida Console" panose="020B0609040504020204" pitchFamily="49" charset="0"/>
-              </a:rPr>
-              <a:t>HDIindex</a:t>
-            </a:r>
-            <a:r>
-              <a:rPr lang="en-US" sz="1200" dirty="0">
-                <a:solidFill>
-                  <a:schemeClr val="bg1"/>
-                </a:solidFill>
-                <a:latin typeface="Lucida Console" panose="020B0609040504020204" pitchFamily="49" charset="0"/>
-              </a:rPr>
-              <a:t>, n, replace </a:t>
-            </a:r>
-            <a:r>
-              <a:rPr lang="en-US" sz="1200" dirty="0">
-                <a:solidFill>
-                  <a:schemeClr val="accent1"/>
-                </a:solidFill>
-                <a:latin typeface="Lucida Console" panose="020B0609040504020204" pitchFamily="49" charset="0"/>
-              </a:rPr>
-              <a:t>=</a:t>
-            </a:r>
-            <a:r>
-              <a:rPr lang="en-US" sz="1200" dirty="0">
-                <a:solidFill>
-                  <a:schemeClr val="bg1"/>
-                </a:solidFill>
-                <a:latin typeface="Lucida Console" panose="020B0609040504020204" pitchFamily="49" charset="0"/>
-              </a:rPr>
-              <a:t> </a:t>
-            </a:r>
-            <a:r>
-              <a:rPr lang="en-US" sz="1200" dirty="0">
-                <a:solidFill>
-                  <a:schemeClr val="accent3"/>
-                </a:solidFill>
-                <a:latin typeface="Lucida Console" panose="020B0609040504020204" pitchFamily="49" charset="0"/>
-              </a:rPr>
-              <a:t>TRUE</a:t>
-            </a:r>
-            <a:r>
-              <a:rPr lang="en-US" sz="1200" dirty="0">
-                <a:solidFill>
-                  <a:schemeClr val="accent1"/>
-                </a:solidFill>
-                <a:latin typeface="Lucida Console" panose="020B0609040504020204" pitchFamily="49" charset="0"/>
-              </a:rPr>
-              <a:t>)</a:t>
-            </a:r>
-          </a:p>
-          <a:p>
-            <a:r>
-              <a:rPr lang="en-US" sz="1200" dirty="0">
-                <a:solidFill>
-                  <a:schemeClr val="bg1"/>
-                </a:solidFill>
-                <a:latin typeface="Lucida Console" panose="020B0609040504020204" pitchFamily="49" charset="0"/>
-              </a:rPr>
-              <a:t>  </a:t>
-            </a:r>
-            <a:r>
-              <a:rPr lang="en-US" sz="1200" dirty="0" err="1">
-                <a:solidFill>
-                  <a:schemeClr val="bg1"/>
-                </a:solidFill>
-                <a:latin typeface="Lucida Console" panose="020B0609040504020204" pitchFamily="49" charset="0"/>
-              </a:rPr>
-              <a:t>BSout</a:t>
-            </a:r>
-            <a:r>
-              <a:rPr lang="en-US" sz="1200" dirty="0">
-                <a:solidFill>
-                  <a:schemeClr val="accent1"/>
-                </a:solidFill>
-                <a:latin typeface="Lucida Console" panose="020B0609040504020204" pitchFamily="49" charset="0"/>
-              </a:rPr>
-              <a:t>[</a:t>
-            </a:r>
-            <a:r>
-              <a:rPr lang="en-US" sz="1200" dirty="0">
-                <a:solidFill>
-                  <a:schemeClr val="bg1"/>
-                </a:solidFill>
-                <a:latin typeface="Lucida Console" panose="020B0609040504020204" pitchFamily="49" charset="0"/>
-              </a:rPr>
-              <a:t>bs, </a:t>
-            </a:r>
-            <a:r>
-              <a:rPr lang="en-US" sz="1200" dirty="0">
-                <a:solidFill>
-                  <a:schemeClr val="accent3"/>
-                </a:solidFill>
-                <a:latin typeface="Lucida Console" panose="020B0609040504020204" pitchFamily="49" charset="0"/>
-              </a:rPr>
-              <a:t>1</a:t>
-            </a:r>
-            <a:r>
-              <a:rPr lang="en-US" sz="1200" dirty="0">
-                <a:solidFill>
-                  <a:schemeClr val="accent1"/>
-                </a:solidFill>
-                <a:latin typeface="Lucida Console" panose="020B0609040504020204" pitchFamily="49" charset="0"/>
-              </a:rPr>
-              <a:t>] &lt;-</a:t>
-            </a:r>
-            <a:r>
-              <a:rPr lang="en-US" sz="1200" dirty="0">
-                <a:solidFill>
-                  <a:schemeClr val="bg1"/>
-                </a:solidFill>
-                <a:latin typeface="Lucida Console" panose="020B0609040504020204" pitchFamily="49" charset="0"/>
-              </a:rPr>
-              <a:t> mean</a:t>
-            </a:r>
-            <a:r>
-              <a:rPr lang="en-US" sz="1200" dirty="0">
-                <a:solidFill>
-                  <a:schemeClr val="accent1"/>
-                </a:solidFill>
-                <a:latin typeface="Lucida Console" panose="020B0609040504020204" pitchFamily="49" charset="0"/>
-              </a:rPr>
-              <a:t>(</a:t>
-            </a:r>
-            <a:r>
-              <a:rPr lang="en-US" sz="1200" dirty="0" err="1">
-                <a:solidFill>
-                  <a:schemeClr val="bg1"/>
-                </a:solidFill>
-                <a:latin typeface="Lucida Console" panose="020B0609040504020204" pitchFamily="49" charset="0"/>
-              </a:rPr>
-              <a:t>bsHDIindex</a:t>
-            </a:r>
-            <a:r>
-              <a:rPr lang="en-US" sz="1200" dirty="0">
-                <a:solidFill>
-                  <a:schemeClr val="accent1"/>
-                </a:solidFill>
-                <a:latin typeface="Lucida Console" panose="020B0609040504020204" pitchFamily="49" charset="0"/>
-              </a:rPr>
-              <a:t>)</a:t>
-            </a:r>
-          </a:p>
-          <a:p>
-            <a:r>
-              <a:rPr lang="en-US" sz="1200" dirty="0">
-                <a:solidFill>
-                  <a:schemeClr val="accent1"/>
-                </a:solidFill>
-                <a:latin typeface="Lucida Console" panose="020B0609040504020204" pitchFamily="49" charset="0"/>
-              </a:rPr>
-              <a:t>}</a:t>
-            </a:r>
-          </a:p>
-          <a:p>
-            <a:endParaRPr lang="en-US" sz="1200" dirty="0">
-              <a:solidFill>
-                <a:schemeClr val="bg1"/>
-              </a:solidFill>
-              <a:latin typeface="Lucida Console" panose="020B0609040504020204" pitchFamily="49" charset="0"/>
-            </a:endParaRPr>
-          </a:p>
-          <a:p>
-            <a:r>
-              <a:rPr lang="en-US" sz="1200" dirty="0" err="1">
-                <a:solidFill>
-                  <a:schemeClr val="bg1"/>
-                </a:solidFill>
-                <a:latin typeface="Lucida Console" panose="020B0609040504020204" pitchFamily="49" charset="0"/>
-              </a:rPr>
-              <a:t>meanCI_BS</a:t>
-            </a:r>
-            <a:r>
-              <a:rPr lang="en-US" sz="1200" dirty="0">
-                <a:solidFill>
-                  <a:schemeClr val="bg1"/>
-                </a:solidFill>
-                <a:latin typeface="Lucida Console" panose="020B0609040504020204" pitchFamily="49" charset="0"/>
-              </a:rPr>
-              <a:t> </a:t>
-            </a:r>
-            <a:r>
-              <a:rPr lang="en-US" sz="1200" dirty="0">
-                <a:solidFill>
-                  <a:schemeClr val="accent1"/>
-                </a:solidFill>
-                <a:latin typeface="Lucida Console" panose="020B0609040504020204" pitchFamily="49" charset="0"/>
-              </a:rPr>
-              <a:t>&lt;-</a:t>
-            </a:r>
-            <a:r>
-              <a:rPr lang="en-US" sz="1200" dirty="0">
-                <a:solidFill>
-                  <a:schemeClr val="bg1"/>
-                </a:solidFill>
-                <a:latin typeface="Lucida Console" panose="020B0609040504020204" pitchFamily="49" charset="0"/>
-              </a:rPr>
-              <a:t> </a:t>
-            </a:r>
-            <a:r>
-              <a:rPr lang="en-US" sz="1200" dirty="0" err="1">
-                <a:solidFill>
-                  <a:schemeClr val="bg1"/>
-                </a:solidFill>
-                <a:latin typeface="Lucida Console" panose="020B0609040504020204" pitchFamily="49" charset="0"/>
-              </a:rPr>
-              <a:t>tibble</a:t>
-            </a:r>
-            <a:r>
-              <a:rPr lang="en-US" sz="1200" dirty="0">
-                <a:solidFill>
-                  <a:schemeClr val="accent1"/>
-                </a:solidFill>
-                <a:latin typeface="Lucida Console" panose="020B0609040504020204" pitchFamily="49" charset="0"/>
-              </a:rPr>
-              <a:t>(</a:t>
-            </a:r>
-            <a:r>
-              <a:rPr lang="en-US" sz="1200" dirty="0" err="1">
-                <a:solidFill>
-                  <a:schemeClr val="bg1"/>
-                </a:solidFill>
-                <a:latin typeface="Lucida Console" panose="020B0609040504020204" pitchFamily="49" charset="0"/>
-              </a:rPr>
-              <a:t>CI_low</a:t>
-            </a:r>
-            <a:r>
-              <a:rPr lang="en-US" sz="1200" dirty="0">
-                <a:solidFill>
-                  <a:schemeClr val="bg1"/>
-                </a:solidFill>
-                <a:latin typeface="Lucida Console" panose="020B0609040504020204" pitchFamily="49" charset="0"/>
-              </a:rPr>
-              <a:t> </a:t>
-            </a:r>
-            <a:r>
-              <a:rPr lang="en-US" sz="1200" dirty="0">
-                <a:solidFill>
-                  <a:schemeClr val="accent1"/>
-                </a:solidFill>
-                <a:latin typeface="Lucida Console" panose="020B0609040504020204" pitchFamily="49" charset="0"/>
-              </a:rPr>
-              <a:t>=</a:t>
-            </a:r>
-            <a:r>
-              <a:rPr lang="en-US" sz="1200" dirty="0">
-                <a:solidFill>
-                  <a:schemeClr val="bg1"/>
-                </a:solidFill>
-                <a:latin typeface="Lucida Console" panose="020B0609040504020204" pitchFamily="49" charset="0"/>
-              </a:rPr>
-              <a:t> numeric</a:t>
-            </a:r>
-            <a:r>
-              <a:rPr lang="en-US" sz="1200" dirty="0">
-                <a:solidFill>
-                  <a:schemeClr val="accent1"/>
-                </a:solidFill>
-                <a:latin typeface="Lucida Console" panose="020B0609040504020204" pitchFamily="49" charset="0"/>
-              </a:rPr>
-              <a:t>()</a:t>
-            </a:r>
-            <a:r>
-              <a:rPr lang="en-US" sz="1200" dirty="0">
-                <a:solidFill>
-                  <a:schemeClr val="bg1"/>
-                </a:solidFill>
-                <a:latin typeface="Lucida Console" panose="020B0609040504020204" pitchFamily="49" charset="0"/>
-              </a:rPr>
-              <a:t>,</a:t>
-            </a:r>
-          </a:p>
-          <a:p>
-            <a:r>
-              <a:rPr lang="en-US" sz="1200" dirty="0">
-                <a:solidFill>
-                  <a:schemeClr val="bg1"/>
-                </a:solidFill>
-                <a:latin typeface="Lucida Console" panose="020B0609040504020204" pitchFamily="49" charset="0"/>
-              </a:rPr>
-              <a:t>                    </a:t>
-            </a:r>
-            <a:r>
-              <a:rPr lang="en-US" sz="1200" dirty="0" err="1">
-                <a:solidFill>
-                  <a:schemeClr val="bg1"/>
-                </a:solidFill>
-                <a:latin typeface="Lucida Console" panose="020B0609040504020204" pitchFamily="49" charset="0"/>
-              </a:rPr>
-              <a:t>CI_high</a:t>
-            </a:r>
-            <a:r>
-              <a:rPr lang="en-US" sz="1200" dirty="0">
-                <a:solidFill>
-                  <a:schemeClr val="bg1"/>
-                </a:solidFill>
-                <a:latin typeface="Lucida Console" panose="020B0609040504020204" pitchFamily="49" charset="0"/>
-              </a:rPr>
-              <a:t> </a:t>
-            </a:r>
-            <a:r>
-              <a:rPr lang="en-US" sz="1200" dirty="0">
-                <a:solidFill>
-                  <a:schemeClr val="accent1"/>
-                </a:solidFill>
-                <a:latin typeface="Lucida Console" panose="020B0609040504020204" pitchFamily="49" charset="0"/>
-              </a:rPr>
-              <a:t>=</a:t>
-            </a:r>
-            <a:r>
-              <a:rPr lang="en-US" sz="1200" dirty="0">
-                <a:solidFill>
-                  <a:schemeClr val="bg1"/>
-                </a:solidFill>
-                <a:latin typeface="Lucida Console" panose="020B0609040504020204" pitchFamily="49" charset="0"/>
-              </a:rPr>
-              <a:t> numeric</a:t>
-            </a:r>
-            <a:r>
-              <a:rPr lang="en-US" sz="1200" dirty="0">
-                <a:solidFill>
-                  <a:schemeClr val="accent1"/>
-                </a:solidFill>
-                <a:latin typeface="Lucida Console" panose="020B0609040504020204" pitchFamily="49" charset="0"/>
-              </a:rPr>
-              <a:t>()</a:t>
-            </a:r>
-            <a:r>
-              <a:rPr lang="en-US" sz="1200" dirty="0">
-                <a:solidFill>
-                  <a:schemeClr val="bg1"/>
-                </a:solidFill>
-                <a:latin typeface="Lucida Console" panose="020B0609040504020204" pitchFamily="49" charset="0"/>
-              </a:rPr>
-              <a:t>,</a:t>
-            </a:r>
-          </a:p>
-          <a:p>
-            <a:r>
-              <a:rPr lang="en-US" sz="1200" dirty="0">
-                <a:solidFill>
-                  <a:schemeClr val="bg1"/>
-                </a:solidFill>
-                <a:latin typeface="Lucida Console" panose="020B0609040504020204" pitchFamily="49" charset="0"/>
-              </a:rPr>
-              <a:t>                    width </a:t>
-            </a:r>
-            <a:r>
-              <a:rPr lang="en-US" sz="1200" dirty="0">
-                <a:solidFill>
-                  <a:schemeClr val="accent1"/>
-                </a:solidFill>
-                <a:latin typeface="Lucida Console" panose="020B0609040504020204" pitchFamily="49" charset="0"/>
-              </a:rPr>
-              <a:t>=</a:t>
-            </a:r>
-            <a:r>
-              <a:rPr lang="en-US" sz="1200" dirty="0">
-                <a:solidFill>
-                  <a:schemeClr val="bg1"/>
-                </a:solidFill>
-                <a:latin typeface="Lucida Console" panose="020B0609040504020204" pitchFamily="49" charset="0"/>
-              </a:rPr>
-              <a:t> numeric</a:t>
-            </a:r>
-            <a:r>
-              <a:rPr lang="en-US" sz="1200" dirty="0">
-                <a:solidFill>
-                  <a:schemeClr val="accent1"/>
-                </a:solidFill>
-                <a:latin typeface="Lucida Console" panose="020B0609040504020204" pitchFamily="49" charset="0"/>
-              </a:rPr>
-              <a:t>())</a:t>
-            </a:r>
-          </a:p>
-          <a:p>
-            <a:endParaRPr lang="en-US" sz="1200" dirty="0">
-              <a:solidFill>
-                <a:schemeClr val="bg1"/>
-              </a:solidFill>
-              <a:latin typeface="Lucida Console" panose="020B0609040504020204" pitchFamily="49" charset="0"/>
-            </a:endParaRPr>
-          </a:p>
-          <a:p>
-            <a:r>
-              <a:rPr lang="en-US" sz="1200" dirty="0" err="1">
-                <a:solidFill>
-                  <a:schemeClr val="bg1"/>
-                </a:solidFill>
-                <a:latin typeface="Lucida Console" panose="020B0609040504020204" pitchFamily="49" charset="0"/>
-              </a:rPr>
-              <a:t>meanCI_BS</a:t>
-            </a:r>
-            <a:r>
-              <a:rPr lang="en-US" sz="1200" dirty="0">
-                <a:solidFill>
-                  <a:schemeClr val="accent1"/>
-                </a:solidFill>
-                <a:latin typeface="Lucida Console" panose="020B0609040504020204" pitchFamily="49" charset="0"/>
-              </a:rPr>
-              <a:t>[</a:t>
-            </a:r>
-            <a:r>
-              <a:rPr lang="en-US" sz="1200" dirty="0">
-                <a:solidFill>
-                  <a:schemeClr val="accent3"/>
-                </a:solidFill>
-                <a:latin typeface="Lucida Console" panose="020B0609040504020204" pitchFamily="49" charset="0"/>
-              </a:rPr>
-              <a:t>1</a:t>
-            </a:r>
-            <a:r>
-              <a:rPr lang="en-US" sz="1200" dirty="0">
-                <a:solidFill>
-                  <a:schemeClr val="bg1"/>
-                </a:solidFill>
-                <a:latin typeface="Lucida Console" panose="020B0609040504020204" pitchFamily="49" charset="0"/>
-              </a:rPr>
-              <a:t>, </a:t>
-            </a:r>
-            <a:r>
-              <a:rPr lang="en-US" sz="1200" dirty="0">
-                <a:solidFill>
-                  <a:schemeClr val="accent3"/>
-                </a:solidFill>
-                <a:latin typeface="Lucida Console" panose="020B0609040504020204" pitchFamily="49" charset="0"/>
-              </a:rPr>
-              <a:t>1</a:t>
-            </a:r>
-            <a:r>
-              <a:rPr lang="en-US" sz="1200" dirty="0">
-                <a:solidFill>
-                  <a:schemeClr val="accent1"/>
-                </a:solidFill>
-                <a:latin typeface="Lucida Console" panose="020B0609040504020204" pitchFamily="49" charset="0"/>
-              </a:rPr>
-              <a:t>] &lt;-</a:t>
-            </a:r>
-            <a:r>
-              <a:rPr lang="en-US" sz="1200" dirty="0">
-                <a:solidFill>
-                  <a:schemeClr val="bg1"/>
-                </a:solidFill>
-                <a:latin typeface="Lucida Console" panose="020B0609040504020204" pitchFamily="49" charset="0"/>
-              </a:rPr>
-              <a:t> round</a:t>
-            </a:r>
-            <a:r>
-              <a:rPr lang="en-US" sz="1200" dirty="0">
-                <a:solidFill>
-                  <a:schemeClr val="accent1"/>
-                </a:solidFill>
-                <a:latin typeface="Lucida Console" panose="020B0609040504020204" pitchFamily="49" charset="0"/>
-              </a:rPr>
-              <a:t>(</a:t>
-            </a:r>
-            <a:r>
-              <a:rPr lang="en-US" sz="1200" dirty="0">
-                <a:solidFill>
-                  <a:schemeClr val="bg1"/>
-                </a:solidFill>
-                <a:latin typeface="Lucida Console" panose="020B0609040504020204" pitchFamily="49" charset="0"/>
-              </a:rPr>
-              <a:t>quantile</a:t>
-            </a:r>
-            <a:r>
-              <a:rPr lang="en-US" sz="1200" dirty="0">
-                <a:solidFill>
-                  <a:schemeClr val="accent1"/>
-                </a:solidFill>
-                <a:latin typeface="Lucida Console" panose="020B0609040504020204" pitchFamily="49" charset="0"/>
-              </a:rPr>
-              <a:t>(</a:t>
-            </a:r>
-            <a:r>
-              <a:rPr lang="en-US" sz="1200" dirty="0" err="1">
-                <a:solidFill>
-                  <a:schemeClr val="bg1"/>
-                </a:solidFill>
-                <a:latin typeface="Lucida Console" panose="020B0609040504020204" pitchFamily="49" charset="0"/>
-              </a:rPr>
-              <a:t>BSout</a:t>
-            </a:r>
-            <a:r>
-              <a:rPr lang="en-US" sz="1200" dirty="0" err="1">
-                <a:solidFill>
-                  <a:schemeClr val="accent1"/>
-                </a:solidFill>
-                <a:latin typeface="Lucida Console" panose="020B0609040504020204" pitchFamily="49" charset="0"/>
-              </a:rPr>
-              <a:t>$</a:t>
-            </a:r>
-            <a:r>
-              <a:rPr lang="en-US" sz="1200" dirty="0" err="1">
-                <a:solidFill>
-                  <a:schemeClr val="bg1"/>
-                </a:solidFill>
-                <a:latin typeface="Lucida Console" panose="020B0609040504020204" pitchFamily="49" charset="0"/>
-              </a:rPr>
-              <a:t>BSmean</a:t>
-            </a:r>
-            <a:r>
-              <a:rPr lang="en-US" sz="1200" dirty="0">
-                <a:solidFill>
-                  <a:schemeClr val="bg1"/>
-                </a:solidFill>
-                <a:latin typeface="Lucida Console" panose="020B0609040504020204" pitchFamily="49" charset="0"/>
-              </a:rPr>
-              <a:t>, </a:t>
-            </a:r>
-            <a:r>
-              <a:rPr lang="en-US" sz="1200" dirty="0">
-                <a:solidFill>
-                  <a:schemeClr val="accent3"/>
-                </a:solidFill>
-                <a:latin typeface="Lucida Console" panose="020B0609040504020204" pitchFamily="49" charset="0"/>
-              </a:rPr>
-              <a:t>0.025</a:t>
-            </a:r>
-            <a:r>
-              <a:rPr lang="en-US" sz="1200" dirty="0">
-                <a:solidFill>
-                  <a:schemeClr val="accent1"/>
-                </a:solidFill>
-                <a:latin typeface="Lucida Console" panose="020B0609040504020204" pitchFamily="49" charset="0"/>
-              </a:rPr>
-              <a:t>)</a:t>
-            </a:r>
-            <a:r>
-              <a:rPr lang="en-US" sz="1200" dirty="0">
-                <a:solidFill>
-                  <a:schemeClr val="bg1"/>
-                </a:solidFill>
-                <a:latin typeface="Lucida Console" panose="020B0609040504020204" pitchFamily="49" charset="0"/>
-              </a:rPr>
-              <a:t>, digits </a:t>
-            </a:r>
-            <a:r>
-              <a:rPr lang="en-US" sz="1200" dirty="0">
-                <a:solidFill>
-                  <a:schemeClr val="accent1"/>
-                </a:solidFill>
-                <a:latin typeface="Lucida Console" panose="020B0609040504020204" pitchFamily="49" charset="0"/>
-              </a:rPr>
-              <a:t>=</a:t>
-            </a:r>
-            <a:r>
-              <a:rPr lang="en-US" sz="1200" dirty="0">
-                <a:solidFill>
-                  <a:schemeClr val="bg1"/>
-                </a:solidFill>
-                <a:latin typeface="Lucida Console" panose="020B0609040504020204" pitchFamily="49" charset="0"/>
-              </a:rPr>
-              <a:t> </a:t>
-            </a:r>
-            <a:r>
-              <a:rPr lang="en-US" sz="1200" dirty="0">
-                <a:solidFill>
-                  <a:schemeClr val="accent3"/>
-                </a:solidFill>
-                <a:latin typeface="Lucida Console" panose="020B0609040504020204" pitchFamily="49" charset="0"/>
-              </a:rPr>
-              <a:t>4</a:t>
-            </a:r>
-            <a:r>
-              <a:rPr lang="en-US" sz="1200" dirty="0">
-                <a:solidFill>
-                  <a:schemeClr val="accent1"/>
-                </a:solidFill>
-                <a:latin typeface="Lucida Console" panose="020B0609040504020204" pitchFamily="49" charset="0"/>
-              </a:rPr>
-              <a:t>)</a:t>
-            </a:r>
-          </a:p>
-          <a:p>
-            <a:r>
-              <a:rPr lang="en-US" sz="1200" dirty="0" err="1">
-                <a:solidFill>
-                  <a:schemeClr val="bg1"/>
-                </a:solidFill>
-                <a:latin typeface="Lucida Console" panose="020B0609040504020204" pitchFamily="49" charset="0"/>
-              </a:rPr>
-              <a:t>meanCI_BS</a:t>
-            </a:r>
-            <a:r>
-              <a:rPr lang="en-US" sz="1200" dirty="0">
-                <a:solidFill>
-                  <a:schemeClr val="accent1"/>
-                </a:solidFill>
-                <a:latin typeface="Lucida Console" panose="020B0609040504020204" pitchFamily="49" charset="0"/>
-              </a:rPr>
-              <a:t>[</a:t>
-            </a:r>
-            <a:r>
-              <a:rPr lang="en-US" sz="1200" dirty="0">
-                <a:solidFill>
-                  <a:schemeClr val="accent3"/>
-                </a:solidFill>
-                <a:latin typeface="Lucida Console" panose="020B0609040504020204" pitchFamily="49" charset="0"/>
-              </a:rPr>
-              <a:t>1</a:t>
-            </a:r>
-            <a:r>
-              <a:rPr lang="en-US" sz="1200" dirty="0">
-                <a:solidFill>
-                  <a:schemeClr val="bg1"/>
-                </a:solidFill>
-                <a:latin typeface="Lucida Console" panose="020B0609040504020204" pitchFamily="49" charset="0"/>
-              </a:rPr>
-              <a:t>, </a:t>
-            </a:r>
-            <a:r>
-              <a:rPr lang="en-US" sz="1200" dirty="0">
-                <a:solidFill>
-                  <a:schemeClr val="accent3"/>
-                </a:solidFill>
-                <a:latin typeface="Lucida Console" panose="020B0609040504020204" pitchFamily="49" charset="0"/>
-              </a:rPr>
-              <a:t>2</a:t>
-            </a:r>
-            <a:r>
-              <a:rPr lang="en-US" sz="1200" dirty="0">
-                <a:solidFill>
-                  <a:schemeClr val="accent1"/>
-                </a:solidFill>
-                <a:latin typeface="Lucida Console" panose="020B0609040504020204" pitchFamily="49" charset="0"/>
-              </a:rPr>
-              <a:t>] &lt;-</a:t>
-            </a:r>
-            <a:r>
-              <a:rPr lang="en-US" sz="1200" dirty="0">
-                <a:solidFill>
-                  <a:schemeClr val="bg1"/>
-                </a:solidFill>
-                <a:latin typeface="Lucida Console" panose="020B0609040504020204" pitchFamily="49" charset="0"/>
-              </a:rPr>
-              <a:t> round</a:t>
-            </a:r>
-            <a:r>
-              <a:rPr lang="en-US" sz="1200" dirty="0">
-                <a:solidFill>
-                  <a:schemeClr val="accent1"/>
-                </a:solidFill>
-                <a:latin typeface="Lucida Console" panose="020B0609040504020204" pitchFamily="49" charset="0"/>
-              </a:rPr>
-              <a:t>(</a:t>
-            </a:r>
-            <a:r>
-              <a:rPr lang="en-US" sz="1200" dirty="0">
-                <a:solidFill>
-                  <a:schemeClr val="bg1"/>
-                </a:solidFill>
-                <a:latin typeface="Lucida Console" panose="020B0609040504020204" pitchFamily="49" charset="0"/>
-              </a:rPr>
-              <a:t>quantile</a:t>
-            </a:r>
-            <a:r>
-              <a:rPr lang="en-US" sz="1200" dirty="0">
-                <a:solidFill>
-                  <a:schemeClr val="accent1"/>
-                </a:solidFill>
-                <a:latin typeface="Lucida Console" panose="020B0609040504020204" pitchFamily="49" charset="0"/>
-              </a:rPr>
-              <a:t>(</a:t>
-            </a:r>
-            <a:r>
-              <a:rPr lang="en-US" sz="1200" dirty="0" err="1">
-                <a:solidFill>
-                  <a:schemeClr val="bg1"/>
-                </a:solidFill>
-                <a:latin typeface="Lucida Console" panose="020B0609040504020204" pitchFamily="49" charset="0"/>
-              </a:rPr>
-              <a:t>BSout</a:t>
-            </a:r>
-            <a:r>
-              <a:rPr lang="en-US" sz="1200" dirty="0" err="1">
-                <a:solidFill>
-                  <a:schemeClr val="accent1"/>
-                </a:solidFill>
-                <a:latin typeface="Lucida Console" panose="020B0609040504020204" pitchFamily="49" charset="0"/>
-              </a:rPr>
-              <a:t>$</a:t>
-            </a:r>
-            <a:r>
-              <a:rPr lang="en-US" sz="1200" dirty="0" err="1">
-                <a:solidFill>
-                  <a:schemeClr val="bg1"/>
-                </a:solidFill>
-                <a:latin typeface="Lucida Console" panose="020B0609040504020204" pitchFamily="49" charset="0"/>
-              </a:rPr>
-              <a:t>BSmean</a:t>
-            </a:r>
-            <a:r>
-              <a:rPr lang="en-US" sz="1200" dirty="0">
-                <a:solidFill>
-                  <a:schemeClr val="bg1"/>
-                </a:solidFill>
-                <a:latin typeface="Lucida Console" panose="020B0609040504020204" pitchFamily="49" charset="0"/>
-              </a:rPr>
-              <a:t>, </a:t>
-            </a:r>
-            <a:r>
-              <a:rPr lang="en-US" sz="1200" dirty="0">
-                <a:solidFill>
-                  <a:schemeClr val="accent3"/>
-                </a:solidFill>
-                <a:latin typeface="Lucida Console" panose="020B0609040504020204" pitchFamily="49" charset="0"/>
-              </a:rPr>
-              <a:t>0.975</a:t>
-            </a:r>
-            <a:r>
-              <a:rPr lang="en-US" sz="1200" dirty="0">
-                <a:solidFill>
-                  <a:schemeClr val="accent1"/>
-                </a:solidFill>
-                <a:latin typeface="Lucida Console" panose="020B0609040504020204" pitchFamily="49" charset="0"/>
-              </a:rPr>
-              <a:t>)</a:t>
-            </a:r>
-            <a:r>
-              <a:rPr lang="en-US" sz="1200" dirty="0">
-                <a:solidFill>
-                  <a:schemeClr val="bg1"/>
-                </a:solidFill>
-                <a:latin typeface="Lucida Console" panose="020B0609040504020204" pitchFamily="49" charset="0"/>
-              </a:rPr>
-              <a:t>, digits </a:t>
-            </a:r>
-            <a:r>
-              <a:rPr lang="en-US" sz="1200" dirty="0">
-                <a:solidFill>
-                  <a:schemeClr val="accent1"/>
-                </a:solidFill>
-                <a:latin typeface="Lucida Console" panose="020B0609040504020204" pitchFamily="49" charset="0"/>
-              </a:rPr>
-              <a:t>=</a:t>
-            </a:r>
-            <a:r>
-              <a:rPr lang="en-US" sz="1200" dirty="0">
-                <a:solidFill>
-                  <a:schemeClr val="bg1"/>
-                </a:solidFill>
-                <a:latin typeface="Lucida Console" panose="020B0609040504020204" pitchFamily="49" charset="0"/>
-              </a:rPr>
-              <a:t> </a:t>
-            </a:r>
-            <a:r>
-              <a:rPr lang="en-US" sz="1200" dirty="0">
-                <a:solidFill>
-                  <a:schemeClr val="accent3"/>
-                </a:solidFill>
-                <a:latin typeface="Lucida Console" panose="020B0609040504020204" pitchFamily="49" charset="0"/>
-              </a:rPr>
-              <a:t>4</a:t>
-            </a:r>
-            <a:r>
-              <a:rPr lang="en-US" sz="1200" dirty="0">
-                <a:solidFill>
-                  <a:schemeClr val="accent1"/>
-                </a:solidFill>
-                <a:latin typeface="Lucida Console" panose="020B0609040504020204" pitchFamily="49" charset="0"/>
-              </a:rPr>
-              <a:t>)</a:t>
-            </a:r>
-          </a:p>
-          <a:p>
-            <a:r>
-              <a:rPr lang="en-US" sz="1200" dirty="0" err="1">
-                <a:solidFill>
-                  <a:schemeClr val="bg1"/>
-                </a:solidFill>
-                <a:latin typeface="Lucida Console" panose="020B0609040504020204" pitchFamily="49" charset="0"/>
-              </a:rPr>
-              <a:t>meanCI_BS</a:t>
-            </a:r>
-            <a:r>
-              <a:rPr lang="en-US" sz="1200" dirty="0" err="1">
-                <a:solidFill>
-                  <a:schemeClr val="accent1"/>
-                </a:solidFill>
-                <a:latin typeface="Lucida Console" panose="020B0609040504020204" pitchFamily="49" charset="0"/>
-              </a:rPr>
-              <a:t>$</a:t>
-            </a:r>
-            <a:r>
-              <a:rPr lang="en-US" sz="1200" dirty="0" err="1">
-                <a:solidFill>
-                  <a:schemeClr val="bg1"/>
-                </a:solidFill>
-                <a:latin typeface="Lucida Console" panose="020B0609040504020204" pitchFamily="49" charset="0"/>
-              </a:rPr>
-              <a:t>width</a:t>
-            </a:r>
-            <a:r>
-              <a:rPr lang="en-US" sz="1200" dirty="0">
-                <a:solidFill>
-                  <a:schemeClr val="bg1"/>
-                </a:solidFill>
-                <a:latin typeface="Lucida Console" panose="020B0609040504020204" pitchFamily="49" charset="0"/>
-              </a:rPr>
-              <a:t> </a:t>
-            </a:r>
-            <a:r>
-              <a:rPr lang="en-US" sz="1200" dirty="0">
-                <a:solidFill>
-                  <a:schemeClr val="accent1"/>
-                </a:solidFill>
-                <a:latin typeface="Lucida Console" panose="020B0609040504020204" pitchFamily="49" charset="0"/>
-              </a:rPr>
-              <a:t>=</a:t>
-            </a:r>
-            <a:r>
-              <a:rPr lang="en-US" sz="1200" dirty="0">
-                <a:solidFill>
-                  <a:schemeClr val="bg1"/>
-                </a:solidFill>
-                <a:latin typeface="Lucida Console" panose="020B0609040504020204" pitchFamily="49" charset="0"/>
-              </a:rPr>
-              <a:t> </a:t>
-            </a:r>
-            <a:r>
-              <a:rPr lang="en-US" sz="1200" dirty="0" err="1">
-                <a:solidFill>
-                  <a:schemeClr val="bg1"/>
-                </a:solidFill>
-                <a:latin typeface="Lucida Console" panose="020B0609040504020204" pitchFamily="49" charset="0"/>
-              </a:rPr>
-              <a:t>meanCI_BS</a:t>
-            </a:r>
-            <a:r>
-              <a:rPr lang="en-US" sz="1200" dirty="0" err="1">
-                <a:solidFill>
-                  <a:schemeClr val="accent1"/>
-                </a:solidFill>
-                <a:latin typeface="Lucida Console" panose="020B0609040504020204" pitchFamily="49" charset="0"/>
-              </a:rPr>
-              <a:t>$</a:t>
-            </a:r>
-            <a:r>
-              <a:rPr lang="en-US" sz="1200" dirty="0" err="1">
-                <a:solidFill>
-                  <a:schemeClr val="bg1"/>
-                </a:solidFill>
-                <a:latin typeface="Lucida Console" panose="020B0609040504020204" pitchFamily="49" charset="0"/>
-              </a:rPr>
-              <a:t>CI_high</a:t>
-            </a:r>
-            <a:r>
-              <a:rPr lang="en-US" sz="1200" dirty="0">
-                <a:solidFill>
-                  <a:schemeClr val="bg1"/>
-                </a:solidFill>
-                <a:latin typeface="Lucida Console" panose="020B0609040504020204" pitchFamily="49" charset="0"/>
-              </a:rPr>
-              <a:t> </a:t>
-            </a:r>
-            <a:r>
-              <a:rPr lang="en-US" sz="1200" dirty="0">
-                <a:solidFill>
-                  <a:schemeClr val="accent1"/>
-                </a:solidFill>
-                <a:latin typeface="Lucida Console" panose="020B0609040504020204" pitchFamily="49" charset="0"/>
-              </a:rPr>
-              <a:t>-</a:t>
-            </a:r>
-            <a:r>
-              <a:rPr lang="en-US" sz="1200" dirty="0">
-                <a:solidFill>
-                  <a:schemeClr val="bg1"/>
-                </a:solidFill>
-                <a:latin typeface="Lucida Console" panose="020B0609040504020204" pitchFamily="49" charset="0"/>
-              </a:rPr>
-              <a:t> </a:t>
-            </a:r>
-            <a:r>
-              <a:rPr lang="en-US" sz="1200" dirty="0" err="1">
-                <a:solidFill>
-                  <a:schemeClr val="bg1"/>
-                </a:solidFill>
-                <a:latin typeface="Lucida Console" panose="020B0609040504020204" pitchFamily="49" charset="0"/>
-              </a:rPr>
-              <a:t>meanCI_BS</a:t>
-            </a:r>
-            <a:r>
-              <a:rPr lang="en-US" sz="1200" dirty="0" err="1">
-                <a:solidFill>
-                  <a:schemeClr val="accent1"/>
-                </a:solidFill>
-                <a:latin typeface="Lucida Console" panose="020B0609040504020204" pitchFamily="49" charset="0"/>
-              </a:rPr>
-              <a:t>$</a:t>
-            </a:r>
-            <a:r>
-              <a:rPr lang="en-US" sz="1200" dirty="0" err="1">
-                <a:solidFill>
-                  <a:schemeClr val="bg1"/>
-                </a:solidFill>
-                <a:latin typeface="Lucida Console" panose="020B0609040504020204" pitchFamily="49" charset="0"/>
-              </a:rPr>
-              <a:t>CI_low</a:t>
-            </a:r>
-            <a:endParaRPr lang="en-US" sz="1200" dirty="0">
-              <a:solidFill>
-                <a:schemeClr val="bg1"/>
-              </a:solidFill>
-              <a:latin typeface="Lucida Console" panose="020B0609040504020204" pitchFamily="49" charset="0"/>
-            </a:endParaRPr>
-          </a:p>
-          <a:p>
-            <a:endParaRPr lang="en-US" sz="1200" dirty="0">
-              <a:solidFill>
-                <a:schemeClr val="bg1"/>
-              </a:solidFill>
-              <a:latin typeface="Lucida Console" panose="020B0609040504020204" pitchFamily="49" charset="0"/>
-            </a:endParaRPr>
-          </a:p>
-          <a:p>
-            <a:r>
-              <a:rPr lang="en-US" sz="1200" dirty="0">
-                <a:solidFill>
-                  <a:schemeClr val="bg1"/>
-                </a:solidFill>
-                <a:latin typeface="Lucida Console" panose="020B0609040504020204" pitchFamily="49" charset="0"/>
-              </a:rPr>
-              <a:t>analysis1_nonpara </a:t>
-            </a:r>
-            <a:r>
-              <a:rPr lang="en-US" sz="1200" dirty="0">
-                <a:solidFill>
-                  <a:schemeClr val="accent1"/>
-                </a:solidFill>
-                <a:latin typeface="Lucida Console" panose="020B0609040504020204" pitchFamily="49" charset="0"/>
-              </a:rPr>
-              <a:t>&lt;-</a:t>
-            </a:r>
-            <a:r>
-              <a:rPr lang="en-US" sz="1200" dirty="0">
-                <a:solidFill>
-                  <a:schemeClr val="bg1"/>
-                </a:solidFill>
-                <a:latin typeface="Lucida Console" panose="020B0609040504020204" pitchFamily="49" charset="0"/>
-              </a:rPr>
-              <a:t> </a:t>
-            </a:r>
-            <a:r>
-              <a:rPr lang="en-US" sz="1200" dirty="0" err="1">
-                <a:solidFill>
-                  <a:schemeClr val="bg1"/>
-                </a:solidFill>
-                <a:latin typeface="Lucida Console" panose="020B0609040504020204" pitchFamily="49" charset="0"/>
-              </a:rPr>
-              <a:t>meanCI_BS</a:t>
-            </a:r>
-            <a:endParaRPr lang="en-US" sz="1200" dirty="0">
-              <a:solidFill>
-                <a:schemeClr val="accent1"/>
-              </a:solidFill>
-              <a:latin typeface="Lucida Console" panose="020B0609040504020204" pitchFamily="49" charset="0"/>
-            </a:endParaRPr>
+              <a:rPr lang="en-US" dirty="0"/>
+              <a:t>Text</a:t>
+            </a:r>
+          </a:p>
+          <a:p>
+            <a:endParaRPr lang="en-US" dirty="0"/>
           </a:p>
         </p:txBody>
       </p:sp>
     </p:spTree>
     <p:extLst>
       <p:ext uri="{BB962C8B-B14F-4D97-AF65-F5344CB8AC3E}">
-        <p14:creationId xmlns:p14="http://schemas.microsoft.com/office/powerpoint/2010/main" val="1107126729"/>
+        <p14:creationId xmlns:p14="http://schemas.microsoft.com/office/powerpoint/2010/main" val="1765256109"/>
       </p:ext>
     </p:extLst>
   </p:cSld>
@@ -5528,7 +5538,7 @@
           <p:cNvPr id="2" name="Title 1">
             <a:extLst>
               <a:ext uri="{FF2B5EF4-FFF2-40B4-BE49-F238E27FC236}">
-                <a16:creationId xmlns:a16="http://schemas.microsoft.com/office/drawing/2014/main" id="{F7038F4E-C17C-476A-A8D5-BB1DF1332FAB}"/>
+                <a16:creationId xmlns:a16="http://schemas.microsoft.com/office/drawing/2014/main" id="{219FC961-4E73-41A2-A54A-93E766693C90}"/>
               </a:ext>
             </a:extLst>
           </p:cNvPr>
@@ -5546,7 +5556,7 @@
           <a:p>
             <a:r>
               <a:rPr lang="en-US" dirty="0"/>
-              <a:t>DISCUSSION</a:t>
+              <a:t>LIMITATIONS</a:t>
             </a:r>
           </a:p>
         </p:txBody>
@@ -5556,7 +5566,7 @@
           <p:cNvPr id="3" name="Content Placeholder 2">
             <a:extLst>
               <a:ext uri="{FF2B5EF4-FFF2-40B4-BE49-F238E27FC236}">
-                <a16:creationId xmlns:a16="http://schemas.microsoft.com/office/drawing/2014/main" id="{22E7DCC7-2736-4166-86E2-FBBC23519826}"/>
+                <a16:creationId xmlns:a16="http://schemas.microsoft.com/office/drawing/2014/main" id="{148AF7E9-44A2-48A8-A8CF-67A80389B59B}"/>
               </a:ext>
             </a:extLst>
           </p:cNvPr>
@@ -5569,23 +5579,22 @@
         </p:nvSpPr>
         <p:spPr/>
         <p:txBody>
-          <a:bodyPr/>
+          <a:bodyPr>
+            <a:normAutofit/>
+          </a:bodyPr>
           <a:lstStyle/>
           <a:p>
             <a:r>
               <a:rPr lang="en-US" dirty="0"/>
               <a:t>Text</a:t>
             </a:r>
-          </a:p>
-          <a:p>
-            <a:endParaRPr lang="en-US" dirty="0"/>
           </a:p>
         </p:txBody>
       </p:sp>
     </p:spTree>
     <p:extLst>
       <p:ext uri="{BB962C8B-B14F-4D97-AF65-F5344CB8AC3E}">
-        <p14:creationId xmlns:p14="http://schemas.microsoft.com/office/powerpoint/2010/main" val="1765256109"/>
+        <p14:creationId xmlns:p14="http://schemas.microsoft.com/office/powerpoint/2010/main" val="1263930634"/>
       </p:ext>
     </p:extLst>
   </p:cSld>
@@ -5617,94 +5626,6 @@
           <p:cNvPr id="2" name="Title 1">
             <a:extLst>
               <a:ext uri="{FF2B5EF4-FFF2-40B4-BE49-F238E27FC236}">
-                <a16:creationId xmlns:a16="http://schemas.microsoft.com/office/drawing/2014/main" id="{219FC961-4E73-41A2-A54A-93E766693C90}"/>
-              </a:ext>
-            </a:extLst>
-          </p:cNvPr>
-          <p:cNvSpPr>
-            <a:spLocks noGrp="1"/>
-          </p:cNvSpPr>
-          <p:nvPr>
-            <p:ph type="title"/>
-          </p:nvPr>
-        </p:nvSpPr>
-        <p:spPr/>
-        <p:txBody>
-          <a:bodyPr/>
-          <a:lstStyle/>
-          <a:p>
-            <a:r>
-              <a:rPr lang="en-US" dirty="0"/>
-              <a:t>LIMITATIONS</a:t>
-            </a:r>
-          </a:p>
-        </p:txBody>
-      </p:sp>
-      <p:sp>
-        <p:nvSpPr>
-          <p:cNvPr id="3" name="Content Placeholder 2">
-            <a:extLst>
-              <a:ext uri="{FF2B5EF4-FFF2-40B4-BE49-F238E27FC236}">
-                <a16:creationId xmlns:a16="http://schemas.microsoft.com/office/drawing/2014/main" id="{148AF7E9-44A2-48A8-A8CF-67A80389B59B}"/>
-              </a:ext>
-            </a:extLst>
-          </p:cNvPr>
-          <p:cNvSpPr>
-            <a:spLocks noGrp="1"/>
-          </p:cNvSpPr>
-          <p:nvPr>
-            <p:ph idx="1"/>
-          </p:nvPr>
-        </p:nvSpPr>
-        <p:spPr/>
-        <p:txBody>
-          <a:bodyPr>
-            <a:normAutofit/>
-          </a:bodyPr>
-          <a:lstStyle/>
-          <a:p>
-            <a:r>
-              <a:rPr lang="en-US" dirty="0"/>
-              <a:t>Text</a:t>
-            </a:r>
-          </a:p>
-        </p:txBody>
-      </p:sp>
-    </p:spTree>
-    <p:extLst>
-      <p:ext uri="{BB962C8B-B14F-4D97-AF65-F5344CB8AC3E}">
-        <p14:creationId xmlns:p14="http://schemas.microsoft.com/office/powerpoint/2010/main" val="1263930634"/>
-      </p:ext>
-    </p:extLst>
-  </p:cSld>
-  <p:clrMapOvr>
-    <a:masterClrMapping/>
-  </p:clrMapOvr>
-</p:sld>
-</file>
-
-<file path=ppt/slides/slide14.xml><?xml version="1.0" encoding="utf-8"?>
-<p:sld xmlns:a="http://schemas.openxmlformats.org/drawingml/2006/main" xmlns:r="http://schemas.openxmlformats.org/officeDocument/2006/relationships" xmlns:p="http://schemas.openxmlformats.org/presentationml/2006/main">
-  <p:cSld>
-    <p:spTree>
-      <p:nvGrpSpPr>
-        <p:cNvPr id="1" name=""/>
-        <p:cNvGrpSpPr/>
-        <p:nvPr/>
-      </p:nvGrpSpPr>
-      <p:grpSpPr>
-        <a:xfrm>
-          <a:off x="0" y="0"/>
-          <a:ext cx="0" cy="0"/>
-          <a:chOff x="0" y="0"/>
-          <a:chExt cx="0" cy="0"/>
-        </a:xfrm>
-      </p:grpSpPr>
-      <p:sp>
-        <p:nvSpPr>
-          <p:cNvPr id="2" name="Title 1">
-            <a:extLst>
-              <a:ext uri="{FF2B5EF4-FFF2-40B4-BE49-F238E27FC236}">
                 <a16:creationId xmlns:a16="http://schemas.microsoft.com/office/drawing/2014/main" id="{0D3D2F6A-581F-4A92-A810-C702D746F729}"/>
               </a:ext>
             </a:extLst>
@@ -5769,7 +5690,7 @@
 </p:sld>
 </file>
 
-<file path=ppt/slides/slide15.xml><?xml version="1.0" encoding="utf-8"?>
+<file path=ppt/slides/slide14.xml><?xml version="1.0" encoding="utf-8"?>
 <p:sld xmlns:a="http://schemas.openxmlformats.org/drawingml/2006/main" xmlns:r="http://schemas.openxmlformats.org/officeDocument/2006/relationships" xmlns:p="http://schemas.openxmlformats.org/presentationml/2006/main">
   <p:cSld>
     <p:spTree>
@@ -5910,7 +5831,7 @@
 </p:sld>
 </file>
 
-<file path=ppt/slides/slide16.xml><?xml version="1.0" encoding="utf-8"?>
+<file path=ppt/slides/slide15.xml><?xml version="1.0" encoding="utf-8"?>
 <p:sld xmlns:a="http://schemas.openxmlformats.org/drawingml/2006/main" xmlns:r="http://schemas.openxmlformats.org/officeDocument/2006/relationships" xmlns:p="http://schemas.openxmlformats.org/presentationml/2006/main">
   <p:cSld>
     <p:spTree>
@@ -7037,19 +6958,7 @@
           <a:p>
             <a:r>
               <a:rPr lang="en-US" dirty="0"/>
-              <a:t>DATA EXPLORATION via </a:t>
-            </a:r>
-            <a:r>
-              <a:rPr lang="en-US" sz="3600" dirty="0" err="1">
-                <a:latin typeface="Lucida Console" panose="020B0609040504020204" pitchFamily="49" charset="0"/>
-              </a:rPr>
-              <a:t>autoplot</a:t>
-            </a:r>
-            <a:r>
-              <a:rPr lang="en-US" sz="3600" dirty="0">
-                <a:latin typeface="Lucida Console" panose="020B0609040504020204" pitchFamily="49" charset="0"/>
-              </a:rPr>
-              <a:t>()</a:t>
+              <a:t>DATA EXPLORATION</a:t>
             </a:r>
             <a:endParaRPr lang="en-US" sz="3600" dirty="0"/>
           </a:p>
@@ -7168,19 +7077,7 @@
           <a:p>
             <a:r>
               <a:rPr lang="en-US" dirty="0"/>
-              <a:t>DATA EXPLORATION via </a:t>
-            </a:r>
-            <a:r>
-              <a:rPr lang="en-US" sz="3600" dirty="0" err="1">
-                <a:latin typeface="Lucida Console" panose="020B0609040504020204" pitchFamily="49" charset="0"/>
-              </a:rPr>
-              <a:t>autoplot</a:t>
-            </a:r>
-            <a:r>
-              <a:rPr lang="en-US" sz="3600" dirty="0">
-                <a:latin typeface="Lucida Console" panose="020B0609040504020204" pitchFamily="49" charset="0"/>
-              </a:rPr>
-              <a:t>()</a:t>
+              <a:t>DATA EXPLORATION</a:t>
             </a:r>
             <a:endParaRPr lang="en-US" sz="3600" dirty="0"/>
           </a:p>
@@ -7251,7 +7148,7 @@
           <p:cNvPr id="2" name="Title 1">
             <a:extLst>
               <a:ext uri="{FF2B5EF4-FFF2-40B4-BE49-F238E27FC236}">
-                <a16:creationId xmlns:a16="http://schemas.microsoft.com/office/drawing/2014/main" id="{B9F118EA-9581-481E-9737-5FBEC7E88C69}"/>
+                <a16:creationId xmlns:a16="http://schemas.microsoft.com/office/drawing/2014/main" id="{91A44E3A-8928-435B-8372-105E37A3D380}"/>
               </a:ext>
             </a:extLst>
           </p:cNvPr>
@@ -7269,28 +7166,74 @@
           <a:p>
             <a:r>
               <a:rPr lang="en-US" dirty="0"/>
-              <a:t>DATA EXPLORATION via </a:t>
-            </a:r>
-            <a:r>
-              <a:rPr lang="en-US" sz="3600" dirty="0" err="1">
-                <a:latin typeface="Lucida Console" panose="020B0609040504020204" pitchFamily="49" charset="0"/>
-              </a:rPr>
-              <a:t>autoplot</a:t>
-            </a:r>
-            <a:r>
-              <a:rPr lang="en-US" sz="3600" dirty="0">
-                <a:latin typeface="Lucida Console" panose="020B0609040504020204" pitchFamily="49" charset="0"/>
-              </a:rPr>
-              <a:t>()</a:t>
-            </a:r>
-            <a:endParaRPr lang="en-US" sz="3600" dirty="0"/>
-          </a:p>
-        </p:txBody>
-      </p:sp>
+              <a:t>CROSS-CORRELATION</a:t>
+            </a:r>
+          </a:p>
+        </p:txBody>
+      </p:sp>
+      <p:sp>
+        <p:nvSpPr>
+          <p:cNvPr id="11" name="Content Placeholder 4">
+            <a:extLst>
+              <a:ext uri="{FF2B5EF4-FFF2-40B4-BE49-F238E27FC236}">
+                <a16:creationId xmlns:a16="http://schemas.microsoft.com/office/drawing/2014/main" id="{D7C459E9-3852-4643-80AB-ABADDA62EB5D}"/>
+              </a:ext>
+            </a:extLst>
+          </p:cNvPr>
+          <p:cNvSpPr>
+            <a:spLocks noGrp="1"/>
+          </p:cNvSpPr>
+          <p:nvPr>
+            <p:ph idx="1"/>
+          </p:nvPr>
+        </p:nvSpPr>
+        <p:spPr>
+          <a:xfrm>
+            <a:off x="476285" y="4070294"/>
+            <a:ext cx="11213722" cy="2199903"/>
+          </a:xfrm>
+        </p:spPr>
+        <p:txBody>
+          <a:bodyPr/>
+          <a:lstStyle/>
+          <a:p>
+            <a:endParaRPr lang="en-US" dirty="0"/>
+          </a:p>
+        </p:txBody>
+      </p:sp>
+      <p:pic>
+        <p:nvPicPr>
+          <p:cNvPr id="3" name="Picture 2">
+            <a:extLst>
+              <a:ext uri="{FF2B5EF4-FFF2-40B4-BE49-F238E27FC236}">
+                <a16:creationId xmlns:a16="http://schemas.microsoft.com/office/drawing/2014/main" id="{9E3F6A02-821A-4F10-A6B0-3D31D28D0925}"/>
+              </a:ext>
+            </a:extLst>
+          </p:cNvPr>
+          <p:cNvPicPr>
+            <a:picLocks noChangeAspect="1"/>
+          </p:cNvPicPr>
+          <p:nvPr/>
+        </p:nvPicPr>
+        <p:blipFill rotWithShape="1">
+          <a:blip r:embed="rId2"/>
+          <a:srcRect t="7294"/>
+          <a:stretch/>
+        </p:blipFill>
+        <p:spPr>
+          <a:xfrm>
+            <a:off x="2554386" y="1305232"/>
+            <a:ext cx="7083228" cy="2626652"/>
+          </a:xfrm>
+          <a:prstGeom prst="rect">
+            <a:avLst/>
+          </a:prstGeom>
+        </p:spPr>
+      </p:pic>
     </p:spTree>
     <p:extLst>
       <p:ext uri="{BB962C8B-B14F-4D97-AF65-F5344CB8AC3E}">
-        <p14:creationId xmlns:p14="http://schemas.microsoft.com/office/powerpoint/2010/main" val="1785365495"/>
+        <p14:creationId xmlns:p14="http://schemas.microsoft.com/office/powerpoint/2010/main" val="42750524"/>
       </p:ext>
     </p:extLst>
   </p:cSld>
@@ -7322,7 +7265,7 @@
           <p:cNvPr id="2" name="Title 1">
             <a:extLst>
               <a:ext uri="{FF2B5EF4-FFF2-40B4-BE49-F238E27FC236}">
-                <a16:creationId xmlns:a16="http://schemas.microsoft.com/office/drawing/2014/main" id="{91A44E3A-8928-435B-8372-105E37A3D380}"/>
+                <a16:creationId xmlns:a16="http://schemas.microsoft.com/office/drawing/2014/main" id="{B7383051-138B-4DB9-9ABB-C3BBE79305E8}"/>
               </a:ext>
             </a:extLst>
           </p:cNvPr>
@@ -7340,17 +7283,17 @@
           <a:p>
             <a:r>
               <a:rPr lang="en-US" dirty="0"/>
-              <a:t>CROSS-CORRELATIONS</a:t>
-            </a:r>
-          </a:p>
-        </p:txBody>
-      </p:sp>
-      <p:sp>
-        <p:nvSpPr>
-          <p:cNvPr id="11" name="Content Placeholder 4">
+              <a:t>ANALYSES PERFORMED</a:t>
+            </a:r>
+          </a:p>
+        </p:txBody>
+      </p:sp>
+      <p:sp>
+        <p:nvSpPr>
+          <p:cNvPr id="5" name="Content Placeholder 4">
             <a:extLst>
               <a:ext uri="{FF2B5EF4-FFF2-40B4-BE49-F238E27FC236}">
-                <a16:creationId xmlns:a16="http://schemas.microsoft.com/office/drawing/2014/main" id="{D7C459E9-3852-4643-80AB-ABADDA62EB5D}"/>
+                <a16:creationId xmlns:a16="http://schemas.microsoft.com/office/drawing/2014/main" id="{C7017BFE-98B3-41BF-AE7C-E6B268B9A67C}"/>
               </a:ext>
             </a:extLst>
           </p:cNvPr>
@@ -7361,12 +7304,7 @@
             <p:ph idx="1"/>
           </p:nvPr>
         </p:nvSpPr>
-        <p:spPr>
-          <a:xfrm>
-            <a:off x="476285" y="1358791"/>
-            <a:ext cx="11213722" cy="4911406"/>
-          </a:xfrm>
-        </p:spPr>
+        <p:spPr/>
         <p:txBody>
           <a:bodyPr/>
           <a:lstStyle/>
@@ -7378,7 +7316,7 @@
     </p:spTree>
     <p:extLst>
       <p:ext uri="{BB962C8B-B14F-4D97-AF65-F5344CB8AC3E}">
-        <p14:creationId xmlns:p14="http://schemas.microsoft.com/office/powerpoint/2010/main" val="42750524"/>
+        <p14:creationId xmlns:p14="http://schemas.microsoft.com/office/powerpoint/2010/main" val="2107817399"/>
       </p:ext>
     </p:extLst>
   </p:cSld>

</xml_diff>

<commit_message>
Fleshing out training vs test datasets for predictions
</commit_message>
<xml_diff>
--- a/Prioli_Final_Proj.pptx
+++ b/Prioli_Final_Proj.pptx
@@ -11,8 +11,8 @@
     <p:sldId id="256" r:id="rId2"/>
     <p:sldId id="257" r:id="rId3"/>
     <p:sldId id="258" r:id="rId4"/>
-    <p:sldId id="259" r:id="rId5"/>
-    <p:sldId id="260" r:id="rId6"/>
+    <p:sldId id="260" r:id="rId5"/>
+    <p:sldId id="259" r:id="rId6"/>
     <p:sldId id="272" r:id="rId7"/>
     <p:sldId id="286" r:id="rId8"/>
     <p:sldId id="267" r:id="rId9"/>
@@ -222,7 +222,7 @@
           <a:p>
             <a:fld id="{4EE169DE-67F4-4753-9B1C-F1A309C78068}" type="datetimeFigureOut">
               <a:rPr lang="en-US" smtClean="0"/>
-              <a:t>4/29/2019</a:t>
+              <a:t>4/30/2019</a:t>
             </a:fld>
             <a:endParaRPr lang="en-US"/>
           </a:p>
@@ -689,7 +689,7 @@
           <a:p>
             <a:fld id="{CF647BC4-379F-449B-8ACB-1D0356C51E22}" type="datetimeFigureOut">
               <a:rPr lang="en-US" smtClean="0"/>
-              <a:t>4/29/2019</a:t>
+              <a:t>4/30/2019</a:t>
             </a:fld>
             <a:endParaRPr lang="en-US"/>
           </a:p>
@@ -879,7 +879,7 @@
           <a:p>
             <a:fld id="{CF647BC4-379F-449B-8ACB-1D0356C51E22}" type="datetimeFigureOut">
               <a:rPr lang="en-US" smtClean="0"/>
-              <a:t>4/29/2019</a:t>
+              <a:t>4/30/2019</a:t>
             </a:fld>
             <a:endParaRPr lang="en-US"/>
           </a:p>
@@ -1059,7 +1059,7 @@
           <a:p>
             <a:fld id="{CF647BC4-379F-449B-8ACB-1D0356C51E22}" type="datetimeFigureOut">
               <a:rPr lang="en-US" smtClean="0"/>
-              <a:t>4/29/2019</a:t>
+              <a:t>4/30/2019</a:t>
             </a:fld>
             <a:endParaRPr lang="en-US"/>
           </a:p>
@@ -1250,7 +1250,7 @@
           <a:p>
             <a:fld id="{CF647BC4-379F-449B-8ACB-1D0356C51E22}" type="datetimeFigureOut">
               <a:rPr lang="en-US" smtClean="0"/>
-              <a:t>4/29/2019</a:t>
+              <a:t>4/30/2019</a:t>
             </a:fld>
             <a:endParaRPr lang="en-US"/>
           </a:p>
@@ -1506,7 +1506,7 @@
           <a:p>
             <a:fld id="{CF647BC4-379F-449B-8ACB-1D0356C51E22}" type="datetimeFigureOut">
               <a:rPr lang="en-US" smtClean="0"/>
-              <a:t>4/29/2019</a:t>
+              <a:t>4/30/2019</a:t>
             </a:fld>
             <a:endParaRPr lang="en-US"/>
           </a:p>
@@ -1794,7 +1794,7 @@
           <a:p>
             <a:fld id="{CF647BC4-379F-449B-8ACB-1D0356C51E22}" type="datetimeFigureOut">
               <a:rPr lang="en-US" smtClean="0"/>
-              <a:t>4/29/2019</a:t>
+              <a:t>4/30/2019</a:t>
             </a:fld>
             <a:endParaRPr lang="en-US"/>
           </a:p>
@@ -2232,7 +2232,7 @@
           <a:p>
             <a:fld id="{CF647BC4-379F-449B-8ACB-1D0356C51E22}" type="datetimeFigureOut">
               <a:rPr lang="en-US" smtClean="0"/>
-              <a:t>4/29/2019</a:t>
+              <a:t>4/30/2019</a:t>
             </a:fld>
             <a:endParaRPr lang="en-US"/>
           </a:p>
@@ -2350,7 +2350,7 @@
           <a:p>
             <a:fld id="{CF647BC4-379F-449B-8ACB-1D0356C51E22}" type="datetimeFigureOut">
               <a:rPr lang="en-US" smtClean="0"/>
-              <a:t>4/29/2019</a:t>
+              <a:t>4/30/2019</a:t>
             </a:fld>
             <a:endParaRPr lang="en-US"/>
           </a:p>
@@ -2445,7 +2445,7 @@
           <a:p>
             <a:fld id="{CF647BC4-379F-449B-8ACB-1D0356C51E22}" type="datetimeFigureOut">
               <a:rPr lang="en-US" smtClean="0"/>
-              <a:t>4/29/2019</a:t>
+              <a:t>4/30/2019</a:t>
             </a:fld>
             <a:endParaRPr lang="en-US"/>
           </a:p>
@@ -2801,7 +2801,7 @@
           <a:p>
             <a:fld id="{CF647BC4-379F-449B-8ACB-1D0356C51E22}" type="datetimeFigureOut">
               <a:rPr lang="en-US" smtClean="0"/>
-              <a:t>4/29/2019</a:t>
+              <a:t>4/30/2019</a:t>
             </a:fld>
             <a:endParaRPr lang="en-US"/>
           </a:p>
@@ -3117,7 +3117,7 @@
           <a:p>
             <a:fld id="{CF647BC4-379F-449B-8ACB-1D0356C51E22}" type="datetimeFigureOut">
               <a:rPr lang="en-US" smtClean="0"/>
-              <a:t>4/29/2019</a:t>
+              <a:t>4/30/2019</a:t>
             </a:fld>
             <a:endParaRPr lang="en-US"/>
           </a:p>
@@ -3349,7 +3349,7 @@
             <a:fld id="{CF647BC4-379F-449B-8ACB-1D0356C51E22}" type="datetimeFigureOut">
               <a:rPr lang="en-US" smtClean="0"/>
               <a:pPr/>
-              <a:t>4/29/2019</a:t>
+              <a:t>4/30/2019</a:t>
             </a:fld>
             <a:endParaRPr lang="en-US"/>
           </a:p>
@@ -5707,12 +5707,94 @@
           <a:chExt cx="0" cy="0"/>
         </a:xfrm>
       </p:grpSpPr>
+      <p:sp>
+        <p:nvSpPr>
+          <p:cNvPr id="2" name="Title 1">
+            <a:extLst>
+              <a:ext uri="{FF2B5EF4-FFF2-40B4-BE49-F238E27FC236}">
+                <a16:creationId xmlns:a16="http://schemas.microsoft.com/office/drawing/2014/main" id="{0879B350-2EF4-446D-81EA-088D5EA1B2AF}"/>
+              </a:ext>
+            </a:extLst>
+          </p:cNvPr>
+          <p:cNvSpPr>
+            <a:spLocks noGrp="1"/>
+          </p:cNvSpPr>
+          <p:nvPr>
+            <p:ph type="title"/>
+          </p:nvPr>
+        </p:nvSpPr>
+        <p:spPr/>
+        <p:txBody>
+          <a:bodyPr/>
+          <a:lstStyle/>
+          <a:p>
+            <a:r>
+              <a:rPr lang="en-US" dirty="0"/>
+              <a:t>QUESTIONS?</a:t>
+            </a:r>
+          </a:p>
+        </p:txBody>
+      </p:sp>
+      <p:sp>
+        <p:nvSpPr>
+          <p:cNvPr id="4" name="Content Placeholder 3">
+            <a:extLst>
+              <a:ext uri="{FF2B5EF4-FFF2-40B4-BE49-F238E27FC236}">
+                <a16:creationId xmlns:a16="http://schemas.microsoft.com/office/drawing/2014/main" id="{82A2A86C-ABAD-4283-9DEA-9608B5D3108E}"/>
+              </a:ext>
+            </a:extLst>
+          </p:cNvPr>
+          <p:cNvSpPr>
+            <a:spLocks noGrp="1"/>
+          </p:cNvSpPr>
+          <p:nvPr>
+            <p:ph sz="half" idx="1"/>
+          </p:nvPr>
+        </p:nvSpPr>
+        <p:spPr>
+          <a:xfrm>
+            <a:off x="676655" y="1998134"/>
+            <a:ext cx="10902431" cy="3767328"/>
+          </a:xfrm>
+        </p:spPr>
+        <p:txBody>
+          <a:bodyPr/>
+          <a:lstStyle/>
+          <a:p>
+            <a:pPr marL="0" indent="0">
+              <a:buNone/>
+            </a:pPr>
+            <a:r>
+              <a:rPr lang="en-US" dirty="0"/>
+              <a:t>Full project code available on GitHub:</a:t>
+            </a:r>
+          </a:p>
+          <a:p>
+            <a:pPr marL="0" indent="0">
+              <a:buNone/>
+            </a:pPr>
+            <a:r>
+              <a:rPr lang="en-US" dirty="0">
+                <a:hlinkClick r:id="rId2"/>
+              </a:rPr>
+              <a:t>https://github.com/kmprioliPROF/MAT_8444_Final_Project</a:t>
+            </a:r>
+            <a:endParaRPr lang="en-US" dirty="0"/>
+          </a:p>
+          <a:p>
+            <a:pPr marL="0" indent="0">
+              <a:buNone/>
+            </a:pPr>
+            <a:endParaRPr lang="en-US" dirty="0"/>
+          </a:p>
+        </p:txBody>
+      </p:sp>
       <p:pic>
         <p:nvPicPr>
-          <p:cNvPr id="3" name="Picture 2">
+          <p:cNvPr id="5" name="Picture 4">
             <a:extLst>
               <a:ext uri="{FF2B5EF4-FFF2-40B4-BE49-F238E27FC236}">
-                <a16:creationId xmlns:a16="http://schemas.microsoft.com/office/drawing/2014/main" id="{85DA79D9-412F-4576-9BAE-F7D7E663F5F0}"/>
+                <a16:creationId xmlns:a16="http://schemas.microsoft.com/office/drawing/2014/main" id="{E9206E4C-802E-4A66-9D8D-66B5034BEEC7}"/>
               </a:ext>
             </a:extLst>
           </p:cNvPr>
@@ -5721,103 +5803,22 @@
           </p:cNvPicPr>
           <p:nvPr/>
         </p:nvPicPr>
-        <p:blipFill rotWithShape="1">
-          <a:blip r:embed="rId2"/>
-          <a:srcRect l="9353" t="9896" r="9941" b="9881"/>
-          <a:stretch/>
+        <p:blipFill>
+          <a:blip r:embed="rId3"/>
+          <a:stretch>
+            <a:fillRect/>
+          </a:stretch>
         </p:blipFill>
         <p:spPr>
           <a:xfrm>
-            <a:off x="4631809" y="3429000"/>
-            <a:ext cx="2901876" cy="2884536"/>
+            <a:off x="4694055" y="3429000"/>
+            <a:ext cx="2803890" cy="2803890"/>
           </a:xfrm>
           <a:prstGeom prst="rect">
             <a:avLst/>
           </a:prstGeom>
         </p:spPr>
       </p:pic>
-      <p:sp>
-        <p:nvSpPr>
-          <p:cNvPr id="2" name="Title 1">
-            <a:extLst>
-              <a:ext uri="{FF2B5EF4-FFF2-40B4-BE49-F238E27FC236}">
-                <a16:creationId xmlns:a16="http://schemas.microsoft.com/office/drawing/2014/main" id="{0879B350-2EF4-446D-81EA-088D5EA1B2AF}"/>
-              </a:ext>
-            </a:extLst>
-          </p:cNvPr>
-          <p:cNvSpPr>
-            <a:spLocks noGrp="1"/>
-          </p:cNvSpPr>
-          <p:nvPr>
-            <p:ph type="title"/>
-          </p:nvPr>
-        </p:nvSpPr>
-        <p:spPr/>
-        <p:txBody>
-          <a:bodyPr/>
-          <a:lstStyle/>
-          <a:p>
-            <a:r>
-              <a:rPr lang="en-US" dirty="0"/>
-              <a:t>QUESTIONS?</a:t>
-            </a:r>
-          </a:p>
-        </p:txBody>
-      </p:sp>
-      <p:sp>
-        <p:nvSpPr>
-          <p:cNvPr id="4" name="Content Placeholder 3">
-            <a:extLst>
-              <a:ext uri="{FF2B5EF4-FFF2-40B4-BE49-F238E27FC236}">
-                <a16:creationId xmlns:a16="http://schemas.microsoft.com/office/drawing/2014/main" id="{82A2A86C-ABAD-4283-9DEA-9608B5D3108E}"/>
-              </a:ext>
-            </a:extLst>
-          </p:cNvPr>
-          <p:cNvSpPr>
-            <a:spLocks noGrp="1"/>
-          </p:cNvSpPr>
-          <p:nvPr>
-            <p:ph sz="half" idx="1"/>
-          </p:nvPr>
-        </p:nvSpPr>
-        <p:spPr>
-          <a:xfrm>
-            <a:off x="676655" y="1998134"/>
-            <a:ext cx="10902431" cy="3767328"/>
-          </a:xfrm>
-        </p:spPr>
-        <p:txBody>
-          <a:bodyPr/>
-          <a:lstStyle/>
-          <a:p>
-            <a:pPr marL="0" indent="0">
-              <a:buNone/>
-            </a:pPr>
-            <a:r>
-              <a:rPr lang="en-US" dirty="0"/>
-              <a:t>Full project code available on GitHub:</a:t>
-            </a:r>
-          </a:p>
-          <a:p>
-            <a:pPr marL="0" indent="0">
-              <a:buNone/>
-            </a:pPr>
-            <a:r>
-              <a:rPr lang="en-US" dirty="0">
-                <a:hlinkClick r:id="rId3"/>
-              </a:rPr>
-              <a:t>https://github.com/kmprioliPROF/MAT_8444_Final_Project</a:t>
-            </a:r>
-            <a:endParaRPr lang="en-US" dirty="0"/>
-          </a:p>
-          <a:p>
-            <a:pPr marL="0" indent="0">
-              <a:buNone/>
-            </a:pPr>
-            <a:endParaRPr lang="en-US" dirty="0"/>
-          </a:p>
-        </p:txBody>
-      </p:sp>
     </p:spTree>
     <p:extLst>
       <p:ext uri="{BB962C8B-B14F-4D97-AF65-F5344CB8AC3E}">
@@ -5893,9 +5894,7 @@
           </p:nvPr>
         </p:nvSpPr>
         <p:spPr>
-          <a:solidFill>
-            <a:srgbClr val="FFFF00"/>
-          </a:solidFill>
+          <a:noFill/>
         </p:spPr>
         <p:txBody>
           <a:bodyPr>
@@ -5915,7 +5914,17 @@
             </a:pPr>
             <a:r>
               <a:rPr lang="en-US" sz="1600" dirty="0"/>
-              <a:t>Helliwell, John F., Richard Layard, and Jeffrey D. Sachs. 2018. “World Happiness Report.” http://worldhappiness.report/ed/2018/.</a:t>
+              <a:t>Federal Reserve Bank of St. Louis.  2018.  “Household Debt Service Payments as a Percent of Disposable Personal Income.” </a:t>
+            </a:r>
+            <a:r>
+              <a:rPr lang="en-US" sz="1600" dirty="0">
+                <a:hlinkClick r:id="rId2"/>
+              </a:rPr>
+              <a:t>https://fred.stlouisfed.org/series/TDSP</a:t>
+            </a:r>
+            <a:r>
+              <a:rPr lang="en-US" sz="1600" dirty="0"/>
+              <a:t>.</a:t>
             </a:r>
           </a:p>
           <a:p>
@@ -5931,15 +5940,25 @@
             </a:pPr>
             <a:r>
               <a:rPr lang="en-US" sz="1600" dirty="0"/>
-              <a:t>James, Gareth, Daniela Witten, Trevor Hastie, and Robert </a:t>
-            </a:r>
-            <a:r>
-              <a:rPr lang="en-US" sz="1600" dirty="0" err="1"/>
-              <a:t>Tibshirani</a:t>
+              <a:t>Federal Reserve Bank of St. Louis.  2018.  “</a:t>
+            </a:r>
+            <a:r>
+              <a:rPr lang="it-IT" sz="1600" dirty="0"/>
+              <a:t>Real Disposable Personal Income – Per Capita.</a:t>
             </a:r>
             <a:r>
               <a:rPr lang="en-US" sz="1600" dirty="0"/>
-              <a:t>. 2013. “An Introduction to Statistical Learning.” Springer. https://www-bcf.usc.edu/~gareth/ISL/.</a:t>
+              <a:t>” </a:t>
+            </a:r>
+            <a:r>
+              <a:rPr lang="en-US" sz="1600" dirty="0">
+                <a:hlinkClick r:id="rId3"/>
+              </a:rPr>
+              <a:t>https://fred.stlouisfed.org/series/A229RX0Q048SBEA</a:t>
+            </a:r>
+            <a:r>
+              <a:rPr lang="en-US" sz="1600" dirty="0"/>
+              <a:t>.</a:t>
             </a:r>
           </a:p>
           <a:p>
@@ -5955,143 +5974,7 @@
             </a:pPr>
             <a:r>
               <a:rPr lang="en-US" sz="1600" dirty="0"/>
-              <a:t>Murphy, Sherry L., </a:t>
-            </a:r>
-            <a:r>
-              <a:rPr lang="en-US" sz="1600" dirty="0" err="1"/>
-              <a:t>Jiaquan</a:t>
-            </a:r>
-            <a:r>
-              <a:rPr lang="en-US" sz="1600" dirty="0"/>
-              <a:t> Xu, Kenneth D. </a:t>
-            </a:r>
-            <a:r>
-              <a:rPr lang="en-US" sz="1600" dirty="0" err="1"/>
-              <a:t>Kochanek</a:t>
-            </a:r>
-            <a:r>
-              <a:rPr lang="en-US" sz="1600" dirty="0"/>
-              <a:t>, and Elizabeth Arias. 2018. “Mortality in the United States, 2017. NCHS Data Brief, No 328.” National Center for Health Statistics. https://www.cdc.gov/nchs/products/databriefs/db328.htm.</a:t>
-            </a:r>
-          </a:p>
-          <a:p>
-            <a:pPr marL="347663" indent="-347663">
-              <a:lnSpc>
-                <a:spcPct val="100000"/>
-              </a:lnSpc>
-              <a:spcBef>
-                <a:spcPts val="0"/>
-              </a:spcBef>
-              <a:buFont typeface="+mj-lt"/>
-              <a:buAutoNum type="arabicPeriod"/>
-            </a:pPr>
-            <a:r>
-              <a:rPr lang="en-US" sz="1600" dirty="0"/>
-              <a:t>Prioli, Katherine M. 2018. “MAT_8790_Final_Project.” https://github.com/kmprioliPROF/MAT_8790_Final_Project.</a:t>
-            </a:r>
-          </a:p>
-          <a:p>
-            <a:pPr marL="347663" indent="-347663">
-              <a:lnSpc>
-                <a:spcPct val="100000"/>
-              </a:lnSpc>
-              <a:spcBef>
-                <a:spcPts val="0"/>
-              </a:spcBef>
-              <a:buFont typeface="+mj-lt"/>
-              <a:buAutoNum type="arabicPeriod"/>
-            </a:pPr>
-            <a:r>
-              <a:rPr lang="en-US" sz="1600" dirty="0"/>
-              <a:t>Social Progress Imperative. 2018. “Social Progress Index.” https://www.socialprogress.org/?tab=4.</a:t>
-            </a:r>
-          </a:p>
-          <a:p>
-            <a:pPr marL="347663" indent="-347663">
-              <a:lnSpc>
-                <a:spcPct val="100000"/>
-              </a:lnSpc>
-              <a:spcBef>
-                <a:spcPts val="0"/>
-              </a:spcBef>
-              <a:buFont typeface="+mj-lt"/>
-              <a:buAutoNum type="arabicPeriod"/>
-            </a:pPr>
-            <a:r>
-              <a:rPr lang="en-US" sz="1600" dirty="0"/>
-              <a:t>The United Nations Development </a:t>
-            </a:r>
-            <a:r>
-              <a:rPr lang="en-US" sz="1600" dirty="0" err="1"/>
-              <a:t>Programme</a:t>
-            </a:r>
-            <a:r>
-              <a:rPr lang="en-US" sz="1600" dirty="0"/>
-              <a:t>. 2018. “Human Development Index.” http://hdr.undp.org/en/data.</a:t>
-            </a:r>
-          </a:p>
-          <a:p>
-            <a:pPr marL="347663" indent="-347663">
-              <a:lnSpc>
-                <a:spcPct val="100000"/>
-              </a:lnSpc>
-              <a:spcBef>
-                <a:spcPts val="0"/>
-              </a:spcBef>
-              <a:buFont typeface="+mj-lt"/>
-              <a:buAutoNum type="arabicPeriod"/>
-            </a:pPr>
-            <a:r>
-              <a:rPr lang="en-US" sz="1600" dirty="0"/>
-              <a:t>The World Bank. 2018. “Gross Domestic Product.” https://data.worldbank.org/indicator/ny.gdp.mktp.cd?view=map&amp;year_high_desc=true.</a:t>
-            </a:r>
-          </a:p>
-          <a:p>
-            <a:pPr marL="347663" indent="-347663">
-              <a:lnSpc>
-                <a:spcPct val="100000"/>
-              </a:lnSpc>
-              <a:spcBef>
-                <a:spcPts val="0"/>
-              </a:spcBef>
-              <a:buFont typeface="+mj-lt"/>
-              <a:buAutoNum type="arabicPeriod"/>
-            </a:pPr>
-            <a:r>
-              <a:rPr lang="en-US" sz="1600" dirty="0"/>
-              <a:t>World Economic Forum. 2016. “Gender Equality.” http://reports.weforum.org/global-gender-gap-report-2016/rankings/.</a:t>
-            </a:r>
-          </a:p>
-          <a:p>
-            <a:pPr marL="347663" indent="-347663">
-              <a:lnSpc>
-                <a:spcPct val="100000"/>
-              </a:lnSpc>
-              <a:spcBef>
-                <a:spcPts val="0"/>
-              </a:spcBef>
-              <a:buFont typeface="+mj-lt"/>
-              <a:buAutoNum type="arabicPeriod"/>
-            </a:pPr>
-            <a:r>
-              <a:rPr lang="en-US" sz="1600" dirty="0"/>
-              <a:t>World Health Organization. 2018a. “Life Expectancy.” http://apps.who.int/gho/data/view.main.SDG2016LEXv?lang=en.</a:t>
-            </a:r>
-          </a:p>
-          <a:p>
-            <a:pPr marL="347663" indent="-347663">
-              <a:lnSpc>
-                <a:spcPct val="100000"/>
-              </a:lnSpc>
-              <a:spcBef>
-                <a:spcPts val="0"/>
-              </a:spcBef>
-              <a:buFont typeface="+mj-lt"/>
-              <a:buAutoNum type="arabicPeriod"/>
-            </a:pPr>
-            <a:r>
-              <a:rPr lang="en-US" sz="1600" dirty="0"/>
-              <a:t>World Health Organization. 2018b. “Probability of Dying Per 1000 Live Births.” http://apps.who.int/gho/data/view.main.182?lang=en.</a:t>
+              <a:t>Federal Reserve Bank of St. Louis.  2018.  “Personal Saving as a Percent of Disposable Personal Income.” https://fred.stlouisfed.org/series/A072RC1Q156SBEA.</a:t>
             </a:r>
           </a:p>
         </p:txBody>
@@ -6265,7 +6148,35 @@
           <a:p>
             <a:r>
               <a:rPr lang="en-US" dirty="0"/>
-              <a:t>Text</a:t>
+              <a:t>Analyze US household debt service payments and personal savings as they relate to real per-capita disposable income over time</a:t>
+            </a:r>
+          </a:p>
+          <a:p>
+            <a:pPr lvl="1"/>
+            <a:r>
+              <a:rPr lang="en-US" dirty="0"/>
+              <a:t>Use </a:t>
+            </a:r>
+            <a:r>
+              <a:rPr lang="en-US" dirty="0" err="1"/>
+              <a:t>tidyverse</a:t>
+            </a:r>
+            <a:r>
+              <a:rPr lang="en-US" dirty="0"/>
+              <a:t>-friendly tooling where possible (e.g., </a:t>
+            </a:r>
+            <a:r>
+              <a:rPr lang="en-US" sz="2200" dirty="0">
+                <a:solidFill>
+                  <a:srgbClr val="404040"/>
+                </a:solidFill>
+                <a:latin typeface="Lucida Console" panose="020B0609040504020204" pitchFamily="49" charset="0"/>
+              </a:rPr>
+              <a:t>forecast</a:t>
+            </a:r>
+            <a:r>
+              <a:rPr lang="en-US" dirty="0"/>
+              <a:t> package)</a:t>
             </a:r>
           </a:p>
         </p:txBody>
@@ -6305,121 +6216,6 @@
           <p:cNvPr id="2" name="Title 1">
             <a:extLst>
               <a:ext uri="{FF2B5EF4-FFF2-40B4-BE49-F238E27FC236}">
-                <a16:creationId xmlns:a16="http://schemas.microsoft.com/office/drawing/2014/main" id="{7F4CC3D0-0CA1-49D1-A58D-ED170897A490}"/>
-              </a:ext>
-            </a:extLst>
-          </p:cNvPr>
-          <p:cNvSpPr>
-            <a:spLocks noGrp="1"/>
-          </p:cNvSpPr>
-          <p:nvPr>
-            <p:ph type="title"/>
-          </p:nvPr>
-        </p:nvSpPr>
-        <p:spPr/>
-        <p:txBody>
-          <a:bodyPr/>
-          <a:lstStyle/>
-          <a:p>
-            <a:r>
-              <a:rPr lang="en-US" dirty="0"/>
-              <a:t>METHODS</a:t>
-            </a:r>
-          </a:p>
-        </p:txBody>
-      </p:sp>
-      <p:sp>
-        <p:nvSpPr>
-          <p:cNvPr id="3" name="Content Placeholder 2">
-            <a:extLst>
-              <a:ext uri="{FF2B5EF4-FFF2-40B4-BE49-F238E27FC236}">
-                <a16:creationId xmlns:a16="http://schemas.microsoft.com/office/drawing/2014/main" id="{32F52577-0D70-4F76-A5F5-16B90F38E66F}"/>
-              </a:ext>
-            </a:extLst>
-          </p:cNvPr>
-          <p:cNvSpPr>
-            <a:spLocks noGrp="1"/>
-          </p:cNvSpPr>
-          <p:nvPr>
-            <p:ph idx="1"/>
-          </p:nvPr>
-        </p:nvSpPr>
-        <p:spPr/>
-        <p:txBody>
-          <a:bodyPr>
-            <a:normAutofit/>
-          </a:bodyPr>
-          <a:lstStyle/>
-          <a:p>
-            <a:r>
-              <a:rPr lang="en-US" dirty="0"/>
-              <a:t>Two stages to the analysis:</a:t>
-            </a:r>
-          </a:p>
-          <a:p>
-            <a:pPr marL="914400" lvl="1" indent="-457200">
-              <a:buFont typeface="+mj-lt"/>
-              <a:buAutoNum type="arabicPeriod"/>
-            </a:pPr>
-            <a:r>
-              <a:rPr lang="en-US" dirty="0"/>
-              <a:t>Explore the data</a:t>
-            </a:r>
-          </a:p>
-          <a:p>
-            <a:pPr marL="1371600" lvl="2"/>
-            <a:r>
-              <a:rPr lang="en-US" dirty="0"/>
-              <a:t>Text</a:t>
-            </a:r>
-          </a:p>
-          <a:p>
-            <a:pPr marL="914400" lvl="1" indent="-457200">
-              <a:buFont typeface="+mj-lt"/>
-              <a:buAutoNum type="arabicPeriod"/>
-            </a:pPr>
-            <a:r>
-              <a:rPr lang="en-US" dirty="0"/>
-              <a:t>Text</a:t>
-            </a:r>
-          </a:p>
-        </p:txBody>
-      </p:sp>
-    </p:spTree>
-    <p:extLst>
-      <p:ext uri="{BB962C8B-B14F-4D97-AF65-F5344CB8AC3E}">
-        <p14:creationId xmlns:p14="http://schemas.microsoft.com/office/powerpoint/2010/main" val="768879525"/>
-      </p:ext>
-    </p:extLst>
-  </p:cSld>
-  <p:clrMapOvr>
-    <a:masterClrMapping/>
-  </p:clrMapOvr>
-</p:sld>
-</file>
-
-<file path=ppt/slides/slide5.xml><?xml version="1.0" encoding="utf-8"?>
-<p:sld xmlns:a="http://schemas.openxmlformats.org/drawingml/2006/main" xmlns:r="http://schemas.openxmlformats.org/officeDocument/2006/relationships" xmlns:p="http://schemas.openxmlformats.org/presentationml/2006/main">
-  <p:cSld>
-    <p:spTree>
-      <p:nvGrpSpPr>
-        <p:cNvPr id="1" name=""/>
-        <p:cNvGrpSpPr/>
-        <p:nvPr/>
-      </p:nvGrpSpPr>
-      <p:grpSpPr>
-        <a:xfrm>
-          <a:off x="0" y="0"/>
-          <a:ext cx="0" cy="0"/>
-          <a:chOff x="0" y="0"/>
-          <a:chExt cx="0" cy="0"/>
-        </a:xfrm>
-      </p:grpSpPr>
-      <p:sp>
-        <p:nvSpPr>
-          <p:cNvPr id="2" name="Title 1">
-            <a:extLst>
-              <a:ext uri="{FF2B5EF4-FFF2-40B4-BE49-F238E27FC236}">
                 <a16:creationId xmlns:a16="http://schemas.microsoft.com/office/drawing/2014/main" id="{7E08F702-C1E7-49FE-9B72-7185D7E4F0AC}"/>
               </a:ext>
             </a:extLst>
@@ -6459,7 +6255,7 @@
             <p:ph idx="1"/>
             <p:extLst>
               <p:ext uri="{D42A27DB-BD31-4B8C-83A1-F6EECF244321}">
-                <p14:modId xmlns:p14="http://schemas.microsoft.com/office/powerpoint/2010/main" val="3576753291"/>
+                <p14:modId xmlns:p14="http://schemas.microsoft.com/office/powerpoint/2010/main" val="1316421514"/>
               </p:ext>
             </p:extLst>
           </p:nvPr>
@@ -6532,7 +6328,7 @@
                       <a:r>
                         <a:rPr lang="en-US" sz="2000" b="0" dirty="0" err="1">
                           <a:solidFill>
-                            <a:srgbClr val="545454"/>
+                            <a:srgbClr val="404040"/>
                           </a:solidFill>
                           <a:latin typeface="Lucida Console" panose="020B0609040504020204" pitchFamily="49" charset="0"/>
                         </a:rPr>
@@ -6540,7 +6336,7 @@
                       </a:r>
                       <a:endParaRPr lang="en-US" sz="2000" b="0" dirty="0">
                         <a:solidFill>
-                          <a:srgbClr val="545454"/>
+                          <a:srgbClr val="404040"/>
                         </a:solidFill>
                         <a:latin typeface="Lucida Console" panose="020B0609040504020204" pitchFamily="49" charset="0"/>
                       </a:endParaRPr>
@@ -6580,7 +6376,7 @@
                       <a:r>
                         <a:rPr lang="en-US" sz="2000" b="0" dirty="0" err="1">
                           <a:solidFill>
-                            <a:srgbClr val="545454"/>
+                            <a:srgbClr val="404040"/>
                           </a:solidFill>
                           <a:latin typeface="Lucida Console" panose="020B0609040504020204" pitchFamily="49" charset="0"/>
                         </a:rPr>
@@ -6588,7 +6384,7 @@
                       </a:r>
                       <a:endParaRPr lang="en-US" sz="2000" b="0" dirty="0">
                         <a:solidFill>
-                          <a:srgbClr val="545454"/>
+                          <a:srgbClr val="404040"/>
                         </a:solidFill>
                         <a:latin typeface="Lucida Console" panose="020B0609040504020204" pitchFamily="49" charset="0"/>
                       </a:endParaRPr>
@@ -6628,7 +6424,7 @@
                       <a:r>
                         <a:rPr lang="en-US" sz="2000" b="0" dirty="0" err="1">
                           <a:solidFill>
-                            <a:srgbClr val="545454"/>
+                            <a:srgbClr val="404040"/>
                           </a:solidFill>
                           <a:latin typeface="Lucida Console" panose="020B0609040504020204" pitchFamily="49" charset="0"/>
                         </a:rPr>
@@ -6636,7 +6432,7 @@
                       </a:r>
                       <a:endParaRPr lang="en-US" sz="2000" b="0" dirty="0">
                         <a:solidFill>
-                          <a:srgbClr val="545454"/>
+                          <a:srgbClr val="404040"/>
                         </a:solidFill>
                         <a:latin typeface="Lucida Console" panose="020B0609040504020204" pitchFamily="49" charset="0"/>
                       </a:endParaRPr>
@@ -6903,12 +6699,246 @@
               <a:t>All share a common year of valuation ($US 2012)</a:t>
             </a:r>
           </a:p>
+          <a:p>
+            <a:r>
+              <a:rPr lang="en-US" dirty="0"/>
+              <a:t>All subset to common time horizon (Q1 1980 through Q3 2018)</a:t>
+            </a:r>
+          </a:p>
+          <a:p>
+            <a:pPr lvl="1"/>
+            <a:r>
+              <a:rPr lang="en-US" dirty="0"/>
+              <a:t>155 observations in each TS</a:t>
+            </a:r>
+          </a:p>
         </p:txBody>
       </p:sp>
     </p:spTree>
     <p:extLst>
       <p:ext uri="{BB962C8B-B14F-4D97-AF65-F5344CB8AC3E}">
         <p14:creationId xmlns:p14="http://schemas.microsoft.com/office/powerpoint/2010/main" val="2751398052"/>
+      </p:ext>
+    </p:extLst>
+  </p:cSld>
+  <p:clrMapOvr>
+    <a:masterClrMapping/>
+  </p:clrMapOvr>
+</p:sld>
+</file>
+
+<file path=ppt/slides/slide5.xml><?xml version="1.0" encoding="utf-8"?>
+<p:sld xmlns:a="http://schemas.openxmlformats.org/drawingml/2006/main" xmlns:r="http://schemas.openxmlformats.org/officeDocument/2006/relationships" xmlns:p="http://schemas.openxmlformats.org/presentationml/2006/main">
+  <p:cSld>
+    <p:spTree>
+      <p:nvGrpSpPr>
+        <p:cNvPr id="1" name=""/>
+        <p:cNvGrpSpPr/>
+        <p:nvPr/>
+      </p:nvGrpSpPr>
+      <p:grpSpPr>
+        <a:xfrm>
+          <a:off x="0" y="0"/>
+          <a:ext cx="0" cy="0"/>
+          <a:chOff x="0" y="0"/>
+          <a:chExt cx="0" cy="0"/>
+        </a:xfrm>
+      </p:grpSpPr>
+      <p:sp>
+        <p:nvSpPr>
+          <p:cNvPr id="2" name="Title 1">
+            <a:extLst>
+              <a:ext uri="{FF2B5EF4-FFF2-40B4-BE49-F238E27FC236}">
+                <a16:creationId xmlns:a16="http://schemas.microsoft.com/office/drawing/2014/main" id="{7F4CC3D0-0CA1-49D1-A58D-ED170897A490}"/>
+              </a:ext>
+            </a:extLst>
+          </p:cNvPr>
+          <p:cNvSpPr>
+            <a:spLocks noGrp="1"/>
+          </p:cNvSpPr>
+          <p:nvPr>
+            <p:ph type="title"/>
+          </p:nvPr>
+        </p:nvSpPr>
+        <p:spPr/>
+        <p:txBody>
+          <a:bodyPr/>
+          <a:lstStyle/>
+          <a:p>
+            <a:r>
+              <a:rPr lang="en-US" dirty="0"/>
+              <a:t>METHODS</a:t>
+            </a:r>
+          </a:p>
+        </p:txBody>
+      </p:sp>
+      <p:sp>
+        <p:nvSpPr>
+          <p:cNvPr id="3" name="Content Placeholder 2">
+            <a:extLst>
+              <a:ext uri="{FF2B5EF4-FFF2-40B4-BE49-F238E27FC236}">
+                <a16:creationId xmlns:a16="http://schemas.microsoft.com/office/drawing/2014/main" id="{32F52577-0D70-4F76-A5F5-16B90F38E66F}"/>
+              </a:ext>
+            </a:extLst>
+          </p:cNvPr>
+          <p:cNvSpPr>
+            <a:spLocks noGrp="1"/>
+          </p:cNvSpPr>
+          <p:nvPr>
+            <p:ph idx="1"/>
+          </p:nvPr>
+        </p:nvSpPr>
+        <p:spPr/>
+        <p:txBody>
+          <a:bodyPr>
+            <a:normAutofit/>
+          </a:bodyPr>
+          <a:lstStyle/>
+          <a:p>
+            <a:r>
+              <a:rPr lang="en-US" dirty="0"/>
+              <a:t>Stages to the analysis:</a:t>
+            </a:r>
+          </a:p>
+          <a:p>
+            <a:pPr marL="914400" lvl="1" indent="-457200">
+              <a:buFont typeface="+mj-lt"/>
+              <a:buAutoNum type="arabicPeriod"/>
+            </a:pPr>
+            <a:r>
+              <a:rPr lang="en-US" dirty="0"/>
+              <a:t>Explore the data</a:t>
+            </a:r>
+          </a:p>
+          <a:p>
+            <a:pPr marL="1371600" lvl="2"/>
+            <a:r>
+              <a:rPr lang="en-US">
+                <a:solidFill>
+                  <a:srgbClr val="404040"/>
+                </a:solidFill>
+                <a:latin typeface="Lucida Console" panose="020B0609040504020204" pitchFamily="49" charset="0"/>
+              </a:rPr>
+              <a:t>ggtsdisplay</a:t>
+            </a:r>
+            <a:r>
+              <a:rPr lang="en-US" dirty="0">
+                <a:solidFill>
+                  <a:srgbClr val="404040"/>
+                </a:solidFill>
+                <a:latin typeface="Lucida Console" panose="020B0609040504020204" pitchFamily="49" charset="0"/>
+              </a:rPr>
+              <a:t>()</a:t>
+            </a:r>
+          </a:p>
+          <a:p>
+            <a:pPr marL="1371600" lvl="2"/>
+            <a:r>
+              <a:rPr lang="en-US" dirty="0"/>
+              <a:t>Decomposition</a:t>
+            </a:r>
+          </a:p>
+          <a:p>
+            <a:pPr marL="1371600" lvl="2"/>
+            <a:r>
+              <a:rPr lang="en-US" dirty="0"/>
+              <a:t>CCF</a:t>
+            </a:r>
+          </a:p>
+          <a:p>
+            <a:pPr marL="914400" lvl="1" indent="-457200">
+              <a:buFont typeface="+mj-lt"/>
+              <a:buAutoNum type="arabicPeriod"/>
+            </a:pPr>
+            <a:r>
+              <a:rPr lang="en-US" dirty="0"/>
+              <a:t>Model the data through Q3 2017</a:t>
+            </a:r>
+          </a:p>
+          <a:p>
+            <a:pPr marL="1377950" lvl="2"/>
+            <a:r>
+              <a:rPr lang="en-US" dirty="0" err="1">
+                <a:solidFill>
+                  <a:srgbClr val="404040"/>
+                </a:solidFill>
+                <a:latin typeface="Lucida Console" panose="020B0609040504020204" pitchFamily="49" charset="0"/>
+              </a:rPr>
+              <a:t>auto.arima</a:t>
+            </a:r>
+            <a:r>
+              <a:rPr lang="en-US" dirty="0">
+                <a:solidFill>
+                  <a:srgbClr val="404040"/>
+                </a:solidFill>
+                <a:latin typeface="Lucida Console" panose="020B0609040504020204" pitchFamily="49" charset="0"/>
+              </a:rPr>
+              <a:t>()</a:t>
+            </a:r>
+            <a:r>
+              <a:rPr lang="en-US" dirty="0"/>
+              <a:t>, </a:t>
+            </a:r>
+            <a:r>
+              <a:rPr lang="en-US" dirty="0">
+                <a:solidFill>
+                  <a:srgbClr val="404040"/>
+                </a:solidFill>
+                <a:latin typeface="Lucida Console" panose="020B0609040504020204" pitchFamily="49" charset="0"/>
+              </a:rPr>
+              <a:t>Arima()</a:t>
+            </a:r>
+            <a:r>
+              <a:rPr lang="en-US" dirty="0"/>
+              <a:t>, and </a:t>
+            </a:r>
+            <a:r>
+              <a:rPr lang="en-US" dirty="0" err="1">
+                <a:solidFill>
+                  <a:srgbClr val="404040"/>
+                </a:solidFill>
+                <a:latin typeface="Lucida Console" panose="020B0609040504020204" pitchFamily="49" charset="0"/>
+              </a:rPr>
+              <a:t>checkresiduals</a:t>
+            </a:r>
+            <a:r>
+              <a:rPr lang="en-US" dirty="0">
+                <a:solidFill>
+                  <a:srgbClr val="404040"/>
+                </a:solidFill>
+                <a:latin typeface="Lucida Console" panose="020B0609040504020204" pitchFamily="49" charset="0"/>
+              </a:rPr>
+              <a:t>()</a:t>
+            </a:r>
+          </a:p>
+          <a:p>
+            <a:pPr marL="914400" lvl="1" indent="-457200">
+              <a:buFont typeface="+mj-lt"/>
+              <a:buAutoNum type="arabicPeriod"/>
+            </a:pPr>
+            <a:r>
+              <a:rPr lang="en-US" dirty="0"/>
+              <a:t>Predictions for Q1 2018 – Q3 2018</a:t>
+            </a:r>
+          </a:p>
+          <a:p>
+            <a:pPr marL="1377950" lvl="2"/>
+            <a:r>
+              <a:rPr lang="en-US" dirty="0">
+                <a:solidFill>
+                  <a:srgbClr val="404040"/>
+                </a:solidFill>
+                <a:latin typeface="Lucida Console" panose="020B0609040504020204" pitchFamily="49" charset="0"/>
+              </a:rPr>
+              <a:t>forecast()</a:t>
+            </a:r>
+          </a:p>
+        </p:txBody>
+      </p:sp>
+    </p:spTree>
+    <p:extLst>
+      <p:ext uri="{BB962C8B-B14F-4D97-AF65-F5344CB8AC3E}">
+        <p14:creationId xmlns:p14="http://schemas.microsoft.com/office/powerpoint/2010/main" val="768879525"/>
       </p:ext>
     </p:extLst>
   </p:cSld>
@@ -6986,38 +7016,8 @@
         </p:blipFill>
         <p:spPr>
           <a:xfrm>
-            <a:off x="82809" y="1371600"/>
+            <a:off x="3098746" y="1371600"/>
             <a:ext cx="6013191" cy="4810553"/>
-          </a:xfrm>
-          <a:prstGeom prst="rect">
-            <a:avLst/>
-          </a:prstGeom>
-        </p:spPr>
-      </p:pic>
-      <p:pic>
-        <p:nvPicPr>
-          <p:cNvPr id="11" name="Picture 10">
-            <a:extLst>
-              <a:ext uri="{FF2B5EF4-FFF2-40B4-BE49-F238E27FC236}">
-                <a16:creationId xmlns:a16="http://schemas.microsoft.com/office/drawing/2014/main" id="{C8D3D606-BDD8-429B-812B-250B9CE9A788}"/>
-              </a:ext>
-            </a:extLst>
-          </p:cNvPr>
-          <p:cNvPicPr>
-            <a:picLocks noChangeAspect="1"/>
-          </p:cNvPicPr>
-          <p:nvPr/>
-        </p:nvPicPr>
-        <p:blipFill>
-          <a:blip r:embed="rId3"/>
-          <a:stretch>
-            <a:fillRect/>
-          </a:stretch>
-        </p:blipFill>
-        <p:spPr>
-          <a:xfrm>
-            <a:off x="6082764" y="1371600"/>
-            <a:ext cx="6014676" cy="4811740"/>
           </a:xfrm>
           <a:prstGeom prst="rect">
             <a:avLst/>
@@ -7105,7 +7105,37 @@
         </p:blipFill>
         <p:spPr>
           <a:xfrm>
-            <a:off x="3088662" y="1371600"/>
+            <a:off x="6080760" y="1371600"/>
+            <a:ext cx="6014676" cy="4811740"/>
+          </a:xfrm>
+          <a:prstGeom prst="rect">
+            <a:avLst/>
+          </a:prstGeom>
+        </p:spPr>
+      </p:pic>
+      <p:pic>
+        <p:nvPicPr>
+          <p:cNvPr id="4" name="Picture 3">
+            <a:extLst>
+              <a:ext uri="{FF2B5EF4-FFF2-40B4-BE49-F238E27FC236}">
+                <a16:creationId xmlns:a16="http://schemas.microsoft.com/office/drawing/2014/main" id="{879D9E4E-4160-4849-AF35-02A5DC9E218C}"/>
+              </a:ext>
+            </a:extLst>
+          </p:cNvPr>
+          <p:cNvPicPr>
+            <a:picLocks noChangeAspect="1"/>
+          </p:cNvPicPr>
+          <p:nvPr/>
+        </p:nvPicPr>
+        <p:blipFill>
+          <a:blip r:embed="rId3"/>
+          <a:stretch>
+            <a:fillRect/>
+          </a:stretch>
+        </p:blipFill>
+        <p:spPr>
+          <a:xfrm>
+            <a:off x="82296" y="1371600"/>
             <a:ext cx="6014676" cy="4811740"/>
           </a:xfrm>
           <a:prstGeom prst="rect">
@@ -7283,7 +7313,7 @@
           <a:p>
             <a:r>
               <a:rPr lang="en-US" dirty="0"/>
-              <a:t>ANALYSES PERFORMED</a:t>
+              <a:t>HEADING</a:t>
             </a:r>
           </a:p>
         </p:txBody>

</xml_diff>

<commit_message>
Fleshing out slides; modifying .gitignore
</commit_message>
<xml_diff>
--- a/Prioli_Final_Proj.pptx
+++ b/Prioli_Final_Proj.pptx
@@ -1,11 +1,11 @@
 
 <file path=ppt/presentation.xml><?xml version="1.0" encoding="utf-8"?>
-<p:presentation xmlns:a="http://schemas.openxmlformats.org/drawingml/2006/main" xmlns:r="http://schemas.openxmlformats.org/officeDocument/2006/relationships" xmlns:p="http://schemas.openxmlformats.org/presentationml/2006/main" saveSubsetFonts="1">
+<p:presentation xmlns:a="http://schemas.openxmlformats.org/drawingml/2006/main" xmlns:r="http://schemas.openxmlformats.org/officeDocument/2006/relationships" xmlns:p="http://schemas.openxmlformats.org/presentationml/2006/main" saveSubsetFonts="1" autoCompressPictures="0">
   <p:sldMasterIdLst>
     <p:sldMasterId id="2147483726" r:id="rId1"/>
   </p:sldMasterIdLst>
   <p:notesMasterIdLst>
-    <p:notesMasterId r:id="rId20"/>
+    <p:notesMasterId r:id="rId21"/>
   </p:notesMasterIdLst>
   <p:sldIdLst>
     <p:sldId id="256" r:id="rId2"/>
@@ -20,12 +20,13 @@
     <p:sldId id="288" r:id="rId11"/>
     <p:sldId id="286" r:id="rId12"/>
     <p:sldId id="267" r:id="rId13"/>
-    <p:sldId id="268" r:id="rId14"/>
-    <p:sldId id="279" r:id="rId15"/>
-    <p:sldId id="280" r:id="rId16"/>
-    <p:sldId id="281" r:id="rId17"/>
-    <p:sldId id="262" r:id="rId18"/>
-    <p:sldId id="261" r:id="rId19"/>
+    <p:sldId id="291" r:id="rId14"/>
+    <p:sldId id="292" r:id="rId15"/>
+    <p:sldId id="279" r:id="rId16"/>
+    <p:sldId id="280" r:id="rId17"/>
+    <p:sldId id="281" r:id="rId18"/>
+    <p:sldId id="262" r:id="rId19"/>
+    <p:sldId id="261" r:id="rId20"/>
   </p:sldIdLst>
   <p:sldSz cx="12192000" cy="6858000"/>
   <p:notesSz cx="6858000" cy="9144000"/>
@@ -4029,10 +4030,10 @@
       </p:sp>
       <p:pic>
         <p:nvPicPr>
-          <p:cNvPr id="3" name="Picture 2">
+          <p:cNvPr id="5" name="Picture 4">
             <a:extLst>
               <a:ext uri="{FF2B5EF4-FFF2-40B4-BE49-F238E27FC236}">
-                <a16:creationId xmlns:a16="http://schemas.microsoft.com/office/drawing/2014/main" id="{79928C7D-CC83-4F71-BECA-D8F31E3B8FF0}"/>
+                <a16:creationId xmlns:a16="http://schemas.microsoft.com/office/drawing/2014/main" id="{79FAA1C6-066D-4E43-B03A-9D63BC3E8490}"/>
               </a:ext>
             </a:extLst>
           </p:cNvPr>
@@ -4049,8 +4050,8 @@
         </p:blipFill>
         <p:spPr>
           <a:xfrm>
-            <a:off x="6080760" y="1371600"/>
-            <a:ext cx="6014676" cy="4811740"/>
+            <a:off x="96565" y="1288828"/>
+            <a:ext cx="5892757" cy="2946378"/>
           </a:xfrm>
           <a:prstGeom prst="rect">
             <a:avLst/>
@@ -4059,10 +4060,10 @@
       </p:pic>
       <p:pic>
         <p:nvPicPr>
-          <p:cNvPr id="4" name="Picture 3">
+          <p:cNvPr id="6" name="Picture 5">
             <a:extLst>
               <a:ext uri="{FF2B5EF4-FFF2-40B4-BE49-F238E27FC236}">
-                <a16:creationId xmlns:a16="http://schemas.microsoft.com/office/drawing/2014/main" id="{879D9E4E-4160-4849-AF35-02A5DC9E218C}"/>
+                <a16:creationId xmlns:a16="http://schemas.microsoft.com/office/drawing/2014/main" id="{A9B2EE67-595A-4E46-87A7-B6DC918B9E3E}"/>
               </a:ext>
             </a:extLst>
           </p:cNvPr>
@@ -4079,14 +4080,248 @@
         </p:blipFill>
         <p:spPr>
           <a:xfrm>
-            <a:off x="82296" y="1371600"/>
-            <a:ext cx="6014676" cy="4811740"/>
+            <a:off x="6202680" y="1288828"/>
+            <a:ext cx="5892757" cy="2946378"/>
           </a:xfrm>
           <a:prstGeom prst="rect">
             <a:avLst/>
           </a:prstGeom>
         </p:spPr>
       </p:pic>
+      <p:sp>
+        <p:nvSpPr>
+          <p:cNvPr id="7" name="Content Placeholder 2">
+            <a:extLst>
+              <a:ext uri="{FF2B5EF4-FFF2-40B4-BE49-F238E27FC236}">
+                <a16:creationId xmlns:a16="http://schemas.microsoft.com/office/drawing/2014/main" id="{E262FFB7-121C-4F64-A268-78C787144D24}"/>
+              </a:ext>
+            </a:extLst>
+          </p:cNvPr>
+          <p:cNvSpPr txBox="1">
+            <a:spLocks/>
+          </p:cNvSpPr>
+          <p:nvPr/>
+        </p:nvSpPr>
+        <p:spPr>
+          <a:xfrm>
+            <a:off x="476285" y="4231433"/>
+            <a:ext cx="11213722" cy="2038764"/>
+          </a:xfrm>
+          <a:prstGeom prst="rect">
+            <a:avLst/>
+          </a:prstGeom>
+        </p:spPr>
+        <p:txBody>
+          <a:bodyPr vert="horz" lIns="91440" tIns="45720" rIns="91440" bIns="45720" rtlCol="0">
+            <a:normAutofit/>
+          </a:bodyPr>
+          <a:lstStyle>
+            <a:lvl1pPr marL="228600" indent="-228600" algn="l" defTabSz="914400" rtl="0" eaLnBrk="1" latinLnBrk="0" hangingPunct="1">
+              <a:lnSpc>
+                <a:spcPct val="85000"/>
+              </a:lnSpc>
+              <a:spcBef>
+                <a:spcPts val="1300"/>
+              </a:spcBef>
+              <a:buFont typeface="Arial" panose="020B0604020202020204" pitchFamily="34" charset="0"/>
+              <a:buChar char="•"/>
+              <a:defRPr sz="2800" kern="1200">
+                <a:solidFill>
+                  <a:schemeClr val="tx1">
+                    <a:lumMod val="85000"/>
+                    <a:lumOff val="15000"/>
+                  </a:schemeClr>
+                </a:solidFill>
+                <a:latin typeface="+mn-lt"/>
+                <a:ea typeface="+mn-ea"/>
+                <a:cs typeface="+mn-cs"/>
+              </a:defRPr>
+            </a:lvl1pPr>
+            <a:lvl2pPr marL="685800" indent="-228600" algn="l" defTabSz="914400" rtl="0" eaLnBrk="1" latinLnBrk="0" hangingPunct="1">
+              <a:lnSpc>
+                <a:spcPct val="85000"/>
+              </a:lnSpc>
+              <a:spcBef>
+                <a:spcPts val="600"/>
+              </a:spcBef>
+              <a:buSzPct val="80000"/>
+              <a:buFont typeface="Courier New" panose="02070309020205020404" pitchFamily="49" charset="0"/>
+              <a:buChar char="o"/>
+              <a:defRPr sz="2400" kern="1200">
+                <a:solidFill>
+                  <a:schemeClr val="tx1">
+                    <a:lumMod val="85000"/>
+                    <a:lumOff val="15000"/>
+                  </a:schemeClr>
+                </a:solidFill>
+                <a:latin typeface="+mn-lt"/>
+                <a:ea typeface="+mn-ea"/>
+                <a:cs typeface="+mn-cs"/>
+              </a:defRPr>
+            </a:lvl2pPr>
+            <a:lvl3pPr marL="1143000" indent="-228600" algn="l" defTabSz="914400" rtl="0" eaLnBrk="1" latinLnBrk="0" hangingPunct="1">
+              <a:lnSpc>
+                <a:spcPct val="85000"/>
+              </a:lnSpc>
+              <a:spcBef>
+                <a:spcPts val="600"/>
+              </a:spcBef>
+              <a:buFont typeface="Arial" panose="020B0604020202020204" pitchFamily="34" charset="0"/>
+              <a:buChar char="•"/>
+              <a:defRPr sz="2000" i="0" kern="1200">
+                <a:solidFill>
+                  <a:schemeClr val="tx1">
+                    <a:lumMod val="85000"/>
+                    <a:lumOff val="15000"/>
+                  </a:schemeClr>
+                </a:solidFill>
+                <a:latin typeface="+mn-lt"/>
+                <a:ea typeface="+mn-ea"/>
+                <a:cs typeface="+mn-cs"/>
+              </a:defRPr>
+            </a:lvl3pPr>
+            <a:lvl4pPr marL="1600200" indent="-228600" algn="l" defTabSz="914400" rtl="0" eaLnBrk="1" latinLnBrk="0" hangingPunct="1">
+              <a:lnSpc>
+                <a:spcPct val="85000"/>
+              </a:lnSpc>
+              <a:spcBef>
+                <a:spcPts val="600"/>
+              </a:spcBef>
+              <a:buSzPct val="80000"/>
+              <a:buFont typeface="Courier New" panose="02070309020205020404" pitchFamily="49" charset="0"/>
+              <a:buChar char="o"/>
+              <a:defRPr sz="1800" kern="1200">
+                <a:solidFill>
+                  <a:schemeClr val="tx1">
+                    <a:lumMod val="85000"/>
+                    <a:lumOff val="15000"/>
+                  </a:schemeClr>
+                </a:solidFill>
+                <a:latin typeface="+mn-lt"/>
+                <a:ea typeface="+mn-ea"/>
+                <a:cs typeface="+mn-cs"/>
+              </a:defRPr>
+            </a:lvl4pPr>
+            <a:lvl5pPr marL="2057400" indent="-228600" algn="l" defTabSz="914400" rtl="0" eaLnBrk="1" latinLnBrk="0" hangingPunct="1">
+              <a:lnSpc>
+                <a:spcPct val="85000"/>
+              </a:lnSpc>
+              <a:spcBef>
+                <a:spcPts val="600"/>
+              </a:spcBef>
+              <a:buFont typeface="Arial" panose="020B0604020202020204" pitchFamily="34" charset="0"/>
+              <a:buChar char="•"/>
+              <a:defRPr sz="1600" kern="1200">
+                <a:solidFill>
+                  <a:schemeClr val="tx1">
+                    <a:lumMod val="85000"/>
+                    <a:lumOff val="15000"/>
+                  </a:schemeClr>
+                </a:solidFill>
+                <a:latin typeface="+mn-lt"/>
+                <a:ea typeface="+mn-ea"/>
+                <a:cs typeface="+mn-cs"/>
+              </a:defRPr>
+            </a:lvl5pPr>
+            <a:lvl6pPr marL="1200000" indent="-228600" algn="l" defTabSz="914400" rtl="0" eaLnBrk="1" latinLnBrk="0" hangingPunct="1">
+              <a:lnSpc>
+                <a:spcPct val="85000"/>
+              </a:lnSpc>
+              <a:spcBef>
+                <a:spcPts val="600"/>
+              </a:spcBef>
+              <a:buFont typeface="Arial" pitchFamily="34" charset="0"/>
+              <a:buChar char=" "/>
+              <a:defRPr sz="1800" kern="1200">
+                <a:solidFill>
+                  <a:schemeClr val="tx1">
+                    <a:lumMod val="85000"/>
+                    <a:lumOff val="15000"/>
+                  </a:schemeClr>
+                </a:solidFill>
+                <a:latin typeface="+mn-lt"/>
+                <a:ea typeface="+mn-ea"/>
+                <a:cs typeface="+mn-cs"/>
+              </a:defRPr>
+            </a:lvl6pPr>
+            <a:lvl7pPr marL="1400000" indent="-228600" algn="l" defTabSz="914400" rtl="0" eaLnBrk="1" latinLnBrk="0" hangingPunct="1">
+              <a:lnSpc>
+                <a:spcPct val="85000"/>
+              </a:lnSpc>
+              <a:spcBef>
+                <a:spcPts val="600"/>
+              </a:spcBef>
+              <a:buFont typeface="Arial" pitchFamily="34" charset="0"/>
+              <a:buChar char=" "/>
+              <a:defRPr sz="1800" kern="1200">
+                <a:solidFill>
+                  <a:schemeClr val="tx1">
+                    <a:lumMod val="85000"/>
+                    <a:lumOff val="15000"/>
+                  </a:schemeClr>
+                </a:solidFill>
+                <a:latin typeface="+mn-lt"/>
+                <a:ea typeface="+mn-ea"/>
+                <a:cs typeface="+mn-cs"/>
+              </a:defRPr>
+            </a:lvl7pPr>
+            <a:lvl8pPr marL="1600000" indent="-228600" algn="l" defTabSz="914400" rtl="0" eaLnBrk="1" latinLnBrk="0" hangingPunct="1">
+              <a:lnSpc>
+                <a:spcPct val="85000"/>
+              </a:lnSpc>
+              <a:spcBef>
+                <a:spcPts val="600"/>
+              </a:spcBef>
+              <a:buFont typeface="Arial" pitchFamily="34" charset="0"/>
+              <a:buChar char=" "/>
+              <a:defRPr sz="1800" kern="1200">
+                <a:solidFill>
+                  <a:schemeClr val="tx1">
+                    <a:lumMod val="85000"/>
+                    <a:lumOff val="15000"/>
+                  </a:schemeClr>
+                </a:solidFill>
+                <a:latin typeface="+mn-lt"/>
+                <a:ea typeface="+mn-ea"/>
+                <a:cs typeface="+mn-cs"/>
+              </a:defRPr>
+            </a:lvl8pPr>
+            <a:lvl9pPr marL="1800000" indent="-228600" algn="l" defTabSz="914400" rtl="0" eaLnBrk="1" latinLnBrk="0" hangingPunct="1">
+              <a:lnSpc>
+                <a:spcPct val="85000"/>
+              </a:lnSpc>
+              <a:spcBef>
+                <a:spcPts val="600"/>
+              </a:spcBef>
+              <a:buFont typeface="Arial" pitchFamily="34" charset="0"/>
+              <a:buChar char=" "/>
+              <a:defRPr sz="1800" kern="1200">
+                <a:solidFill>
+                  <a:schemeClr val="tx1">
+                    <a:lumMod val="85000"/>
+                    <a:lumOff val="15000"/>
+                  </a:schemeClr>
+                </a:solidFill>
+                <a:latin typeface="+mn-lt"/>
+                <a:ea typeface="+mn-ea"/>
+                <a:cs typeface="+mn-cs"/>
+              </a:defRPr>
+            </a:lvl9pPr>
+          </a:lstStyle>
+          <a:p>
+            <a:r>
+              <a:rPr lang="en-US" dirty="0"/>
+              <a:t>Both series clearly require differencing (not shown here)</a:t>
+            </a:r>
+          </a:p>
+          <a:p>
+            <a:r>
+              <a:rPr lang="en-US" dirty="0"/>
+              <a:t>Rough relationship seen:  as debt increases, savings decreases</a:t>
+            </a:r>
+          </a:p>
+        </p:txBody>
+      </p:sp>
     </p:spTree>
     <p:extLst>
       <p:ext uri="{BB962C8B-B14F-4D97-AF65-F5344CB8AC3E}">
@@ -4163,7 +4398,7 @@
         </p:nvSpPr>
         <p:spPr>
           <a:xfrm>
-            <a:off x="476285" y="4230648"/>
+            <a:off x="476285" y="4467597"/>
             <a:ext cx="11213722" cy="2199903"/>
           </a:xfrm>
         </p:spPr>
@@ -4202,7 +4437,15 @@
             <a:pPr lvl="1"/>
             <a:r>
               <a:rPr lang="en-US" dirty="0"/>
-              <a:t>Suggests that differenced debt at h=-1 may only be weakly predictive of differenced savings</a:t>
+              <a:t>Suggests that differenced debt at h=-1 may only be </a:t>
+            </a:r>
+            <a:r>
+              <a:rPr lang="en-US" i="1" dirty="0"/>
+              <a:t>weakly</a:t>
+            </a:r>
+            <a:r>
+              <a:rPr lang="en-US" dirty="0"/>
+              <a:t> predictive of differenced savings</a:t>
             </a:r>
           </a:p>
         </p:txBody>
@@ -4229,8 +4472,8 @@
         </p:blipFill>
         <p:spPr>
           <a:xfrm>
-            <a:off x="2638004" y="1243496"/>
-            <a:ext cx="6915992" cy="2766398"/>
+            <a:off x="2089989" y="1167165"/>
+            <a:ext cx="8012022" cy="3204810"/>
           </a:xfrm>
           <a:prstGeom prst="rect">
             <a:avLst/>
@@ -4269,10 +4512,51 @@
       </p:grpSpPr>
       <p:sp>
         <p:nvSpPr>
+          <p:cNvPr id="6" name="Content Placeholder 4">
+            <a:extLst>
+              <a:ext uri="{FF2B5EF4-FFF2-40B4-BE49-F238E27FC236}">
+                <a16:creationId xmlns:a16="http://schemas.microsoft.com/office/drawing/2014/main" id="{C42FB8C5-6DB1-442D-BBFD-86BBCA2F992D}"/>
+              </a:ext>
+            </a:extLst>
+          </p:cNvPr>
+          <p:cNvSpPr>
+            <a:spLocks noGrp="1"/>
+          </p:cNvSpPr>
+          <p:nvPr>
+            <p:ph idx="1"/>
+          </p:nvPr>
+        </p:nvSpPr>
+        <p:spPr>
+          <a:xfrm>
+            <a:off x="476285" y="1288830"/>
+            <a:ext cx="6760900" cy="1286416"/>
+          </a:xfrm>
+        </p:spPr>
+        <p:txBody>
+          <a:bodyPr>
+            <a:normAutofit/>
+          </a:bodyPr>
+          <a:lstStyle/>
+          <a:p>
+            <a:r>
+              <a:rPr lang="en-US" sz="2400" dirty="0"/>
+              <a:t>Model was fit with lagged debt to predict savings (h=-1)</a:t>
+            </a:r>
+          </a:p>
+          <a:p>
+            <a:r>
+              <a:rPr lang="en-US" sz="2400" dirty="0"/>
+              <a:t>Recommended model was ARIMA(1,1,0)</a:t>
+            </a:r>
+          </a:p>
+        </p:txBody>
+      </p:sp>
+      <p:sp>
+        <p:nvSpPr>
           <p:cNvPr id="2" name="Title 1">
             <a:extLst>
               <a:ext uri="{FF2B5EF4-FFF2-40B4-BE49-F238E27FC236}">
-                <a16:creationId xmlns:a16="http://schemas.microsoft.com/office/drawing/2014/main" id="{B7383051-138B-4DB9-9ABB-C3BBE79305E8}"/>
+                <a16:creationId xmlns:a16="http://schemas.microsoft.com/office/drawing/2014/main" id="{B9F118EA-9581-481E-9737-5FBEC7E88C69}"/>
               </a:ext>
             </a:extLst>
           </p:cNvPr>
@@ -4290,40 +4574,710 @@
           <a:p>
             <a:r>
               <a:rPr lang="en-US" dirty="0"/>
-              <a:t>HEADING</a:t>
-            </a:r>
-          </a:p>
-        </p:txBody>
-      </p:sp>
-      <p:sp>
-        <p:nvSpPr>
-          <p:cNvPr id="5" name="Content Placeholder 4">
+              <a:t>MODEL</a:t>
+            </a:r>
+            <a:endParaRPr lang="en-US" sz="3600" dirty="0"/>
+          </a:p>
+        </p:txBody>
+      </p:sp>
+      <p:sp>
+        <p:nvSpPr>
+          <p:cNvPr id="4" name="TextBox 3">
             <a:extLst>
               <a:ext uri="{FF2B5EF4-FFF2-40B4-BE49-F238E27FC236}">
-                <a16:creationId xmlns:a16="http://schemas.microsoft.com/office/drawing/2014/main" id="{C7017BFE-98B3-41BF-AE7C-E6B268B9A67C}"/>
+                <a16:creationId xmlns:a16="http://schemas.microsoft.com/office/drawing/2014/main" id="{E009032F-A42D-4494-AF12-5990B4E594ED}"/>
               </a:ext>
             </a:extLst>
           </p:cNvPr>
-          <p:cNvSpPr>
-            <a:spLocks noGrp="1"/>
-          </p:cNvSpPr>
-          <p:nvPr>
-            <p:ph idx="1"/>
-          </p:nvPr>
-        </p:nvSpPr>
-        <p:spPr/>
-        <p:txBody>
-          <a:bodyPr/>
+          <p:cNvSpPr txBox="1"/>
+          <p:nvPr/>
+        </p:nvSpPr>
+        <p:spPr>
+          <a:xfrm>
+            <a:off x="7236794" y="1288829"/>
+            <a:ext cx="4726605" cy="3893374"/>
+          </a:xfrm>
+          <a:prstGeom prst="rect">
+            <a:avLst/>
+          </a:prstGeom>
+          <a:solidFill>
+            <a:srgbClr val="404040"/>
+          </a:solidFill>
+          <a:ln>
+            <a:solidFill>
+              <a:schemeClr val="tx1"/>
+            </a:solidFill>
+          </a:ln>
+        </p:spPr>
+        <p:txBody>
+          <a:bodyPr wrap="square" rtlCol="0">
+            <a:spAutoFit/>
+          </a:bodyPr>
           <a:lstStyle/>
           <a:p>
-            <a:endParaRPr lang="en-US"/>
-          </a:p>
-        </p:txBody>
-      </p:sp>
+            <a:r>
+              <a:rPr lang="en-US" sz="950" dirty="0">
+                <a:solidFill>
+                  <a:schemeClr val="bg1"/>
+                </a:solidFill>
+                <a:latin typeface="Lucida Console" panose="020B0609040504020204" pitchFamily="49" charset="0"/>
+              </a:rPr>
+              <a:t>Series: </a:t>
+            </a:r>
+            <a:r>
+              <a:rPr lang="en-US" sz="950" dirty="0" err="1">
+                <a:solidFill>
+                  <a:schemeClr val="bg1"/>
+                </a:solidFill>
+                <a:latin typeface="Lucida Console" panose="020B0609040504020204" pitchFamily="49" charset="0"/>
+              </a:rPr>
+              <a:t>savdebt_ts</a:t>
+            </a:r>
+            <a:r>
+              <a:rPr lang="en-US" sz="950" dirty="0">
+                <a:solidFill>
+                  <a:schemeClr val="bg1"/>
+                </a:solidFill>
+                <a:latin typeface="Lucida Console" panose="020B0609040504020204" pitchFamily="49" charset="0"/>
+              </a:rPr>
+              <a:t>[, 2] </a:t>
+            </a:r>
+          </a:p>
+          <a:p>
+            <a:r>
+              <a:rPr lang="en-US" sz="950" dirty="0">
+                <a:solidFill>
+                  <a:schemeClr val="bg1"/>
+                </a:solidFill>
+                <a:latin typeface="Lucida Console" panose="020B0609040504020204" pitchFamily="49" charset="0"/>
+              </a:rPr>
+              <a:t>Regression with ARIMA(1,1,0) errors </a:t>
+            </a:r>
+          </a:p>
+          <a:p>
+            <a:endParaRPr lang="en-US" sz="950" dirty="0">
+              <a:solidFill>
+                <a:schemeClr val="bg1"/>
+              </a:solidFill>
+              <a:latin typeface="Lucida Console" panose="020B0609040504020204" pitchFamily="49" charset="0"/>
+            </a:endParaRPr>
+          </a:p>
+          <a:p>
+            <a:r>
+              <a:rPr lang="en-US" sz="950" dirty="0">
+                <a:solidFill>
+                  <a:schemeClr val="bg1"/>
+                </a:solidFill>
+                <a:latin typeface="Lucida Console" panose="020B0609040504020204" pitchFamily="49" charset="0"/>
+              </a:rPr>
+              <a:t>Coefficients:</a:t>
+            </a:r>
+          </a:p>
+          <a:p>
+            <a:r>
+              <a:rPr lang="en-US" sz="950" dirty="0">
+                <a:solidFill>
+                  <a:schemeClr val="bg1"/>
+                </a:solidFill>
+                <a:latin typeface="Lucida Console" panose="020B0609040504020204" pitchFamily="49" charset="0"/>
+              </a:rPr>
+              <a:t>          ar1     </a:t>
+            </a:r>
+            <a:r>
+              <a:rPr lang="en-US" sz="950" dirty="0" err="1">
+                <a:solidFill>
+                  <a:schemeClr val="bg1"/>
+                </a:solidFill>
+                <a:latin typeface="Lucida Console" panose="020B0609040504020204" pitchFamily="49" charset="0"/>
+              </a:rPr>
+              <a:t>xreg</a:t>
+            </a:r>
+            <a:endParaRPr lang="en-US" sz="950" dirty="0">
+              <a:solidFill>
+                <a:schemeClr val="bg1"/>
+              </a:solidFill>
+              <a:latin typeface="Lucida Console" panose="020B0609040504020204" pitchFamily="49" charset="0"/>
+            </a:endParaRPr>
+          </a:p>
+          <a:p>
+            <a:r>
+              <a:rPr lang="en-US" sz="950" dirty="0">
+                <a:solidFill>
+                  <a:schemeClr val="bg1"/>
+                </a:solidFill>
+                <a:latin typeface="Lucida Console" panose="020B0609040504020204" pitchFamily="49" charset="0"/>
+              </a:rPr>
+              <a:t>      -0.3639  -0.0066</a:t>
+            </a:r>
+          </a:p>
+          <a:p>
+            <a:r>
+              <a:rPr lang="en-US" sz="950" dirty="0" err="1">
+                <a:solidFill>
+                  <a:schemeClr val="bg1"/>
+                </a:solidFill>
+                <a:latin typeface="Lucida Console" panose="020B0609040504020204" pitchFamily="49" charset="0"/>
+              </a:rPr>
+              <a:t>s.e.</a:t>
+            </a:r>
+            <a:r>
+              <a:rPr lang="en-US" sz="950" dirty="0">
+                <a:solidFill>
+                  <a:schemeClr val="bg1"/>
+                </a:solidFill>
+                <a:latin typeface="Lucida Console" panose="020B0609040504020204" pitchFamily="49" charset="0"/>
+              </a:rPr>
+              <a:t>   0.0858   0.4440</a:t>
+            </a:r>
+          </a:p>
+          <a:p>
+            <a:endParaRPr lang="en-US" sz="950" dirty="0">
+              <a:solidFill>
+                <a:schemeClr val="bg1"/>
+              </a:solidFill>
+              <a:latin typeface="Lucida Console" panose="020B0609040504020204" pitchFamily="49" charset="0"/>
+            </a:endParaRPr>
+          </a:p>
+          <a:p>
+            <a:r>
+              <a:rPr lang="en-US" sz="950" dirty="0">
+                <a:solidFill>
+                  <a:schemeClr val="bg1"/>
+                </a:solidFill>
+                <a:latin typeface="Lucida Console" panose="020B0609040504020204" pitchFamily="49" charset="0"/>
+              </a:rPr>
+              <a:t>sigma^2 estimated as 0.5671:  log likelihood=-169.36</a:t>
+            </a:r>
+          </a:p>
+          <a:p>
+            <a:r>
+              <a:rPr lang="en-US" sz="950" dirty="0">
+                <a:solidFill>
+                  <a:schemeClr val="bg1"/>
+                </a:solidFill>
+                <a:latin typeface="Lucida Console" panose="020B0609040504020204" pitchFamily="49" charset="0"/>
+              </a:rPr>
+              <a:t>AIC=344.72   </a:t>
+            </a:r>
+            <a:r>
+              <a:rPr lang="en-US" sz="950" dirty="0" err="1">
+                <a:solidFill>
+                  <a:schemeClr val="bg1"/>
+                </a:solidFill>
+                <a:latin typeface="Lucida Console" panose="020B0609040504020204" pitchFamily="49" charset="0"/>
+              </a:rPr>
+              <a:t>AICc</a:t>
+            </a:r>
+            <a:r>
+              <a:rPr lang="en-US" sz="950" dirty="0">
+                <a:solidFill>
+                  <a:schemeClr val="bg1"/>
+                </a:solidFill>
+                <a:latin typeface="Lucida Console" panose="020B0609040504020204" pitchFamily="49" charset="0"/>
+              </a:rPr>
+              <a:t>=344.89   BIC=353.76</a:t>
+            </a:r>
+          </a:p>
+          <a:p>
+            <a:endParaRPr lang="en-US" sz="950" dirty="0">
+              <a:solidFill>
+                <a:schemeClr val="bg1"/>
+              </a:solidFill>
+              <a:latin typeface="Lucida Console" panose="020B0609040504020204" pitchFamily="49" charset="0"/>
+            </a:endParaRPr>
+          </a:p>
+          <a:p>
+            <a:r>
+              <a:rPr lang="en-US" sz="950" dirty="0">
+                <a:solidFill>
+                  <a:schemeClr val="bg1"/>
+                </a:solidFill>
+                <a:latin typeface="Lucida Console" panose="020B0609040504020204" pitchFamily="49" charset="0"/>
+              </a:rPr>
+              <a:t>z test of coefficients:</a:t>
+            </a:r>
+          </a:p>
+          <a:p>
+            <a:endParaRPr lang="en-US" sz="950" dirty="0">
+              <a:solidFill>
+                <a:schemeClr val="bg1"/>
+              </a:solidFill>
+              <a:latin typeface="Lucida Console" panose="020B0609040504020204" pitchFamily="49" charset="0"/>
+            </a:endParaRPr>
+          </a:p>
+          <a:p>
+            <a:r>
+              <a:rPr lang="en-US" sz="950" dirty="0">
+                <a:solidFill>
+                  <a:schemeClr val="bg1"/>
+                </a:solidFill>
+                <a:latin typeface="Lucida Console" panose="020B0609040504020204" pitchFamily="49" charset="0"/>
+              </a:rPr>
+              <a:t>       Estimate Std. Error z value  </a:t>
+            </a:r>
+            <a:r>
+              <a:rPr lang="en-US" sz="950" dirty="0" err="1">
+                <a:solidFill>
+                  <a:schemeClr val="bg1"/>
+                </a:solidFill>
+                <a:latin typeface="Lucida Console" panose="020B0609040504020204" pitchFamily="49" charset="0"/>
+              </a:rPr>
+              <a:t>Pr</a:t>
+            </a:r>
+            <a:r>
+              <a:rPr lang="en-US" sz="950" dirty="0">
+                <a:solidFill>
+                  <a:schemeClr val="bg1"/>
+                </a:solidFill>
+                <a:latin typeface="Lucida Console" panose="020B0609040504020204" pitchFamily="49" charset="0"/>
+              </a:rPr>
+              <a:t>(&gt;|z|)    </a:t>
+            </a:r>
+          </a:p>
+          <a:p>
+            <a:r>
+              <a:rPr lang="en-US" sz="950" dirty="0">
+                <a:solidFill>
+                  <a:schemeClr val="bg1"/>
+                </a:solidFill>
+                <a:latin typeface="Lucida Console" panose="020B0609040504020204" pitchFamily="49" charset="0"/>
+              </a:rPr>
+              <a:t>ar1  -0.3638799  0.0857849 -4.2418 2.218e-05 ***</a:t>
+            </a:r>
+          </a:p>
+          <a:p>
+            <a:r>
+              <a:rPr lang="en-US" sz="950" dirty="0" err="1">
+                <a:solidFill>
+                  <a:schemeClr val="bg1"/>
+                </a:solidFill>
+                <a:latin typeface="Lucida Console" panose="020B0609040504020204" pitchFamily="49" charset="0"/>
+              </a:rPr>
+              <a:t>xreg</a:t>
+            </a:r>
+            <a:r>
+              <a:rPr lang="en-US" sz="950" dirty="0">
+                <a:solidFill>
+                  <a:schemeClr val="bg1"/>
+                </a:solidFill>
+                <a:latin typeface="Lucida Console" panose="020B0609040504020204" pitchFamily="49" charset="0"/>
+              </a:rPr>
+              <a:t> -0.0065701  0.4439923 -0.0148    0.9882    </a:t>
+            </a:r>
+          </a:p>
+          <a:p>
+            <a:r>
+              <a:rPr lang="en-US" sz="950" dirty="0">
+                <a:solidFill>
+                  <a:schemeClr val="bg1"/>
+                </a:solidFill>
+                <a:latin typeface="Lucida Console" panose="020B0609040504020204" pitchFamily="49" charset="0"/>
+              </a:rPr>
+              <a:t>---</a:t>
+            </a:r>
+          </a:p>
+          <a:p>
+            <a:r>
+              <a:rPr lang="en-US" sz="950" dirty="0" err="1">
+                <a:solidFill>
+                  <a:schemeClr val="bg1"/>
+                </a:solidFill>
+                <a:latin typeface="Lucida Console" panose="020B0609040504020204" pitchFamily="49" charset="0"/>
+              </a:rPr>
+              <a:t>Signif</a:t>
+            </a:r>
+            <a:r>
+              <a:rPr lang="en-US" sz="950" dirty="0">
+                <a:solidFill>
+                  <a:schemeClr val="bg1"/>
+                </a:solidFill>
+                <a:latin typeface="Lucida Console" panose="020B0609040504020204" pitchFamily="49" charset="0"/>
+              </a:rPr>
+              <a:t>. codes:  0 ‘***’ 0.001 ‘**’ 0.01 ‘*’ 0.05 ‘.’ 0.1 ‘ ’ 1</a:t>
+            </a:r>
+          </a:p>
+          <a:p>
+            <a:endParaRPr lang="en-US" sz="950" dirty="0">
+              <a:solidFill>
+                <a:schemeClr val="bg1"/>
+              </a:solidFill>
+              <a:latin typeface="Lucida Console" panose="020B0609040504020204" pitchFamily="49" charset="0"/>
+            </a:endParaRPr>
+          </a:p>
+          <a:p>
+            <a:endParaRPr lang="en-US" sz="950" dirty="0">
+              <a:solidFill>
+                <a:schemeClr val="bg1"/>
+              </a:solidFill>
+              <a:latin typeface="Lucida Console" panose="020B0609040504020204" pitchFamily="49" charset="0"/>
+            </a:endParaRPr>
+          </a:p>
+          <a:p>
+            <a:r>
+              <a:rPr lang="en-US" sz="950" dirty="0">
+                <a:solidFill>
+                  <a:schemeClr val="bg1"/>
+                </a:solidFill>
+                <a:latin typeface="Lucida Console" panose="020B0609040504020204" pitchFamily="49" charset="0"/>
+              </a:rPr>
+              <a:t>	</a:t>
+            </a:r>
+            <a:r>
+              <a:rPr lang="en-US" sz="950" dirty="0" err="1">
+                <a:solidFill>
+                  <a:schemeClr val="bg1"/>
+                </a:solidFill>
+                <a:latin typeface="Lucida Console" panose="020B0609040504020204" pitchFamily="49" charset="0"/>
+              </a:rPr>
+              <a:t>Ljung</a:t>
+            </a:r>
+            <a:r>
+              <a:rPr lang="en-US" sz="950" dirty="0">
+                <a:solidFill>
+                  <a:schemeClr val="bg1"/>
+                </a:solidFill>
+                <a:latin typeface="Lucida Console" panose="020B0609040504020204" pitchFamily="49" charset="0"/>
+              </a:rPr>
+              <a:t>-Box test</a:t>
+            </a:r>
+          </a:p>
+          <a:p>
+            <a:endParaRPr lang="en-US" sz="950" dirty="0">
+              <a:solidFill>
+                <a:schemeClr val="bg1"/>
+              </a:solidFill>
+              <a:latin typeface="Lucida Console" panose="020B0609040504020204" pitchFamily="49" charset="0"/>
+            </a:endParaRPr>
+          </a:p>
+          <a:p>
+            <a:r>
+              <a:rPr lang="en-US" sz="950" dirty="0">
+                <a:solidFill>
+                  <a:schemeClr val="bg1"/>
+                </a:solidFill>
+                <a:latin typeface="Lucida Console" panose="020B0609040504020204" pitchFamily="49" charset="0"/>
+              </a:rPr>
+              <a:t>data:  Residuals from Regression with ARIMA(1,1,0) errors</a:t>
+            </a:r>
+          </a:p>
+          <a:p>
+            <a:r>
+              <a:rPr lang="en-US" sz="950" dirty="0">
+                <a:solidFill>
+                  <a:schemeClr val="bg1"/>
+                </a:solidFill>
+                <a:latin typeface="Lucida Console" panose="020B0609040504020204" pitchFamily="49" charset="0"/>
+              </a:rPr>
+              <a:t>Q* = 7.4125, df = 6, p-value = 0.2844</a:t>
+            </a:r>
+          </a:p>
+          <a:p>
+            <a:endParaRPr lang="en-US" sz="950" dirty="0">
+              <a:solidFill>
+                <a:schemeClr val="bg1"/>
+              </a:solidFill>
+              <a:latin typeface="Lucida Console" panose="020B0609040504020204" pitchFamily="49" charset="0"/>
+            </a:endParaRPr>
+          </a:p>
+          <a:p>
+            <a:r>
+              <a:rPr lang="en-US" sz="950" dirty="0">
+                <a:solidFill>
+                  <a:schemeClr val="bg1"/>
+                </a:solidFill>
+                <a:latin typeface="Lucida Console" panose="020B0609040504020204" pitchFamily="49" charset="0"/>
+              </a:rPr>
+              <a:t>Model df: 2.   Total lags used: 8</a:t>
+            </a:r>
+          </a:p>
+        </p:txBody>
+      </p:sp>
+      <p:sp>
+        <p:nvSpPr>
+          <p:cNvPr id="7" name="Content Placeholder 4">
+            <a:extLst>
+              <a:ext uri="{FF2B5EF4-FFF2-40B4-BE49-F238E27FC236}">
+                <a16:creationId xmlns:a16="http://schemas.microsoft.com/office/drawing/2014/main" id="{5FAEFCA5-A03A-48E7-AC26-83F1A50303E2}"/>
+              </a:ext>
+            </a:extLst>
+          </p:cNvPr>
+          <p:cNvSpPr txBox="1">
+            <a:spLocks/>
+          </p:cNvSpPr>
+          <p:nvPr/>
+        </p:nvSpPr>
+        <p:spPr>
+          <a:xfrm>
+            <a:off x="476284" y="5421094"/>
+            <a:ext cx="11487115" cy="1246406"/>
+          </a:xfrm>
+          <a:prstGeom prst="rect">
+            <a:avLst/>
+          </a:prstGeom>
+        </p:spPr>
+        <p:txBody>
+          <a:bodyPr vert="horz" lIns="91440" tIns="45720" rIns="91440" bIns="45720" rtlCol="0">
+            <a:normAutofit/>
+          </a:bodyPr>
+          <a:lstStyle>
+            <a:lvl1pPr marL="228600" indent="-228600" algn="l" defTabSz="914400" rtl="0" eaLnBrk="1" latinLnBrk="0" hangingPunct="1">
+              <a:lnSpc>
+                <a:spcPct val="85000"/>
+              </a:lnSpc>
+              <a:spcBef>
+                <a:spcPts val="1300"/>
+              </a:spcBef>
+              <a:buFont typeface="Arial" panose="020B0604020202020204" pitchFamily="34" charset="0"/>
+              <a:buChar char="•"/>
+              <a:defRPr sz="2800" kern="1200">
+                <a:solidFill>
+                  <a:schemeClr val="tx1">
+                    <a:lumMod val="85000"/>
+                    <a:lumOff val="15000"/>
+                  </a:schemeClr>
+                </a:solidFill>
+                <a:latin typeface="+mn-lt"/>
+                <a:ea typeface="+mn-ea"/>
+                <a:cs typeface="+mn-cs"/>
+              </a:defRPr>
+            </a:lvl1pPr>
+            <a:lvl2pPr marL="685800" indent="-228600" algn="l" defTabSz="914400" rtl="0" eaLnBrk="1" latinLnBrk="0" hangingPunct="1">
+              <a:lnSpc>
+                <a:spcPct val="85000"/>
+              </a:lnSpc>
+              <a:spcBef>
+                <a:spcPts val="600"/>
+              </a:spcBef>
+              <a:buSzPct val="80000"/>
+              <a:buFont typeface="Courier New" panose="02070309020205020404" pitchFamily="49" charset="0"/>
+              <a:buChar char="o"/>
+              <a:defRPr sz="2400" kern="1200">
+                <a:solidFill>
+                  <a:schemeClr val="tx1">
+                    <a:lumMod val="85000"/>
+                    <a:lumOff val="15000"/>
+                  </a:schemeClr>
+                </a:solidFill>
+                <a:latin typeface="+mn-lt"/>
+                <a:ea typeface="+mn-ea"/>
+                <a:cs typeface="+mn-cs"/>
+              </a:defRPr>
+            </a:lvl2pPr>
+            <a:lvl3pPr marL="1143000" indent="-228600" algn="l" defTabSz="914400" rtl="0" eaLnBrk="1" latinLnBrk="0" hangingPunct="1">
+              <a:lnSpc>
+                <a:spcPct val="85000"/>
+              </a:lnSpc>
+              <a:spcBef>
+                <a:spcPts val="600"/>
+              </a:spcBef>
+              <a:buFont typeface="Arial" panose="020B0604020202020204" pitchFamily="34" charset="0"/>
+              <a:buChar char="•"/>
+              <a:defRPr sz="2000" i="0" kern="1200">
+                <a:solidFill>
+                  <a:schemeClr val="tx1">
+                    <a:lumMod val="85000"/>
+                    <a:lumOff val="15000"/>
+                  </a:schemeClr>
+                </a:solidFill>
+                <a:latin typeface="+mn-lt"/>
+                <a:ea typeface="+mn-ea"/>
+                <a:cs typeface="+mn-cs"/>
+              </a:defRPr>
+            </a:lvl3pPr>
+            <a:lvl4pPr marL="1600200" indent="-228600" algn="l" defTabSz="914400" rtl="0" eaLnBrk="1" latinLnBrk="0" hangingPunct="1">
+              <a:lnSpc>
+                <a:spcPct val="85000"/>
+              </a:lnSpc>
+              <a:spcBef>
+                <a:spcPts val="600"/>
+              </a:spcBef>
+              <a:buSzPct val="80000"/>
+              <a:buFont typeface="Courier New" panose="02070309020205020404" pitchFamily="49" charset="0"/>
+              <a:buChar char="o"/>
+              <a:defRPr sz="1800" kern="1200">
+                <a:solidFill>
+                  <a:schemeClr val="tx1">
+                    <a:lumMod val="85000"/>
+                    <a:lumOff val="15000"/>
+                  </a:schemeClr>
+                </a:solidFill>
+                <a:latin typeface="+mn-lt"/>
+                <a:ea typeface="+mn-ea"/>
+                <a:cs typeface="+mn-cs"/>
+              </a:defRPr>
+            </a:lvl4pPr>
+            <a:lvl5pPr marL="2057400" indent="-228600" algn="l" defTabSz="914400" rtl="0" eaLnBrk="1" latinLnBrk="0" hangingPunct="1">
+              <a:lnSpc>
+                <a:spcPct val="85000"/>
+              </a:lnSpc>
+              <a:spcBef>
+                <a:spcPts val="600"/>
+              </a:spcBef>
+              <a:buFont typeface="Arial" panose="020B0604020202020204" pitchFamily="34" charset="0"/>
+              <a:buChar char="•"/>
+              <a:defRPr sz="1600" kern="1200">
+                <a:solidFill>
+                  <a:schemeClr val="tx1">
+                    <a:lumMod val="85000"/>
+                    <a:lumOff val="15000"/>
+                  </a:schemeClr>
+                </a:solidFill>
+                <a:latin typeface="+mn-lt"/>
+                <a:ea typeface="+mn-ea"/>
+                <a:cs typeface="+mn-cs"/>
+              </a:defRPr>
+            </a:lvl5pPr>
+            <a:lvl6pPr marL="1200000" indent="-228600" algn="l" defTabSz="914400" rtl="0" eaLnBrk="1" latinLnBrk="0" hangingPunct="1">
+              <a:lnSpc>
+                <a:spcPct val="85000"/>
+              </a:lnSpc>
+              <a:spcBef>
+                <a:spcPts val="600"/>
+              </a:spcBef>
+              <a:buFont typeface="Arial" pitchFamily="34" charset="0"/>
+              <a:buChar char=" "/>
+              <a:defRPr sz="1800" kern="1200">
+                <a:solidFill>
+                  <a:schemeClr val="tx1">
+                    <a:lumMod val="85000"/>
+                    <a:lumOff val="15000"/>
+                  </a:schemeClr>
+                </a:solidFill>
+                <a:latin typeface="+mn-lt"/>
+                <a:ea typeface="+mn-ea"/>
+                <a:cs typeface="+mn-cs"/>
+              </a:defRPr>
+            </a:lvl6pPr>
+            <a:lvl7pPr marL="1400000" indent="-228600" algn="l" defTabSz="914400" rtl="0" eaLnBrk="1" latinLnBrk="0" hangingPunct="1">
+              <a:lnSpc>
+                <a:spcPct val="85000"/>
+              </a:lnSpc>
+              <a:spcBef>
+                <a:spcPts val="600"/>
+              </a:spcBef>
+              <a:buFont typeface="Arial" pitchFamily="34" charset="0"/>
+              <a:buChar char=" "/>
+              <a:defRPr sz="1800" kern="1200">
+                <a:solidFill>
+                  <a:schemeClr val="tx1">
+                    <a:lumMod val="85000"/>
+                    <a:lumOff val="15000"/>
+                  </a:schemeClr>
+                </a:solidFill>
+                <a:latin typeface="+mn-lt"/>
+                <a:ea typeface="+mn-ea"/>
+                <a:cs typeface="+mn-cs"/>
+              </a:defRPr>
+            </a:lvl7pPr>
+            <a:lvl8pPr marL="1600000" indent="-228600" algn="l" defTabSz="914400" rtl="0" eaLnBrk="1" latinLnBrk="0" hangingPunct="1">
+              <a:lnSpc>
+                <a:spcPct val="85000"/>
+              </a:lnSpc>
+              <a:spcBef>
+                <a:spcPts val="600"/>
+              </a:spcBef>
+              <a:buFont typeface="Arial" pitchFamily="34" charset="0"/>
+              <a:buChar char=" "/>
+              <a:defRPr sz="1800" kern="1200">
+                <a:solidFill>
+                  <a:schemeClr val="tx1">
+                    <a:lumMod val="85000"/>
+                    <a:lumOff val="15000"/>
+                  </a:schemeClr>
+                </a:solidFill>
+                <a:latin typeface="+mn-lt"/>
+                <a:ea typeface="+mn-ea"/>
+                <a:cs typeface="+mn-cs"/>
+              </a:defRPr>
+            </a:lvl8pPr>
+            <a:lvl9pPr marL="1800000" indent="-228600" algn="l" defTabSz="914400" rtl="0" eaLnBrk="1" latinLnBrk="0" hangingPunct="1">
+              <a:lnSpc>
+                <a:spcPct val="85000"/>
+              </a:lnSpc>
+              <a:spcBef>
+                <a:spcPts val="600"/>
+              </a:spcBef>
+              <a:buFont typeface="Arial" pitchFamily="34" charset="0"/>
+              <a:buChar char=" "/>
+              <a:defRPr sz="1800" kern="1200">
+                <a:solidFill>
+                  <a:schemeClr val="tx1">
+                    <a:lumMod val="85000"/>
+                    <a:lumOff val="15000"/>
+                  </a:schemeClr>
+                </a:solidFill>
+                <a:latin typeface="+mn-lt"/>
+                <a:ea typeface="+mn-ea"/>
+                <a:cs typeface="+mn-cs"/>
+              </a:defRPr>
+            </a:lvl9pPr>
+          </a:lstStyle>
+          <a:p>
+            <a:pPr>
+              <a:lnSpc>
+                <a:spcPct val="75000"/>
+              </a:lnSpc>
+            </a:pPr>
+            <a:r>
+              <a:rPr lang="en-US" sz="2400" dirty="0"/>
+              <a:t>Histogram shows reasonable normality for bulk of data but tails deviate from normality</a:t>
+            </a:r>
+          </a:p>
+          <a:p>
+            <a:pPr>
+              <a:lnSpc>
+                <a:spcPct val="75000"/>
+              </a:lnSpc>
+            </a:pPr>
+            <a:r>
+              <a:rPr lang="en-US" sz="2400" dirty="0"/>
+              <a:t>ACF looks like white noise and </a:t>
+            </a:r>
+            <a:r>
+              <a:rPr lang="en-US" sz="2400" dirty="0" err="1"/>
+              <a:t>Ljung</a:t>
+            </a:r>
+            <a:r>
+              <a:rPr lang="en-US" sz="2400" dirty="0"/>
+              <a:t>-Box test is NSS over 8 lags, thus residuals are consistent with white noise</a:t>
+            </a:r>
+          </a:p>
+        </p:txBody>
+      </p:sp>
+      <p:pic>
+        <p:nvPicPr>
+          <p:cNvPr id="5" name="Picture 4">
+            <a:extLst>
+              <a:ext uri="{FF2B5EF4-FFF2-40B4-BE49-F238E27FC236}">
+                <a16:creationId xmlns:a16="http://schemas.microsoft.com/office/drawing/2014/main" id="{A7A8B684-D05D-4B1E-8334-A88C30D0597D}"/>
+              </a:ext>
+            </a:extLst>
+          </p:cNvPr>
+          <p:cNvPicPr>
+            <a:picLocks noChangeAspect="1"/>
+          </p:cNvPicPr>
+          <p:nvPr/>
+        </p:nvPicPr>
+        <p:blipFill>
+          <a:blip r:embed="rId2"/>
+          <a:stretch>
+            <a:fillRect/>
+          </a:stretch>
+        </p:blipFill>
+        <p:spPr>
+          <a:xfrm>
+            <a:off x="475902" y="2575246"/>
+            <a:ext cx="6517393" cy="2606957"/>
+          </a:xfrm>
+          <a:prstGeom prst="rect">
+            <a:avLst/>
+          </a:prstGeom>
+        </p:spPr>
+      </p:pic>
     </p:spTree>
     <p:extLst>
       <p:ext uri="{BB962C8B-B14F-4D97-AF65-F5344CB8AC3E}">
-        <p14:creationId xmlns:p14="http://schemas.microsoft.com/office/powerpoint/2010/main" val="2107817399"/>
+        <p14:creationId xmlns:p14="http://schemas.microsoft.com/office/powerpoint/2010/main" val="3794638764"/>
       </p:ext>
     </p:extLst>
   </p:cSld>
@@ -4350,12 +5304,48 @@
           <a:chExt cx="0" cy="0"/>
         </a:xfrm>
       </p:grpSpPr>
+      <p:pic>
+        <p:nvPicPr>
+          <p:cNvPr id="5" name="Picture 4">
+            <a:extLst>
+              <a:ext uri="{FF2B5EF4-FFF2-40B4-BE49-F238E27FC236}">
+                <a16:creationId xmlns:a16="http://schemas.microsoft.com/office/drawing/2014/main" id="{49EDB50A-7D96-4F37-B433-65E0221BD3E8}"/>
+              </a:ext>
+            </a:extLst>
+          </p:cNvPr>
+          <p:cNvPicPr>
+            <a:picLocks noChangeAspect="1"/>
+          </p:cNvPicPr>
+          <p:nvPr/>
+        </p:nvPicPr>
+        <p:blipFill>
+          <a:blip r:embed="rId2">
+            <a:extLst>
+              <a:ext uri="{96DAC541-7B7A-43D3-8B79-37D633B846F1}">
+                <asvg:svgBlip xmlns:asvg="http://schemas.microsoft.com/office/drawing/2016/SVG/main" r:embed="rId3"/>
+              </a:ext>
+            </a:extLst>
+          </a:blip>
+          <a:stretch>
+            <a:fillRect/>
+          </a:stretch>
+        </p:blipFill>
+        <p:spPr>
+          <a:xfrm>
+            <a:off x="1290177" y="1288829"/>
+            <a:ext cx="8469782" cy="3387912"/>
+          </a:xfrm>
+          <a:prstGeom prst="rect">
+            <a:avLst/>
+          </a:prstGeom>
+        </p:spPr>
+      </p:pic>
       <p:sp>
         <p:nvSpPr>
           <p:cNvPr id="2" name="Title 1">
             <a:extLst>
               <a:ext uri="{FF2B5EF4-FFF2-40B4-BE49-F238E27FC236}">
-                <a16:creationId xmlns:a16="http://schemas.microsoft.com/office/drawing/2014/main" id="{F7038F4E-C17C-476A-A8D5-BB1DF1332FAB}"/>
+                <a16:creationId xmlns:a16="http://schemas.microsoft.com/office/drawing/2014/main" id="{B9F118EA-9581-481E-9737-5FBEC7E88C69}"/>
               </a:ext>
             </a:extLst>
           </p:cNvPr>
@@ -4373,20 +5363,248 @@
           <a:p>
             <a:r>
               <a:rPr lang="en-US" dirty="0"/>
-              <a:t>DISCUSSION</a:t>
-            </a:r>
-          </a:p>
-        </p:txBody>
-      </p:sp>
-      <p:sp>
-        <p:nvSpPr>
-          <p:cNvPr id="3" name="Content Placeholder 2">
+              <a:t>FORECASTS</a:t>
+            </a:r>
+            <a:endParaRPr lang="en-US" sz="3600" dirty="0"/>
+          </a:p>
+        </p:txBody>
+      </p:sp>
+      <p:pic>
+        <p:nvPicPr>
+          <p:cNvPr id="6" name="Picture 5">
             <a:extLst>
               <a:ext uri="{FF2B5EF4-FFF2-40B4-BE49-F238E27FC236}">
-                <a16:creationId xmlns:a16="http://schemas.microsoft.com/office/drawing/2014/main" id="{22E7DCC7-2736-4166-86E2-FBBC23519826}"/>
+                <a16:creationId xmlns:a16="http://schemas.microsoft.com/office/drawing/2014/main" id="{E2957F3D-B83B-43F5-9472-48F255AA7741}"/>
               </a:ext>
             </a:extLst>
           </p:cNvPr>
+          <p:cNvPicPr>
+            <a:picLocks noChangeAspect="1"/>
+          </p:cNvPicPr>
+          <p:nvPr/>
+        </p:nvPicPr>
+        <p:blipFill rotWithShape="1">
+          <a:blip r:embed="rId2">
+            <a:extLst>
+              <a:ext uri="{96DAC541-7B7A-43D3-8B79-37D633B846F1}">
+                <asvg:svgBlip xmlns:asvg="http://schemas.microsoft.com/office/drawing/2016/SVG/main" r:embed="rId3"/>
+              </a:ext>
+            </a:extLst>
+          </a:blip>
+          <a:srcRect l="91774" t="49916" r="3786" b="38889"/>
+          <a:stretch/>
+        </p:blipFill>
+        <p:spPr>
+          <a:xfrm>
+            <a:off x="10196512" y="3024873"/>
+            <a:ext cx="1347788" cy="1359419"/>
+          </a:xfrm>
+          <a:prstGeom prst="rect">
+            <a:avLst/>
+          </a:prstGeom>
+          <a:ln w="28575">
+            <a:solidFill>
+              <a:schemeClr val="accent1"/>
+            </a:solidFill>
+          </a:ln>
+        </p:spPr>
+      </p:pic>
+      <p:sp>
+        <p:nvSpPr>
+          <p:cNvPr id="7" name="Rectangle 6">
+            <a:extLst>
+              <a:ext uri="{FF2B5EF4-FFF2-40B4-BE49-F238E27FC236}">
+                <a16:creationId xmlns:a16="http://schemas.microsoft.com/office/drawing/2014/main" id="{E527C6F7-1AC1-4BD5-BC22-F78B905F9AF8}"/>
+              </a:ext>
+            </a:extLst>
+          </p:cNvPr>
+          <p:cNvSpPr/>
+          <p:nvPr/>
+        </p:nvSpPr>
+        <p:spPr>
+          <a:xfrm>
+            <a:off x="9092525" y="2982785"/>
+            <a:ext cx="330586" cy="334718"/>
+          </a:xfrm>
+          <a:prstGeom prst="rect">
+            <a:avLst/>
+          </a:prstGeom>
+          <a:noFill/>
+          <a:ln w="28575">
+            <a:solidFill>
+              <a:schemeClr val="accent1"/>
+            </a:solidFill>
+          </a:ln>
+        </p:spPr>
+        <p:style>
+          <a:lnRef idx="2">
+            <a:schemeClr val="accent1">
+              <a:shade val="50000"/>
+            </a:schemeClr>
+          </a:lnRef>
+          <a:fillRef idx="1">
+            <a:schemeClr val="accent1"/>
+          </a:fillRef>
+          <a:effectRef idx="0">
+            <a:schemeClr val="accent1"/>
+          </a:effectRef>
+          <a:fontRef idx="minor">
+            <a:schemeClr val="lt1"/>
+          </a:fontRef>
+        </p:style>
+        <p:txBody>
+          <a:bodyPr rtlCol="0" anchor="ctr"/>
+          <a:lstStyle/>
+          <a:p>
+            <a:pPr algn="ctr"/>
+            <a:endParaRPr lang="en-US"/>
+          </a:p>
+        </p:txBody>
+      </p:sp>
+      <p:pic>
+        <p:nvPicPr>
+          <p:cNvPr id="9" name="Graphic 8" descr="Line arrow: Counter-clockwise curve">
+            <a:extLst>
+              <a:ext uri="{FF2B5EF4-FFF2-40B4-BE49-F238E27FC236}">
+                <a16:creationId xmlns:a16="http://schemas.microsoft.com/office/drawing/2014/main" id="{2C34CAB8-93C3-4E5F-AA31-E726F8E4A026}"/>
+              </a:ext>
+            </a:extLst>
+          </p:cNvPr>
+          <p:cNvPicPr>
+            <a:picLocks noChangeAspect="1"/>
+          </p:cNvPicPr>
+          <p:nvPr/>
+        </p:nvPicPr>
+        <p:blipFill>
+          <a:blip r:embed="rId4">
+            <a:extLst>
+              <a:ext uri="{28A0092B-C50C-407E-A947-70E740481C1C}">
+                <a14:useLocalDpi xmlns:a14="http://schemas.microsoft.com/office/drawing/2010/main" val="0"/>
+              </a:ext>
+              <a:ext uri="{96DAC541-7B7A-43D3-8B79-37D633B846F1}">
+                <asvg:svgBlip xmlns:asvg="http://schemas.microsoft.com/office/drawing/2016/SVG/main" r:embed="rId5"/>
+              </a:ext>
+            </a:extLst>
+          </a:blip>
+          <a:stretch>
+            <a:fillRect/>
+          </a:stretch>
+        </p:blipFill>
+        <p:spPr>
+          <a:xfrm rot="7629903">
+            <a:off x="9236633" y="3222391"/>
+            <a:ext cx="896685" cy="807131"/>
+          </a:xfrm>
+          <a:prstGeom prst="rect">
+            <a:avLst/>
+          </a:prstGeom>
+        </p:spPr>
+      </p:pic>
+      <p:sp>
+        <p:nvSpPr>
+          <p:cNvPr id="10" name="TextBox 9">
+            <a:extLst>
+              <a:ext uri="{FF2B5EF4-FFF2-40B4-BE49-F238E27FC236}">
+                <a16:creationId xmlns:a16="http://schemas.microsoft.com/office/drawing/2014/main" id="{4CF68A60-E295-4741-B25D-ACFF95DB6017}"/>
+              </a:ext>
+            </a:extLst>
+          </p:cNvPr>
+          <p:cNvSpPr txBox="1"/>
+          <p:nvPr/>
+        </p:nvSpPr>
+        <p:spPr>
+          <a:xfrm>
+            <a:off x="6196791" y="5160612"/>
+            <a:ext cx="5760208" cy="1015663"/>
+          </a:xfrm>
+          <a:prstGeom prst="rect">
+            <a:avLst/>
+          </a:prstGeom>
+          <a:solidFill>
+            <a:srgbClr val="404040"/>
+          </a:solidFill>
+          <a:ln>
+            <a:solidFill>
+              <a:schemeClr val="tx1"/>
+            </a:solidFill>
+          </a:ln>
+        </p:spPr>
+        <p:txBody>
+          <a:bodyPr wrap="square" rtlCol="0">
+            <a:spAutoFit/>
+          </a:bodyPr>
+          <a:lstStyle/>
+          <a:p>
+            <a:pPr algn="ctr"/>
+            <a:r>
+              <a:rPr lang="en-US" sz="1200" dirty="0">
+                <a:solidFill>
+                  <a:schemeClr val="bg1"/>
+                </a:solidFill>
+                <a:latin typeface="Lucida Console" panose="020B0609040504020204" pitchFamily="49" charset="0"/>
+              </a:rPr>
+              <a:t>|Timepoint | Predicted Values| Actual Values| Percent Error|</a:t>
+            </a:r>
+          </a:p>
+          <a:p>
+            <a:pPr algn="ctr"/>
+            <a:r>
+              <a:rPr lang="en-US" sz="1200" dirty="0">
+                <a:solidFill>
+                  <a:schemeClr val="bg1"/>
+                </a:solidFill>
+                <a:latin typeface="Lucida Console" panose="020B0609040504020204" pitchFamily="49" charset="0"/>
+              </a:rPr>
+              <a:t>|:---------|----------------:|-------------:|-------------:|</a:t>
+            </a:r>
+          </a:p>
+          <a:p>
+            <a:pPr algn="ctr"/>
+            <a:r>
+              <a:rPr lang="en-US" sz="1200" dirty="0">
+                <a:solidFill>
+                  <a:schemeClr val="bg1"/>
+                </a:solidFill>
+                <a:latin typeface="Lucida Console" panose="020B0609040504020204" pitchFamily="49" charset="0"/>
+              </a:rPr>
+              <a:t>|Q1 2018   |             6.45|           7.2|        -10.42|</a:t>
+            </a:r>
+          </a:p>
+          <a:p>
+            <a:pPr algn="ctr"/>
+            <a:r>
+              <a:rPr lang="en-US" sz="1200" dirty="0">
+                <a:solidFill>
+                  <a:schemeClr val="bg1"/>
+                </a:solidFill>
+                <a:latin typeface="Lucida Console" panose="020B0609040504020204" pitchFamily="49" charset="0"/>
+              </a:rPr>
+              <a:t>|Q2 2018   |             6.39|           6.7|         -4.63|</a:t>
+            </a:r>
+          </a:p>
+          <a:p>
+            <a:pPr algn="ctr"/>
+            <a:r>
+              <a:rPr lang="en-US" sz="1200" dirty="0">
+                <a:solidFill>
+                  <a:schemeClr val="bg1"/>
+                </a:solidFill>
+                <a:latin typeface="Lucida Console" panose="020B0609040504020204" pitchFamily="49" charset="0"/>
+              </a:rPr>
+              <a:t>|Q3 2018   |             6.41|           6.3|          1.75|</a:t>
+            </a:r>
+          </a:p>
+        </p:txBody>
+      </p:sp>
+      <p:sp>
+        <p:nvSpPr>
+          <p:cNvPr id="13" name="Content Placeholder 4">
+            <a:extLst>
+              <a:ext uri="{FF2B5EF4-FFF2-40B4-BE49-F238E27FC236}">
+                <a16:creationId xmlns:a16="http://schemas.microsoft.com/office/drawing/2014/main" id="{3F97CE57-25E2-4643-9828-437258EDA577}"/>
+              </a:ext>
+            </a:extLst>
+          </p:cNvPr>
           <p:cNvSpPr>
             <a:spLocks noGrp="1"/>
           </p:cNvSpPr>
@@ -4394,25 +5612,41 @@
             <p:ph idx="1"/>
           </p:nvPr>
         </p:nvSpPr>
-        <p:spPr/>
-        <p:txBody>
-          <a:bodyPr/>
+        <p:spPr>
+          <a:xfrm>
+            <a:off x="476285" y="4676742"/>
+            <a:ext cx="5619715" cy="1977515"/>
+          </a:xfrm>
+        </p:spPr>
+        <p:txBody>
+          <a:bodyPr>
+            <a:normAutofit lnSpcReduction="10000"/>
+          </a:bodyPr>
           <a:lstStyle/>
           <a:p>
             <a:r>
-              <a:rPr lang="en-US" dirty="0"/>
-              <a:t>Text</a:t>
-            </a:r>
-          </a:p>
-          <a:p>
-            <a:endParaRPr lang="en-US" dirty="0"/>
+              <a:rPr lang="en-US" sz="2400" dirty="0"/>
+              <a:t>Predictions aren’t terrible but not great, consistent with expectations per CCF plot</a:t>
+            </a:r>
+          </a:p>
+          <a:p>
+            <a:r>
+              <a:rPr lang="en-US" sz="2400" dirty="0"/>
+              <a:t>Error ranges from ~2% to ~10.5% in magnitude</a:t>
+            </a:r>
+          </a:p>
+          <a:p>
+            <a:r>
+              <a:rPr lang="en-US" sz="2400" dirty="0"/>
+              <a:t>Observed values are within 95% CI</a:t>
+            </a:r>
           </a:p>
         </p:txBody>
       </p:sp>
     </p:spTree>
     <p:extLst>
       <p:ext uri="{BB962C8B-B14F-4D97-AF65-F5344CB8AC3E}">
-        <p14:creationId xmlns:p14="http://schemas.microsoft.com/office/powerpoint/2010/main" val="1765256109"/>
+        <p14:creationId xmlns:p14="http://schemas.microsoft.com/office/powerpoint/2010/main" val="1360571537"/>
       </p:ext>
     </p:extLst>
   </p:cSld>
@@ -4444,7 +5678,7 @@
           <p:cNvPr id="2" name="Title 1">
             <a:extLst>
               <a:ext uri="{FF2B5EF4-FFF2-40B4-BE49-F238E27FC236}">
-                <a16:creationId xmlns:a16="http://schemas.microsoft.com/office/drawing/2014/main" id="{219FC961-4E73-41A2-A54A-93E766693C90}"/>
+                <a16:creationId xmlns:a16="http://schemas.microsoft.com/office/drawing/2014/main" id="{F7038F4E-C17C-476A-A8D5-BB1DF1332FAB}"/>
               </a:ext>
             </a:extLst>
           </p:cNvPr>
@@ -4462,7 +5696,7 @@
           <a:p>
             <a:r>
               <a:rPr lang="en-US" dirty="0"/>
-              <a:t>LIMITATIONS</a:t>
+              <a:t>DISCUSSION</a:t>
             </a:r>
           </a:p>
         </p:txBody>
@@ -4472,7 +5706,7 @@
           <p:cNvPr id="3" name="Content Placeholder 2">
             <a:extLst>
               <a:ext uri="{FF2B5EF4-FFF2-40B4-BE49-F238E27FC236}">
-                <a16:creationId xmlns:a16="http://schemas.microsoft.com/office/drawing/2014/main" id="{148AF7E9-44A2-48A8-A8CF-67A80389B59B}"/>
+                <a16:creationId xmlns:a16="http://schemas.microsoft.com/office/drawing/2014/main" id="{22E7DCC7-2736-4166-86E2-FBBC23519826}"/>
               </a:ext>
             </a:extLst>
           </p:cNvPr>
@@ -4485,22 +5719,74 @@
         </p:nvSpPr>
         <p:spPr/>
         <p:txBody>
-          <a:bodyPr>
-            <a:normAutofit/>
-          </a:bodyPr>
+          <a:bodyPr/>
           <a:lstStyle/>
           <a:p>
             <a:r>
               <a:rPr lang="en-US" dirty="0"/>
-              <a:t>Text</a:t>
-            </a:r>
+              <a:t>Model for disposable personal income worked very well for forecasting</a:t>
+            </a:r>
+          </a:p>
+          <a:p>
+            <a:r>
+              <a:rPr lang="en-US" dirty="0"/>
+              <a:t>Model for savings vs. debt worked passably for forecasting</a:t>
+            </a:r>
+          </a:p>
+          <a:p>
+            <a:pPr lvl="1"/>
+            <a:r>
+              <a:rPr lang="en-US" dirty="0"/>
+              <a:t>Suggests another predictor may be needed</a:t>
+            </a:r>
+          </a:p>
+          <a:p>
+            <a:pPr lvl="2"/>
+            <a:r>
+              <a:rPr lang="en-US" dirty="0"/>
+              <a:t>Consider including a predictor for nonessential spending (e.g., recreation, dining out)</a:t>
+            </a:r>
+          </a:p>
+          <a:p>
+            <a:pPr lvl="1"/>
+            <a:r>
+              <a:rPr lang="en-US" dirty="0"/>
+              <a:t>Smoothing may help improve predictions when they occur at turning points</a:t>
+            </a:r>
+          </a:p>
+          <a:p>
+            <a:r>
+              <a:rPr lang="en-US" dirty="0"/>
+              <a:t>Toolset provided by </a:t>
+            </a:r>
+            <a:r>
+              <a:rPr lang="en-US" sz="2400" dirty="0">
+                <a:latin typeface="Lucida Console" panose="020B0609040504020204" pitchFamily="49" charset="0"/>
+              </a:rPr>
+              <a:t>forecast</a:t>
+            </a:r>
+            <a:r>
+              <a:rPr lang="en-US" dirty="0"/>
+              <a:t> package is easy to use, well documented, and plays well with </a:t>
+            </a:r>
+            <a:r>
+              <a:rPr lang="en-US" dirty="0" err="1"/>
+              <a:t>tidyverse</a:t>
+            </a:r>
+            <a:r>
+              <a:rPr lang="en-US" dirty="0"/>
+              <a:t> syntax and functions</a:t>
+            </a:r>
+          </a:p>
+          <a:p>
+            <a:endParaRPr lang="en-US" dirty="0"/>
           </a:p>
         </p:txBody>
       </p:sp>
     </p:spTree>
     <p:extLst>
       <p:ext uri="{BB962C8B-B14F-4D97-AF65-F5344CB8AC3E}">
-        <p14:creationId xmlns:p14="http://schemas.microsoft.com/office/powerpoint/2010/main" val="1263930634"/>
+        <p14:creationId xmlns:p14="http://schemas.microsoft.com/office/powerpoint/2010/main" val="1765256109"/>
       </p:ext>
     </p:extLst>
   </p:cSld>
@@ -4532,6 +5818,129 @@
           <p:cNvPr id="2" name="Title 1">
             <a:extLst>
               <a:ext uri="{FF2B5EF4-FFF2-40B4-BE49-F238E27FC236}">
+                <a16:creationId xmlns:a16="http://schemas.microsoft.com/office/drawing/2014/main" id="{219FC961-4E73-41A2-A54A-93E766693C90}"/>
+              </a:ext>
+            </a:extLst>
+          </p:cNvPr>
+          <p:cNvSpPr>
+            <a:spLocks noGrp="1"/>
+          </p:cNvSpPr>
+          <p:nvPr>
+            <p:ph type="title"/>
+          </p:nvPr>
+        </p:nvSpPr>
+        <p:spPr/>
+        <p:txBody>
+          <a:bodyPr/>
+          <a:lstStyle/>
+          <a:p>
+            <a:r>
+              <a:rPr lang="en-US" dirty="0"/>
+              <a:t>LIMITATIONS</a:t>
+            </a:r>
+          </a:p>
+        </p:txBody>
+      </p:sp>
+      <p:sp>
+        <p:nvSpPr>
+          <p:cNvPr id="3" name="Content Placeholder 2">
+            <a:extLst>
+              <a:ext uri="{FF2B5EF4-FFF2-40B4-BE49-F238E27FC236}">
+                <a16:creationId xmlns:a16="http://schemas.microsoft.com/office/drawing/2014/main" id="{148AF7E9-44A2-48A8-A8CF-67A80389B59B}"/>
+              </a:ext>
+            </a:extLst>
+          </p:cNvPr>
+          <p:cNvSpPr>
+            <a:spLocks noGrp="1"/>
+          </p:cNvSpPr>
+          <p:nvPr>
+            <p:ph idx="1"/>
+          </p:nvPr>
+        </p:nvSpPr>
+        <p:spPr/>
+        <p:txBody>
+          <a:bodyPr>
+            <a:normAutofit/>
+          </a:bodyPr>
+          <a:lstStyle/>
+          <a:p>
+            <a:r>
+              <a:rPr lang="en-US" dirty="0"/>
+              <a:t>Data was already seasonally adjusted when it was obtained</a:t>
+            </a:r>
+          </a:p>
+          <a:p>
+            <a:pPr lvl="1"/>
+            <a:r>
+              <a:rPr lang="en-US" dirty="0"/>
+              <a:t>Limits ability to incorporate additional datapoints when they become available</a:t>
+            </a:r>
+          </a:p>
+          <a:p>
+            <a:pPr lvl="2"/>
+            <a:r>
+              <a:rPr lang="en-US" dirty="0"/>
+              <a:t>Data is not static, therefore not wise to simply gather future datapoints and compare to predicted values (not really an apples-to-apples comparison)</a:t>
+            </a:r>
+          </a:p>
+          <a:p>
+            <a:pPr lvl="1"/>
+            <a:r>
+              <a:rPr lang="en-US" dirty="0"/>
+              <a:t>Limits usefulness of frequency approach</a:t>
+            </a:r>
+          </a:p>
+          <a:p>
+            <a:pPr lvl="2"/>
+            <a:r>
+              <a:rPr lang="en-US" dirty="0"/>
+              <a:t>Some seasonality remained in each TS, but it was of diminishing magnitude in comparison to scale of raw data</a:t>
+            </a:r>
+          </a:p>
+          <a:p>
+            <a:pPr lvl="2"/>
+            <a:r>
+              <a:rPr lang="en-US" dirty="0"/>
+              <a:t>Periodogram analysis was performed for one TS (not shown here) but was predictably uninteresting</a:t>
+            </a:r>
+          </a:p>
+        </p:txBody>
+      </p:sp>
+    </p:spTree>
+    <p:extLst>
+      <p:ext uri="{BB962C8B-B14F-4D97-AF65-F5344CB8AC3E}">
+        <p14:creationId xmlns:p14="http://schemas.microsoft.com/office/powerpoint/2010/main" val="1263930634"/>
+      </p:ext>
+    </p:extLst>
+  </p:cSld>
+  <p:clrMapOvr>
+    <a:masterClrMapping/>
+  </p:clrMapOvr>
+</p:sld>
+</file>
+
+<file path=ppt/slides/slide17.xml><?xml version="1.0" encoding="utf-8"?>
+<p:sld xmlns:a="http://schemas.openxmlformats.org/drawingml/2006/main" xmlns:r="http://schemas.openxmlformats.org/officeDocument/2006/relationships" xmlns:p="http://schemas.openxmlformats.org/presentationml/2006/main">
+  <p:cSld>
+    <p:spTree>
+      <p:nvGrpSpPr>
+        <p:cNvPr id="1" name=""/>
+        <p:cNvGrpSpPr/>
+        <p:nvPr/>
+      </p:nvGrpSpPr>
+      <p:grpSpPr>
+        <a:xfrm>
+          <a:off x="0" y="0"/>
+          <a:ext cx="0" cy="0"/>
+          <a:chOff x="0" y="0"/>
+          <a:chExt cx="0" cy="0"/>
+        </a:xfrm>
+      </p:grpSpPr>
+      <p:sp>
+        <p:nvSpPr>
+          <p:cNvPr id="2" name="Title 1">
+            <a:extLst>
+              <a:ext uri="{FF2B5EF4-FFF2-40B4-BE49-F238E27FC236}">
                 <a16:creationId xmlns:a16="http://schemas.microsoft.com/office/drawing/2014/main" id="{0D3D2F6A-581F-4A92-A810-C702D746F729}"/>
               </a:ext>
             </a:extLst>
@@ -4578,7 +5987,13 @@
           <a:p>
             <a:r>
               <a:rPr lang="en-US" dirty="0"/>
-              <a:t>Text</a:t>
+              <a:t>Forecasting works well when a strong trend is seen</a:t>
+            </a:r>
+          </a:p>
+          <a:p>
+            <a:r>
+              <a:rPr lang="en-US" dirty="0"/>
+              <a:t>Forecasting with a lagged predictor may perform acceptably but not well when data is volatile and/or when CCF plot shows a weak cross-correlation</a:t>
             </a:r>
           </a:p>
         </p:txBody>
@@ -4596,7 +6011,7 @@
 </p:sld>
 </file>
 
-<file path=ppt/slides/slide17.xml><?xml version="1.0" encoding="utf-8"?>
+<file path=ppt/slides/slide18.xml><?xml version="1.0" encoding="utf-8"?>
 <p:sld xmlns:a="http://schemas.openxmlformats.org/drawingml/2006/main" xmlns:r="http://schemas.openxmlformats.org/officeDocument/2006/relationships" xmlns:p="http://schemas.openxmlformats.org/presentationml/2006/main">
   <p:cSld>
     <p:spTree>
@@ -4738,7 +6153,7 @@
 </p:sld>
 </file>
 
-<file path=ppt/slides/slide18.xml><?xml version="1.0" encoding="utf-8"?>
+<file path=ppt/slides/slide19.xml><?xml version="1.0" encoding="utf-8"?>
 <p:sld xmlns:a="http://schemas.openxmlformats.org/drawingml/2006/main" xmlns:r="http://schemas.openxmlformats.org/officeDocument/2006/relationships" xmlns:p="http://schemas.openxmlformats.org/presentationml/2006/main">
   <p:cSld>
     <p:spTree>
@@ -4932,13 +6347,37 @@
             </a:pPr>
             <a:r>
               <a:rPr lang="en-US" sz="1600" dirty="0"/>
-              <a:t>Federal Reserve Bank of St. Louis.  2018.  “Household Debt Service Payments as a Percent of Disposable Personal Income.” </a:t>
+              <a:t>Hyndman R, </a:t>
+            </a:r>
+            <a:r>
+              <a:rPr lang="en-US" sz="1600" dirty="0" err="1"/>
+              <a:t>Athanasopoulos</a:t>
+            </a:r>
+            <a:r>
+              <a:rPr lang="en-US" sz="1600" dirty="0"/>
+              <a:t> G, </a:t>
+            </a:r>
+            <a:r>
+              <a:rPr lang="en-US" sz="1600" dirty="0" err="1"/>
+              <a:t>Bergmeir</a:t>
+            </a:r>
+            <a:r>
+              <a:rPr lang="en-US" sz="1600" dirty="0"/>
+              <a:t> C, Caceres G, Chhay L, O'Hara-Wild M, Petropoulos F, </a:t>
+            </a:r>
+            <a:r>
+              <a:rPr lang="en-US" sz="1600" dirty="0" err="1"/>
+              <a:t>Razbash</a:t>
+            </a:r>
+            <a:r>
+              <a:rPr lang="en-US" sz="1600" dirty="0"/>
+              <a:t> S, Wang E, Yasmeen F.  2019.  “forecast: Forecasting functions for time series and linear models.” R package version 8.5. </a:t>
             </a:r>
             <a:r>
               <a:rPr lang="en-US" sz="1600" dirty="0">
                 <a:hlinkClick r:id="rId6"/>
               </a:rPr>
-              <a:t>https://fred.stlouisfed.org/series/TDSP</a:t>
+              <a:t>http://pkg.robjhyndman.com/forecast</a:t>
             </a:r>
             <a:r>
               <a:rPr lang="en-US" sz="1600" dirty="0"/>
@@ -4958,6 +6397,32 @@
             </a:pPr>
             <a:r>
               <a:rPr lang="en-US" sz="1600" dirty="0"/>
+              <a:t>Federal Reserve Bank of St. Louis.  2018.  “Household Debt Service Payments as a Percent of Disposable Personal Income.” </a:t>
+            </a:r>
+            <a:r>
+              <a:rPr lang="en-US" sz="1600" dirty="0">
+                <a:hlinkClick r:id="rId7"/>
+              </a:rPr>
+              <a:t>https://fred.stlouisfed.org/series/TDSP</a:t>
+            </a:r>
+            <a:r>
+              <a:rPr lang="en-US" sz="1600" dirty="0"/>
+              <a:t>.</a:t>
+            </a:r>
+          </a:p>
+          <a:p>
+            <a:pPr marL="347663" indent="-347663">
+              <a:lnSpc>
+                <a:spcPct val="100000"/>
+              </a:lnSpc>
+              <a:spcBef>
+                <a:spcPts val="0"/>
+              </a:spcBef>
+              <a:buFont typeface="+mj-lt"/>
+              <a:buAutoNum type="arabicPeriod"/>
+            </a:pPr>
+            <a:r>
+              <a:rPr lang="en-US" sz="1600" dirty="0"/>
               <a:t>Federal Reserve Bank of St. Louis.  2018.  “</a:t>
             </a:r>
             <a:r>
@@ -4970,7 +6435,7 @@
             </a:r>
             <a:r>
               <a:rPr lang="en-US" sz="1600" dirty="0">
-                <a:hlinkClick r:id="rId7"/>
+                <a:hlinkClick r:id="rId8"/>
               </a:rPr>
               <a:t>https://fred.stlouisfed.org/series/A229RX0Q048SBEA</a:t>
             </a:r>
@@ -5251,7 +6716,15 @@
             </a:r>
             <a:r>
               <a:rPr lang="en-US" dirty="0"/>
-              <a:t> package)</a:t>
+              <a:t> package</a:t>
+            </a:r>
+            <a:r>
+              <a:rPr lang="en-US" baseline="30000" dirty="0"/>
+              <a:t>5</a:t>
+            </a:r>
+            <a:r>
+              <a:rPr lang="en-US" dirty="0"/>
+              <a:t>)</a:t>
             </a:r>
           </a:p>
         </p:txBody>
@@ -5330,7 +6803,7 @@
             <p:ph idx="1"/>
             <p:extLst>
               <p:ext uri="{D42A27DB-BD31-4B8C-83A1-F6EECF244321}">
-                <p14:modId xmlns:p14="http://schemas.microsoft.com/office/powerpoint/2010/main" val="1316421514"/>
+                <p14:modId xmlns:p14="http://schemas.microsoft.com/office/powerpoint/2010/main" val="2826729566"/>
               </p:ext>
             </p:extLst>
           </p:nvPr>
@@ -5432,6 +6905,14 @@
                         </a:rPr>
                         <a:t>Per-capita disposable income, adjusted for inflation in chained $US 2012, seasonally adjusted</a:t>
                       </a:r>
+                      <a:r>
+                        <a:rPr lang="en-US" sz="2200" baseline="30000" dirty="0">
+                          <a:solidFill>
+                            <a:srgbClr val="404040"/>
+                          </a:solidFill>
+                        </a:rPr>
+                        <a:t>6</a:t>
+                      </a:r>
                     </a:p>
                   </a:txBody>
                   <a:tcPr anchor="ctr"/>
@@ -5479,6 +6960,14 @@
                           </a:solidFill>
                         </a:rPr>
                         <a:t>Household debt service payments as a percent of disposable personal income, seasonally adjusted</a:t>
+                      </a:r>
+                      <a:r>
+                        <a:rPr lang="en-US" sz="2200" baseline="30000" dirty="0">
+                          <a:solidFill>
+                            <a:srgbClr val="404040"/>
+                          </a:solidFill>
+                        </a:rPr>
+                        <a:t>7</a:t>
                       </a:r>
                     </a:p>
                   </a:txBody>
@@ -5528,6 +7017,14 @@
                         </a:rPr>
                         <a:t>Personal saving as a percentage of disposable personal income, seasonally adjusted</a:t>
                       </a:r>
+                      <a:r>
+                        <a:rPr lang="en-US" sz="2200" baseline="30000" dirty="0">
+                          <a:solidFill>
+                            <a:srgbClr val="404040"/>
+                          </a:solidFill>
+                        </a:rPr>
+                        <a:t>8</a:t>
+                      </a:r>
                     </a:p>
                   </a:txBody>
                   <a:tcPr anchor="ctr"/>
@@ -5936,7 +7433,7 @@
             <a:pPr marL="1371600" lvl="2"/>
             <a:r>
               <a:rPr lang="en-US" dirty="0"/>
-              <a:t>Decomposition</a:t>
+              <a:t>Decomposition (not shown here)</a:t>
             </a:r>
           </a:p>
           <a:p>
@@ -5950,7 +7447,7 @@
             <a:pPr marL="1371600" lvl="2"/>
             <a:r>
               <a:rPr lang="en-US" dirty="0"/>
-              <a:t>Scaled periodogram</a:t>
+              <a:t>Scaled periodogram (not shown here)</a:t>
             </a:r>
           </a:p>
           <a:p>
@@ -5960,7 +7457,7 @@
             </a:pPr>
             <a:r>
               <a:rPr lang="en-US" dirty="0"/>
-              <a:t>Model the data through Q3 2017</a:t>
+              <a:t>Model the data through Q4 2017</a:t>
             </a:r>
           </a:p>
           <a:p>
@@ -6185,12 +7682,53 @@
           </a:p>
         </p:txBody>
       </p:sp>
+      <p:sp>
+        <p:nvSpPr>
+          <p:cNvPr id="4" name="Content Placeholder 2">
+            <a:extLst>
+              <a:ext uri="{FF2B5EF4-FFF2-40B4-BE49-F238E27FC236}">
+                <a16:creationId xmlns:a16="http://schemas.microsoft.com/office/drawing/2014/main" id="{F0580854-B835-4B57-A252-F1C7DE88777E}"/>
+              </a:ext>
+            </a:extLst>
+          </p:cNvPr>
+          <p:cNvSpPr>
+            <a:spLocks noGrp="1"/>
+          </p:cNvSpPr>
+          <p:nvPr>
+            <p:ph idx="1"/>
+          </p:nvPr>
+        </p:nvSpPr>
+        <p:spPr>
+          <a:xfrm>
+            <a:off x="476285" y="1358791"/>
+            <a:ext cx="5473924" cy="2301579"/>
+          </a:xfrm>
+        </p:spPr>
+        <p:txBody>
+          <a:bodyPr>
+            <a:normAutofit/>
+          </a:bodyPr>
+          <a:lstStyle/>
+          <a:p>
+            <a:r>
+              <a:rPr lang="en-US" dirty="0"/>
+              <a:t>Raw data shows clear increasing trend without any obvious seasonality</a:t>
+            </a:r>
+          </a:p>
+          <a:p>
+            <a:r>
+              <a:rPr lang="en-US" dirty="0"/>
+              <a:t>ACF plot suggests differencing is needed</a:t>
+            </a:r>
+          </a:p>
+        </p:txBody>
+      </p:sp>
       <p:pic>
         <p:nvPicPr>
-          <p:cNvPr id="8" name="Picture 7">
+          <p:cNvPr id="3" name="Picture 2">
             <a:extLst>
               <a:ext uri="{FF2B5EF4-FFF2-40B4-BE49-F238E27FC236}">
-                <a16:creationId xmlns:a16="http://schemas.microsoft.com/office/drawing/2014/main" id="{A6277358-81EB-4D1E-82A9-FEF4B29EC782}"/>
+                <a16:creationId xmlns:a16="http://schemas.microsoft.com/office/drawing/2014/main" id="{7D61A625-045C-4C12-9578-06D2C3ED62B0}"/>
               </a:ext>
             </a:extLst>
           </p:cNvPr>
@@ -6207,14 +7745,299 @@
         </p:blipFill>
         <p:spPr>
           <a:xfrm>
-            <a:off x="3098746" y="1371600"/>
-            <a:ext cx="6013191" cy="4810553"/>
+            <a:off x="5862772" y="540094"/>
+            <a:ext cx="6100628" cy="3050314"/>
           </a:xfrm>
           <a:prstGeom prst="rect">
             <a:avLst/>
           </a:prstGeom>
         </p:spPr>
       </p:pic>
+      <p:grpSp>
+        <p:nvGrpSpPr>
+          <p:cNvPr id="11" name="Group 10">
+            <a:extLst>
+              <a:ext uri="{FF2B5EF4-FFF2-40B4-BE49-F238E27FC236}">
+                <a16:creationId xmlns:a16="http://schemas.microsoft.com/office/drawing/2014/main" id="{5FBF559D-44BE-43FE-B3F1-9BD3CEC31139}"/>
+              </a:ext>
+            </a:extLst>
+          </p:cNvPr>
+          <p:cNvGrpSpPr/>
+          <p:nvPr/>
+        </p:nvGrpSpPr>
+        <p:grpSpPr>
+          <a:xfrm>
+            <a:off x="476285" y="3660370"/>
+            <a:ext cx="11482442" cy="3047978"/>
+            <a:chOff x="476285" y="3660370"/>
+            <a:chExt cx="11482442" cy="3047978"/>
+          </a:xfrm>
+        </p:grpSpPr>
+        <p:pic>
+          <p:nvPicPr>
+            <p:cNvPr id="5" name="Picture 4">
+              <a:extLst>
+                <a:ext uri="{FF2B5EF4-FFF2-40B4-BE49-F238E27FC236}">
+                  <a16:creationId xmlns:a16="http://schemas.microsoft.com/office/drawing/2014/main" id="{FF03E3D5-A6CC-4DCD-A190-9362442207C7}"/>
+                </a:ext>
+              </a:extLst>
+            </p:cNvPr>
+            <p:cNvPicPr>
+              <a:picLocks noChangeAspect="1"/>
+            </p:cNvPicPr>
+            <p:nvPr/>
+          </p:nvPicPr>
+          <p:blipFill>
+            <a:blip r:embed="rId3"/>
+            <a:stretch>
+              <a:fillRect/>
+            </a:stretch>
+          </p:blipFill>
+          <p:spPr>
+            <a:xfrm>
+              <a:off x="5862772" y="3660370"/>
+              <a:ext cx="6095955" cy="3047978"/>
+            </a:xfrm>
+            <a:prstGeom prst="rect">
+              <a:avLst/>
+            </a:prstGeom>
+          </p:spPr>
+        </p:pic>
+        <p:sp>
+          <p:nvSpPr>
+            <p:cNvPr id="10" name="Content Placeholder 2">
+              <a:extLst>
+                <a:ext uri="{FF2B5EF4-FFF2-40B4-BE49-F238E27FC236}">
+                  <a16:creationId xmlns:a16="http://schemas.microsoft.com/office/drawing/2014/main" id="{6AA4EA24-5275-4B17-B10E-1147CF29F302}"/>
+                </a:ext>
+              </a:extLst>
+            </p:cNvPr>
+            <p:cNvSpPr txBox="1">
+              <a:spLocks/>
+            </p:cNvSpPr>
+            <p:nvPr/>
+          </p:nvSpPr>
+          <p:spPr>
+            <a:xfrm>
+              <a:off x="476285" y="4025347"/>
+              <a:ext cx="5473924" cy="2244849"/>
+            </a:xfrm>
+            <a:prstGeom prst="rect">
+              <a:avLst/>
+            </a:prstGeom>
+          </p:spPr>
+          <p:txBody>
+            <a:bodyPr vert="horz" lIns="91440" tIns="45720" rIns="91440" bIns="45720" rtlCol="0">
+              <a:normAutofit/>
+            </a:bodyPr>
+            <a:lstStyle>
+              <a:lvl1pPr marL="228600" indent="-228600" algn="l" defTabSz="914400" rtl="0" eaLnBrk="1" latinLnBrk="0" hangingPunct="1">
+                <a:lnSpc>
+                  <a:spcPct val="85000"/>
+                </a:lnSpc>
+                <a:spcBef>
+                  <a:spcPts val="1300"/>
+                </a:spcBef>
+                <a:buFont typeface="Arial" panose="020B0604020202020204" pitchFamily="34" charset="0"/>
+                <a:buChar char="•"/>
+                <a:defRPr sz="2800" kern="1200">
+                  <a:solidFill>
+                    <a:schemeClr val="tx1">
+                      <a:lumMod val="85000"/>
+                      <a:lumOff val="15000"/>
+                    </a:schemeClr>
+                  </a:solidFill>
+                  <a:latin typeface="+mn-lt"/>
+                  <a:ea typeface="+mn-ea"/>
+                  <a:cs typeface="+mn-cs"/>
+                </a:defRPr>
+              </a:lvl1pPr>
+              <a:lvl2pPr marL="685800" indent="-228600" algn="l" defTabSz="914400" rtl="0" eaLnBrk="1" latinLnBrk="0" hangingPunct="1">
+                <a:lnSpc>
+                  <a:spcPct val="85000"/>
+                </a:lnSpc>
+                <a:spcBef>
+                  <a:spcPts val="600"/>
+                </a:spcBef>
+                <a:buSzPct val="80000"/>
+                <a:buFont typeface="Courier New" panose="02070309020205020404" pitchFamily="49" charset="0"/>
+                <a:buChar char="o"/>
+                <a:defRPr sz="2400" kern="1200">
+                  <a:solidFill>
+                    <a:schemeClr val="tx1">
+                      <a:lumMod val="85000"/>
+                      <a:lumOff val="15000"/>
+                    </a:schemeClr>
+                  </a:solidFill>
+                  <a:latin typeface="+mn-lt"/>
+                  <a:ea typeface="+mn-ea"/>
+                  <a:cs typeface="+mn-cs"/>
+                </a:defRPr>
+              </a:lvl2pPr>
+              <a:lvl3pPr marL="1143000" indent="-228600" algn="l" defTabSz="914400" rtl="0" eaLnBrk="1" latinLnBrk="0" hangingPunct="1">
+                <a:lnSpc>
+                  <a:spcPct val="85000"/>
+                </a:lnSpc>
+                <a:spcBef>
+                  <a:spcPts val="600"/>
+                </a:spcBef>
+                <a:buFont typeface="Arial" panose="020B0604020202020204" pitchFamily="34" charset="0"/>
+                <a:buChar char="•"/>
+                <a:defRPr sz="2000" i="0" kern="1200">
+                  <a:solidFill>
+                    <a:schemeClr val="tx1">
+                      <a:lumMod val="85000"/>
+                      <a:lumOff val="15000"/>
+                    </a:schemeClr>
+                  </a:solidFill>
+                  <a:latin typeface="+mn-lt"/>
+                  <a:ea typeface="+mn-ea"/>
+                  <a:cs typeface="+mn-cs"/>
+                </a:defRPr>
+              </a:lvl3pPr>
+              <a:lvl4pPr marL="1600200" indent="-228600" algn="l" defTabSz="914400" rtl="0" eaLnBrk="1" latinLnBrk="0" hangingPunct="1">
+                <a:lnSpc>
+                  <a:spcPct val="85000"/>
+                </a:lnSpc>
+                <a:spcBef>
+                  <a:spcPts val="600"/>
+                </a:spcBef>
+                <a:buSzPct val="80000"/>
+                <a:buFont typeface="Courier New" panose="02070309020205020404" pitchFamily="49" charset="0"/>
+                <a:buChar char="o"/>
+                <a:defRPr sz="1800" kern="1200">
+                  <a:solidFill>
+                    <a:schemeClr val="tx1">
+                      <a:lumMod val="85000"/>
+                      <a:lumOff val="15000"/>
+                    </a:schemeClr>
+                  </a:solidFill>
+                  <a:latin typeface="+mn-lt"/>
+                  <a:ea typeface="+mn-ea"/>
+                  <a:cs typeface="+mn-cs"/>
+                </a:defRPr>
+              </a:lvl4pPr>
+              <a:lvl5pPr marL="2057400" indent="-228600" algn="l" defTabSz="914400" rtl="0" eaLnBrk="1" latinLnBrk="0" hangingPunct="1">
+                <a:lnSpc>
+                  <a:spcPct val="85000"/>
+                </a:lnSpc>
+                <a:spcBef>
+                  <a:spcPts val="600"/>
+                </a:spcBef>
+                <a:buFont typeface="Arial" panose="020B0604020202020204" pitchFamily="34" charset="0"/>
+                <a:buChar char="•"/>
+                <a:defRPr sz="1600" kern="1200">
+                  <a:solidFill>
+                    <a:schemeClr val="tx1">
+                      <a:lumMod val="85000"/>
+                      <a:lumOff val="15000"/>
+                    </a:schemeClr>
+                  </a:solidFill>
+                  <a:latin typeface="+mn-lt"/>
+                  <a:ea typeface="+mn-ea"/>
+                  <a:cs typeface="+mn-cs"/>
+                </a:defRPr>
+              </a:lvl5pPr>
+              <a:lvl6pPr marL="1200000" indent="-228600" algn="l" defTabSz="914400" rtl="0" eaLnBrk="1" latinLnBrk="0" hangingPunct="1">
+                <a:lnSpc>
+                  <a:spcPct val="85000"/>
+                </a:lnSpc>
+                <a:spcBef>
+                  <a:spcPts val="600"/>
+                </a:spcBef>
+                <a:buFont typeface="Arial" pitchFamily="34" charset="0"/>
+                <a:buChar char=" "/>
+                <a:defRPr sz="1800" kern="1200">
+                  <a:solidFill>
+                    <a:schemeClr val="tx1">
+                      <a:lumMod val="85000"/>
+                      <a:lumOff val="15000"/>
+                    </a:schemeClr>
+                  </a:solidFill>
+                  <a:latin typeface="+mn-lt"/>
+                  <a:ea typeface="+mn-ea"/>
+                  <a:cs typeface="+mn-cs"/>
+                </a:defRPr>
+              </a:lvl6pPr>
+              <a:lvl7pPr marL="1400000" indent="-228600" algn="l" defTabSz="914400" rtl="0" eaLnBrk="1" latinLnBrk="0" hangingPunct="1">
+                <a:lnSpc>
+                  <a:spcPct val="85000"/>
+                </a:lnSpc>
+                <a:spcBef>
+                  <a:spcPts val="600"/>
+                </a:spcBef>
+                <a:buFont typeface="Arial" pitchFamily="34" charset="0"/>
+                <a:buChar char=" "/>
+                <a:defRPr sz="1800" kern="1200">
+                  <a:solidFill>
+                    <a:schemeClr val="tx1">
+                      <a:lumMod val="85000"/>
+                      <a:lumOff val="15000"/>
+                    </a:schemeClr>
+                  </a:solidFill>
+                  <a:latin typeface="+mn-lt"/>
+                  <a:ea typeface="+mn-ea"/>
+                  <a:cs typeface="+mn-cs"/>
+                </a:defRPr>
+              </a:lvl7pPr>
+              <a:lvl8pPr marL="1600000" indent="-228600" algn="l" defTabSz="914400" rtl="0" eaLnBrk="1" latinLnBrk="0" hangingPunct="1">
+                <a:lnSpc>
+                  <a:spcPct val="85000"/>
+                </a:lnSpc>
+                <a:spcBef>
+                  <a:spcPts val="600"/>
+                </a:spcBef>
+                <a:buFont typeface="Arial" pitchFamily="34" charset="0"/>
+                <a:buChar char=" "/>
+                <a:defRPr sz="1800" kern="1200">
+                  <a:solidFill>
+                    <a:schemeClr val="tx1">
+                      <a:lumMod val="85000"/>
+                      <a:lumOff val="15000"/>
+                    </a:schemeClr>
+                  </a:solidFill>
+                  <a:latin typeface="+mn-lt"/>
+                  <a:ea typeface="+mn-ea"/>
+                  <a:cs typeface="+mn-cs"/>
+                </a:defRPr>
+              </a:lvl8pPr>
+              <a:lvl9pPr marL="1800000" indent="-228600" algn="l" defTabSz="914400" rtl="0" eaLnBrk="1" latinLnBrk="0" hangingPunct="1">
+                <a:lnSpc>
+                  <a:spcPct val="85000"/>
+                </a:lnSpc>
+                <a:spcBef>
+                  <a:spcPts val="600"/>
+                </a:spcBef>
+                <a:buFont typeface="Arial" pitchFamily="34" charset="0"/>
+                <a:buChar char=" "/>
+                <a:defRPr sz="1800" kern="1200">
+                  <a:solidFill>
+                    <a:schemeClr val="tx1">
+                      <a:lumMod val="85000"/>
+                      <a:lumOff val="15000"/>
+                    </a:schemeClr>
+                  </a:solidFill>
+                  <a:latin typeface="+mn-lt"/>
+                  <a:ea typeface="+mn-ea"/>
+                  <a:cs typeface="+mn-cs"/>
+                </a:defRPr>
+              </a:lvl9pPr>
+            </a:lstStyle>
+            <a:p>
+              <a:r>
+                <a:rPr lang="en-US" dirty="0"/>
+                <a:t>After differencing, series appears stationary</a:t>
+              </a:r>
+            </a:p>
+            <a:p>
+              <a:r>
+                <a:rPr lang="en-US" dirty="0"/>
+                <a:t>AR(1) may be appropriate</a:t>
+              </a:r>
+            </a:p>
+          </p:txBody>
+        </p:sp>
+      </p:grpSp>
     </p:spTree>
     <p:extLst>
       <p:ext uri="{BB962C8B-B14F-4D97-AF65-F5344CB8AC3E}">
@@ -6225,6 +8048,81 @@
   <p:clrMapOvr>
     <a:masterClrMapping/>
   </p:clrMapOvr>
+  <p:timing>
+    <p:tnLst>
+      <p:par>
+        <p:cTn id="1" dur="indefinite" restart="never" nodeType="tmRoot">
+          <p:childTnLst>
+            <p:seq concurrent="1" nextAc="seek">
+              <p:cTn id="2" dur="indefinite" nodeType="mainSeq">
+                <p:childTnLst>
+                  <p:par>
+                    <p:cTn id="3" fill="hold">
+                      <p:stCondLst>
+                        <p:cond delay="indefinite"/>
+                      </p:stCondLst>
+                      <p:childTnLst>
+                        <p:par>
+                          <p:cTn id="4" fill="hold">
+                            <p:stCondLst>
+                              <p:cond delay="0"/>
+                            </p:stCondLst>
+                            <p:childTnLst>
+                              <p:par>
+                                <p:cTn id="5" presetID="1" presetClass="entr" presetSubtype="0" fill="hold" nodeType="clickEffect">
+                                  <p:stCondLst>
+                                    <p:cond delay="0"/>
+                                  </p:stCondLst>
+                                  <p:childTnLst>
+                                    <p:set>
+                                      <p:cBhvr>
+                                        <p:cTn id="6" dur="1" fill="hold">
+                                          <p:stCondLst>
+                                            <p:cond delay="0"/>
+                                          </p:stCondLst>
+                                        </p:cTn>
+                                        <p:tgtEl>
+                                          <p:spTgt spid="11"/>
+                                        </p:tgtEl>
+                                        <p:attrNameLst>
+                                          <p:attrName>style.visibility</p:attrName>
+                                        </p:attrNameLst>
+                                      </p:cBhvr>
+                                      <p:to>
+                                        <p:strVal val="visible"/>
+                                      </p:to>
+                                    </p:set>
+                                  </p:childTnLst>
+                                </p:cTn>
+                              </p:par>
+                            </p:childTnLst>
+                          </p:cTn>
+                        </p:par>
+                      </p:childTnLst>
+                    </p:cTn>
+                  </p:par>
+                </p:childTnLst>
+              </p:cTn>
+              <p:prevCondLst>
+                <p:cond evt="onPrev" delay="0">
+                  <p:tgtEl>
+                    <p:sldTgt/>
+                  </p:tgtEl>
+                </p:cond>
+              </p:prevCondLst>
+              <p:nextCondLst>
+                <p:cond evt="onNext" delay="0">
+                  <p:tgtEl>
+                    <p:sldTgt/>
+                  </p:tgtEl>
+                </p:cond>
+              </p:nextCondLst>
+            </p:seq>
+          </p:childTnLst>
+        </p:cTn>
+      </p:par>
+    </p:tnLst>
+  </p:timing>
 </p:sld>
 </file>
 
@@ -6245,439 +8143,6 @@
           <a:chExt cx="0" cy="0"/>
         </a:xfrm>
       </p:grpSpPr>
-      <p:sp>
-        <p:nvSpPr>
-          <p:cNvPr id="2" name="Title 1">
-            <a:extLst>
-              <a:ext uri="{FF2B5EF4-FFF2-40B4-BE49-F238E27FC236}">
-                <a16:creationId xmlns:a16="http://schemas.microsoft.com/office/drawing/2014/main" id="{B9F118EA-9581-481E-9737-5FBEC7E88C69}"/>
-              </a:ext>
-            </a:extLst>
-          </p:cNvPr>
-          <p:cNvSpPr>
-            <a:spLocks noGrp="1"/>
-          </p:cNvSpPr>
-          <p:nvPr>
-            <p:ph type="title"/>
-          </p:nvPr>
-        </p:nvSpPr>
-        <p:spPr/>
-        <p:txBody>
-          <a:bodyPr/>
-          <a:lstStyle/>
-          <a:p>
-            <a:r>
-              <a:rPr lang="en-US" dirty="0"/>
-              <a:t>MODEL</a:t>
-            </a:r>
-            <a:endParaRPr lang="en-US" sz="3600" dirty="0"/>
-          </a:p>
-        </p:txBody>
-      </p:sp>
-      <p:sp>
-        <p:nvSpPr>
-          <p:cNvPr id="4" name="TextBox 3">
-            <a:extLst>
-              <a:ext uri="{FF2B5EF4-FFF2-40B4-BE49-F238E27FC236}">
-                <a16:creationId xmlns:a16="http://schemas.microsoft.com/office/drawing/2014/main" id="{E009032F-A42D-4494-AF12-5990B4E594ED}"/>
-              </a:ext>
-            </a:extLst>
-          </p:cNvPr>
-          <p:cNvSpPr txBox="1"/>
-          <p:nvPr/>
-        </p:nvSpPr>
-        <p:spPr>
-          <a:xfrm>
-            <a:off x="7523922" y="1288829"/>
-            <a:ext cx="4439478" cy="3970318"/>
-          </a:xfrm>
-          <a:prstGeom prst="rect">
-            <a:avLst/>
-          </a:prstGeom>
-          <a:solidFill>
-            <a:srgbClr val="404040"/>
-          </a:solidFill>
-          <a:ln>
-            <a:solidFill>
-              <a:schemeClr val="tx1"/>
-            </a:solidFill>
-          </a:ln>
-        </p:spPr>
-        <p:txBody>
-          <a:bodyPr wrap="square" rtlCol="0">
-            <a:spAutoFit/>
-          </a:bodyPr>
-          <a:lstStyle/>
-          <a:p>
-            <a:r>
-              <a:rPr lang="en-US" sz="900" dirty="0">
-                <a:solidFill>
-                  <a:schemeClr val="bg1"/>
-                </a:solidFill>
-                <a:latin typeface="Lucida Console" panose="020B0609040504020204" pitchFamily="49" charset="0"/>
-              </a:rPr>
-              <a:t>Series: </a:t>
-            </a:r>
-            <a:r>
-              <a:rPr lang="en-US" sz="900" dirty="0" err="1">
-                <a:solidFill>
-                  <a:schemeClr val="bg1"/>
-                </a:solidFill>
-                <a:latin typeface="Lucida Console" panose="020B0609040504020204" pitchFamily="49" charset="0"/>
-              </a:rPr>
-              <a:t>fred_disposable_train</a:t>
-            </a:r>
-            <a:r>
-              <a:rPr lang="en-US" sz="900" dirty="0">
-                <a:solidFill>
-                  <a:schemeClr val="bg1"/>
-                </a:solidFill>
-                <a:latin typeface="Lucida Console" panose="020B0609040504020204" pitchFamily="49" charset="0"/>
-              </a:rPr>
-              <a:t> </a:t>
-            </a:r>
-          </a:p>
-          <a:p>
-            <a:r>
-              <a:rPr lang="en-US" sz="900" dirty="0">
-                <a:solidFill>
-                  <a:schemeClr val="bg1"/>
-                </a:solidFill>
-                <a:latin typeface="Lucida Console" panose="020B0609040504020204" pitchFamily="49" charset="0"/>
-              </a:rPr>
-              <a:t>ARIMA(1,1,0) with drift </a:t>
-            </a:r>
-          </a:p>
-          <a:p>
-            <a:endParaRPr lang="en-US" sz="900" dirty="0">
-              <a:solidFill>
-                <a:schemeClr val="bg1"/>
-              </a:solidFill>
-              <a:latin typeface="Lucida Console" panose="020B0609040504020204" pitchFamily="49" charset="0"/>
-            </a:endParaRPr>
-          </a:p>
-          <a:p>
-            <a:r>
-              <a:rPr lang="en-US" sz="900" dirty="0">
-                <a:solidFill>
-                  <a:schemeClr val="bg1"/>
-                </a:solidFill>
-                <a:latin typeface="Lucida Console" panose="020B0609040504020204" pitchFamily="49" charset="0"/>
-              </a:rPr>
-              <a:t>Coefficients:</a:t>
-            </a:r>
-          </a:p>
-          <a:p>
-            <a:r>
-              <a:rPr lang="en-US" sz="900" dirty="0">
-                <a:solidFill>
-                  <a:schemeClr val="bg1"/>
-                </a:solidFill>
-                <a:latin typeface="Lucida Console" panose="020B0609040504020204" pitchFamily="49" charset="0"/>
-              </a:rPr>
-              <a:t>          ar1     drift</a:t>
-            </a:r>
-          </a:p>
-          <a:p>
-            <a:r>
-              <a:rPr lang="en-US" sz="900" dirty="0">
-                <a:solidFill>
-                  <a:schemeClr val="bg1"/>
-                </a:solidFill>
-                <a:latin typeface="Lucida Console" panose="020B0609040504020204" pitchFamily="49" charset="0"/>
-              </a:rPr>
-              <a:t>      -0.2489  142.5335</a:t>
-            </a:r>
-          </a:p>
-          <a:p>
-            <a:r>
-              <a:rPr lang="en-US" sz="900" dirty="0" err="1">
-                <a:solidFill>
-                  <a:schemeClr val="bg1"/>
-                </a:solidFill>
-                <a:latin typeface="Lucida Console" panose="020B0609040504020204" pitchFamily="49" charset="0"/>
-              </a:rPr>
-              <a:t>s.e.</a:t>
-            </a:r>
-            <a:r>
-              <a:rPr lang="en-US" sz="900" dirty="0">
-                <a:solidFill>
-                  <a:schemeClr val="bg1"/>
-                </a:solidFill>
-                <a:latin typeface="Lucida Console" panose="020B0609040504020204" pitchFamily="49" charset="0"/>
-              </a:rPr>
-              <a:t>   0.0790   18.2321</a:t>
-            </a:r>
-          </a:p>
-          <a:p>
-            <a:endParaRPr lang="en-US" sz="900" dirty="0">
-              <a:solidFill>
-                <a:schemeClr val="bg1"/>
-              </a:solidFill>
-              <a:latin typeface="Lucida Console" panose="020B0609040504020204" pitchFamily="49" charset="0"/>
-            </a:endParaRPr>
-          </a:p>
-          <a:p>
-            <a:r>
-              <a:rPr lang="en-US" sz="900" dirty="0">
-                <a:solidFill>
-                  <a:schemeClr val="bg1"/>
-                </a:solidFill>
-                <a:latin typeface="Lucida Console" panose="020B0609040504020204" pitchFamily="49" charset="0"/>
-              </a:rPr>
-              <a:t>sigma^2 estimated as 79132:  log likelihood=-1064.84</a:t>
-            </a:r>
-          </a:p>
-          <a:p>
-            <a:r>
-              <a:rPr lang="en-US" sz="900" dirty="0">
-                <a:solidFill>
-                  <a:schemeClr val="bg1"/>
-                </a:solidFill>
-                <a:latin typeface="Lucida Console" panose="020B0609040504020204" pitchFamily="49" charset="0"/>
-              </a:rPr>
-              <a:t>AIC=2135.67   </a:t>
-            </a:r>
-            <a:r>
-              <a:rPr lang="en-US" sz="900" dirty="0" err="1">
-                <a:solidFill>
-                  <a:schemeClr val="bg1"/>
-                </a:solidFill>
-                <a:latin typeface="Lucida Console" panose="020B0609040504020204" pitchFamily="49" charset="0"/>
-              </a:rPr>
-              <a:t>AICc</a:t>
-            </a:r>
-            <a:r>
-              <a:rPr lang="en-US" sz="900" dirty="0">
-                <a:solidFill>
-                  <a:schemeClr val="bg1"/>
-                </a:solidFill>
-                <a:latin typeface="Lucida Console" panose="020B0609040504020204" pitchFamily="49" charset="0"/>
-              </a:rPr>
-              <a:t>=2135.84   BIC=2144.73</a:t>
-            </a:r>
-          </a:p>
-          <a:p>
-            <a:endParaRPr lang="en-US" sz="900" dirty="0">
-              <a:solidFill>
-                <a:schemeClr val="bg1"/>
-              </a:solidFill>
-              <a:latin typeface="Lucida Console" panose="020B0609040504020204" pitchFamily="49" charset="0"/>
-            </a:endParaRPr>
-          </a:p>
-          <a:p>
-            <a:r>
-              <a:rPr lang="en-US" sz="900" dirty="0">
-                <a:solidFill>
-                  <a:schemeClr val="bg1"/>
-                </a:solidFill>
-                <a:latin typeface="Lucida Console" panose="020B0609040504020204" pitchFamily="49" charset="0"/>
-              </a:rPr>
-              <a:t>z test of coefficients:</a:t>
-            </a:r>
-          </a:p>
-          <a:p>
-            <a:endParaRPr lang="en-US" sz="900" dirty="0">
-              <a:solidFill>
-                <a:schemeClr val="bg1"/>
-              </a:solidFill>
-              <a:latin typeface="Lucida Console" panose="020B0609040504020204" pitchFamily="49" charset="0"/>
-            </a:endParaRPr>
-          </a:p>
-          <a:p>
-            <a:r>
-              <a:rPr lang="en-US" sz="900" dirty="0">
-                <a:solidFill>
-                  <a:schemeClr val="bg1"/>
-                </a:solidFill>
-                <a:latin typeface="Lucida Console" panose="020B0609040504020204" pitchFamily="49" charset="0"/>
-              </a:rPr>
-              <a:t>        Estimate Std. Error z value  </a:t>
-            </a:r>
-            <a:r>
-              <a:rPr lang="en-US" sz="900" dirty="0" err="1">
-                <a:solidFill>
-                  <a:schemeClr val="bg1"/>
-                </a:solidFill>
-                <a:latin typeface="Lucida Console" panose="020B0609040504020204" pitchFamily="49" charset="0"/>
-              </a:rPr>
-              <a:t>Pr</a:t>
-            </a:r>
-            <a:r>
-              <a:rPr lang="en-US" sz="900" dirty="0">
-                <a:solidFill>
-                  <a:schemeClr val="bg1"/>
-                </a:solidFill>
-                <a:latin typeface="Lucida Console" panose="020B0609040504020204" pitchFamily="49" charset="0"/>
-              </a:rPr>
-              <a:t>(&gt;|z|)    </a:t>
-            </a:r>
-          </a:p>
-          <a:p>
-            <a:r>
-              <a:rPr lang="en-US" sz="900" dirty="0">
-                <a:solidFill>
-                  <a:schemeClr val="bg1"/>
-                </a:solidFill>
-                <a:latin typeface="Lucida Console" panose="020B0609040504020204" pitchFamily="49" charset="0"/>
-              </a:rPr>
-              <a:t>ar1    -0.248912   0.079026 -3.1497  0.001634 ** </a:t>
-            </a:r>
-          </a:p>
-          <a:p>
-            <a:r>
-              <a:rPr lang="en-US" sz="900" dirty="0">
-                <a:solidFill>
-                  <a:schemeClr val="bg1"/>
-                </a:solidFill>
-                <a:latin typeface="Lucida Console" panose="020B0609040504020204" pitchFamily="49" charset="0"/>
-              </a:rPr>
-              <a:t>drift 142.533522  18.232105  7.8177 5.379e-15 ***</a:t>
-            </a:r>
-          </a:p>
-          <a:p>
-            <a:r>
-              <a:rPr lang="en-US" sz="900" dirty="0">
-                <a:solidFill>
-                  <a:schemeClr val="bg1"/>
-                </a:solidFill>
-                <a:latin typeface="Lucida Console" panose="020B0609040504020204" pitchFamily="49" charset="0"/>
-              </a:rPr>
-              <a:t>---</a:t>
-            </a:r>
-          </a:p>
-          <a:p>
-            <a:r>
-              <a:rPr lang="en-US" sz="900" dirty="0" err="1">
-                <a:solidFill>
-                  <a:schemeClr val="bg1"/>
-                </a:solidFill>
-                <a:latin typeface="Lucida Console" panose="020B0609040504020204" pitchFamily="49" charset="0"/>
-              </a:rPr>
-              <a:t>Signif</a:t>
-            </a:r>
-            <a:r>
-              <a:rPr lang="en-US" sz="900" dirty="0">
-                <a:solidFill>
-                  <a:schemeClr val="bg1"/>
-                </a:solidFill>
-                <a:latin typeface="Lucida Console" panose="020B0609040504020204" pitchFamily="49" charset="0"/>
-              </a:rPr>
-              <a:t>. codes:  0 ‘***’ 0.001 ‘**’ 0.01 ‘*’ 0.05 ‘.’ 0.1 ‘ ’ 1</a:t>
-            </a:r>
-          </a:p>
-          <a:p>
-            <a:endParaRPr lang="en-US" sz="900" dirty="0">
-              <a:solidFill>
-                <a:schemeClr val="bg1"/>
-              </a:solidFill>
-              <a:latin typeface="Lucida Console" panose="020B0609040504020204" pitchFamily="49" charset="0"/>
-            </a:endParaRPr>
-          </a:p>
-          <a:p>
-            <a:endParaRPr lang="en-US" sz="900" dirty="0">
-              <a:solidFill>
-                <a:schemeClr val="bg1"/>
-              </a:solidFill>
-              <a:latin typeface="Lucida Console" panose="020B0609040504020204" pitchFamily="49" charset="0"/>
-            </a:endParaRPr>
-          </a:p>
-          <a:p>
-            <a:endParaRPr lang="en-US" sz="900" dirty="0">
-              <a:solidFill>
-                <a:schemeClr val="bg1"/>
-              </a:solidFill>
-              <a:latin typeface="Lucida Console" panose="020B0609040504020204" pitchFamily="49" charset="0"/>
-            </a:endParaRPr>
-          </a:p>
-          <a:p>
-            <a:endParaRPr lang="en-US" sz="900" dirty="0">
-              <a:solidFill>
-                <a:schemeClr val="bg1"/>
-              </a:solidFill>
-              <a:latin typeface="Lucida Console" panose="020B0609040504020204" pitchFamily="49" charset="0"/>
-            </a:endParaRPr>
-          </a:p>
-          <a:p>
-            <a:r>
-              <a:rPr lang="en-US" sz="900" dirty="0">
-                <a:solidFill>
-                  <a:schemeClr val="bg1"/>
-                </a:solidFill>
-                <a:latin typeface="Lucida Console" panose="020B0609040504020204" pitchFamily="49" charset="0"/>
-              </a:rPr>
-              <a:t>	</a:t>
-            </a:r>
-            <a:r>
-              <a:rPr lang="en-US" sz="900" dirty="0" err="1">
-                <a:solidFill>
-                  <a:schemeClr val="bg1"/>
-                </a:solidFill>
-                <a:latin typeface="Lucida Console" panose="020B0609040504020204" pitchFamily="49" charset="0"/>
-              </a:rPr>
-              <a:t>Ljung</a:t>
-            </a:r>
-            <a:r>
-              <a:rPr lang="en-US" sz="900" dirty="0">
-                <a:solidFill>
-                  <a:schemeClr val="bg1"/>
-                </a:solidFill>
-                <a:latin typeface="Lucida Console" panose="020B0609040504020204" pitchFamily="49" charset="0"/>
-              </a:rPr>
-              <a:t>-Box test</a:t>
-            </a:r>
-          </a:p>
-          <a:p>
-            <a:endParaRPr lang="en-US" sz="900" dirty="0">
-              <a:solidFill>
-                <a:schemeClr val="bg1"/>
-              </a:solidFill>
-              <a:latin typeface="Lucida Console" panose="020B0609040504020204" pitchFamily="49" charset="0"/>
-            </a:endParaRPr>
-          </a:p>
-          <a:p>
-            <a:r>
-              <a:rPr lang="en-US" sz="900" dirty="0">
-                <a:solidFill>
-                  <a:schemeClr val="bg1"/>
-                </a:solidFill>
-                <a:latin typeface="Lucida Console" panose="020B0609040504020204" pitchFamily="49" charset="0"/>
-              </a:rPr>
-              <a:t>data:  Residuals from ARIMA(1,1,0) with drift</a:t>
-            </a:r>
-          </a:p>
-          <a:p>
-            <a:r>
-              <a:rPr lang="en-US" sz="900" dirty="0">
-                <a:solidFill>
-                  <a:schemeClr val="bg1"/>
-                </a:solidFill>
-                <a:latin typeface="Lucida Console" panose="020B0609040504020204" pitchFamily="49" charset="0"/>
-              </a:rPr>
-              <a:t>Q* = 6.4507, df = 6, p-value = 0.3746</a:t>
-            </a:r>
-          </a:p>
-          <a:p>
-            <a:endParaRPr lang="en-US" sz="900" dirty="0">
-              <a:solidFill>
-                <a:schemeClr val="bg1"/>
-              </a:solidFill>
-              <a:latin typeface="Lucida Console" panose="020B0609040504020204" pitchFamily="49" charset="0"/>
-            </a:endParaRPr>
-          </a:p>
-          <a:p>
-            <a:r>
-              <a:rPr lang="en-US" sz="900" dirty="0">
-                <a:solidFill>
-                  <a:schemeClr val="bg1"/>
-                </a:solidFill>
-                <a:latin typeface="Lucida Console" panose="020B0609040504020204" pitchFamily="49" charset="0"/>
-              </a:rPr>
-              <a:t>Model df: 2.   Total lags used: 8</a:t>
-            </a:r>
-          </a:p>
-        </p:txBody>
-      </p:sp>
       <p:pic>
         <p:nvPicPr>
           <p:cNvPr id="3" name="Picture 2">
@@ -6700,8 +8165,8 @@
         </p:blipFill>
         <p:spPr>
           <a:xfrm>
-            <a:off x="475903" y="1288829"/>
-            <a:ext cx="6761282" cy="3380641"/>
+            <a:off x="249500" y="2023608"/>
+            <a:ext cx="6828668" cy="3414332"/>
           </a:xfrm>
           <a:prstGeom prst="rect">
             <a:avLst/>
@@ -6726,8 +8191,8 @@
         </p:nvSpPr>
         <p:spPr>
           <a:xfrm>
-            <a:off x="476285" y="4676742"/>
-            <a:ext cx="6760900" cy="1977515"/>
+            <a:off x="476285" y="1288830"/>
+            <a:ext cx="6760900" cy="1156196"/>
           </a:xfrm>
         </p:spPr>
         <p:txBody>
@@ -6738,23 +8203,706 @@
           <a:p>
             <a:r>
               <a:rPr lang="en-US" sz="2400" dirty="0"/>
-              <a:t>ACF looks like white noise</a:t>
-            </a:r>
-          </a:p>
-          <a:p>
+              <a:t>Model recommended by </a:t>
+            </a:r>
+            <a:r>
+              <a:rPr lang="en-US" sz="2200" dirty="0" err="1">
+                <a:solidFill>
+                  <a:srgbClr val="404040"/>
+                </a:solidFill>
+                <a:latin typeface="Lucida Console" panose="020B0609040504020204" pitchFamily="49" charset="0"/>
+              </a:rPr>
+              <a:t>auto.arima</a:t>
+            </a:r>
+            <a:r>
+              <a:rPr lang="en-US" sz="2200" dirty="0">
+                <a:solidFill>
+                  <a:srgbClr val="404040"/>
+                </a:solidFill>
+                <a:latin typeface="Lucida Console" panose="020B0609040504020204" pitchFamily="49" charset="0"/>
+              </a:rPr>
+              <a:t>()</a:t>
+            </a:r>
             <a:r>
               <a:rPr lang="en-US" sz="2400" dirty="0"/>
-              <a:t>Histogram shows reasonable normality for bulk of data but evidence of some nonnormality about tails</a:t>
-            </a:r>
-          </a:p>
-          <a:p>
+              <a:t> is ARIMA(1,1,0) with drift</a:t>
+            </a:r>
+          </a:p>
+        </p:txBody>
+      </p:sp>
+      <p:sp>
+        <p:nvSpPr>
+          <p:cNvPr id="2" name="Title 1">
+            <a:extLst>
+              <a:ext uri="{FF2B5EF4-FFF2-40B4-BE49-F238E27FC236}">
+                <a16:creationId xmlns:a16="http://schemas.microsoft.com/office/drawing/2014/main" id="{B9F118EA-9581-481E-9737-5FBEC7E88C69}"/>
+              </a:ext>
+            </a:extLst>
+          </p:cNvPr>
+          <p:cNvSpPr>
+            <a:spLocks noGrp="1"/>
+          </p:cNvSpPr>
+          <p:nvPr>
+            <p:ph type="title"/>
+          </p:nvPr>
+        </p:nvSpPr>
+        <p:spPr/>
+        <p:txBody>
+          <a:bodyPr/>
+          <a:lstStyle/>
+          <a:p>
+            <a:r>
+              <a:rPr lang="en-US" dirty="0"/>
+              <a:t>MODEL</a:t>
+            </a:r>
+            <a:endParaRPr lang="en-US" sz="3600" dirty="0"/>
+          </a:p>
+        </p:txBody>
+      </p:sp>
+      <p:sp>
+        <p:nvSpPr>
+          <p:cNvPr id="4" name="TextBox 3">
+            <a:extLst>
+              <a:ext uri="{FF2B5EF4-FFF2-40B4-BE49-F238E27FC236}">
+                <a16:creationId xmlns:a16="http://schemas.microsoft.com/office/drawing/2014/main" id="{E009032F-A42D-4494-AF12-5990B4E594ED}"/>
+              </a:ext>
+            </a:extLst>
+          </p:cNvPr>
+          <p:cNvSpPr txBox="1"/>
+          <p:nvPr/>
+        </p:nvSpPr>
+        <p:spPr>
+          <a:xfrm>
+            <a:off x="7237185" y="1288829"/>
+            <a:ext cx="4717080" cy="4039567"/>
+          </a:xfrm>
+          <a:prstGeom prst="rect">
+            <a:avLst/>
+          </a:prstGeom>
+          <a:solidFill>
+            <a:srgbClr val="404040"/>
+          </a:solidFill>
+          <a:ln>
+            <a:solidFill>
+              <a:schemeClr val="tx1"/>
+            </a:solidFill>
+          </a:ln>
+        </p:spPr>
+        <p:txBody>
+          <a:bodyPr wrap="square" rtlCol="0">
+            <a:spAutoFit/>
+          </a:bodyPr>
+          <a:lstStyle/>
+          <a:p>
+            <a:r>
+              <a:rPr lang="en-US" sz="950" dirty="0">
+                <a:solidFill>
+                  <a:schemeClr val="bg1"/>
+                </a:solidFill>
+                <a:latin typeface="Lucida Console" panose="020B0609040504020204" pitchFamily="49" charset="0"/>
+              </a:rPr>
+              <a:t>Series: </a:t>
+            </a:r>
+            <a:r>
+              <a:rPr lang="en-US" sz="950" dirty="0" err="1">
+                <a:solidFill>
+                  <a:schemeClr val="bg1"/>
+                </a:solidFill>
+                <a:latin typeface="Lucida Console" panose="020B0609040504020204" pitchFamily="49" charset="0"/>
+              </a:rPr>
+              <a:t>fred_disposable_train</a:t>
+            </a:r>
+            <a:r>
+              <a:rPr lang="en-US" sz="950" dirty="0">
+                <a:solidFill>
+                  <a:schemeClr val="bg1"/>
+                </a:solidFill>
+                <a:latin typeface="Lucida Console" panose="020B0609040504020204" pitchFamily="49" charset="0"/>
+              </a:rPr>
+              <a:t> </a:t>
+            </a:r>
+          </a:p>
+          <a:p>
+            <a:r>
+              <a:rPr lang="en-US" sz="950" dirty="0">
+                <a:solidFill>
+                  <a:schemeClr val="bg1"/>
+                </a:solidFill>
+                <a:latin typeface="Lucida Console" panose="020B0609040504020204" pitchFamily="49" charset="0"/>
+              </a:rPr>
+              <a:t>ARIMA(1,1,0) with drift </a:t>
+            </a:r>
+          </a:p>
+          <a:p>
+            <a:endParaRPr lang="en-US" sz="950" dirty="0">
+              <a:solidFill>
+                <a:schemeClr val="bg1"/>
+              </a:solidFill>
+              <a:latin typeface="Lucida Console" panose="020B0609040504020204" pitchFamily="49" charset="0"/>
+            </a:endParaRPr>
+          </a:p>
+          <a:p>
+            <a:r>
+              <a:rPr lang="en-US" sz="950" dirty="0">
+                <a:solidFill>
+                  <a:schemeClr val="bg1"/>
+                </a:solidFill>
+                <a:latin typeface="Lucida Console" panose="020B0609040504020204" pitchFamily="49" charset="0"/>
+              </a:rPr>
+              <a:t>Coefficients:</a:t>
+            </a:r>
+          </a:p>
+          <a:p>
+            <a:r>
+              <a:rPr lang="en-US" sz="950" dirty="0">
+                <a:solidFill>
+                  <a:schemeClr val="bg1"/>
+                </a:solidFill>
+                <a:latin typeface="Lucida Console" panose="020B0609040504020204" pitchFamily="49" charset="0"/>
+              </a:rPr>
+              <a:t>          ar1     drift</a:t>
+            </a:r>
+          </a:p>
+          <a:p>
+            <a:r>
+              <a:rPr lang="en-US" sz="950" dirty="0">
+                <a:solidFill>
+                  <a:schemeClr val="bg1"/>
+                </a:solidFill>
+                <a:latin typeface="Lucida Console" panose="020B0609040504020204" pitchFamily="49" charset="0"/>
+              </a:rPr>
+              <a:t>      -0.2489  142.5335</a:t>
+            </a:r>
+          </a:p>
+          <a:p>
+            <a:r>
+              <a:rPr lang="en-US" sz="950" dirty="0" err="1">
+                <a:solidFill>
+                  <a:schemeClr val="bg1"/>
+                </a:solidFill>
+                <a:latin typeface="Lucida Console" panose="020B0609040504020204" pitchFamily="49" charset="0"/>
+              </a:rPr>
+              <a:t>s.e.</a:t>
+            </a:r>
+            <a:r>
+              <a:rPr lang="en-US" sz="950" dirty="0">
+                <a:solidFill>
+                  <a:schemeClr val="bg1"/>
+                </a:solidFill>
+                <a:latin typeface="Lucida Console" panose="020B0609040504020204" pitchFamily="49" charset="0"/>
+              </a:rPr>
+              <a:t>   0.0790   18.2321</a:t>
+            </a:r>
+          </a:p>
+          <a:p>
+            <a:endParaRPr lang="en-US" sz="950" dirty="0">
+              <a:solidFill>
+                <a:schemeClr val="bg1"/>
+              </a:solidFill>
+              <a:latin typeface="Lucida Console" panose="020B0609040504020204" pitchFamily="49" charset="0"/>
+            </a:endParaRPr>
+          </a:p>
+          <a:p>
+            <a:r>
+              <a:rPr lang="en-US" sz="950" dirty="0">
+                <a:solidFill>
+                  <a:schemeClr val="bg1"/>
+                </a:solidFill>
+                <a:latin typeface="Lucida Console" panose="020B0609040504020204" pitchFamily="49" charset="0"/>
+              </a:rPr>
+              <a:t>sigma^2 estimated as 79132:  log likelihood=-1064.84</a:t>
+            </a:r>
+          </a:p>
+          <a:p>
+            <a:r>
+              <a:rPr lang="en-US" sz="950" dirty="0">
+                <a:solidFill>
+                  <a:schemeClr val="bg1"/>
+                </a:solidFill>
+                <a:latin typeface="Lucida Console" panose="020B0609040504020204" pitchFamily="49" charset="0"/>
+              </a:rPr>
+              <a:t>AIC=2135.67   </a:t>
+            </a:r>
+            <a:r>
+              <a:rPr lang="en-US" sz="950" dirty="0" err="1">
+                <a:solidFill>
+                  <a:schemeClr val="bg1"/>
+                </a:solidFill>
+                <a:latin typeface="Lucida Console" panose="020B0609040504020204" pitchFamily="49" charset="0"/>
+              </a:rPr>
+              <a:t>AICc</a:t>
+            </a:r>
+            <a:r>
+              <a:rPr lang="en-US" sz="950" dirty="0">
+                <a:solidFill>
+                  <a:schemeClr val="bg1"/>
+                </a:solidFill>
+                <a:latin typeface="Lucida Console" panose="020B0609040504020204" pitchFamily="49" charset="0"/>
+              </a:rPr>
+              <a:t>=2135.84   BIC=2144.73</a:t>
+            </a:r>
+          </a:p>
+          <a:p>
+            <a:endParaRPr lang="en-US" sz="950" dirty="0">
+              <a:solidFill>
+                <a:schemeClr val="bg1"/>
+              </a:solidFill>
+              <a:latin typeface="Lucida Console" panose="020B0609040504020204" pitchFamily="49" charset="0"/>
+            </a:endParaRPr>
+          </a:p>
+          <a:p>
+            <a:r>
+              <a:rPr lang="en-US" sz="950" dirty="0">
+                <a:solidFill>
+                  <a:schemeClr val="bg1"/>
+                </a:solidFill>
+                <a:latin typeface="Lucida Console" panose="020B0609040504020204" pitchFamily="49" charset="0"/>
+              </a:rPr>
+              <a:t>z test of coefficients:</a:t>
+            </a:r>
+          </a:p>
+          <a:p>
+            <a:endParaRPr lang="en-US" sz="950" dirty="0">
+              <a:solidFill>
+                <a:schemeClr val="bg1"/>
+              </a:solidFill>
+              <a:latin typeface="Lucida Console" panose="020B0609040504020204" pitchFamily="49" charset="0"/>
+            </a:endParaRPr>
+          </a:p>
+          <a:p>
+            <a:r>
+              <a:rPr lang="en-US" sz="950" dirty="0">
+                <a:solidFill>
+                  <a:schemeClr val="bg1"/>
+                </a:solidFill>
+                <a:latin typeface="Lucida Console" panose="020B0609040504020204" pitchFamily="49" charset="0"/>
+              </a:rPr>
+              <a:t>        Estimate Std. Error z value  </a:t>
+            </a:r>
+            <a:r>
+              <a:rPr lang="en-US" sz="950" dirty="0" err="1">
+                <a:solidFill>
+                  <a:schemeClr val="bg1"/>
+                </a:solidFill>
+                <a:latin typeface="Lucida Console" panose="020B0609040504020204" pitchFamily="49" charset="0"/>
+              </a:rPr>
+              <a:t>Pr</a:t>
+            </a:r>
+            <a:r>
+              <a:rPr lang="en-US" sz="950" dirty="0">
+                <a:solidFill>
+                  <a:schemeClr val="bg1"/>
+                </a:solidFill>
+                <a:latin typeface="Lucida Console" panose="020B0609040504020204" pitchFamily="49" charset="0"/>
+              </a:rPr>
+              <a:t>(&gt;|z|)    </a:t>
+            </a:r>
+          </a:p>
+          <a:p>
+            <a:r>
+              <a:rPr lang="en-US" sz="950" dirty="0">
+                <a:solidFill>
+                  <a:schemeClr val="bg1"/>
+                </a:solidFill>
+                <a:latin typeface="Lucida Console" panose="020B0609040504020204" pitchFamily="49" charset="0"/>
+              </a:rPr>
+              <a:t>ar1    -0.248912   0.079026 -3.1497  0.001634 ** </a:t>
+            </a:r>
+          </a:p>
+          <a:p>
+            <a:r>
+              <a:rPr lang="en-US" sz="950" dirty="0">
+                <a:solidFill>
+                  <a:schemeClr val="bg1"/>
+                </a:solidFill>
+                <a:latin typeface="Lucida Console" panose="020B0609040504020204" pitchFamily="49" charset="0"/>
+              </a:rPr>
+              <a:t>drift 142.533522  18.232105  7.8177 5.379e-15 ***</a:t>
+            </a:r>
+          </a:p>
+          <a:p>
+            <a:r>
+              <a:rPr lang="en-US" sz="950" dirty="0">
+                <a:solidFill>
+                  <a:schemeClr val="bg1"/>
+                </a:solidFill>
+                <a:latin typeface="Lucida Console" panose="020B0609040504020204" pitchFamily="49" charset="0"/>
+              </a:rPr>
+              <a:t>---</a:t>
+            </a:r>
+          </a:p>
+          <a:p>
+            <a:r>
+              <a:rPr lang="en-US" sz="950" dirty="0" err="1">
+                <a:solidFill>
+                  <a:schemeClr val="bg1"/>
+                </a:solidFill>
+                <a:latin typeface="Lucida Console" panose="020B0609040504020204" pitchFamily="49" charset="0"/>
+              </a:rPr>
+              <a:t>Signif</a:t>
+            </a:r>
+            <a:r>
+              <a:rPr lang="en-US" sz="950" dirty="0">
+                <a:solidFill>
+                  <a:schemeClr val="bg1"/>
+                </a:solidFill>
+                <a:latin typeface="Lucida Console" panose="020B0609040504020204" pitchFamily="49" charset="0"/>
+              </a:rPr>
+              <a:t>. codes:  0 ‘***’ 0.001 ‘**’ 0.01 ‘*’ 0.05 ‘.’ 0.1 ‘ ’ 1</a:t>
+            </a:r>
+          </a:p>
+          <a:p>
+            <a:endParaRPr lang="en-US" sz="950" dirty="0">
+              <a:solidFill>
+                <a:schemeClr val="bg1"/>
+              </a:solidFill>
+              <a:latin typeface="Lucida Console" panose="020B0609040504020204" pitchFamily="49" charset="0"/>
+            </a:endParaRPr>
+          </a:p>
+          <a:p>
+            <a:endParaRPr lang="en-US" sz="950" dirty="0">
+              <a:solidFill>
+                <a:schemeClr val="bg1"/>
+              </a:solidFill>
+              <a:latin typeface="Lucida Console" panose="020B0609040504020204" pitchFamily="49" charset="0"/>
+            </a:endParaRPr>
+          </a:p>
+          <a:p>
+            <a:endParaRPr lang="en-US" sz="950" dirty="0">
+              <a:solidFill>
+                <a:schemeClr val="bg1"/>
+              </a:solidFill>
+              <a:latin typeface="Lucida Console" panose="020B0609040504020204" pitchFamily="49" charset="0"/>
+            </a:endParaRPr>
+          </a:p>
+          <a:p>
+            <a:r>
+              <a:rPr lang="en-US" sz="950" dirty="0">
+                <a:solidFill>
+                  <a:schemeClr val="bg1"/>
+                </a:solidFill>
+                <a:latin typeface="Lucida Console" panose="020B0609040504020204" pitchFamily="49" charset="0"/>
+              </a:rPr>
+              <a:t>	</a:t>
+            </a:r>
+            <a:r>
+              <a:rPr lang="en-US" sz="950" dirty="0" err="1">
+                <a:solidFill>
+                  <a:schemeClr val="bg1"/>
+                </a:solidFill>
+                <a:latin typeface="Lucida Console" panose="020B0609040504020204" pitchFamily="49" charset="0"/>
+              </a:rPr>
+              <a:t>Ljung</a:t>
+            </a:r>
+            <a:r>
+              <a:rPr lang="en-US" sz="950" dirty="0">
+                <a:solidFill>
+                  <a:schemeClr val="bg1"/>
+                </a:solidFill>
+                <a:latin typeface="Lucida Console" panose="020B0609040504020204" pitchFamily="49" charset="0"/>
+              </a:rPr>
+              <a:t>-Box test</a:t>
+            </a:r>
+          </a:p>
+          <a:p>
+            <a:endParaRPr lang="en-US" sz="950" dirty="0">
+              <a:solidFill>
+                <a:schemeClr val="bg1"/>
+              </a:solidFill>
+              <a:latin typeface="Lucida Console" panose="020B0609040504020204" pitchFamily="49" charset="0"/>
+            </a:endParaRPr>
+          </a:p>
+          <a:p>
+            <a:r>
+              <a:rPr lang="en-US" sz="950" dirty="0">
+                <a:solidFill>
+                  <a:schemeClr val="bg1"/>
+                </a:solidFill>
+                <a:latin typeface="Lucida Console" panose="020B0609040504020204" pitchFamily="49" charset="0"/>
+              </a:rPr>
+              <a:t>data:  Residuals from ARIMA(1,1,0) with drift</a:t>
+            </a:r>
+          </a:p>
+          <a:p>
+            <a:r>
+              <a:rPr lang="en-US" sz="950" dirty="0">
+                <a:solidFill>
+                  <a:schemeClr val="bg1"/>
+                </a:solidFill>
+                <a:latin typeface="Lucida Console" panose="020B0609040504020204" pitchFamily="49" charset="0"/>
+              </a:rPr>
+              <a:t>Q* = 6.4507, df = 6, p-value = 0.3746</a:t>
+            </a:r>
+          </a:p>
+          <a:p>
+            <a:endParaRPr lang="en-US" sz="950" dirty="0">
+              <a:solidFill>
+                <a:schemeClr val="bg1"/>
+              </a:solidFill>
+              <a:latin typeface="Lucida Console" panose="020B0609040504020204" pitchFamily="49" charset="0"/>
+            </a:endParaRPr>
+          </a:p>
+          <a:p>
+            <a:r>
+              <a:rPr lang="en-US" sz="950" dirty="0">
+                <a:solidFill>
+                  <a:schemeClr val="bg1"/>
+                </a:solidFill>
+                <a:latin typeface="Lucida Console" panose="020B0609040504020204" pitchFamily="49" charset="0"/>
+              </a:rPr>
+              <a:t>Model df: 2.   Total lags used: 8</a:t>
+            </a:r>
+          </a:p>
+        </p:txBody>
+      </p:sp>
+      <p:sp>
+        <p:nvSpPr>
+          <p:cNvPr id="7" name="Content Placeholder 4">
+            <a:extLst>
+              <a:ext uri="{FF2B5EF4-FFF2-40B4-BE49-F238E27FC236}">
+                <a16:creationId xmlns:a16="http://schemas.microsoft.com/office/drawing/2014/main" id="{5FAEFCA5-A03A-48E7-AC26-83F1A50303E2}"/>
+              </a:ext>
+            </a:extLst>
+          </p:cNvPr>
+          <p:cNvSpPr txBox="1">
+            <a:spLocks/>
+          </p:cNvSpPr>
+          <p:nvPr/>
+        </p:nvSpPr>
+        <p:spPr>
+          <a:xfrm>
+            <a:off x="476284" y="5421094"/>
+            <a:ext cx="11487115" cy="1431234"/>
+          </a:xfrm>
+          <a:prstGeom prst="rect">
+            <a:avLst/>
+          </a:prstGeom>
+        </p:spPr>
+        <p:txBody>
+          <a:bodyPr vert="horz" lIns="91440" tIns="45720" rIns="91440" bIns="45720" rtlCol="0">
+            <a:normAutofit/>
+          </a:bodyPr>
+          <a:lstStyle>
+            <a:lvl1pPr marL="228600" indent="-228600" algn="l" defTabSz="914400" rtl="0" eaLnBrk="1" latinLnBrk="0" hangingPunct="1">
+              <a:lnSpc>
+                <a:spcPct val="85000"/>
+              </a:lnSpc>
+              <a:spcBef>
+                <a:spcPts val="1300"/>
+              </a:spcBef>
+              <a:buFont typeface="Arial" panose="020B0604020202020204" pitchFamily="34" charset="0"/>
+              <a:buChar char="•"/>
+              <a:defRPr sz="2800" kern="1200">
+                <a:solidFill>
+                  <a:schemeClr val="tx1">
+                    <a:lumMod val="85000"/>
+                    <a:lumOff val="15000"/>
+                  </a:schemeClr>
+                </a:solidFill>
+                <a:latin typeface="+mn-lt"/>
+                <a:ea typeface="+mn-ea"/>
+                <a:cs typeface="+mn-cs"/>
+              </a:defRPr>
+            </a:lvl1pPr>
+            <a:lvl2pPr marL="685800" indent="-228600" algn="l" defTabSz="914400" rtl="0" eaLnBrk="1" latinLnBrk="0" hangingPunct="1">
+              <a:lnSpc>
+                <a:spcPct val="85000"/>
+              </a:lnSpc>
+              <a:spcBef>
+                <a:spcPts val="600"/>
+              </a:spcBef>
+              <a:buSzPct val="80000"/>
+              <a:buFont typeface="Courier New" panose="02070309020205020404" pitchFamily="49" charset="0"/>
+              <a:buChar char="o"/>
+              <a:defRPr sz="2400" kern="1200">
+                <a:solidFill>
+                  <a:schemeClr val="tx1">
+                    <a:lumMod val="85000"/>
+                    <a:lumOff val="15000"/>
+                  </a:schemeClr>
+                </a:solidFill>
+                <a:latin typeface="+mn-lt"/>
+                <a:ea typeface="+mn-ea"/>
+                <a:cs typeface="+mn-cs"/>
+              </a:defRPr>
+            </a:lvl2pPr>
+            <a:lvl3pPr marL="1143000" indent="-228600" algn="l" defTabSz="914400" rtl="0" eaLnBrk="1" latinLnBrk="0" hangingPunct="1">
+              <a:lnSpc>
+                <a:spcPct val="85000"/>
+              </a:lnSpc>
+              <a:spcBef>
+                <a:spcPts val="600"/>
+              </a:spcBef>
+              <a:buFont typeface="Arial" panose="020B0604020202020204" pitchFamily="34" charset="0"/>
+              <a:buChar char="•"/>
+              <a:defRPr sz="2000" i="0" kern="1200">
+                <a:solidFill>
+                  <a:schemeClr val="tx1">
+                    <a:lumMod val="85000"/>
+                    <a:lumOff val="15000"/>
+                  </a:schemeClr>
+                </a:solidFill>
+                <a:latin typeface="+mn-lt"/>
+                <a:ea typeface="+mn-ea"/>
+                <a:cs typeface="+mn-cs"/>
+              </a:defRPr>
+            </a:lvl3pPr>
+            <a:lvl4pPr marL="1600200" indent="-228600" algn="l" defTabSz="914400" rtl="0" eaLnBrk="1" latinLnBrk="0" hangingPunct="1">
+              <a:lnSpc>
+                <a:spcPct val="85000"/>
+              </a:lnSpc>
+              <a:spcBef>
+                <a:spcPts val="600"/>
+              </a:spcBef>
+              <a:buSzPct val="80000"/>
+              <a:buFont typeface="Courier New" panose="02070309020205020404" pitchFamily="49" charset="0"/>
+              <a:buChar char="o"/>
+              <a:defRPr sz="1800" kern="1200">
+                <a:solidFill>
+                  <a:schemeClr val="tx1">
+                    <a:lumMod val="85000"/>
+                    <a:lumOff val="15000"/>
+                  </a:schemeClr>
+                </a:solidFill>
+                <a:latin typeface="+mn-lt"/>
+                <a:ea typeface="+mn-ea"/>
+                <a:cs typeface="+mn-cs"/>
+              </a:defRPr>
+            </a:lvl4pPr>
+            <a:lvl5pPr marL="2057400" indent="-228600" algn="l" defTabSz="914400" rtl="0" eaLnBrk="1" latinLnBrk="0" hangingPunct="1">
+              <a:lnSpc>
+                <a:spcPct val="85000"/>
+              </a:lnSpc>
+              <a:spcBef>
+                <a:spcPts val="600"/>
+              </a:spcBef>
+              <a:buFont typeface="Arial" panose="020B0604020202020204" pitchFamily="34" charset="0"/>
+              <a:buChar char="•"/>
+              <a:defRPr sz="1600" kern="1200">
+                <a:solidFill>
+                  <a:schemeClr val="tx1">
+                    <a:lumMod val="85000"/>
+                    <a:lumOff val="15000"/>
+                  </a:schemeClr>
+                </a:solidFill>
+                <a:latin typeface="+mn-lt"/>
+                <a:ea typeface="+mn-ea"/>
+                <a:cs typeface="+mn-cs"/>
+              </a:defRPr>
+            </a:lvl5pPr>
+            <a:lvl6pPr marL="1200000" indent="-228600" algn="l" defTabSz="914400" rtl="0" eaLnBrk="1" latinLnBrk="0" hangingPunct="1">
+              <a:lnSpc>
+                <a:spcPct val="85000"/>
+              </a:lnSpc>
+              <a:spcBef>
+                <a:spcPts val="600"/>
+              </a:spcBef>
+              <a:buFont typeface="Arial" pitchFamily="34" charset="0"/>
+              <a:buChar char=" "/>
+              <a:defRPr sz="1800" kern="1200">
+                <a:solidFill>
+                  <a:schemeClr val="tx1">
+                    <a:lumMod val="85000"/>
+                    <a:lumOff val="15000"/>
+                  </a:schemeClr>
+                </a:solidFill>
+                <a:latin typeface="+mn-lt"/>
+                <a:ea typeface="+mn-ea"/>
+                <a:cs typeface="+mn-cs"/>
+              </a:defRPr>
+            </a:lvl6pPr>
+            <a:lvl7pPr marL="1400000" indent="-228600" algn="l" defTabSz="914400" rtl="0" eaLnBrk="1" latinLnBrk="0" hangingPunct="1">
+              <a:lnSpc>
+                <a:spcPct val="85000"/>
+              </a:lnSpc>
+              <a:spcBef>
+                <a:spcPts val="600"/>
+              </a:spcBef>
+              <a:buFont typeface="Arial" pitchFamily="34" charset="0"/>
+              <a:buChar char=" "/>
+              <a:defRPr sz="1800" kern="1200">
+                <a:solidFill>
+                  <a:schemeClr val="tx1">
+                    <a:lumMod val="85000"/>
+                    <a:lumOff val="15000"/>
+                  </a:schemeClr>
+                </a:solidFill>
+                <a:latin typeface="+mn-lt"/>
+                <a:ea typeface="+mn-ea"/>
+                <a:cs typeface="+mn-cs"/>
+              </a:defRPr>
+            </a:lvl7pPr>
+            <a:lvl8pPr marL="1600000" indent="-228600" algn="l" defTabSz="914400" rtl="0" eaLnBrk="1" latinLnBrk="0" hangingPunct="1">
+              <a:lnSpc>
+                <a:spcPct val="85000"/>
+              </a:lnSpc>
+              <a:spcBef>
+                <a:spcPts val="600"/>
+              </a:spcBef>
+              <a:buFont typeface="Arial" pitchFamily="34" charset="0"/>
+              <a:buChar char=" "/>
+              <a:defRPr sz="1800" kern="1200">
+                <a:solidFill>
+                  <a:schemeClr val="tx1">
+                    <a:lumMod val="85000"/>
+                    <a:lumOff val="15000"/>
+                  </a:schemeClr>
+                </a:solidFill>
+                <a:latin typeface="+mn-lt"/>
+                <a:ea typeface="+mn-ea"/>
+                <a:cs typeface="+mn-cs"/>
+              </a:defRPr>
+            </a:lvl8pPr>
+            <a:lvl9pPr marL="1800000" indent="-228600" algn="l" defTabSz="914400" rtl="0" eaLnBrk="1" latinLnBrk="0" hangingPunct="1">
+              <a:lnSpc>
+                <a:spcPct val="85000"/>
+              </a:lnSpc>
+              <a:spcBef>
+                <a:spcPts val="600"/>
+              </a:spcBef>
+              <a:buFont typeface="Arial" pitchFamily="34" charset="0"/>
+              <a:buChar char=" "/>
+              <a:defRPr sz="1800" kern="1200">
+                <a:solidFill>
+                  <a:schemeClr val="tx1">
+                    <a:lumMod val="85000"/>
+                    <a:lumOff val="15000"/>
+                  </a:schemeClr>
+                </a:solidFill>
+                <a:latin typeface="+mn-lt"/>
+                <a:ea typeface="+mn-ea"/>
+                <a:cs typeface="+mn-cs"/>
+              </a:defRPr>
+            </a:lvl9pPr>
+          </a:lstStyle>
+          <a:p>
+            <a:pPr>
+              <a:lnSpc>
+                <a:spcPct val="75000"/>
+              </a:lnSpc>
+            </a:pPr>
+            <a:r>
+              <a:rPr lang="en-US" sz="2400" dirty="0"/>
+              <a:t>Histogram shows reasonable normality for bulk of data but evidence of nontrivial deviation from normality about lower tail</a:t>
+            </a:r>
+          </a:p>
+          <a:p>
+            <a:pPr>
+              <a:lnSpc>
+                <a:spcPct val="75000"/>
+              </a:lnSpc>
+            </a:pPr>
+            <a:r>
+              <a:rPr lang="en-US" sz="2400" dirty="0"/>
+              <a:t>ACF looks like white noise and </a:t>
+            </a:r>
             <a:r>
               <a:rPr lang="en-US" sz="2400" dirty="0" err="1"/>
               <a:t>Ljung</a:t>
             </a:r>
             <a:r>
               <a:rPr lang="en-US" sz="2400" dirty="0"/>
-              <a:t>-Box test is NSS</a:t>
+              <a:t>-Box test is NSS over 8 lags, indicating residuals are consistent with white noise</a:t>
             </a:r>
           </a:p>
         </p:txBody>
@@ -6820,10 +8968,10 @@
       </p:sp>
       <p:grpSp>
         <p:nvGrpSpPr>
-          <p:cNvPr id="12" name="Group 11">
+          <p:cNvPr id="3" name="Group 2">
             <a:extLst>
               <a:ext uri="{FF2B5EF4-FFF2-40B4-BE49-F238E27FC236}">
-                <a16:creationId xmlns:a16="http://schemas.microsoft.com/office/drawing/2014/main" id="{F99E4D7F-557D-4C73-B161-19B84CD572DA}"/>
+                <a16:creationId xmlns:a16="http://schemas.microsoft.com/office/drawing/2014/main" id="{B800D72E-5D2A-45E3-92B0-5EE0FD25C562}"/>
               </a:ext>
             </a:extLst>
           </p:cNvPr>
@@ -6832,10 +8980,10 @@
         </p:nvGrpSpPr>
         <p:grpSpPr>
           <a:xfrm>
-            <a:off x="1290176" y="1288829"/>
-            <a:ext cx="9611647" cy="3387913"/>
-            <a:chOff x="475903" y="1288829"/>
-            <a:chExt cx="10503025" cy="3702106"/>
+            <a:off x="1290177" y="1288829"/>
+            <a:ext cx="9345444" cy="3387913"/>
+            <a:chOff x="1290177" y="1288829"/>
+            <a:chExt cx="9345444" cy="3387913"/>
           </a:xfrm>
         </p:grpSpPr>
         <p:pic>
@@ -6853,15 +9001,24 @@
             <p:nvPr/>
           </p:nvPicPr>
           <p:blipFill>
-            <a:blip r:embed="rId2"/>
+            <a:blip r:embed="rId2">
+              <a:extLst>
+                <a:ext uri="{28A0092B-C50C-407E-A947-70E740481C1C}">
+                  <a14:useLocalDpi xmlns:a14="http://schemas.microsoft.com/office/drawing/2010/main" val="0"/>
+                </a:ext>
+                <a:ext uri="{96DAC541-7B7A-43D3-8B79-37D633B846F1}">
+                  <asvg:svgBlip xmlns:asvg="http://schemas.microsoft.com/office/drawing/2016/SVG/main" r:embed="rId3"/>
+                </a:ext>
+              </a:extLst>
+            </a:blip>
             <a:stretch>
               <a:fillRect/>
             </a:stretch>
           </p:blipFill>
           <p:spPr>
             <a:xfrm>
-              <a:off x="475903" y="1288829"/>
-              <a:ext cx="9255266" cy="3702106"/>
+              <a:off x="1290177" y="1288829"/>
+              <a:ext cx="8469782" cy="3387913"/>
             </a:xfrm>
             <a:prstGeom prst="rect">
               <a:avLst/>
@@ -6883,14 +9040,23 @@
             <p:nvPr/>
           </p:nvPicPr>
           <p:blipFill rotWithShape="1">
-            <a:blip r:embed="rId2"/>
-            <a:srcRect l="92135" t="10906" r="3556" b="78383"/>
+            <a:blip r:embed="rId2">
+              <a:extLst>
+                <a:ext uri="{28A0092B-C50C-407E-A947-70E740481C1C}">
+                  <a14:useLocalDpi xmlns:a14="http://schemas.microsoft.com/office/drawing/2010/main" val="0"/>
+                </a:ext>
+                <a:ext uri="{96DAC541-7B7A-43D3-8B79-37D633B846F1}">
+                  <asvg:svgBlip xmlns:asvg="http://schemas.microsoft.com/office/drawing/2016/SVG/main" r:embed="rId3"/>
+                </a:ext>
+              </a:extLst>
+            </a:blip>
+            <a:srcRect l="92689" t="11115" r="3863" b="80451"/>
             <a:stretch/>
           </p:blipFill>
           <p:spPr>
             <a:xfrm>
-              <a:off x="9206573" y="2547866"/>
-              <a:ext cx="1772355" cy="1762268"/>
+              <a:off x="9546087" y="2395751"/>
+              <a:ext cx="1089534" cy="1065850"/>
             </a:xfrm>
             <a:prstGeom prst="rect">
               <a:avLst/>
@@ -6916,8 +9082,8 @@
           </p:nvSpPr>
           <p:spPr>
             <a:xfrm>
-              <a:off x="9031185" y="1684185"/>
-              <a:ext cx="361244" cy="365760"/>
+              <a:off x="9119382" y="1650632"/>
+              <a:ext cx="330586" cy="334718"/>
             </a:xfrm>
             <a:prstGeom prst="rect">
               <a:avLst/>
@@ -6969,13 +9135,13 @@
             <p:nvPr/>
           </p:nvPicPr>
           <p:blipFill>
-            <a:blip r:embed="rId3">
+            <a:blip r:embed="rId4">
               <a:extLst>
                 <a:ext uri="{28A0092B-C50C-407E-A947-70E740481C1C}">
                   <a14:useLocalDpi xmlns:a14="http://schemas.microsoft.com/office/drawing/2010/main" val="0"/>
                 </a:ext>
                 <a:ext uri="{96DAC541-7B7A-43D3-8B79-37D633B846F1}">
-                  <asvg:svgBlip xmlns:asvg="http://schemas.microsoft.com/office/drawing/2016/SVG/main" r:embed="rId4"/>
+                  <asvg:svgBlip xmlns:asvg="http://schemas.microsoft.com/office/drawing/2016/SVG/main" r:embed="rId5"/>
                 </a:ext>
               </a:extLst>
             </a:blip>
@@ -6985,8 +9151,8 @@
           </p:blipFill>
           <p:spPr>
             <a:xfrm rot="7054032" flipH="1">
-              <a:off x="9288974" y="1645368"/>
-              <a:ext cx="1058843" cy="881984"/>
+              <a:off x="9355293" y="1615109"/>
+              <a:ext cx="968980" cy="807131"/>
             </a:xfrm>
             <a:prstGeom prst="rect">
               <a:avLst/>
@@ -7029,6 +9195,7 @@
           </a:bodyPr>
           <a:lstStyle/>
           <a:p>
+            <a:pPr algn="ctr"/>
             <a:r>
               <a:rPr lang="en-US" sz="1200" dirty="0">
                 <a:solidFill>
@@ -7040,6 +9207,7 @@
             </a:r>
           </a:p>
           <a:p>
+            <a:pPr algn="ctr"/>
             <a:r>
               <a:rPr lang="en-US" sz="1200" dirty="0">
                 <a:solidFill>
@@ -7051,6 +9219,7 @@
             </a:r>
           </a:p>
           <a:p>
+            <a:pPr algn="ctr"/>
             <a:r>
               <a:rPr lang="en-US" sz="1200" dirty="0">
                 <a:solidFill>
@@ -7062,6 +9231,7 @@
             </a:r>
           </a:p>
           <a:p>
+            <a:pPr algn="ctr"/>
             <a:r>
               <a:rPr lang="en-US" sz="1200" dirty="0">
                 <a:solidFill>
@@ -7073,6 +9243,7 @@
             </a:r>
           </a:p>
           <a:p>
+            <a:pPr algn="ctr"/>
             <a:r>
               <a:rPr lang="en-US" sz="1200" dirty="0">
                 <a:solidFill>
@@ -7109,7 +9280,7 @@
         </p:spPr>
         <p:txBody>
           <a:bodyPr>
-            <a:normAutofit lnSpcReduction="10000"/>
+            <a:normAutofit/>
           </a:bodyPr>
           <a:lstStyle/>
           <a:p>
@@ -7121,7 +9292,7 @@
           <a:p>
             <a:r>
               <a:rPr lang="en-US" sz="2400" dirty="0"/>
-              <a:t>Percent error within 1% of observed values in all cases</a:t>
+              <a:t>Error within 1% in all cases</a:t>
             </a:r>
           </a:p>
           <a:p>

</xml_diff>

<commit_message>
Adding pgram to .pptx
</commit_message>
<xml_diff>
--- a/Prioli_Final_Proj.pptx
+++ b/Prioli_Final_Proj.pptx
@@ -5,7 +5,7 @@
     <p:sldMasterId id="2147483726" r:id="rId1"/>
   </p:sldMasterIdLst>
   <p:notesMasterIdLst>
-    <p:notesMasterId r:id="rId21"/>
+    <p:notesMasterId r:id="rId22"/>
   </p:notesMasterIdLst>
   <p:sldIdLst>
     <p:sldId id="256" r:id="rId2"/>
@@ -19,14 +19,15 @@
     <p:sldId id="290" r:id="rId10"/>
     <p:sldId id="288" r:id="rId11"/>
     <p:sldId id="286" r:id="rId12"/>
-    <p:sldId id="267" r:id="rId13"/>
-    <p:sldId id="291" r:id="rId14"/>
-    <p:sldId id="292" r:id="rId15"/>
-    <p:sldId id="279" r:id="rId16"/>
-    <p:sldId id="280" r:id="rId17"/>
-    <p:sldId id="281" r:id="rId18"/>
-    <p:sldId id="262" r:id="rId19"/>
-    <p:sldId id="261" r:id="rId20"/>
+    <p:sldId id="293" r:id="rId13"/>
+    <p:sldId id="267" r:id="rId14"/>
+    <p:sldId id="291" r:id="rId15"/>
+    <p:sldId id="292" r:id="rId16"/>
+    <p:sldId id="279" r:id="rId17"/>
+    <p:sldId id="280" r:id="rId18"/>
+    <p:sldId id="281" r:id="rId19"/>
+    <p:sldId id="262" r:id="rId20"/>
+    <p:sldId id="261" r:id="rId21"/>
   </p:sldIdLst>
   <p:sldSz cx="12192000" cy="6858000"/>
   <p:notesSz cx="6858000" cy="9144000"/>
@@ -231,7 +232,7 @@
           <a:p>
             <a:fld id="{4EE169DE-67F4-4753-9B1C-F1A309C78068}" type="datetimeFigureOut">
               <a:rPr lang="en-US" smtClean="0"/>
-              <a:t>5/5/2019</a:t>
+              <a:t>5/6/2019</a:t>
             </a:fld>
             <a:endParaRPr lang="en-US"/>
           </a:p>
@@ -698,7 +699,7 @@
           <a:p>
             <a:fld id="{CF647BC4-379F-449B-8ACB-1D0356C51E22}" type="datetimeFigureOut">
               <a:rPr lang="en-US" smtClean="0"/>
-              <a:t>5/5/2019</a:t>
+              <a:t>5/6/2019</a:t>
             </a:fld>
             <a:endParaRPr lang="en-US"/>
           </a:p>
@@ -888,7 +889,7 @@
           <a:p>
             <a:fld id="{CF647BC4-379F-449B-8ACB-1D0356C51E22}" type="datetimeFigureOut">
               <a:rPr lang="en-US" smtClean="0"/>
-              <a:t>5/5/2019</a:t>
+              <a:t>5/6/2019</a:t>
             </a:fld>
             <a:endParaRPr lang="en-US"/>
           </a:p>
@@ -1068,7 +1069,7 @@
           <a:p>
             <a:fld id="{CF647BC4-379F-449B-8ACB-1D0356C51E22}" type="datetimeFigureOut">
               <a:rPr lang="en-US" smtClean="0"/>
-              <a:t>5/5/2019</a:t>
+              <a:t>5/6/2019</a:t>
             </a:fld>
             <a:endParaRPr lang="en-US"/>
           </a:p>
@@ -1259,7 +1260,7 @@
           <a:p>
             <a:fld id="{CF647BC4-379F-449B-8ACB-1D0356C51E22}" type="datetimeFigureOut">
               <a:rPr lang="en-US" smtClean="0"/>
-              <a:t>5/5/2019</a:t>
+              <a:t>5/6/2019</a:t>
             </a:fld>
             <a:endParaRPr lang="en-US"/>
           </a:p>
@@ -1515,7 +1516,7 @@
           <a:p>
             <a:fld id="{CF647BC4-379F-449B-8ACB-1D0356C51E22}" type="datetimeFigureOut">
               <a:rPr lang="en-US" smtClean="0"/>
-              <a:t>5/5/2019</a:t>
+              <a:t>5/6/2019</a:t>
             </a:fld>
             <a:endParaRPr lang="en-US"/>
           </a:p>
@@ -1803,7 +1804,7 @@
           <a:p>
             <a:fld id="{CF647BC4-379F-449B-8ACB-1D0356C51E22}" type="datetimeFigureOut">
               <a:rPr lang="en-US" smtClean="0"/>
-              <a:t>5/5/2019</a:t>
+              <a:t>5/6/2019</a:t>
             </a:fld>
             <a:endParaRPr lang="en-US"/>
           </a:p>
@@ -2241,7 +2242,7 @@
           <a:p>
             <a:fld id="{CF647BC4-379F-449B-8ACB-1D0356C51E22}" type="datetimeFigureOut">
               <a:rPr lang="en-US" smtClean="0"/>
-              <a:t>5/5/2019</a:t>
+              <a:t>5/6/2019</a:t>
             </a:fld>
             <a:endParaRPr lang="en-US"/>
           </a:p>
@@ -2359,7 +2360,7 @@
           <a:p>
             <a:fld id="{CF647BC4-379F-449B-8ACB-1D0356C51E22}" type="datetimeFigureOut">
               <a:rPr lang="en-US" smtClean="0"/>
-              <a:t>5/5/2019</a:t>
+              <a:t>5/6/2019</a:t>
             </a:fld>
             <a:endParaRPr lang="en-US"/>
           </a:p>
@@ -2454,7 +2455,7 @@
           <a:p>
             <a:fld id="{CF647BC4-379F-449B-8ACB-1D0356C51E22}" type="datetimeFigureOut">
               <a:rPr lang="en-US" smtClean="0"/>
-              <a:t>5/5/2019</a:t>
+              <a:t>5/6/2019</a:t>
             </a:fld>
             <a:endParaRPr lang="en-US"/>
           </a:p>
@@ -2810,7 +2811,7 @@
           <a:p>
             <a:fld id="{CF647BC4-379F-449B-8ACB-1D0356C51E22}" type="datetimeFigureOut">
               <a:rPr lang="en-US" smtClean="0"/>
-              <a:t>5/5/2019</a:t>
+              <a:t>5/6/2019</a:t>
             </a:fld>
             <a:endParaRPr lang="en-US"/>
           </a:p>
@@ -3126,7 +3127,7 @@
           <a:p>
             <a:fld id="{CF647BC4-379F-449B-8ACB-1D0356C51E22}" type="datetimeFigureOut">
               <a:rPr lang="en-US" smtClean="0"/>
-              <a:t>5/5/2019</a:t>
+              <a:t>5/6/2019</a:t>
             </a:fld>
             <a:endParaRPr lang="en-US"/>
           </a:p>
@@ -3358,7 +3359,7 @@
             <a:fld id="{CF647BC4-379F-449B-8ACB-1D0356C51E22}" type="datetimeFigureOut">
               <a:rPr lang="en-US" smtClean="0"/>
               <a:pPr/>
-              <a:t>5/5/2019</a:t>
+              <a:t>5/6/2019</a:t>
             </a:fld>
             <a:endParaRPr lang="en-US"/>
           </a:p>
@@ -4357,6 +4358,793 @@
           <p:cNvPr id="2" name="Title 1">
             <a:extLst>
               <a:ext uri="{FF2B5EF4-FFF2-40B4-BE49-F238E27FC236}">
+                <a16:creationId xmlns:a16="http://schemas.microsoft.com/office/drawing/2014/main" id="{B9F118EA-9581-481E-9737-5FBEC7E88C69}"/>
+              </a:ext>
+            </a:extLst>
+          </p:cNvPr>
+          <p:cNvSpPr>
+            <a:spLocks noGrp="1"/>
+          </p:cNvSpPr>
+          <p:nvPr>
+            <p:ph type="title"/>
+          </p:nvPr>
+        </p:nvSpPr>
+        <p:spPr/>
+        <p:txBody>
+          <a:bodyPr/>
+          <a:lstStyle/>
+          <a:p>
+            <a:r>
+              <a:rPr lang="en-US" dirty="0"/>
+              <a:t>SAVINGS PERIODOGRAM</a:t>
+            </a:r>
+            <a:endParaRPr lang="en-US" sz="3600" dirty="0"/>
+          </a:p>
+        </p:txBody>
+      </p:sp>
+      <p:pic>
+        <p:nvPicPr>
+          <p:cNvPr id="5" name="Picture 4">
+            <a:extLst>
+              <a:ext uri="{FF2B5EF4-FFF2-40B4-BE49-F238E27FC236}">
+                <a16:creationId xmlns:a16="http://schemas.microsoft.com/office/drawing/2014/main" id="{79FAA1C6-066D-4E43-B03A-9D63BC3E8490}"/>
+              </a:ext>
+            </a:extLst>
+          </p:cNvPr>
+          <p:cNvPicPr>
+            <a:picLocks noChangeAspect="1"/>
+          </p:cNvPicPr>
+          <p:nvPr/>
+        </p:nvPicPr>
+        <p:blipFill>
+          <a:blip r:embed="rId2">
+            <a:extLst>
+              <a:ext uri="{96DAC541-7B7A-43D3-8B79-37D633B846F1}">
+                <asvg:svgBlip xmlns:asvg="http://schemas.microsoft.com/office/drawing/2016/SVG/main" r:embed="rId3"/>
+              </a:ext>
+            </a:extLst>
+          </a:blip>
+          <a:stretch>
+            <a:fillRect/>
+          </a:stretch>
+        </p:blipFill>
+        <p:spPr>
+          <a:xfrm>
+            <a:off x="242093" y="1288828"/>
+            <a:ext cx="5601700" cy="3361020"/>
+          </a:xfrm>
+          <a:prstGeom prst="rect">
+            <a:avLst/>
+          </a:prstGeom>
+        </p:spPr>
+      </p:pic>
+      <p:pic>
+        <p:nvPicPr>
+          <p:cNvPr id="6" name="Picture 5">
+            <a:extLst>
+              <a:ext uri="{FF2B5EF4-FFF2-40B4-BE49-F238E27FC236}">
+                <a16:creationId xmlns:a16="http://schemas.microsoft.com/office/drawing/2014/main" id="{A9B2EE67-595A-4E46-87A7-B6DC918B9E3E}"/>
+              </a:ext>
+            </a:extLst>
+          </p:cNvPr>
+          <p:cNvPicPr>
+            <a:picLocks noChangeAspect="1"/>
+          </p:cNvPicPr>
+          <p:nvPr/>
+        </p:nvPicPr>
+        <p:blipFill>
+          <a:blip r:embed="rId4">
+            <a:extLst>
+              <a:ext uri="{96DAC541-7B7A-43D3-8B79-37D633B846F1}">
+                <asvg:svgBlip xmlns:asvg="http://schemas.microsoft.com/office/drawing/2016/SVG/main" r:embed="rId5"/>
+              </a:ext>
+            </a:extLst>
+          </a:blip>
+          <a:stretch>
+            <a:fillRect/>
+          </a:stretch>
+        </p:blipFill>
+        <p:spPr>
+          <a:xfrm>
+            <a:off x="6348207" y="1288826"/>
+            <a:ext cx="5601702" cy="3361022"/>
+          </a:xfrm>
+          <a:prstGeom prst="rect">
+            <a:avLst/>
+          </a:prstGeom>
+        </p:spPr>
+      </p:pic>
+      <p:sp>
+        <p:nvSpPr>
+          <p:cNvPr id="7" name="Content Placeholder 2">
+            <a:extLst>
+              <a:ext uri="{FF2B5EF4-FFF2-40B4-BE49-F238E27FC236}">
+                <a16:creationId xmlns:a16="http://schemas.microsoft.com/office/drawing/2014/main" id="{E262FFB7-121C-4F64-A268-78C787144D24}"/>
+              </a:ext>
+            </a:extLst>
+          </p:cNvPr>
+          <p:cNvSpPr txBox="1">
+            <a:spLocks/>
+          </p:cNvSpPr>
+          <p:nvPr/>
+        </p:nvSpPr>
+        <p:spPr>
+          <a:xfrm>
+            <a:off x="476285" y="4669103"/>
+            <a:ext cx="8918568" cy="1998397"/>
+          </a:xfrm>
+          <a:prstGeom prst="rect">
+            <a:avLst/>
+          </a:prstGeom>
+        </p:spPr>
+        <p:txBody>
+          <a:bodyPr vert="horz" lIns="91440" tIns="45720" rIns="91440" bIns="45720" rtlCol="0">
+            <a:normAutofit fontScale="92500" lnSpcReduction="10000"/>
+          </a:bodyPr>
+          <a:lstStyle>
+            <a:lvl1pPr marL="228600" indent="-228600" algn="l" defTabSz="914400" rtl="0" eaLnBrk="1" latinLnBrk="0" hangingPunct="1">
+              <a:lnSpc>
+                <a:spcPct val="85000"/>
+              </a:lnSpc>
+              <a:spcBef>
+                <a:spcPts val="1300"/>
+              </a:spcBef>
+              <a:buFont typeface="Arial" panose="020B0604020202020204" pitchFamily="34" charset="0"/>
+              <a:buChar char="•"/>
+              <a:defRPr sz="2800" kern="1200">
+                <a:solidFill>
+                  <a:schemeClr val="tx1">
+                    <a:lumMod val="85000"/>
+                    <a:lumOff val="15000"/>
+                  </a:schemeClr>
+                </a:solidFill>
+                <a:latin typeface="+mn-lt"/>
+                <a:ea typeface="+mn-ea"/>
+                <a:cs typeface="+mn-cs"/>
+              </a:defRPr>
+            </a:lvl1pPr>
+            <a:lvl2pPr marL="685800" indent="-228600" algn="l" defTabSz="914400" rtl="0" eaLnBrk="1" latinLnBrk="0" hangingPunct="1">
+              <a:lnSpc>
+                <a:spcPct val="85000"/>
+              </a:lnSpc>
+              <a:spcBef>
+                <a:spcPts val="600"/>
+              </a:spcBef>
+              <a:buSzPct val="80000"/>
+              <a:buFont typeface="Courier New" panose="02070309020205020404" pitchFamily="49" charset="0"/>
+              <a:buChar char="o"/>
+              <a:defRPr sz="2400" kern="1200">
+                <a:solidFill>
+                  <a:schemeClr val="tx1">
+                    <a:lumMod val="85000"/>
+                    <a:lumOff val="15000"/>
+                  </a:schemeClr>
+                </a:solidFill>
+                <a:latin typeface="+mn-lt"/>
+                <a:ea typeface="+mn-ea"/>
+                <a:cs typeface="+mn-cs"/>
+              </a:defRPr>
+            </a:lvl2pPr>
+            <a:lvl3pPr marL="1143000" indent="-228600" algn="l" defTabSz="914400" rtl="0" eaLnBrk="1" latinLnBrk="0" hangingPunct="1">
+              <a:lnSpc>
+                <a:spcPct val="85000"/>
+              </a:lnSpc>
+              <a:spcBef>
+                <a:spcPts val="600"/>
+              </a:spcBef>
+              <a:buFont typeface="Arial" panose="020B0604020202020204" pitchFamily="34" charset="0"/>
+              <a:buChar char="•"/>
+              <a:defRPr sz="2000" i="0" kern="1200">
+                <a:solidFill>
+                  <a:schemeClr val="tx1">
+                    <a:lumMod val="85000"/>
+                    <a:lumOff val="15000"/>
+                  </a:schemeClr>
+                </a:solidFill>
+                <a:latin typeface="+mn-lt"/>
+                <a:ea typeface="+mn-ea"/>
+                <a:cs typeface="+mn-cs"/>
+              </a:defRPr>
+            </a:lvl3pPr>
+            <a:lvl4pPr marL="1600200" indent="-228600" algn="l" defTabSz="914400" rtl="0" eaLnBrk="1" latinLnBrk="0" hangingPunct="1">
+              <a:lnSpc>
+                <a:spcPct val="85000"/>
+              </a:lnSpc>
+              <a:spcBef>
+                <a:spcPts val="600"/>
+              </a:spcBef>
+              <a:buSzPct val="80000"/>
+              <a:buFont typeface="Courier New" panose="02070309020205020404" pitchFamily="49" charset="0"/>
+              <a:buChar char="o"/>
+              <a:defRPr sz="1800" kern="1200">
+                <a:solidFill>
+                  <a:schemeClr val="tx1">
+                    <a:lumMod val="85000"/>
+                    <a:lumOff val="15000"/>
+                  </a:schemeClr>
+                </a:solidFill>
+                <a:latin typeface="+mn-lt"/>
+                <a:ea typeface="+mn-ea"/>
+                <a:cs typeface="+mn-cs"/>
+              </a:defRPr>
+            </a:lvl4pPr>
+            <a:lvl5pPr marL="2057400" indent="-228600" algn="l" defTabSz="914400" rtl="0" eaLnBrk="1" latinLnBrk="0" hangingPunct="1">
+              <a:lnSpc>
+                <a:spcPct val="85000"/>
+              </a:lnSpc>
+              <a:spcBef>
+                <a:spcPts val="600"/>
+              </a:spcBef>
+              <a:buFont typeface="Arial" panose="020B0604020202020204" pitchFamily="34" charset="0"/>
+              <a:buChar char="•"/>
+              <a:defRPr sz="1600" kern="1200">
+                <a:solidFill>
+                  <a:schemeClr val="tx1">
+                    <a:lumMod val="85000"/>
+                    <a:lumOff val="15000"/>
+                  </a:schemeClr>
+                </a:solidFill>
+                <a:latin typeface="+mn-lt"/>
+                <a:ea typeface="+mn-ea"/>
+                <a:cs typeface="+mn-cs"/>
+              </a:defRPr>
+            </a:lvl5pPr>
+            <a:lvl6pPr marL="1200000" indent="-228600" algn="l" defTabSz="914400" rtl="0" eaLnBrk="1" latinLnBrk="0" hangingPunct="1">
+              <a:lnSpc>
+                <a:spcPct val="85000"/>
+              </a:lnSpc>
+              <a:spcBef>
+                <a:spcPts val="600"/>
+              </a:spcBef>
+              <a:buFont typeface="Arial" pitchFamily="34" charset="0"/>
+              <a:buChar char=" "/>
+              <a:defRPr sz="1800" kern="1200">
+                <a:solidFill>
+                  <a:schemeClr val="tx1">
+                    <a:lumMod val="85000"/>
+                    <a:lumOff val="15000"/>
+                  </a:schemeClr>
+                </a:solidFill>
+                <a:latin typeface="+mn-lt"/>
+                <a:ea typeface="+mn-ea"/>
+                <a:cs typeface="+mn-cs"/>
+              </a:defRPr>
+            </a:lvl6pPr>
+            <a:lvl7pPr marL="1400000" indent="-228600" algn="l" defTabSz="914400" rtl="0" eaLnBrk="1" latinLnBrk="0" hangingPunct="1">
+              <a:lnSpc>
+                <a:spcPct val="85000"/>
+              </a:lnSpc>
+              <a:spcBef>
+                <a:spcPts val="600"/>
+              </a:spcBef>
+              <a:buFont typeface="Arial" pitchFamily="34" charset="0"/>
+              <a:buChar char=" "/>
+              <a:defRPr sz="1800" kern="1200">
+                <a:solidFill>
+                  <a:schemeClr val="tx1">
+                    <a:lumMod val="85000"/>
+                    <a:lumOff val="15000"/>
+                  </a:schemeClr>
+                </a:solidFill>
+                <a:latin typeface="+mn-lt"/>
+                <a:ea typeface="+mn-ea"/>
+                <a:cs typeface="+mn-cs"/>
+              </a:defRPr>
+            </a:lvl7pPr>
+            <a:lvl8pPr marL="1600000" indent="-228600" algn="l" defTabSz="914400" rtl="0" eaLnBrk="1" latinLnBrk="0" hangingPunct="1">
+              <a:lnSpc>
+                <a:spcPct val="85000"/>
+              </a:lnSpc>
+              <a:spcBef>
+                <a:spcPts val="600"/>
+              </a:spcBef>
+              <a:buFont typeface="Arial" pitchFamily="34" charset="0"/>
+              <a:buChar char=" "/>
+              <a:defRPr sz="1800" kern="1200">
+                <a:solidFill>
+                  <a:schemeClr val="tx1">
+                    <a:lumMod val="85000"/>
+                    <a:lumOff val="15000"/>
+                  </a:schemeClr>
+                </a:solidFill>
+                <a:latin typeface="+mn-lt"/>
+                <a:ea typeface="+mn-ea"/>
+                <a:cs typeface="+mn-cs"/>
+              </a:defRPr>
+            </a:lvl8pPr>
+            <a:lvl9pPr marL="1800000" indent="-228600" algn="l" defTabSz="914400" rtl="0" eaLnBrk="1" latinLnBrk="0" hangingPunct="1">
+              <a:lnSpc>
+                <a:spcPct val="85000"/>
+              </a:lnSpc>
+              <a:spcBef>
+                <a:spcPts val="600"/>
+              </a:spcBef>
+              <a:buFont typeface="Arial" pitchFamily="34" charset="0"/>
+              <a:buChar char=" "/>
+              <a:defRPr sz="1800" kern="1200">
+                <a:solidFill>
+                  <a:schemeClr val="tx1">
+                    <a:lumMod val="85000"/>
+                    <a:lumOff val="15000"/>
+                  </a:schemeClr>
+                </a:solidFill>
+                <a:latin typeface="+mn-lt"/>
+                <a:ea typeface="+mn-ea"/>
+                <a:cs typeface="+mn-cs"/>
+              </a:defRPr>
+            </a:lvl9pPr>
+          </a:lstStyle>
+          <a:p>
+            <a:r>
+              <a:rPr lang="en-US" sz="2400" dirty="0"/>
+              <a:t>Of the three decompositions, greatest seasonality was seen in savings data</a:t>
+            </a:r>
+          </a:p>
+          <a:p>
+            <a:pPr lvl="1"/>
+            <a:r>
+              <a:rPr lang="en-US" sz="2000" dirty="0"/>
+              <a:t>Small in magnitude compared to scale of savings</a:t>
+            </a:r>
+          </a:p>
+          <a:p>
+            <a:r>
+              <a:rPr lang="en-US" sz="2400" dirty="0"/>
+              <a:t>Scaled periodogram of differenced savings shows 3 key frequencies</a:t>
+            </a:r>
+          </a:p>
+          <a:p>
+            <a:pPr lvl="1"/>
+            <a:r>
+              <a:rPr lang="el-GR" sz="2000" i="1" dirty="0"/>
+              <a:t>ω</a:t>
+            </a:r>
+            <a:r>
+              <a:rPr lang="en-US" sz="2000" baseline="-25000" dirty="0"/>
+              <a:t>1</a:t>
+            </a:r>
+            <a:r>
+              <a:rPr lang="en-US" sz="2000" dirty="0"/>
+              <a:t> = 0.123, </a:t>
+            </a:r>
+            <a:r>
+              <a:rPr lang="el-GR" sz="2000" i="1" dirty="0"/>
+              <a:t>ω</a:t>
+            </a:r>
+            <a:r>
+              <a:rPr lang="en-US" sz="2000" baseline="-25000" dirty="0"/>
+              <a:t>2</a:t>
+            </a:r>
+            <a:r>
+              <a:rPr lang="en-US" sz="2000" dirty="0"/>
+              <a:t> = 0.377, </a:t>
+            </a:r>
+            <a:r>
+              <a:rPr lang="el-GR" sz="2000" i="1" dirty="0"/>
+              <a:t>ω</a:t>
+            </a:r>
+            <a:r>
+              <a:rPr lang="en-US" sz="2000" baseline="-25000" dirty="0"/>
+              <a:t>3</a:t>
+            </a:r>
+            <a:r>
+              <a:rPr lang="en-US" sz="2000" dirty="0"/>
+              <a:t> = 0.448 with clustering about </a:t>
+            </a:r>
+            <a:r>
+              <a:rPr lang="el-GR" sz="2000" i="1" dirty="0"/>
+              <a:t>ω</a:t>
+            </a:r>
+            <a:r>
+              <a:rPr lang="en-US" sz="2000" baseline="-25000" dirty="0"/>
+              <a:t>3 </a:t>
+            </a:r>
+            <a:endParaRPr lang="en-US" sz="2000" dirty="0"/>
+          </a:p>
+          <a:p>
+            <a:pPr lvl="1"/>
+            <a:r>
+              <a:rPr lang="en-US" sz="2000" dirty="0"/>
+              <a:t>None of these are expected to be meaningful (data is already seasonally adjusted) so nothing further was done with the frequency domain approach</a:t>
+            </a:r>
+          </a:p>
+        </p:txBody>
+      </p:sp>
+      <p:grpSp>
+        <p:nvGrpSpPr>
+          <p:cNvPr id="14" name="Group 13">
+            <a:extLst>
+              <a:ext uri="{FF2B5EF4-FFF2-40B4-BE49-F238E27FC236}">
+                <a16:creationId xmlns:a16="http://schemas.microsoft.com/office/drawing/2014/main" id="{40CE0E97-28E6-486B-BF91-CDAB86BB4592}"/>
+              </a:ext>
+            </a:extLst>
+          </p:cNvPr>
+          <p:cNvGrpSpPr/>
+          <p:nvPr/>
+        </p:nvGrpSpPr>
+        <p:grpSpPr>
+          <a:xfrm>
+            <a:off x="7941323" y="1046654"/>
+            <a:ext cx="3919448" cy="4948412"/>
+            <a:chOff x="7941323" y="1046654"/>
+            <a:chExt cx="3919448" cy="4948412"/>
+          </a:xfrm>
+        </p:grpSpPr>
+        <p:sp>
+          <p:nvSpPr>
+            <p:cNvPr id="8" name="TextBox 7">
+              <a:extLst>
+                <a:ext uri="{FF2B5EF4-FFF2-40B4-BE49-F238E27FC236}">
+                  <a16:creationId xmlns:a16="http://schemas.microsoft.com/office/drawing/2014/main" id="{1163BAB0-3550-4E5C-AB93-1BA603C01DE8}"/>
+                </a:ext>
+              </a:extLst>
+            </p:cNvPr>
+            <p:cNvSpPr txBox="1"/>
+            <p:nvPr/>
+          </p:nvSpPr>
+          <p:spPr>
+            <a:xfrm>
+              <a:off x="9860090" y="4879376"/>
+              <a:ext cx="1065634" cy="1115690"/>
+            </a:xfrm>
+            <a:prstGeom prst="rect">
+              <a:avLst/>
+            </a:prstGeom>
+            <a:solidFill>
+              <a:srgbClr val="404040"/>
+            </a:solidFill>
+            <a:ln>
+              <a:solidFill>
+                <a:schemeClr val="tx1"/>
+              </a:solidFill>
+            </a:ln>
+          </p:spPr>
+          <p:txBody>
+            <a:bodyPr wrap="square" rtlCol="0">
+              <a:spAutoFit/>
+            </a:bodyPr>
+            <a:lstStyle/>
+            <a:p>
+              <a:pPr algn="ctr"/>
+              <a:r>
+                <a:rPr lang="en-US" sz="950" dirty="0">
+                  <a:solidFill>
+                    <a:schemeClr val="bg1"/>
+                  </a:solidFill>
+                  <a:latin typeface="Lucida Console" panose="020B0609040504020204" pitchFamily="49" charset="0"/>
+                </a:rPr>
+                <a:t>| Frequency|</a:t>
+              </a:r>
+            </a:p>
+            <a:p>
+              <a:pPr algn="ctr"/>
+              <a:r>
+                <a:rPr lang="en-US" sz="950" dirty="0">
+                  <a:solidFill>
+                    <a:schemeClr val="bg1"/>
+                  </a:solidFill>
+                  <a:latin typeface="Lucida Console" panose="020B0609040504020204" pitchFamily="49" charset="0"/>
+                </a:rPr>
+                <a:t>|---------:|</a:t>
+              </a:r>
+            </a:p>
+            <a:p>
+              <a:pPr algn="ctr"/>
+              <a:r>
+                <a:rPr lang="en-US" sz="950" dirty="0">
+                  <a:solidFill>
+                    <a:schemeClr val="bg1"/>
+                  </a:solidFill>
+                  <a:latin typeface="Lucida Console" panose="020B0609040504020204" pitchFamily="49" charset="0"/>
+                </a:rPr>
+                <a:t>|     0.123|</a:t>
+              </a:r>
+            </a:p>
+            <a:p>
+              <a:pPr algn="ctr"/>
+              <a:r>
+                <a:rPr lang="en-US" sz="950" dirty="0">
+                  <a:solidFill>
+                    <a:schemeClr val="bg1"/>
+                  </a:solidFill>
+                  <a:latin typeface="Lucida Console" panose="020B0609040504020204" pitchFamily="49" charset="0"/>
+                </a:rPr>
+                <a:t>|     0.377|</a:t>
+              </a:r>
+            </a:p>
+            <a:p>
+              <a:pPr algn="ctr"/>
+              <a:r>
+                <a:rPr lang="en-US" sz="950" dirty="0">
+                  <a:solidFill>
+                    <a:schemeClr val="bg1"/>
+                  </a:solidFill>
+                  <a:latin typeface="Lucida Console" panose="020B0609040504020204" pitchFamily="49" charset="0"/>
+                </a:rPr>
+                <a:t>|     0.435|</a:t>
+              </a:r>
+            </a:p>
+            <a:p>
+              <a:pPr algn="ctr"/>
+              <a:r>
+                <a:rPr lang="en-US" sz="950" dirty="0">
+                  <a:solidFill>
+                    <a:schemeClr val="bg1"/>
+                  </a:solidFill>
+                  <a:latin typeface="Lucida Console" panose="020B0609040504020204" pitchFamily="49" charset="0"/>
+                </a:rPr>
+                <a:t>|     0.448|</a:t>
+              </a:r>
+            </a:p>
+            <a:p>
+              <a:pPr algn="ctr"/>
+              <a:r>
+                <a:rPr lang="en-US" sz="950" dirty="0">
+                  <a:solidFill>
+                    <a:schemeClr val="bg1"/>
+                  </a:solidFill>
+                  <a:latin typeface="Lucida Console" panose="020B0609040504020204" pitchFamily="49" charset="0"/>
+                </a:rPr>
+                <a:t>|     0.487|</a:t>
+              </a:r>
+            </a:p>
+          </p:txBody>
+        </p:sp>
+        <p:pic>
+          <p:nvPicPr>
+            <p:cNvPr id="9" name="Graphic 8" descr="Line arrow: Counter-clockwise curve">
+              <a:extLst>
+                <a:ext uri="{FF2B5EF4-FFF2-40B4-BE49-F238E27FC236}">
+                  <a16:creationId xmlns:a16="http://schemas.microsoft.com/office/drawing/2014/main" id="{72989ACF-81E9-4616-B576-54CB2409688A}"/>
+                </a:ext>
+              </a:extLst>
+            </p:cNvPr>
+            <p:cNvPicPr>
+              <a:picLocks noChangeAspect="1"/>
+            </p:cNvPicPr>
+            <p:nvPr/>
+          </p:nvPicPr>
+          <p:blipFill>
+            <a:blip r:embed="rId6">
+              <a:extLst>
+                <a:ext uri="{28A0092B-C50C-407E-A947-70E740481C1C}">
+                  <a14:useLocalDpi xmlns:a14="http://schemas.microsoft.com/office/drawing/2010/main" val="0"/>
+                </a:ext>
+                <a:ext uri="{96DAC541-7B7A-43D3-8B79-37D633B846F1}">
+                  <asvg:svgBlip xmlns:asvg="http://schemas.microsoft.com/office/drawing/2016/SVG/main" r:embed="rId7"/>
+                </a:ext>
+              </a:extLst>
+            </a:blip>
+            <a:stretch>
+              <a:fillRect/>
+            </a:stretch>
+          </p:blipFill>
+          <p:spPr>
+            <a:xfrm rot="11711311" flipH="1">
+              <a:off x="10910505" y="4602828"/>
+              <a:ext cx="950266" cy="807131"/>
+            </a:xfrm>
+            <a:prstGeom prst="rect">
+              <a:avLst/>
+            </a:prstGeom>
+          </p:spPr>
+        </p:pic>
+        <p:pic>
+          <p:nvPicPr>
+            <p:cNvPr id="4" name="Graphic 3" descr="Line arrow: Straight">
+              <a:extLst>
+                <a:ext uri="{FF2B5EF4-FFF2-40B4-BE49-F238E27FC236}">
+                  <a16:creationId xmlns:a16="http://schemas.microsoft.com/office/drawing/2014/main" id="{D01A050C-5AB2-4C60-9085-22D8D6594970}"/>
+                </a:ext>
+              </a:extLst>
+            </p:cNvPr>
+            <p:cNvPicPr>
+              <a:picLocks noChangeAspect="1"/>
+            </p:cNvPicPr>
+            <p:nvPr/>
+          </p:nvPicPr>
+          <p:blipFill>
+            <a:blip r:embed="rId8">
+              <a:extLst>
+                <a:ext uri="{96DAC541-7B7A-43D3-8B79-37D633B846F1}">
+                  <asvg:svgBlip xmlns:asvg="http://schemas.microsoft.com/office/drawing/2016/SVG/main" r:embed="rId9"/>
+                </a:ext>
+              </a:extLst>
+            </a:blip>
+            <a:stretch>
+              <a:fillRect/>
+            </a:stretch>
+          </p:blipFill>
+          <p:spPr>
+            <a:xfrm rot="16200000">
+              <a:off x="7881231" y="1960814"/>
+              <a:ext cx="536097" cy="415913"/>
+            </a:xfrm>
+            <a:prstGeom prst="rect">
+              <a:avLst/>
+            </a:prstGeom>
+          </p:spPr>
+        </p:pic>
+        <p:pic>
+          <p:nvPicPr>
+            <p:cNvPr id="10" name="Graphic 9" descr="Line arrow: Straight">
+              <a:extLst>
+                <a:ext uri="{FF2B5EF4-FFF2-40B4-BE49-F238E27FC236}">
+                  <a16:creationId xmlns:a16="http://schemas.microsoft.com/office/drawing/2014/main" id="{A96E9DA6-B34B-492F-B391-F68120C8F43B}"/>
+                </a:ext>
+              </a:extLst>
+            </p:cNvPr>
+            <p:cNvPicPr>
+              <a:picLocks noChangeAspect="1"/>
+            </p:cNvPicPr>
+            <p:nvPr/>
+          </p:nvPicPr>
+          <p:blipFill>
+            <a:blip r:embed="rId8">
+              <a:extLst>
+                <a:ext uri="{96DAC541-7B7A-43D3-8B79-37D633B846F1}">
+                  <asvg:svgBlip xmlns:asvg="http://schemas.microsoft.com/office/drawing/2016/SVG/main" r:embed="rId9"/>
+                </a:ext>
+              </a:extLst>
+            </a:blip>
+            <a:stretch>
+              <a:fillRect/>
+            </a:stretch>
+          </p:blipFill>
+          <p:spPr>
+            <a:xfrm rot="16200000">
+              <a:off x="10249643" y="1958433"/>
+              <a:ext cx="536097" cy="415913"/>
+            </a:xfrm>
+            <a:prstGeom prst="rect">
+              <a:avLst/>
+            </a:prstGeom>
+          </p:spPr>
+        </p:pic>
+        <p:pic>
+          <p:nvPicPr>
+            <p:cNvPr id="11" name="Graphic 10" descr="Line arrow: Straight">
+              <a:extLst>
+                <a:ext uri="{FF2B5EF4-FFF2-40B4-BE49-F238E27FC236}">
+                  <a16:creationId xmlns:a16="http://schemas.microsoft.com/office/drawing/2014/main" id="{0DB15E48-4CD7-45E9-84AE-B3BE0BE9BAC8}"/>
+                </a:ext>
+              </a:extLst>
+            </p:cNvPr>
+            <p:cNvPicPr>
+              <a:picLocks noChangeAspect="1"/>
+            </p:cNvPicPr>
+            <p:nvPr/>
+          </p:nvPicPr>
+          <p:blipFill>
+            <a:blip r:embed="rId8">
+              <a:extLst>
+                <a:ext uri="{96DAC541-7B7A-43D3-8B79-37D633B846F1}">
+                  <asvg:svgBlip xmlns:asvg="http://schemas.microsoft.com/office/drawing/2016/SVG/main" r:embed="rId9"/>
+                </a:ext>
+              </a:extLst>
+            </a:blip>
+            <a:stretch>
+              <a:fillRect/>
+            </a:stretch>
+          </p:blipFill>
+          <p:spPr>
+            <a:xfrm rot="16200000">
+              <a:off x="10794320" y="1573576"/>
+              <a:ext cx="536097" cy="415913"/>
+            </a:xfrm>
+            <a:prstGeom prst="rect">
+              <a:avLst/>
+            </a:prstGeom>
+          </p:spPr>
+        </p:pic>
+        <p:pic>
+          <p:nvPicPr>
+            <p:cNvPr id="12" name="Graphic 11" descr="Line arrow: Straight">
+              <a:extLst>
+                <a:ext uri="{FF2B5EF4-FFF2-40B4-BE49-F238E27FC236}">
+                  <a16:creationId xmlns:a16="http://schemas.microsoft.com/office/drawing/2014/main" id="{FD782086-8AAE-414B-B538-4BDA6901BCF8}"/>
+                </a:ext>
+              </a:extLst>
+            </p:cNvPr>
+            <p:cNvPicPr>
+              <a:picLocks noChangeAspect="1"/>
+            </p:cNvPicPr>
+            <p:nvPr/>
+          </p:nvPicPr>
+          <p:blipFill>
+            <a:blip r:embed="rId8">
+              <a:extLst>
+                <a:ext uri="{96DAC541-7B7A-43D3-8B79-37D633B846F1}">
+                  <asvg:svgBlip xmlns:asvg="http://schemas.microsoft.com/office/drawing/2016/SVG/main" r:embed="rId9"/>
+                </a:ext>
+              </a:extLst>
+            </a:blip>
+            <a:stretch>
+              <a:fillRect/>
+            </a:stretch>
+          </p:blipFill>
+          <p:spPr>
+            <a:xfrm rot="16200000">
+              <a:off x="10915409" y="1106746"/>
+              <a:ext cx="536097" cy="415913"/>
+            </a:xfrm>
+            <a:prstGeom prst="rect">
+              <a:avLst/>
+            </a:prstGeom>
+          </p:spPr>
+        </p:pic>
+        <p:pic>
+          <p:nvPicPr>
+            <p:cNvPr id="13" name="Graphic 12" descr="Line arrow: Straight">
+              <a:extLst>
+                <a:ext uri="{FF2B5EF4-FFF2-40B4-BE49-F238E27FC236}">
+                  <a16:creationId xmlns:a16="http://schemas.microsoft.com/office/drawing/2014/main" id="{0E4ED77D-F0FA-4B0F-8945-113EE3EFB247}"/>
+                </a:ext>
+              </a:extLst>
+            </p:cNvPr>
+            <p:cNvPicPr>
+              <a:picLocks noChangeAspect="1"/>
+            </p:cNvPicPr>
+            <p:nvPr/>
+          </p:nvPicPr>
+          <p:blipFill>
+            <a:blip r:embed="rId8">
+              <a:extLst>
+                <a:ext uri="{96DAC541-7B7A-43D3-8B79-37D633B846F1}">
+                  <asvg:svgBlip xmlns:asvg="http://schemas.microsoft.com/office/drawing/2016/SVG/main" r:embed="rId9"/>
+                </a:ext>
+              </a:extLst>
+            </a:blip>
+            <a:stretch>
+              <a:fillRect/>
+            </a:stretch>
+          </p:blipFill>
+          <p:spPr>
+            <a:xfrm rot="16200000">
+              <a:off x="11277800" y="1504309"/>
+              <a:ext cx="536097" cy="415913"/>
+            </a:xfrm>
+            <a:prstGeom prst="rect">
+              <a:avLst/>
+            </a:prstGeom>
+          </p:spPr>
+        </p:pic>
+      </p:grpSp>
+    </p:spTree>
+    <p:extLst>
+      <p:ext uri="{BB962C8B-B14F-4D97-AF65-F5344CB8AC3E}">
+        <p14:creationId xmlns:p14="http://schemas.microsoft.com/office/powerpoint/2010/main" val="169424178"/>
+      </p:ext>
+    </p:extLst>
+  </p:cSld>
+  <p:clrMapOvr>
+    <a:masterClrMapping/>
+  </p:clrMapOvr>
+</p:sld>
+</file>
+
+<file path=ppt/slides/slide13.xml><?xml version="1.0" encoding="utf-8"?>
+<p:sld xmlns:a="http://schemas.openxmlformats.org/drawingml/2006/main" xmlns:r="http://schemas.openxmlformats.org/officeDocument/2006/relationships" xmlns:p="http://schemas.openxmlformats.org/presentationml/2006/main">
+  <p:cSld>
+    <p:spTree>
+      <p:nvGrpSpPr>
+        <p:cNvPr id="1" name=""/>
+        <p:cNvGrpSpPr/>
+        <p:nvPr/>
+      </p:nvGrpSpPr>
+      <p:grpSpPr>
+        <a:xfrm>
+          <a:off x="0" y="0"/>
+          <a:ext cx="0" cy="0"/>
+          <a:chOff x="0" y="0"/>
+          <a:chExt cx="0" cy="0"/>
+        </a:xfrm>
+      </p:grpSpPr>
+      <p:sp>
+        <p:nvSpPr>
+          <p:cNvPr id="2" name="Title 1">
+            <a:extLst>
+              <a:ext uri="{FF2B5EF4-FFF2-40B4-BE49-F238E27FC236}">
                 <a16:creationId xmlns:a16="http://schemas.microsoft.com/office/drawing/2014/main" id="{91A44E3A-8928-435B-8372-105E37A3D380}"/>
               </a:ext>
             </a:extLst>
@@ -4423,7 +5211,15 @@
           <a:p>
             <a:r>
               <a:rPr lang="en-US" dirty="0"/>
-              <a:t>Cross-correlation seen at lag h=-1</a:t>
+              <a:t>Cross-correlation seen at lag </a:t>
+            </a:r>
+            <a:r>
+              <a:rPr lang="en-US" i="1" dirty="0"/>
+              <a:t>h</a:t>
+            </a:r>
+            <a:r>
+              <a:rPr lang="en-US" dirty="0"/>
+              <a:t>=-1</a:t>
             </a:r>
           </a:p>
           <a:p>
@@ -4437,7 +5233,15 @@
             <a:pPr lvl="1"/>
             <a:r>
               <a:rPr lang="en-US" dirty="0"/>
-              <a:t>Suggests that differenced debt at h=-1 may only be </a:t>
+              <a:t>Suggests that differenced debt at </a:t>
+            </a:r>
+            <a:r>
+              <a:rPr lang="en-US" i="1" dirty="0"/>
+              <a:t>h</a:t>
+            </a:r>
+            <a:r>
+              <a:rPr lang="en-US" dirty="0"/>
+              <a:t>=-1 may only be </a:t>
             </a:r>
             <a:r>
               <a:rPr lang="en-US" i="1" dirty="0"/>
@@ -4493,7 +5297,7 @@
 </p:sld>
 </file>
 
-<file path=ppt/slides/slide13.xml><?xml version="1.0" encoding="utf-8"?>
+<file path=ppt/slides/slide14.xml><?xml version="1.0" encoding="utf-8"?>
 <p:sld xmlns:a="http://schemas.openxmlformats.org/drawingml/2006/main" xmlns:r="http://schemas.openxmlformats.org/officeDocument/2006/relationships" xmlns:p="http://schemas.openxmlformats.org/presentationml/2006/main">
   <p:cSld>
     <p:spTree>
@@ -4540,7 +5344,15 @@
           <a:p>
             <a:r>
               <a:rPr lang="en-US" sz="2400" dirty="0"/>
-              <a:t>Model was fit with lagged debt to predict savings (h=-1)</a:t>
+              <a:t>Model was fit with lagged debt to predict savings (</a:t>
+            </a:r>
+            <a:r>
+              <a:rPr lang="en-US" sz="2400" i="1" dirty="0"/>
+              <a:t>h</a:t>
+            </a:r>
+            <a:r>
+              <a:rPr lang="en-US" sz="2400" dirty="0"/>
+              <a:t>=-1)</a:t>
             </a:r>
           </a:p>
           <a:p>
@@ -5287,7 +6099,7 @@
 </p:sld>
 </file>
 
-<file path=ppt/slides/slide14.xml><?xml version="1.0" encoding="utf-8"?>
+<file path=ppt/slides/slide15.xml><?xml version="1.0" encoding="utf-8"?>
 <p:sld xmlns:a="http://schemas.openxmlformats.org/drawingml/2006/main" xmlns:r="http://schemas.openxmlformats.org/officeDocument/2006/relationships" xmlns:p="http://schemas.openxmlformats.org/presentationml/2006/main">
   <p:cSld>
     <p:spTree>
@@ -5656,146 +6468,6 @@
 </p:sld>
 </file>
 
-<file path=ppt/slides/slide15.xml><?xml version="1.0" encoding="utf-8"?>
-<p:sld xmlns:a="http://schemas.openxmlformats.org/drawingml/2006/main" xmlns:r="http://schemas.openxmlformats.org/officeDocument/2006/relationships" xmlns:p="http://schemas.openxmlformats.org/presentationml/2006/main">
-  <p:cSld>
-    <p:spTree>
-      <p:nvGrpSpPr>
-        <p:cNvPr id="1" name=""/>
-        <p:cNvGrpSpPr/>
-        <p:nvPr/>
-      </p:nvGrpSpPr>
-      <p:grpSpPr>
-        <a:xfrm>
-          <a:off x="0" y="0"/>
-          <a:ext cx="0" cy="0"/>
-          <a:chOff x="0" y="0"/>
-          <a:chExt cx="0" cy="0"/>
-        </a:xfrm>
-      </p:grpSpPr>
-      <p:sp>
-        <p:nvSpPr>
-          <p:cNvPr id="2" name="Title 1">
-            <a:extLst>
-              <a:ext uri="{FF2B5EF4-FFF2-40B4-BE49-F238E27FC236}">
-                <a16:creationId xmlns:a16="http://schemas.microsoft.com/office/drawing/2014/main" id="{F7038F4E-C17C-476A-A8D5-BB1DF1332FAB}"/>
-              </a:ext>
-            </a:extLst>
-          </p:cNvPr>
-          <p:cNvSpPr>
-            <a:spLocks noGrp="1"/>
-          </p:cNvSpPr>
-          <p:nvPr>
-            <p:ph type="title"/>
-          </p:nvPr>
-        </p:nvSpPr>
-        <p:spPr/>
-        <p:txBody>
-          <a:bodyPr/>
-          <a:lstStyle/>
-          <a:p>
-            <a:r>
-              <a:rPr lang="en-US" dirty="0"/>
-              <a:t>DISCUSSION</a:t>
-            </a:r>
-          </a:p>
-        </p:txBody>
-      </p:sp>
-      <p:sp>
-        <p:nvSpPr>
-          <p:cNvPr id="3" name="Content Placeholder 2">
-            <a:extLst>
-              <a:ext uri="{FF2B5EF4-FFF2-40B4-BE49-F238E27FC236}">
-                <a16:creationId xmlns:a16="http://schemas.microsoft.com/office/drawing/2014/main" id="{22E7DCC7-2736-4166-86E2-FBBC23519826}"/>
-              </a:ext>
-            </a:extLst>
-          </p:cNvPr>
-          <p:cNvSpPr>
-            <a:spLocks noGrp="1"/>
-          </p:cNvSpPr>
-          <p:nvPr>
-            <p:ph idx="1"/>
-          </p:nvPr>
-        </p:nvSpPr>
-        <p:spPr/>
-        <p:txBody>
-          <a:bodyPr/>
-          <a:lstStyle/>
-          <a:p>
-            <a:r>
-              <a:rPr lang="en-US" dirty="0"/>
-              <a:t>Model for disposable personal income worked very well for forecasting</a:t>
-            </a:r>
-          </a:p>
-          <a:p>
-            <a:r>
-              <a:rPr lang="en-US" dirty="0"/>
-              <a:t>Model for savings vs. debt worked passably for forecasting</a:t>
-            </a:r>
-          </a:p>
-          <a:p>
-            <a:pPr lvl="1"/>
-            <a:r>
-              <a:rPr lang="en-US" dirty="0"/>
-              <a:t>Suggests another predictor may be needed</a:t>
-            </a:r>
-          </a:p>
-          <a:p>
-            <a:pPr lvl="2"/>
-            <a:r>
-              <a:rPr lang="en-US" dirty="0"/>
-              <a:t>Consider including a predictor for nonessential spending (e.g., recreation, dining out)</a:t>
-            </a:r>
-          </a:p>
-          <a:p>
-            <a:pPr lvl="1"/>
-            <a:r>
-              <a:rPr lang="en-US" dirty="0"/>
-              <a:t>Smoothing may help improve predictions when they occur at turning points</a:t>
-            </a:r>
-          </a:p>
-          <a:p>
-            <a:r>
-              <a:rPr lang="en-US" dirty="0"/>
-              <a:t>Toolset provided by </a:t>
-            </a:r>
-            <a:r>
-              <a:rPr lang="en-US" sz="2400" dirty="0">
-                <a:latin typeface="Lucida Console" panose="020B0609040504020204" pitchFamily="49" charset="0"/>
-              </a:rPr>
-              <a:t>forecast</a:t>
-            </a:r>
-            <a:r>
-              <a:rPr lang="en-US" dirty="0"/>
-              <a:t> package is easy to use, well documented, and plays well with </a:t>
-            </a:r>
-            <a:r>
-              <a:rPr lang="en-US" dirty="0" err="1"/>
-              <a:t>tidyverse</a:t>
-            </a:r>
-            <a:r>
-              <a:rPr lang="en-US" dirty="0"/>
-              <a:t> syntax and functions</a:t>
-            </a:r>
-          </a:p>
-          <a:p>
-            <a:endParaRPr lang="en-US" dirty="0"/>
-          </a:p>
-        </p:txBody>
-      </p:sp>
-    </p:spTree>
-    <p:extLst>
-      <p:ext uri="{BB962C8B-B14F-4D97-AF65-F5344CB8AC3E}">
-        <p14:creationId xmlns:p14="http://schemas.microsoft.com/office/powerpoint/2010/main" val="1765256109"/>
-      </p:ext>
-    </p:extLst>
-  </p:cSld>
-  <p:clrMapOvr>
-    <a:masterClrMapping/>
-  </p:clrMapOvr>
-</p:sld>
-</file>
-
 <file path=ppt/slides/slide16.xml><?xml version="1.0" encoding="utf-8"?>
 <p:sld xmlns:a="http://schemas.openxmlformats.org/drawingml/2006/main" xmlns:r="http://schemas.openxmlformats.org/officeDocument/2006/relationships" xmlns:p="http://schemas.openxmlformats.org/presentationml/2006/main">
   <p:cSld>
@@ -5818,7 +6490,7 @@
           <p:cNvPr id="2" name="Title 1">
             <a:extLst>
               <a:ext uri="{FF2B5EF4-FFF2-40B4-BE49-F238E27FC236}">
-                <a16:creationId xmlns:a16="http://schemas.microsoft.com/office/drawing/2014/main" id="{219FC961-4E73-41A2-A54A-93E766693C90}"/>
+                <a16:creationId xmlns:a16="http://schemas.microsoft.com/office/drawing/2014/main" id="{F7038F4E-C17C-476A-A8D5-BB1DF1332FAB}"/>
               </a:ext>
             </a:extLst>
           </p:cNvPr>
@@ -5836,7 +6508,7 @@
           <a:p>
             <a:r>
               <a:rPr lang="en-US" dirty="0"/>
-              <a:t>LIMITATIONS</a:t>
+              <a:t>DISCUSSION</a:t>
             </a:r>
           </a:p>
         </p:txBody>
@@ -5846,7 +6518,7 @@
           <p:cNvPr id="3" name="Content Placeholder 2">
             <a:extLst>
               <a:ext uri="{FF2B5EF4-FFF2-40B4-BE49-F238E27FC236}">
-                <a16:creationId xmlns:a16="http://schemas.microsoft.com/office/drawing/2014/main" id="{148AF7E9-44A2-48A8-A8CF-67A80389B59B}"/>
+                <a16:creationId xmlns:a16="http://schemas.microsoft.com/office/drawing/2014/main" id="{22E7DCC7-2736-4166-86E2-FBBC23519826}"/>
               </a:ext>
             </a:extLst>
           </p:cNvPr>
@@ -5859,49 +6531,39 @@
         </p:nvSpPr>
         <p:spPr/>
         <p:txBody>
-          <a:bodyPr>
-            <a:normAutofit/>
-          </a:bodyPr>
+          <a:bodyPr/>
           <a:lstStyle/>
           <a:p>
             <a:r>
               <a:rPr lang="en-US" dirty="0"/>
-              <a:t>Data was already seasonally adjusted when it was obtained</a:t>
+              <a:t>Model for disposable personal income worked very well for forecasting</a:t>
+            </a:r>
+          </a:p>
+          <a:p>
+            <a:r>
+              <a:rPr lang="en-US" dirty="0"/>
+              <a:t>Model for savings vs. debt worked passably for forecasting</a:t>
             </a:r>
           </a:p>
           <a:p>
             <a:pPr lvl="1"/>
             <a:r>
               <a:rPr lang="en-US" dirty="0"/>
-              <a:t>Limits ability to incorporate additional datapoints when they become available</a:t>
+              <a:t>Suggests another predictor may be needed</a:t>
             </a:r>
           </a:p>
           <a:p>
             <a:pPr lvl="2"/>
             <a:r>
               <a:rPr lang="en-US" dirty="0"/>
-              <a:t>Data is not static, therefore not wise to simply gather future datapoints and compare to predicted values (not really an apples-to-apples comparison)</a:t>
+              <a:t>Consider including a predictor for nonessential spending (e.g., recreation, dining out)</a:t>
             </a:r>
           </a:p>
           <a:p>
             <a:pPr lvl="1"/>
             <a:r>
               <a:rPr lang="en-US" dirty="0"/>
-              <a:t>Limits usefulness of frequency approach</a:t>
-            </a:r>
-          </a:p>
-          <a:p>
-            <a:pPr lvl="2"/>
-            <a:r>
-              <a:rPr lang="en-US" dirty="0"/>
-              <a:t>Some seasonality remained in each TS, but it was of diminishing magnitude in comparison to scale of raw data</a:t>
-            </a:r>
-          </a:p>
-          <a:p>
-            <a:pPr lvl="2"/>
-            <a:r>
-              <a:rPr lang="en-US" dirty="0"/>
-              <a:t>Periodogram analysis was performed for one TS (not shown here) but was predictably uninteresting</a:t>
+              <a:t>Smoothing may help improve predictions when they occur at turning points</a:t>
             </a:r>
           </a:p>
         </p:txBody>
@@ -5909,7 +6571,7 @@
     </p:spTree>
     <p:extLst>
       <p:ext uri="{BB962C8B-B14F-4D97-AF65-F5344CB8AC3E}">
-        <p14:creationId xmlns:p14="http://schemas.microsoft.com/office/powerpoint/2010/main" val="1263930634"/>
+        <p14:creationId xmlns:p14="http://schemas.microsoft.com/office/powerpoint/2010/main" val="1765256109"/>
       </p:ext>
     </p:extLst>
   </p:cSld>
@@ -5941,7 +6603,7 @@
           <p:cNvPr id="2" name="Title 1">
             <a:extLst>
               <a:ext uri="{FF2B5EF4-FFF2-40B4-BE49-F238E27FC236}">
-                <a16:creationId xmlns:a16="http://schemas.microsoft.com/office/drawing/2014/main" id="{0D3D2F6A-581F-4A92-A810-C702D746F729}"/>
+                <a16:creationId xmlns:a16="http://schemas.microsoft.com/office/drawing/2014/main" id="{219FC961-4E73-41A2-A54A-93E766693C90}"/>
               </a:ext>
             </a:extLst>
           </p:cNvPr>
@@ -5959,7 +6621,7 @@
           <a:p>
             <a:r>
               <a:rPr lang="en-US" dirty="0"/>
-              <a:t>CONCLUSION</a:t>
+              <a:t>LIMITATIONS</a:t>
             </a:r>
           </a:p>
         </p:txBody>
@@ -5969,7 +6631,7 @@
           <p:cNvPr id="3" name="Content Placeholder 2">
             <a:extLst>
               <a:ext uri="{FF2B5EF4-FFF2-40B4-BE49-F238E27FC236}">
-                <a16:creationId xmlns:a16="http://schemas.microsoft.com/office/drawing/2014/main" id="{AF765D17-C7D1-460C-9AB0-8782FF3D7A66}"/>
+                <a16:creationId xmlns:a16="http://schemas.microsoft.com/office/drawing/2014/main" id="{148AF7E9-44A2-48A8-A8CF-67A80389B59B}"/>
               </a:ext>
             </a:extLst>
           </p:cNvPr>
@@ -5982,18 +6644,49 @@
         </p:nvSpPr>
         <p:spPr/>
         <p:txBody>
-          <a:bodyPr/>
+          <a:bodyPr>
+            <a:normAutofit/>
+          </a:bodyPr>
           <a:lstStyle/>
           <a:p>
             <a:r>
               <a:rPr lang="en-US" dirty="0"/>
-              <a:t>Forecasting works well when a strong trend is seen</a:t>
-            </a:r>
-          </a:p>
-          <a:p>
+              <a:t>Data was already seasonally adjusted when it was obtained</a:t>
+            </a:r>
+          </a:p>
+          <a:p>
+            <a:pPr lvl="1"/>
             <a:r>
               <a:rPr lang="en-US" dirty="0"/>
-              <a:t>Forecasting with a lagged predictor may perform acceptably but not well when data is volatile and/or when CCF plot shows a weak cross-correlation</a:t>
+              <a:t>Limits ability to incorporate additional datapoints when they become available</a:t>
+            </a:r>
+          </a:p>
+          <a:p>
+            <a:pPr lvl="2"/>
+            <a:r>
+              <a:rPr lang="en-US" dirty="0"/>
+              <a:t>Data is not static, therefore not wise to simply gather future datapoints and compare to predicted values (not really an apples-to-apples comparison)</a:t>
+            </a:r>
+          </a:p>
+          <a:p>
+            <a:pPr lvl="1"/>
+            <a:r>
+              <a:rPr lang="en-US" dirty="0"/>
+              <a:t>Limits usefulness of frequency approach</a:t>
+            </a:r>
+          </a:p>
+          <a:p>
+            <a:pPr lvl="2"/>
+            <a:r>
+              <a:rPr lang="en-US" dirty="0"/>
+              <a:t>Some seasonality remained in each TS, but it was of diminishing magnitude in comparison to scale of raw data</a:t>
+            </a:r>
+          </a:p>
+          <a:p>
+            <a:pPr lvl="2"/>
+            <a:r>
+              <a:rPr lang="en-US" dirty="0"/>
+              <a:t>Periodogram was predictably uninteresting</a:t>
             </a:r>
           </a:p>
         </p:txBody>
@@ -6001,7 +6694,7 @@
     </p:spTree>
     <p:extLst>
       <p:ext uri="{BB962C8B-B14F-4D97-AF65-F5344CB8AC3E}">
-        <p14:creationId xmlns:p14="http://schemas.microsoft.com/office/powerpoint/2010/main" val="3083234804"/>
+        <p14:creationId xmlns:p14="http://schemas.microsoft.com/office/powerpoint/2010/main" val="1263930634"/>
       </p:ext>
     </p:extLst>
   </p:cSld>
@@ -6033,6 +6726,122 @@
           <p:cNvPr id="2" name="Title 1">
             <a:extLst>
               <a:ext uri="{FF2B5EF4-FFF2-40B4-BE49-F238E27FC236}">
+                <a16:creationId xmlns:a16="http://schemas.microsoft.com/office/drawing/2014/main" id="{0D3D2F6A-581F-4A92-A810-C702D746F729}"/>
+              </a:ext>
+            </a:extLst>
+          </p:cNvPr>
+          <p:cNvSpPr>
+            <a:spLocks noGrp="1"/>
+          </p:cNvSpPr>
+          <p:nvPr>
+            <p:ph type="title"/>
+          </p:nvPr>
+        </p:nvSpPr>
+        <p:spPr/>
+        <p:txBody>
+          <a:bodyPr/>
+          <a:lstStyle/>
+          <a:p>
+            <a:r>
+              <a:rPr lang="en-US" dirty="0"/>
+              <a:t>CONCLUSION</a:t>
+            </a:r>
+          </a:p>
+        </p:txBody>
+      </p:sp>
+      <p:sp>
+        <p:nvSpPr>
+          <p:cNvPr id="3" name="Content Placeholder 2">
+            <a:extLst>
+              <a:ext uri="{FF2B5EF4-FFF2-40B4-BE49-F238E27FC236}">
+                <a16:creationId xmlns:a16="http://schemas.microsoft.com/office/drawing/2014/main" id="{AF765D17-C7D1-460C-9AB0-8782FF3D7A66}"/>
+              </a:ext>
+            </a:extLst>
+          </p:cNvPr>
+          <p:cNvSpPr>
+            <a:spLocks noGrp="1"/>
+          </p:cNvSpPr>
+          <p:nvPr>
+            <p:ph idx="1"/>
+          </p:nvPr>
+        </p:nvSpPr>
+        <p:spPr/>
+        <p:txBody>
+          <a:bodyPr/>
+          <a:lstStyle/>
+          <a:p>
+            <a:r>
+              <a:rPr lang="en-US" dirty="0"/>
+              <a:t>Forecasting works well when a strong trend is seen</a:t>
+            </a:r>
+          </a:p>
+          <a:p>
+            <a:r>
+              <a:rPr lang="en-US" dirty="0"/>
+              <a:t>Forecasting with a lagged predictor may perform acceptably but not well when data is locally volatile and/or when CCF plot shows a weak cross-correlation</a:t>
+            </a:r>
+          </a:p>
+          <a:p>
+            <a:r>
+              <a:rPr lang="en-US" dirty="0"/>
+              <a:t>Time series analysis toolset provided by </a:t>
+            </a:r>
+            <a:r>
+              <a:rPr lang="en-US" sz="2400" dirty="0">
+                <a:latin typeface="Lucida Console" panose="020B0609040504020204" pitchFamily="49" charset="0"/>
+              </a:rPr>
+              <a:t>forecast</a:t>
+            </a:r>
+            <a:r>
+              <a:rPr lang="en-US" dirty="0"/>
+              <a:t> package is easy to use, well documented, and plays well with </a:t>
+            </a:r>
+            <a:r>
+              <a:rPr lang="en-US" dirty="0" err="1"/>
+              <a:t>tidyverse</a:t>
+            </a:r>
+            <a:r>
+              <a:rPr lang="en-US" dirty="0"/>
+              <a:t> syntax and functions</a:t>
+            </a:r>
+          </a:p>
+        </p:txBody>
+      </p:sp>
+    </p:spTree>
+    <p:extLst>
+      <p:ext uri="{BB962C8B-B14F-4D97-AF65-F5344CB8AC3E}">
+        <p14:creationId xmlns:p14="http://schemas.microsoft.com/office/powerpoint/2010/main" val="3083234804"/>
+      </p:ext>
+    </p:extLst>
+  </p:cSld>
+  <p:clrMapOvr>
+    <a:masterClrMapping/>
+  </p:clrMapOvr>
+</p:sld>
+</file>
+
+<file path=ppt/slides/slide19.xml><?xml version="1.0" encoding="utf-8"?>
+<p:sld xmlns:a="http://schemas.openxmlformats.org/drawingml/2006/main" xmlns:r="http://schemas.openxmlformats.org/officeDocument/2006/relationships" xmlns:p="http://schemas.openxmlformats.org/presentationml/2006/main">
+  <p:cSld>
+    <p:spTree>
+      <p:nvGrpSpPr>
+        <p:cNvPr id="1" name=""/>
+        <p:cNvGrpSpPr/>
+        <p:nvPr/>
+      </p:nvGrpSpPr>
+      <p:grpSpPr>
+        <a:xfrm>
+          <a:off x="0" y="0"/>
+          <a:ext cx="0" cy="0"/>
+          <a:chOff x="0" y="0"/>
+          <a:chExt cx="0" cy="0"/>
+        </a:xfrm>
+      </p:grpSpPr>
+      <p:sp>
+        <p:nvSpPr>
+          <p:cNvPr id="2" name="Title 1">
+            <a:extLst>
+              <a:ext uri="{FF2B5EF4-FFF2-40B4-BE49-F238E27FC236}">
                 <a16:creationId xmlns:a16="http://schemas.microsoft.com/office/drawing/2014/main" id="{0879B350-2EF4-446D-81EA-088D5EA1B2AF}"/>
               </a:ext>
             </a:extLst>
@@ -6096,11 +6905,18 @@
             </a:pPr>
             <a:r>
               <a:rPr lang="en-US" dirty="0">
+                <a:solidFill>
+                  <a:srgbClr val="1FC967"/>
+                </a:solidFill>
                 <a:hlinkClick r:id="rId2"/>
               </a:rPr>
               <a:t>https://github.com/kmprioliPROF/MAT_8444_Final_Project</a:t>
             </a:r>
-            <a:endParaRPr lang="en-US" dirty="0"/>
+            <a:endParaRPr lang="en-US" dirty="0">
+              <a:solidFill>
+                <a:srgbClr val="1FC967"/>
+              </a:solidFill>
+            </a:endParaRPr>
           </a:p>
           <a:p>
             <a:pPr marL="0" indent="0">
@@ -6153,328 +6969,6 @@
 </p:sld>
 </file>
 
-<file path=ppt/slides/slide19.xml><?xml version="1.0" encoding="utf-8"?>
-<p:sld xmlns:a="http://schemas.openxmlformats.org/drawingml/2006/main" xmlns:r="http://schemas.openxmlformats.org/officeDocument/2006/relationships" xmlns:p="http://schemas.openxmlformats.org/presentationml/2006/main">
-  <p:cSld>
-    <p:spTree>
-      <p:nvGrpSpPr>
-        <p:cNvPr id="1" name=""/>
-        <p:cNvGrpSpPr/>
-        <p:nvPr/>
-      </p:nvGrpSpPr>
-      <p:grpSpPr>
-        <a:xfrm>
-          <a:off x="0" y="0"/>
-          <a:ext cx="0" cy="0"/>
-          <a:chOff x="0" y="0"/>
-          <a:chExt cx="0" cy="0"/>
-        </a:xfrm>
-      </p:grpSpPr>
-      <p:sp>
-        <p:nvSpPr>
-          <p:cNvPr id="2" name="Title 1">
-            <a:extLst>
-              <a:ext uri="{FF2B5EF4-FFF2-40B4-BE49-F238E27FC236}">
-                <a16:creationId xmlns:a16="http://schemas.microsoft.com/office/drawing/2014/main" id="{6DC7B1ED-694E-40A6-8BFD-E0658AE4A81F}"/>
-              </a:ext>
-            </a:extLst>
-          </p:cNvPr>
-          <p:cNvSpPr>
-            <a:spLocks noGrp="1"/>
-          </p:cNvSpPr>
-          <p:nvPr>
-            <p:ph type="title"/>
-          </p:nvPr>
-        </p:nvSpPr>
-        <p:spPr/>
-        <p:txBody>
-          <a:bodyPr/>
-          <a:lstStyle/>
-          <a:p>
-            <a:r>
-              <a:rPr lang="en-US" dirty="0"/>
-              <a:t>REFERENCES</a:t>
-            </a:r>
-          </a:p>
-        </p:txBody>
-      </p:sp>
-      <p:sp>
-        <p:nvSpPr>
-          <p:cNvPr id="3" name="Content Placeholder 2">
-            <a:extLst>
-              <a:ext uri="{FF2B5EF4-FFF2-40B4-BE49-F238E27FC236}">
-                <a16:creationId xmlns:a16="http://schemas.microsoft.com/office/drawing/2014/main" id="{DEFE95A9-4EBA-4FD5-900B-D5815B5F15E8}"/>
-              </a:ext>
-            </a:extLst>
-          </p:cNvPr>
-          <p:cNvSpPr>
-            <a:spLocks noGrp="1"/>
-          </p:cNvSpPr>
-          <p:nvPr>
-            <p:ph idx="1"/>
-          </p:nvPr>
-        </p:nvSpPr>
-        <p:spPr>
-          <a:noFill/>
-        </p:spPr>
-        <p:txBody>
-          <a:bodyPr>
-            <a:normAutofit/>
-          </a:bodyPr>
-          <a:lstStyle/>
-          <a:p>
-            <a:pPr marL="347663" indent="-347663">
-              <a:lnSpc>
-                <a:spcPct val="100000"/>
-              </a:lnSpc>
-              <a:spcBef>
-                <a:spcPts val="0"/>
-              </a:spcBef>
-              <a:buFont typeface="+mj-lt"/>
-              <a:buAutoNum type="arabicPeriod"/>
-            </a:pPr>
-            <a:r>
-              <a:rPr lang="en-US" sz="1600" dirty="0"/>
-              <a:t>Federal Reserve Bank of New York Center for Microeconomic Data.  2019.  “Quarterly Report on Household Debt and Credit:  2018 Q4.” </a:t>
-            </a:r>
-            <a:r>
-              <a:rPr lang="en-US" sz="1600" dirty="0">
-                <a:hlinkClick r:id="rId2"/>
-              </a:rPr>
-              <a:t>https://www.newyorkfed.org/medialibrary/interactives/householdcredit/data/pdf//HHDC_2018Q4.pdf</a:t>
-            </a:r>
-            <a:r>
-              <a:rPr lang="en-US" sz="1600" dirty="0"/>
-              <a:t>.</a:t>
-            </a:r>
-          </a:p>
-          <a:p>
-            <a:pPr marL="347663" indent="-347663">
-              <a:lnSpc>
-                <a:spcPct val="100000"/>
-              </a:lnSpc>
-              <a:spcBef>
-                <a:spcPts val="0"/>
-              </a:spcBef>
-              <a:buFont typeface="+mj-lt"/>
-              <a:buAutoNum type="arabicPeriod"/>
-            </a:pPr>
-            <a:r>
-              <a:rPr lang="en-US" sz="1600" dirty="0" err="1"/>
-              <a:t>Organisation</a:t>
-            </a:r>
-            <a:r>
-              <a:rPr lang="en-US" sz="1600" dirty="0"/>
-              <a:t> for Economic Co-operation and Development.  2018.  “Household Spending.” </a:t>
-            </a:r>
-            <a:r>
-              <a:rPr lang="en-US" sz="1600" dirty="0">
-                <a:hlinkClick r:id="rId3"/>
-              </a:rPr>
-              <a:t>https://data.oecd.org/hha/household-spending.htm</a:t>
-            </a:r>
-            <a:r>
-              <a:rPr lang="en-US" sz="1600" dirty="0"/>
-              <a:t>.</a:t>
-            </a:r>
-          </a:p>
-          <a:p>
-            <a:pPr marL="347663" indent="-347663">
-              <a:lnSpc>
-                <a:spcPct val="100000"/>
-              </a:lnSpc>
-              <a:spcBef>
-                <a:spcPts val="0"/>
-              </a:spcBef>
-              <a:buFont typeface="+mj-lt"/>
-              <a:buAutoNum type="arabicPeriod"/>
-            </a:pPr>
-            <a:r>
-              <a:rPr lang="en-US" sz="1600" dirty="0" err="1"/>
-              <a:t>Organisation</a:t>
-            </a:r>
-            <a:r>
-              <a:rPr lang="en-US" sz="1600" dirty="0"/>
-              <a:t> for Economic Co-operation and Development.  2018.  “Household Savings.” </a:t>
-            </a:r>
-            <a:r>
-              <a:rPr lang="en-US" sz="1600" dirty="0">
-                <a:hlinkClick r:id="rId4"/>
-              </a:rPr>
-              <a:t>https://data.oecd.org/hha/household-savings.htm</a:t>
-            </a:r>
-            <a:r>
-              <a:rPr lang="en-US" sz="1600" dirty="0"/>
-              <a:t>.</a:t>
-            </a:r>
-          </a:p>
-          <a:p>
-            <a:pPr marL="347663" indent="-347663">
-              <a:lnSpc>
-                <a:spcPct val="100000"/>
-              </a:lnSpc>
-              <a:spcBef>
-                <a:spcPts val="0"/>
-              </a:spcBef>
-              <a:buFont typeface="+mj-lt"/>
-              <a:buAutoNum type="arabicPeriod"/>
-            </a:pPr>
-            <a:r>
-              <a:rPr lang="en-US" sz="1600" dirty="0"/>
-              <a:t>Federal Reserve Bank of St. Louis.  2016.  “Consumer Price Index:  Total All Items for the United States.” </a:t>
-            </a:r>
-            <a:r>
-              <a:rPr lang="en-US" sz="1600" dirty="0">
-                <a:hlinkClick r:id="rId5"/>
-              </a:rPr>
-              <a:t>https://fred.stlouisfed.org/series/CPALTT01USM661S</a:t>
-            </a:r>
-            <a:r>
-              <a:rPr lang="en-US" sz="1600" dirty="0"/>
-              <a:t>.</a:t>
-            </a:r>
-          </a:p>
-          <a:p>
-            <a:pPr marL="347663" indent="-347663">
-              <a:lnSpc>
-                <a:spcPct val="100000"/>
-              </a:lnSpc>
-              <a:spcBef>
-                <a:spcPts val="0"/>
-              </a:spcBef>
-              <a:buFont typeface="+mj-lt"/>
-              <a:buAutoNum type="arabicPeriod"/>
-            </a:pPr>
-            <a:r>
-              <a:rPr lang="en-US" sz="1600" dirty="0"/>
-              <a:t>Hyndman R, </a:t>
-            </a:r>
-            <a:r>
-              <a:rPr lang="en-US" sz="1600" dirty="0" err="1"/>
-              <a:t>Athanasopoulos</a:t>
-            </a:r>
-            <a:r>
-              <a:rPr lang="en-US" sz="1600" dirty="0"/>
-              <a:t> G, </a:t>
-            </a:r>
-            <a:r>
-              <a:rPr lang="en-US" sz="1600" dirty="0" err="1"/>
-              <a:t>Bergmeir</a:t>
-            </a:r>
-            <a:r>
-              <a:rPr lang="en-US" sz="1600" dirty="0"/>
-              <a:t> C, Caceres G, Chhay L, O'Hara-Wild M, Petropoulos F, </a:t>
-            </a:r>
-            <a:r>
-              <a:rPr lang="en-US" sz="1600" dirty="0" err="1"/>
-              <a:t>Razbash</a:t>
-            </a:r>
-            <a:r>
-              <a:rPr lang="en-US" sz="1600" dirty="0"/>
-              <a:t> S, Wang E, Yasmeen F.  2019.  “forecast: Forecasting functions for time series and linear models.” R package version 8.5. </a:t>
-            </a:r>
-            <a:r>
-              <a:rPr lang="en-US" sz="1600" dirty="0">
-                <a:hlinkClick r:id="rId6"/>
-              </a:rPr>
-              <a:t>http://pkg.robjhyndman.com/forecast</a:t>
-            </a:r>
-            <a:r>
-              <a:rPr lang="en-US" sz="1600" dirty="0"/>
-              <a:t>.</a:t>
-            </a:r>
-          </a:p>
-          <a:p>
-            <a:pPr marL="347663" indent="-347663">
-              <a:lnSpc>
-                <a:spcPct val="100000"/>
-              </a:lnSpc>
-              <a:spcBef>
-                <a:spcPts val="0"/>
-              </a:spcBef>
-              <a:buFont typeface="+mj-lt"/>
-              <a:buAutoNum type="arabicPeriod"/>
-            </a:pPr>
-            <a:r>
-              <a:rPr lang="en-US" sz="1600" dirty="0"/>
-              <a:t>Federal Reserve Bank of St. Louis.  2018.  “Household Debt Service Payments as a Percent of Disposable Personal Income.” </a:t>
-            </a:r>
-            <a:r>
-              <a:rPr lang="en-US" sz="1600" dirty="0">
-                <a:hlinkClick r:id="rId7"/>
-              </a:rPr>
-              <a:t>https://fred.stlouisfed.org/series/TDSP</a:t>
-            </a:r>
-            <a:r>
-              <a:rPr lang="en-US" sz="1600" dirty="0"/>
-              <a:t>.</a:t>
-            </a:r>
-          </a:p>
-          <a:p>
-            <a:pPr marL="347663" indent="-347663">
-              <a:lnSpc>
-                <a:spcPct val="100000"/>
-              </a:lnSpc>
-              <a:spcBef>
-                <a:spcPts val="0"/>
-              </a:spcBef>
-              <a:buFont typeface="+mj-lt"/>
-              <a:buAutoNum type="arabicPeriod"/>
-            </a:pPr>
-            <a:r>
-              <a:rPr lang="en-US" sz="1600" dirty="0"/>
-              <a:t>Federal Reserve Bank of St. Louis.  2018.  “</a:t>
-            </a:r>
-            <a:r>
-              <a:rPr lang="it-IT" sz="1600" dirty="0"/>
-              <a:t>Real Disposable Personal Income – Per Capita.</a:t>
-            </a:r>
-            <a:r>
-              <a:rPr lang="en-US" sz="1600" dirty="0"/>
-              <a:t>” </a:t>
-            </a:r>
-            <a:r>
-              <a:rPr lang="en-US" sz="1600" dirty="0">
-                <a:hlinkClick r:id="rId8"/>
-              </a:rPr>
-              <a:t>https://fred.stlouisfed.org/series/A229RX0Q048SBEA</a:t>
-            </a:r>
-            <a:r>
-              <a:rPr lang="en-US" sz="1600" dirty="0"/>
-              <a:t>.</a:t>
-            </a:r>
-          </a:p>
-          <a:p>
-            <a:pPr marL="347663" indent="-347663">
-              <a:lnSpc>
-                <a:spcPct val="100000"/>
-              </a:lnSpc>
-              <a:spcBef>
-                <a:spcPts val="0"/>
-              </a:spcBef>
-              <a:buFont typeface="+mj-lt"/>
-              <a:buAutoNum type="arabicPeriod"/>
-            </a:pPr>
-            <a:r>
-              <a:rPr lang="en-US" sz="1600" dirty="0"/>
-              <a:t>Federal Reserve Bank of St. Louis.  2018.  “Personal Saving as a Percent of Disposable Personal Income.” https://fred.stlouisfed.org/series/A072RC1Q156SBEA.</a:t>
-            </a:r>
-          </a:p>
-        </p:txBody>
-      </p:sp>
-    </p:spTree>
-    <p:extLst>
-      <p:ext uri="{BB962C8B-B14F-4D97-AF65-F5344CB8AC3E}">
-        <p14:creationId xmlns:p14="http://schemas.microsoft.com/office/powerpoint/2010/main" val="4229999681"/>
-      </p:ext>
-    </p:extLst>
-  </p:cSld>
-  <p:clrMapOvr>
-    <a:masterClrMapping/>
-  </p:clrMapOvr>
-</p:sld>
-</file>
-
 <file path=ppt/slides/slide2.xml><?xml version="1.0" encoding="utf-8"?>
 <p:sld xmlns:a="http://schemas.openxmlformats.org/drawingml/2006/main" xmlns:r="http://schemas.openxmlformats.org/officeDocument/2006/relationships" xmlns:p="http://schemas.openxmlformats.org/presentationml/2006/main">
   <p:cSld>
@@ -6598,6 +7092,328 @@
     <p:extLst>
       <p:ext uri="{BB962C8B-B14F-4D97-AF65-F5344CB8AC3E}">
         <p14:creationId xmlns:p14="http://schemas.microsoft.com/office/powerpoint/2010/main" val="2720812227"/>
+      </p:ext>
+    </p:extLst>
+  </p:cSld>
+  <p:clrMapOvr>
+    <a:masterClrMapping/>
+  </p:clrMapOvr>
+</p:sld>
+</file>
+
+<file path=ppt/slides/slide20.xml><?xml version="1.0" encoding="utf-8"?>
+<p:sld xmlns:a="http://schemas.openxmlformats.org/drawingml/2006/main" xmlns:r="http://schemas.openxmlformats.org/officeDocument/2006/relationships" xmlns:p="http://schemas.openxmlformats.org/presentationml/2006/main">
+  <p:cSld>
+    <p:spTree>
+      <p:nvGrpSpPr>
+        <p:cNvPr id="1" name=""/>
+        <p:cNvGrpSpPr/>
+        <p:nvPr/>
+      </p:nvGrpSpPr>
+      <p:grpSpPr>
+        <a:xfrm>
+          <a:off x="0" y="0"/>
+          <a:ext cx="0" cy="0"/>
+          <a:chOff x="0" y="0"/>
+          <a:chExt cx="0" cy="0"/>
+        </a:xfrm>
+      </p:grpSpPr>
+      <p:sp>
+        <p:nvSpPr>
+          <p:cNvPr id="2" name="Title 1">
+            <a:extLst>
+              <a:ext uri="{FF2B5EF4-FFF2-40B4-BE49-F238E27FC236}">
+                <a16:creationId xmlns:a16="http://schemas.microsoft.com/office/drawing/2014/main" id="{6DC7B1ED-694E-40A6-8BFD-E0658AE4A81F}"/>
+              </a:ext>
+            </a:extLst>
+          </p:cNvPr>
+          <p:cNvSpPr>
+            <a:spLocks noGrp="1"/>
+          </p:cNvSpPr>
+          <p:nvPr>
+            <p:ph type="title"/>
+          </p:nvPr>
+        </p:nvSpPr>
+        <p:spPr/>
+        <p:txBody>
+          <a:bodyPr/>
+          <a:lstStyle/>
+          <a:p>
+            <a:r>
+              <a:rPr lang="en-US" dirty="0"/>
+              <a:t>REFERENCES</a:t>
+            </a:r>
+          </a:p>
+        </p:txBody>
+      </p:sp>
+      <p:sp>
+        <p:nvSpPr>
+          <p:cNvPr id="3" name="Content Placeholder 2">
+            <a:extLst>
+              <a:ext uri="{FF2B5EF4-FFF2-40B4-BE49-F238E27FC236}">
+                <a16:creationId xmlns:a16="http://schemas.microsoft.com/office/drawing/2014/main" id="{DEFE95A9-4EBA-4FD5-900B-D5815B5F15E8}"/>
+              </a:ext>
+            </a:extLst>
+          </p:cNvPr>
+          <p:cNvSpPr>
+            <a:spLocks noGrp="1"/>
+          </p:cNvSpPr>
+          <p:nvPr>
+            <p:ph idx="1"/>
+          </p:nvPr>
+        </p:nvSpPr>
+        <p:spPr>
+          <a:noFill/>
+        </p:spPr>
+        <p:txBody>
+          <a:bodyPr>
+            <a:normAutofit/>
+          </a:bodyPr>
+          <a:lstStyle/>
+          <a:p>
+            <a:pPr marL="347663" indent="-347663">
+              <a:lnSpc>
+                <a:spcPct val="100000"/>
+              </a:lnSpc>
+              <a:spcBef>
+                <a:spcPts val="0"/>
+              </a:spcBef>
+              <a:buFont typeface="+mj-lt"/>
+              <a:buAutoNum type="arabicPeriod"/>
+            </a:pPr>
+            <a:r>
+              <a:rPr lang="en-US" sz="1600" dirty="0"/>
+              <a:t>Federal Reserve Bank of New York Center for Microeconomic Data.  2019.  “Quarterly Report on Household Debt and Credit:  2018 Q4.” </a:t>
+            </a:r>
+            <a:r>
+              <a:rPr lang="en-US" sz="1600" dirty="0">
+                <a:hlinkClick r:id="rId2"/>
+              </a:rPr>
+              <a:t>https://www.newyorkfed.org/medialibrary/interactives/householdcredit/data/pdf//HHDC_2018Q4.pdf</a:t>
+            </a:r>
+            <a:r>
+              <a:rPr lang="en-US" sz="1600" dirty="0"/>
+              <a:t>.</a:t>
+            </a:r>
+          </a:p>
+          <a:p>
+            <a:pPr marL="347663" indent="-347663">
+              <a:lnSpc>
+                <a:spcPct val="100000"/>
+              </a:lnSpc>
+              <a:spcBef>
+                <a:spcPts val="0"/>
+              </a:spcBef>
+              <a:buFont typeface="+mj-lt"/>
+              <a:buAutoNum type="arabicPeriod"/>
+            </a:pPr>
+            <a:r>
+              <a:rPr lang="en-US" sz="1600" dirty="0" err="1"/>
+              <a:t>Organisation</a:t>
+            </a:r>
+            <a:r>
+              <a:rPr lang="en-US" sz="1600" dirty="0"/>
+              <a:t> for Economic Co-operation and Development.  2018.  “Household Spending.” </a:t>
+            </a:r>
+            <a:r>
+              <a:rPr lang="en-US" sz="1600" dirty="0">
+                <a:hlinkClick r:id="rId3"/>
+              </a:rPr>
+              <a:t>https://data.oecd.org/hha/household-spending.htm</a:t>
+            </a:r>
+            <a:r>
+              <a:rPr lang="en-US" sz="1600" dirty="0"/>
+              <a:t>.</a:t>
+            </a:r>
+          </a:p>
+          <a:p>
+            <a:pPr marL="347663" indent="-347663">
+              <a:lnSpc>
+                <a:spcPct val="100000"/>
+              </a:lnSpc>
+              <a:spcBef>
+                <a:spcPts val="0"/>
+              </a:spcBef>
+              <a:buFont typeface="+mj-lt"/>
+              <a:buAutoNum type="arabicPeriod"/>
+            </a:pPr>
+            <a:r>
+              <a:rPr lang="en-US" sz="1600" dirty="0" err="1"/>
+              <a:t>Organisation</a:t>
+            </a:r>
+            <a:r>
+              <a:rPr lang="en-US" sz="1600" dirty="0"/>
+              <a:t> for Economic Co-operation and Development.  2018.  “Household Savings.” </a:t>
+            </a:r>
+            <a:r>
+              <a:rPr lang="en-US" sz="1600" dirty="0">
+                <a:hlinkClick r:id="rId4"/>
+              </a:rPr>
+              <a:t>https://data.oecd.org/hha/household-savings.htm</a:t>
+            </a:r>
+            <a:r>
+              <a:rPr lang="en-US" sz="1600" dirty="0"/>
+              <a:t>.</a:t>
+            </a:r>
+          </a:p>
+          <a:p>
+            <a:pPr marL="347663" indent="-347663">
+              <a:lnSpc>
+                <a:spcPct val="100000"/>
+              </a:lnSpc>
+              <a:spcBef>
+                <a:spcPts val="0"/>
+              </a:spcBef>
+              <a:buFont typeface="+mj-lt"/>
+              <a:buAutoNum type="arabicPeriod"/>
+            </a:pPr>
+            <a:r>
+              <a:rPr lang="en-US" sz="1600" dirty="0"/>
+              <a:t>Federal Reserve Bank of St. Louis.  2016.  “Consumer Price Index:  Total All Items for the United States.” </a:t>
+            </a:r>
+            <a:r>
+              <a:rPr lang="en-US" sz="1600" dirty="0">
+                <a:hlinkClick r:id="rId5"/>
+              </a:rPr>
+              <a:t>https://fred.stlouisfed.org/series/CPALTT01USM661S</a:t>
+            </a:r>
+            <a:r>
+              <a:rPr lang="en-US" sz="1600" dirty="0"/>
+              <a:t>.</a:t>
+            </a:r>
+          </a:p>
+          <a:p>
+            <a:pPr marL="347663" indent="-347663">
+              <a:lnSpc>
+                <a:spcPct val="100000"/>
+              </a:lnSpc>
+              <a:spcBef>
+                <a:spcPts val="0"/>
+              </a:spcBef>
+              <a:buFont typeface="+mj-lt"/>
+              <a:buAutoNum type="arabicPeriod"/>
+            </a:pPr>
+            <a:r>
+              <a:rPr lang="en-US" sz="1600" dirty="0"/>
+              <a:t>Hyndman R, </a:t>
+            </a:r>
+            <a:r>
+              <a:rPr lang="en-US" sz="1600" dirty="0" err="1"/>
+              <a:t>Athanasopoulos</a:t>
+            </a:r>
+            <a:r>
+              <a:rPr lang="en-US" sz="1600" dirty="0"/>
+              <a:t> G, </a:t>
+            </a:r>
+            <a:r>
+              <a:rPr lang="en-US" sz="1600" dirty="0" err="1"/>
+              <a:t>Bergmeir</a:t>
+            </a:r>
+            <a:r>
+              <a:rPr lang="en-US" sz="1600" dirty="0"/>
+              <a:t> C, Caceres G, Chhay L, O'Hara-Wild M, Petropoulos F, </a:t>
+            </a:r>
+            <a:r>
+              <a:rPr lang="en-US" sz="1600" dirty="0" err="1"/>
+              <a:t>Razbash</a:t>
+            </a:r>
+            <a:r>
+              <a:rPr lang="en-US" sz="1600" dirty="0"/>
+              <a:t> S, Wang E, Yasmeen F.  2019.  “forecast: Forecasting functions for time series and linear models.” R package version 8.5. </a:t>
+            </a:r>
+            <a:r>
+              <a:rPr lang="en-US" sz="1600" dirty="0">
+                <a:hlinkClick r:id="rId6"/>
+              </a:rPr>
+              <a:t>http://pkg.robjhyndman.com/forecast</a:t>
+            </a:r>
+            <a:r>
+              <a:rPr lang="en-US" sz="1600" dirty="0"/>
+              <a:t>.</a:t>
+            </a:r>
+          </a:p>
+          <a:p>
+            <a:pPr marL="347663" indent="-347663">
+              <a:lnSpc>
+                <a:spcPct val="100000"/>
+              </a:lnSpc>
+              <a:spcBef>
+                <a:spcPts val="0"/>
+              </a:spcBef>
+              <a:buFont typeface="+mj-lt"/>
+              <a:buAutoNum type="arabicPeriod"/>
+            </a:pPr>
+            <a:r>
+              <a:rPr lang="en-US" sz="1600" dirty="0"/>
+              <a:t>Federal Reserve Bank of St. Louis.  2018.  “Household Debt Service Payments as a Percent of Disposable Personal Income.” </a:t>
+            </a:r>
+            <a:r>
+              <a:rPr lang="en-US" sz="1600" dirty="0">
+                <a:hlinkClick r:id="rId7"/>
+              </a:rPr>
+              <a:t>https://fred.stlouisfed.org/series/TDSP</a:t>
+            </a:r>
+            <a:r>
+              <a:rPr lang="en-US" sz="1600" dirty="0"/>
+              <a:t>.</a:t>
+            </a:r>
+          </a:p>
+          <a:p>
+            <a:pPr marL="347663" indent="-347663">
+              <a:lnSpc>
+                <a:spcPct val="100000"/>
+              </a:lnSpc>
+              <a:spcBef>
+                <a:spcPts val="0"/>
+              </a:spcBef>
+              <a:buFont typeface="+mj-lt"/>
+              <a:buAutoNum type="arabicPeriod"/>
+            </a:pPr>
+            <a:r>
+              <a:rPr lang="en-US" sz="1600" dirty="0"/>
+              <a:t>Federal Reserve Bank of St. Louis.  2018.  “</a:t>
+            </a:r>
+            <a:r>
+              <a:rPr lang="it-IT" sz="1600" dirty="0"/>
+              <a:t>Real Disposable Personal Income – Per Capita.</a:t>
+            </a:r>
+            <a:r>
+              <a:rPr lang="en-US" sz="1600" dirty="0"/>
+              <a:t>” </a:t>
+            </a:r>
+            <a:r>
+              <a:rPr lang="en-US" sz="1600" dirty="0">
+                <a:hlinkClick r:id="rId8"/>
+              </a:rPr>
+              <a:t>https://fred.stlouisfed.org/series/A229RX0Q048SBEA</a:t>
+            </a:r>
+            <a:r>
+              <a:rPr lang="en-US" sz="1600" dirty="0"/>
+              <a:t>.</a:t>
+            </a:r>
+          </a:p>
+          <a:p>
+            <a:pPr marL="347663" indent="-347663">
+              <a:lnSpc>
+                <a:spcPct val="100000"/>
+              </a:lnSpc>
+              <a:spcBef>
+                <a:spcPts val="0"/>
+              </a:spcBef>
+              <a:buFont typeface="+mj-lt"/>
+              <a:buAutoNum type="arabicPeriod"/>
+            </a:pPr>
+            <a:r>
+              <a:rPr lang="en-US" sz="1600" dirty="0"/>
+              <a:t>Federal Reserve Bank of St. Louis.  2018.  “Personal Saving as a Percent of Disposable Personal Income.” https://fred.stlouisfed.org/series/A072RC1Q156SBEA.</a:t>
+            </a:r>
+          </a:p>
+        </p:txBody>
+      </p:sp>
+    </p:spTree>
+    <p:extLst>
+      <p:ext uri="{BB962C8B-B14F-4D97-AF65-F5344CB8AC3E}">
+        <p14:creationId xmlns:p14="http://schemas.microsoft.com/office/powerpoint/2010/main" val="4229999681"/>
       </p:ext>
     </p:extLst>
   </p:cSld>
@@ -7433,7 +8249,7 @@
             <a:pPr marL="1371600" lvl="2"/>
             <a:r>
               <a:rPr lang="en-US" dirty="0"/>
-              <a:t>Decomposition (not shown here)</a:t>
+              <a:t>Decomposition</a:t>
             </a:r>
           </a:p>
           <a:p>
@@ -7447,7 +8263,7 @@
             <a:pPr marL="1371600" lvl="2"/>
             <a:r>
               <a:rPr lang="en-US" dirty="0"/>
-              <a:t>Scaled periodogram (not shown here)</a:t>
+              <a:t>Scaled periodogram</a:t>
             </a:r>
           </a:p>
           <a:p>
@@ -9319,7 +10135,7 @@
 <file path=ppt/theme/theme1.xml><?xml version="1.0" encoding="utf-8"?>
 <a:theme xmlns:a="http://schemas.openxmlformats.org/drawingml/2006/main" name="Metropolitan">
   <a:themeElements>
-    <a:clrScheme name="Blue Green">
+    <a:clrScheme name="KMP_BlueGreen2">
       <a:dk1>
         <a:sysClr val="windowText" lastClr="000000"/>
       </a:dk1>
@@ -9351,10 +10167,10 @@
         <a:srgbClr val="2683C6"/>
       </a:accent6>
       <a:hlink>
-        <a:srgbClr val="6B9F25"/>
+        <a:srgbClr val="1FC967"/>
       </a:hlink>
       <a:folHlink>
-        <a:srgbClr val="9F6715"/>
+        <a:srgbClr val="12783E"/>
       </a:folHlink>
     </a:clrScheme>
     <a:fontScheme name="Metropolitan">

</xml_diff>

<commit_message>
Updating slides to reflect corrections to savings vs debt model
</commit_message>
<xml_diff>
--- a/Prioli_Final_Proj.pptx
+++ b/Prioli_Final_Proj.pptx
@@ -232,7 +232,7 @@
           <a:p>
             <a:fld id="{4EE169DE-67F4-4753-9B1C-F1A309C78068}" type="datetimeFigureOut">
               <a:rPr lang="en-US" smtClean="0"/>
-              <a:t>5/6/2019</a:t>
+              <a:t>5/7/2019</a:t>
             </a:fld>
             <a:endParaRPr lang="en-US"/>
           </a:p>
@@ -699,7 +699,7 @@
           <a:p>
             <a:fld id="{CF647BC4-379F-449B-8ACB-1D0356C51E22}" type="datetimeFigureOut">
               <a:rPr lang="en-US" smtClean="0"/>
-              <a:t>5/6/2019</a:t>
+              <a:t>5/7/2019</a:t>
             </a:fld>
             <a:endParaRPr lang="en-US"/>
           </a:p>
@@ -889,7 +889,7 @@
           <a:p>
             <a:fld id="{CF647BC4-379F-449B-8ACB-1D0356C51E22}" type="datetimeFigureOut">
               <a:rPr lang="en-US" smtClean="0"/>
-              <a:t>5/6/2019</a:t>
+              <a:t>5/7/2019</a:t>
             </a:fld>
             <a:endParaRPr lang="en-US"/>
           </a:p>
@@ -1069,7 +1069,7 @@
           <a:p>
             <a:fld id="{CF647BC4-379F-449B-8ACB-1D0356C51E22}" type="datetimeFigureOut">
               <a:rPr lang="en-US" smtClean="0"/>
-              <a:t>5/6/2019</a:t>
+              <a:t>5/7/2019</a:t>
             </a:fld>
             <a:endParaRPr lang="en-US"/>
           </a:p>
@@ -1260,7 +1260,7 @@
           <a:p>
             <a:fld id="{CF647BC4-379F-449B-8ACB-1D0356C51E22}" type="datetimeFigureOut">
               <a:rPr lang="en-US" smtClean="0"/>
-              <a:t>5/6/2019</a:t>
+              <a:t>5/7/2019</a:t>
             </a:fld>
             <a:endParaRPr lang="en-US"/>
           </a:p>
@@ -1516,7 +1516,7 @@
           <a:p>
             <a:fld id="{CF647BC4-379F-449B-8ACB-1D0356C51E22}" type="datetimeFigureOut">
               <a:rPr lang="en-US" smtClean="0"/>
-              <a:t>5/6/2019</a:t>
+              <a:t>5/7/2019</a:t>
             </a:fld>
             <a:endParaRPr lang="en-US"/>
           </a:p>
@@ -1804,7 +1804,7 @@
           <a:p>
             <a:fld id="{CF647BC4-379F-449B-8ACB-1D0356C51E22}" type="datetimeFigureOut">
               <a:rPr lang="en-US" smtClean="0"/>
-              <a:t>5/6/2019</a:t>
+              <a:t>5/7/2019</a:t>
             </a:fld>
             <a:endParaRPr lang="en-US"/>
           </a:p>
@@ -2242,7 +2242,7 @@
           <a:p>
             <a:fld id="{CF647BC4-379F-449B-8ACB-1D0356C51E22}" type="datetimeFigureOut">
               <a:rPr lang="en-US" smtClean="0"/>
-              <a:t>5/6/2019</a:t>
+              <a:t>5/7/2019</a:t>
             </a:fld>
             <a:endParaRPr lang="en-US"/>
           </a:p>
@@ -2360,7 +2360,7 @@
           <a:p>
             <a:fld id="{CF647BC4-379F-449B-8ACB-1D0356C51E22}" type="datetimeFigureOut">
               <a:rPr lang="en-US" smtClean="0"/>
-              <a:t>5/6/2019</a:t>
+              <a:t>5/7/2019</a:t>
             </a:fld>
             <a:endParaRPr lang="en-US"/>
           </a:p>
@@ -2455,7 +2455,7 @@
           <a:p>
             <a:fld id="{CF647BC4-379F-449B-8ACB-1D0356C51E22}" type="datetimeFigureOut">
               <a:rPr lang="en-US" smtClean="0"/>
-              <a:t>5/6/2019</a:t>
+              <a:t>5/7/2019</a:t>
             </a:fld>
             <a:endParaRPr lang="en-US"/>
           </a:p>
@@ -2811,7 +2811,7 @@
           <a:p>
             <a:fld id="{CF647BC4-379F-449B-8ACB-1D0356C51E22}" type="datetimeFigureOut">
               <a:rPr lang="en-US" smtClean="0"/>
-              <a:t>5/6/2019</a:t>
+              <a:t>5/7/2019</a:t>
             </a:fld>
             <a:endParaRPr lang="en-US"/>
           </a:p>
@@ -3127,7 +3127,7 @@
           <a:p>
             <a:fld id="{CF647BC4-379F-449B-8ACB-1D0356C51E22}" type="datetimeFigureOut">
               <a:rPr lang="en-US" smtClean="0"/>
-              <a:t>5/6/2019</a:t>
+              <a:t>5/7/2019</a:t>
             </a:fld>
             <a:endParaRPr lang="en-US"/>
           </a:p>
@@ -3359,7 +3359,7 @@
             <a:fld id="{CF647BC4-379F-449B-8ACB-1D0356C51E22}" type="datetimeFigureOut">
               <a:rPr lang="en-US" smtClean="0"/>
               <a:pPr/>
-              <a:t>5/6/2019</a:t>
+              <a:t>5/7/2019</a:t>
             </a:fld>
             <a:endParaRPr lang="en-US"/>
           </a:p>
@@ -5333,7 +5333,7 @@
         <p:spPr>
           <a:xfrm>
             <a:off x="476285" y="1288830"/>
-            <a:ext cx="6760900" cy="1286416"/>
+            <a:ext cx="6760900" cy="1050887"/>
           </a:xfrm>
         </p:spPr>
         <p:txBody>
@@ -5343,22 +5343,22 @@
           <a:lstStyle/>
           <a:p>
             <a:r>
-              <a:rPr lang="en-US" sz="2400" dirty="0"/>
+              <a:rPr lang="en-US" sz="2200" dirty="0"/>
               <a:t>Model was fit with lagged debt to predict savings (</a:t>
             </a:r>
             <a:r>
-              <a:rPr lang="en-US" sz="2400" i="1" dirty="0"/>
+              <a:rPr lang="en-US" sz="2200" i="1" dirty="0"/>
               <a:t>h</a:t>
             </a:r>
             <a:r>
-              <a:rPr lang="en-US" sz="2400" dirty="0"/>
+              <a:rPr lang="en-US" sz="2200" dirty="0"/>
               <a:t>=-1)</a:t>
             </a:r>
           </a:p>
           <a:p>
             <a:r>
-              <a:rPr lang="en-US" sz="2400" dirty="0"/>
-              <a:t>Recommended model was ARIMA(1,1,0)</a:t>
+              <a:rPr lang="en-US" sz="2200" dirty="0"/>
+              <a:t>Recommended model was ARIMA(2,1,1)</a:t>
             </a:r>
           </a:p>
         </p:txBody>
@@ -5406,8 +5406,8 @@
         </p:nvSpPr>
         <p:spPr>
           <a:xfrm>
-            <a:off x="7236794" y="1288829"/>
-            <a:ext cx="4726605" cy="3893374"/>
+            <a:off x="7236794" y="915319"/>
+            <a:ext cx="4726605" cy="4331955"/>
           </a:xfrm>
           <a:prstGeom prst="rect">
             <a:avLst/>
@@ -5463,7 +5463,7 @@
                 </a:solidFill>
                 <a:latin typeface="Lucida Console" panose="020B0609040504020204" pitchFamily="49" charset="0"/>
               </a:rPr>
-              <a:t>Regression with ARIMA(1,1,0) errors </a:t>
+              <a:t>Regression with ARIMA(2,1,1) errors </a:t>
             </a:r>
           </a:p>
           <a:p>
@@ -5493,7 +5493,7 @@
                 </a:solidFill>
                 <a:latin typeface="Lucida Console" panose="020B0609040504020204" pitchFamily="49" charset="0"/>
               </a:rPr>
-              <a:t>          ar1     </a:t>
+              <a:t>         ar1     ar2      ma1    drift     </a:t>
             </a:r>
             <a:r>
               <a:rPr lang="en-US" sz="950" dirty="0" err="1">
@@ -5519,7 +5519,7 @@
                 </a:solidFill>
                 <a:latin typeface="Lucida Console" panose="020B0609040504020204" pitchFamily="49" charset="0"/>
               </a:rPr>
-              <a:t>      -0.3639  -0.0066</a:t>
+              <a:t>      0.3977  0.2882  -0.9324  -0.0327  -1.0207</a:t>
             </a:r>
           </a:p>
           <a:p>
@@ -5539,7 +5539,7 @@
                 </a:solidFill>
                 <a:latin typeface="Lucida Console" panose="020B0609040504020204" pitchFamily="49" charset="0"/>
               </a:rPr>
-              <a:t>   0.0858   0.4440</a:t>
+              <a:t>  0.0971  0.0904   0.0507   0.0139   0.2683</a:t>
             </a:r>
           </a:p>
           <a:p>
@@ -5558,7 +5558,7 @@
                 </a:solidFill>
                 <a:latin typeface="Lucida Console" panose="020B0609040504020204" pitchFamily="49" charset="0"/>
               </a:rPr>
-              <a:t>sigma^2 estimated as 0.5671:  log likelihood=-169.36</a:t>
+              <a:t>sigma^2 estimated as 0.5494:  log likelihood=-165.7</a:t>
             </a:r>
           </a:p>
           <a:p>
@@ -5569,7 +5569,7 @@
                 </a:solidFill>
                 <a:latin typeface="Lucida Console" panose="020B0609040504020204" pitchFamily="49" charset="0"/>
               </a:rPr>
-              <a:t>AIC=344.72   </a:t>
+              <a:t>AIC=343.39   </a:t>
             </a:r>
             <a:r>
               <a:rPr lang="en-US" sz="950" dirty="0" err="1">
@@ -5587,7 +5587,7 @@
                 </a:solidFill>
                 <a:latin typeface="Lucida Console" panose="020B0609040504020204" pitchFamily="49" charset="0"/>
               </a:rPr>
-              <a:t>=344.89   BIC=353.76</a:t>
+              <a:t>=343.98   BIC=361.46</a:t>
             </a:r>
           </a:p>
           <a:p>
@@ -5625,7 +5625,7 @@
                 </a:solidFill>
                 <a:latin typeface="Lucida Console" panose="020B0609040504020204" pitchFamily="49" charset="0"/>
               </a:rPr>
-              <a:t>       Estimate Std. Error z value  </a:t>
+              <a:t>       Estimate Std. Error  z value  </a:t>
             </a:r>
             <a:r>
               <a:rPr lang="en-US" sz="950" dirty="0" err="1">
@@ -5654,7 +5654,40 @@
                 </a:solidFill>
                 <a:latin typeface="Lucida Console" panose="020B0609040504020204" pitchFamily="49" charset="0"/>
               </a:rPr>
-              <a:t>ar1  -0.3638799  0.0857849 -4.2418 2.218e-05 ***</a:t>
+              <a:t>ar1    0.397680   0.097130   4.0943 4.235e-05 ***</a:t>
+            </a:r>
+          </a:p>
+          <a:p>
+            <a:r>
+              <a:rPr lang="en-US" sz="950" dirty="0">
+                <a:solidFill>
+                  <a:schemeClr val="bg1"/>
+                </a:solidFill>
+                <a:latin typeface="Lucida Console" panose="020B0609040504020204" pitchFamily="49" charset="0"/>
+              </a:rPr>
+              <a:t>ar2    0.288219   0.090370   3.1893 0.0014261 ** </a:t>
+            </a:r>
+          </a:p>
+          <a:p>
+            <a:r>
+              <a:rPr lang="en-US" sz="950" dirty="0">
+                <a:solidFill>
+                  <a:schemeClr val="bg1"/>
+                </a:solidFill>
+                <a:latin typeface="Lucida Console" panose="020B0609040504020204" pitchFamily="49" charset="0"/>
+              </a:rPr>
+              <a:t>ma1   -0.932420   0.050732 -18.3792 &lt; 2.2e-16 ***</a:t>
+            </a:r>
+          </a:p>
+          <a:p>
+            <a:r>
+              <a:rPr lang="en-US" sz="950" dirty="0">
+                <a:solidFill>
+                  <a:schemeClr val="bg1"/>
+                </a:solidFill>
+                <a:latin typeface="Lucida Console" panose="020B0609040504020204" pitchFamily="49" charset="0"/>
+              </a:rPr>
+              <a:t>drift -0.032696   0.013879  -2.3557 0.0184876 *  </a:t>
             </a:r>
           </a:p>
           <a:p>
@@ -5674,7 +5707,7 @@
                 </a:solidFill>
                 <a:latin typeface="Lucida Console" panose="020B0609040504020204" pitchFamily="49" charset="0"/>
               </a:rPr>
-              <a:t> -0.0065701  0.4439923 -0.0148    0.9882    </a:t>
+              <a:t>  -1.020721   0.268268  -3.8049 0.0001419 ***</a:t>
             </a:r>
           </a:p>
           <a:p>
@@ -5769,7 +5802,7 @@
                 </a:solidFill>
                 <a:latin typeface="Lucida Console" panose="020B0609040504020204" pitchFamily="49" charset="0"/>
               </a:rPr>
-              <a:t>data:  Residuals from Regression with ARIMA(1,1,0) errors</a:t>
+              <a:t>data:  Residuals from Regression with ARIMA(2,1,1) errors</a:t>
             </a:r>
           </a:p>
           <a:p>
@@ -5780,7 +5813,7 @@
                 </a:solidFill>
                 <a:latin typeface="Lucida Console" panose="020B0609040504020204" pitchFamily="49" charset="0"/>
               </a:rPr>
-              <a:t>Q* = 7.4125, df = 6, p-value = 0.2844</a:t>
+              <a:t>Q* = 5.434, df = 3, p-value = 0.1426</a:t>
             </a:r>
           </a:p>
           <a:p>
@@ -5799,7 +5832,7 @@
                 </a:solidFill>
                 <a:latin typeface="Lucida Console" panose="020B0609040504020204" pitchFamily="49" charset="0"/>
               </a:rPr>
-              <a:t>Model df: 2.   Total lags used: 8</a:t>
+              <a:t>Model df: 5.   Total lags used: 8</a:t>
             </a:r>
           </a:p>
         </p:txBody>
@@ -5829,7 +5862,7 @@
         </p:spPr>
         <p:txBody>
           <a:bodyPr vert="horz" lIns="91440" tIns="45720" rIns="91440" bIns="45720" rtlCol="0">
-            <a:normAutofit/>
+            <a:normAutofit lnSpcReduction="10000"/>
           </a:bodyPr>
           <a:lstStyle>
             <a:lvl1pPr marL="228600" indent="-228600" algn="l" defTabSz="914400" rtl="0" eaLnBrk="1" latinLnBrk="0" hangingPunct="1">
@@ -6032,7 +6065,7 @@
             </a:pPr>
             <a:r>
               <a:rPr lang="en-US" sz="2400" dirty="0"/>
-              <a:t>Histogram shows reasonable normality for bulk of data but tails deviate from normality</a:t>
+              <a:t>Histogram shows reasonable normality for bulk of data with slight deviation from normality at tails</a:t>
             </a:r>
           </a:p>
           <a:p>
@@ -6058,10 +6091,10 @@
       </p:sp>
       <p:pic>
         <p:nvPicPr>
-          <p:cNvPr id="5" name="Picture 4">
+          <p:cNvPr id="3" name="Picture 2">
             <a:extLst>
               <a:ext uri="{FF2B5EF4-FFF2-40B4-BE49-F238E27FC236}">
-                <a16:creationId xmlns:a16="http://schemas.microsoft.com/office/drawing/2014/main" id="{A7A8B684-D05D-4B1E-8334-A88C30D0597D}"/>
+                <a16:creationId xmlns:a16="http://schemas.microsoft.com/office/drawing/2014/main" id="{68142042-5F8E-450B-895D-223F150E3290}"/>
               </a:ext>
             </a:extLst>
           </p:cNvPr>
@@ -6078,8 +6111,8 @@
         </p:blipFill>
         <p:spPr>
           <a:xfrm>
-            <a:off x="475902" y="2575246"/>
-            <a:ext cx="6517393" cy="2606957"/>
+            <a:off x="475488" y="2135372"/>
+            <a:ext cx="6502352" cy="3251176"/>
           </a:xfrm>
           <a:prstGeom prst="rect">
             <a:avLst/>
@@ -6144,8 +6177,8 @@
         </p:blipFill>
         <p:spPr>
           <a:xfrm>
-            <a:off x="1290177" y="1288829"/>
-            <a:ext cx="8469782" cy="3387912"/>
+            <a:off x="1290178" y="1288829"/>
+            <a:ext cx="8469780" cy="3387912"/>
           </a:xfrm>
           <a:prstGeom prst="rect">
             <a:avLst/>
@@ -6203,13 +6236,13 @@
               </a:ext>
             </a:extLst>
           </a:blip>
-          <a:srcRect l="91774" t="49916" r="3786" b="38889"/>
+          <a:srcRect l="92308" t="49910" r="3902" b="40653"/>
           <a:stretch/>
         </p:blipFill>
         <p:spPr>
           <a:xfrm>
-            <a:off x="10196512" y="3024873"/>
-            <a:ext cx="1347788" cy="1359419"/>
+            <a:off x="10213461" y="3024873"/>
+            <a:ext cx="1376721" cy="1371600"/>
           </a:xfrm>
           <a:prstGeom prst="rect">
             <a:avLst/>
@@ -6379,7 +6412,7 @@
                 </a:solidFill>
                 <a:latin typeface="Lucida Console" panose="020B0609040504020204" pitchFamily="49" charset="0"/>
               </a:rPr>
-              <a:t>|Q1 2018   |             6.45|           7.2|        -10.42|</a:t>
+              <a:t>|Q4 2017   |             6.78|           7.2|         -5.83|</a:t>
             </a:r>
           </a:p>
           <a:p>
@@ -6391,7 +6424,7 @@
                 </a:solidFill>
                 <a:latin typeface="Lucida Console" panose="020B0609040504020204" pitchFamily="49" charset="0"/>
               </a:rPr>
-              <a:t>|Q2 2018   |             6.39|           6.7|         -4.63|</a:t>
+              <a:t>|Q1 2018   |             6.77|           6.7|          1.04|</a:t>
             </a:r>
           </a:p>
           <a:p>
@@ -6403,7 +6436,7 @@
                 </a:solidFill>
                 <a:latin typeface="Lucida Console" panose="020B0609040504020204" pitchFamily="49" charset="0"/>
               </a:rPr>
-              <a:t>|Q3 2018   |             6.41|           6.3|          1.75|</a:t>
+              <a:t>|Q2 2018   |             6.77|           6.3|          7.46|</a:t>
             </a:r>
           </a:p>
         </p:txBody>
@@ -6432,7 +6465,7 @@
         </p:spPr>
         <p:txBody>
           <a:bodyPr>
-            <a:normAutofit lnSpcReduction="10000"/>
+            <a:normAutofit fontScale="92500" lnSpcReduction="10000"/>
           </a:bodyPr>
           <a:lstStyle/>
           <a:p>
@@ -6444,13 +6477,19 @@
           <a:p>
             <a:r>
               <a:rPr lang="en-US" sz="2400" dirty="0"/>
-              <a:t>Error ranges from ~2% to ~10.5% in magnitude</a:t>
+              <a:t>Error ranges from ~1% to ~7.5% in magnitude</a:t>
             </a:r>
           </a:p>
           <a:p>
             <a:r>
               <a:rPr lang="en-US" sz="2400" dirty="0"/>
               <a:t>Observed values are within 95% PI</a:t>
+            </a:r>
+          </a:p>
+          <a:p>
+            <a:r>
+              <a:rPr lang="en-US" sz="2400" dirty="0"/>
+              <a:t>Local volatility yields poorer predictions</a:t>
             </a:r>
           </a:p>
         </p:txBody>
@@ -6542,7 +6581,7 @@
           <a:p>
             <a:r>
               <a:rPr lang="en-US" dirty="0"/>
-              <a:t>Model for savings vs. debt worked passably for forecasting</a:t>
+              <a:t>Model for savings vs. debt worked acceptably well for forecasting</a:t>
             </a:r>
           </a:p>
           <a:p>
@@ -8273,7 +8312,7 @@
             </a:pPr>
             <a:r>
               <a:rPr lang="en-US" dirty="0"/>
-              <a:t>Model the data through Q4 2017</a:t>
+              <a:t>Model the data leaving out last 3 observations</a:t>
             </a:r>
           </a:p>
           <a:p>
@@ -8320,7 +8359,7 @@
                 </a:solidFill>
                 <a:latin typeface="Lucida Console" panose="020B0609040504020204" pitchFamily="49" charset="0"/>
               </a:rPr>
-              <a:t>checkresiduals</a:t>
+              <a:t>coeftest</a:t>
             </a:r>
             <a:r>
               <a:rPr lang="en-US" dirty="0">
@@ -8333,7 +8372,7 @@
             </a:r>
             <a:r>
               <a:rPr lang="en-US" dirty="0"/>
-              <a:t> , and </a:t>
+              <a:t>, and </a:t>
             </a:r>
             <a:r>
               <a:rPr lang="en-US" dirty="0" err="1">
@@ -8342,7 +8381,7 @@
                 </a:solidFill>
                 <a:latin typeface="Lucida Console" panose="020B0609040504020204" pitchFamily="49" charset="0"/>
               </a:rPr>
-              <a:t>coeftest</a:t>
+              <a:t>checkresiduals</a:t>
             </a:r>
             <a:r>
               <a:rPr lang="en-US" dirty="0">
@@ -8361,7 +8400,7 @@
             </a:pPr>
             <a:r>
               <a:rPr lang="en-US" dirty="0"/>
-              <a:t>Make predictions for Q1 2018 – Q3 2018 and check against known values</a:t>
+              <a:t>Make predictions for last 3 observations and check against known values</a:t>
             </a:r>
           </a:p>
           <a:p>
@@ -9797,9 +9836,9 @@
         <p:grpSpPr>
           <a:xfrm>
             <a:off x="1290177" y="1288829"/>
-            <a:ext cx="9345444" cy="3387913"/>
+            <a:ext cx="9561869" cy="3387913"/>
             <a:chOff x="1290177" y="1288829"/>
-            <a:chExt cx="9345444" cy="3387913"/>
+            <a:chExt cx="9561869" cy="3387913"/>
           </a:xfrm>
         </p:grpSpPr>
         <p:pic>
@@ -9871,8 +9910,8 @@
           </p:blipFill>
           <p:spPr>
             <a:xfrm>
-              <a:off x="9546087" y="2395751"/>
-              <a:ext cx="1089534" cy="1065850"/>
+              <a:off x="9449968" y="2395751"/>
+              <a:ext cx="1402078" cy="1371600"/>
             </a:xfrm>
             <a:prstGeom prst="rect">
               <a:avLst/>

</xml_diff>

<commit_message>
Updating text to reflect corrected savings vs debt analysis; minor tweaks to slides
</commit_message>
<xml_diff>
--- a/Prioli_Final_Proj.pptx
+++ b/Prioli_Final_Proj.pptx
@@ -5338,7 +5338,7 @@
         </p:spPr>
         <p:txBody>
           <a:bodyPr>
-            <a:normAutofit/>
+            <a:normAutofit fontScale="92500" lnSpcReduction="10000"/>
           </a:bodyPr>
           <a:lstStyle/>
           <a:p>
@@ -5358,7 +5358,14 @@
           <a:p>
             <a:r>
               <a:rPr lang="en-US" sz="2200" dirty="0"/>
-              <a:t>Recommended model was ARIMA(2,1,1)</a:t>
+              <a:t>Recommended model was ARIMA(2,1,1) with drift</a:t>
+            </a:r>
+          </a:p>
+          <a:p>
+            <a:pPr lvl="1"/>
+            <a:r>
+              <a:rPr lang="en-US" sz="1800" dirty="0"/>
+              <a:t>Includes the needed differencing</a:t>
             </a:r>
           </a:p>
         </p:txBody>
@@ -5406,7 +5413,7 @@
         </p:nvSpPr>
         <p:spPr>
           <a:xfrm>
-            <a:off x="7236794" y="915319"/>
+            <a:off x="7236794" y="1169429"/>
             <a:ext cx="4726605" cy="4331955"/>
           </a:xfrm>
           <a:prstGeom prst="rect">
@@ -5853,8 +5860,8 @@
         </p:nvSpPr>
         <p:spPr>
           <a:xfrm>
-            <a:off x="476284" y="5421094"/>
-            <a:ext cx="11487115" cy="1246406"/>
+            <a:off x="476284" y="5611594"/>
+            <a:ext cx="11487115" cy="1055906"/>
           </a:xfrm>
           <a:prstGeom prst="rect">
             <a:avLst/>
@@ -5862,7 +5869,7 @@
         </p:spPr>
         <p:txBody>
           <a:bodyPr vert="horz" lIns="91440" tIns="45720" rIns="91440" bIns="45720" rtlCol="0">
-            <a:normAutofit lnSpcReduction="10000"/>
+            <a:normAutofit/>
           </a:bodyPr>
           <a:lstStyle>
             <a:lvl1pPr marL="228600" indent="-228600" algn="l" defTabSz="914400" rtl="0" eaLnBrk="1" latinLnBrk="0" hangingPunct="1">
@@ -6064,7 +6071,7 @@
               </a:lnSpc>
             </a:pPr>
             <a:r>
-              <a:rPr lang="en-US" sz="2400" dirty="0"/>
+              <a:rPr lang="en-US" sz="2000" dirty="0"/>
               <a:t>Histogram shows reasonable normality for bulk of data with slight deviation from normality at tails</a:t>
             </a:r>
           </a:p>
@@ -6075,15 +6082,15 @@
               </a:lnSpc>
             </a:pPr>
             <a:r>
-              <a:rPr lang="en-US" sz="2400" dirty="0"/>
+              <a:rPr lang="en-US" sz="2000" dirty="0"/>
               <a:t>ACF looks like white noise and </a:t>
             </a:r>
             <a:r>
-              <a:rPr lang="en-US" sz="2400" dirty="0" err="1"/>
+              <a:rPr lang="en-US" sz="2000" dirty="0" err="1"/>
               <a:t>Ljung</a:t>
             </a:r>
             <a:r>
-              <a:rPr lang="en-US" sz="2400" dirty="0"/>
+              <a:rPr lang="en-US" sz="2000" dirty="0"/>
               <a:t>-Box test is NSS over 8 lags, thus residuals are consistent with white noise</a:t>
             </a:r>
           </a:p>
@@ -6111,7 +6118,7 @@
         </p:blipFill>
         <p:spPr>
           <a:xfrm>
-            <a:off x="475488" y="2135372"/>
+            <a:off x="475488" y="2350068"/>
             <a:ext cx="6502352" cy="3251176"/>
           </a:xfrm>
           <a:prstGeom prst="rect">
@@ -6471,7 +6478,7 @@
           <a:p>
             <a:r>
               <a:rPr lang="en-US" sz="2400" dirty="0"/>
-              <a:t>Predictions aren’t terrible but not great, consistent with expectations per CCF plot</a:t>
+              <a:t>Predictions are acceptable but not great, consistent with expectations per CCF plot</a:t>
             </a:r>
           </a:p>
           <a:p>

</xml_diff>

<commit_message>
Slide edits following presentation dry run
</commit_message>
<xml_diff>
--- a/Prioli_Final_Proj.pptx
+++ b/Prioli_Final_Proj.pptx
@@ -4800,7 +4800,7 @@
             </a:ln>
           </p:spPr>
           <p:txBody>
-            <a:bodyPr wrap="square" rtlCol="0">
+            <a:bodyPr wrap="square" rtlCol="0" anchor="ctr" anchorCtr="0">
               <a:spAutoFit/>
             </a:bodyPr>
             <a:lstStyle/>
@@ -5413,8 +5413,8 @@
         </p:nvSpPr>
         <p:spPr>
           <a:xfrm>
-            <a:off x="7236794" y="1169429"/>
-            <a:ext cx="4726605" cy="4331955"/>
+            <a:off x="7236794" y="850047"/>
+            <a:ext cx="4726605" cy="4478149"/>
           </a:xfrm>
           <a:prstGeom prst="rect">
             <a:avLst/>
@@ -5429,7 +5429,7 @@
           </a:ln>
         </p:spPr>
         <p:txBody>
-          <a:bodyPr wrap="square" rtlCol="0">
+          <a:bodyPr wrap="square" rtlCol="0" anchor="ctr" anchorCtr="0">
             <a:spAutoFit/>
           </a:bodyPr>
           <a:lstStyle/>
@@ -5596,6 +5596,14 @@
               </a:rPr>
               <a:t>=343.98   BIC=361.46</a:t>
             </a:r>
+          </a:p>
+          <a:p>
+            <a:endParaRPr lang="en-US" sz="950" dirty="0">
+              <a:solidFill>
+                <a:schemeClr val="bg1"/>
+              </a:solidFill>
+              <a:latin typeface="Lucida Console" panose="020B0609040504020204" pitchFamily="49" charset="0"/>
+            </a:endParaRPr>
           </a:p>
           <a:p>
             <a:endParaRPr lang="en-US" sz="950" dirty="0">
@@ -6382,7 +6390,7 @@
           </a:ln>
         </p:spPr>
         <p:txBody>
-          <a:bodyPr wrap="square" rtlCol="0">
+          <a:bodyPr wrap="square" rtlCol="0" anchor="ctr" anchorCtr="0">
             <a:spAutoFit/>
           </a:bodyPr>
           <a:lstStyle/>
@@ -6835,7 +6843,7 @@
             <a:r>
               <a:rPr lang="en-US" sz="2400" dirty="0">
                 <a:solidFill>
-                  <a:srgbClr val="404040"/>
+                  <a:srgbClr val="1FC967"/>
                 </a:solidFill>
                 <a:latin typeface="Lucida Console" panose="020B0609040504020204" pitchFamily="49" charset="0"/>
               </a:rPr>
@@ -7583,7 +7591,7 @@
             <a:r>
               <a:rPr lang="en-US" sz="2400" dirty="0">
                 <a:solidFill>
-                  <a:srgbClr val="404040"/>
+                  <a:srgbClr val="1FC967"/>
                 </a:solidFill>
                 <a:latin typeface="Lucida Console" panose="020B0609040504020204" pitchFamily="49" charset="0"/>
               </a:rPr>
@@ -7939,7 +7947,7 @@
         </p:spPr>
         <p:txBody>
           <a:bodyPr vert="horz" lIns="91440" tIns="45720" rIns="91440" bIns="45720" rtlCol="0">
-            <a:normAutofit/>
+            <a:normAutofit fontScale="92500" lnSpcReduction="20000"/>
           </a:bodyPr>
           <a:lstStyle>
             <a:lvl1pPr marL="228600" indent="-228600" algn="l" defTabSz="914400" rtl="0" eaLnBrk="1" latinLnBrk="0" hangingPunct="1">
@@ -8149,7 +8157,13 @@
           <a:p>
             <a:r>
               <a:rPr lang="en-US" dirty="0"/>
-              <a:t>All subset to common time horizon (Q1 1980 through Q3 2018)</a:t>
+              <a:t>All are already seasonally adjusted</a:t>
+            </a:r>
+          </a:p>
+          <a:p>
+            <a:r>
+              <a:rPr lang="en-US" dirty="0"/>
+              <a:t>All three TS were subset to common time horizon (Q1 1980 through Q3 2018)</a:t>
             </a:r>
           </a:p>
           <a:p>
@@ -8286,9 +8300,15 @@
           <a:p>
             <a:pPr marL="1371600" lvl="2"/>
             <a:r>
+              <a:rPr lang="en-US" dirty="0">
+                <a:latin typeface="Lucida Console" panose="020B0609040504020204" pitchFamily="49" charset="0"/>
+              </a:rPr>
+              <a:t>​</a:t>
+            </a:r>
+            <a:r>
               <a:rPr lang="en-US" dirty="0" err="1">
                 <a:solidFill>
-                  <a:srgbClr val="404040"/>
+                  <a:srgbClr val="1FC967"/>
                 </a:solidFill>
                 <a:latin typeface="Lucida Console" panose="020B0609040504020204" pitchFamily="49" charset="0"/>
               </a:rPr>
@@ -8297,7 +8317,7 @@
             <a:r>
               <a:rPr lang="en-US" dirty="0">
                 <a:solidFill>
-                  <a:srgbClr val="404040"/>
+                  <a:srgbClr val="1FC967"/>
                 </a:solidFill>
                 <a:latin typeface="Lucida Console" panose="020B0609040504020204" pitchFamily="49" charset="0"/>
               </a:rPr>
@@ -8315,14 +8335,14 @@
             <a:pPr marL="1371600" lvl="2"/>
             <a:r>
               <a:rPr lang="en-US" dirty="0"/>
+              <a:t>Scaled periodogram</a:t>
+            </a:r>
+          </a:p>
+          <a:p>
+            <a:pPr marL="1371600" lvl="2"/>
+            <a:r>
+              <a:rPr lang="en-US" dirty="0"/>
               <a:t>CCF</a:t>
-            </a:r>
-          </a:p>
-          <a:p>
-            <a:pPr marL="1371600" lvl="2"/>
-            <a:r>
-              <a:rPr lang="en-US" dirty="0"/>
-              <a:t>Scaled periodogram</a:t>
             </a:r>
           </a:p>
           <a:p>
@@ -8338,9 +8358,15 @@
           <a:p>
             <a:pPr marL="1377950" lvl="2"/>
             <a:r>
+              <a:rPr lang="en-US" dirty="0">
+                <a:latin typeface="Lucida Console" panose="020B0609040504020204" pitchFamily="49" charset="0"/>
+              </a:rPr>
+              <a:t>​</a:t>
+            </a:r>
+            <a:r>
               <a:rPr lang="en-US" dirty="0" err="1">
                 <a:solidFill>
-                  <a:srgbClr val="404040"/>
+                  <a:srgbClr val="1FC967"/>
                 </a:solidFill>
                 <a:latin typeface="Lucida Console" panose="020B0609040504020204" pitchFamily="49" charset="0"/>
               </a:rPr>
@@ -8349,7 +8375,7 @@
             <a:r>
               <a:rPr lang="en-US" dirty="0">
                 <a:solidFill>
-                  <a:srgbClr val="404040"/>
+                  <a:srgbClr val="1FC967"/>
                 </a:solidFill>
                 <a:latin typeface="Lucida Console" panose="020B0609040504020204" pitchFamily="49" charset="0"/>
               </a:rPr>
@@ -8362,7 +8388,7 @@
             <a:r>
               <a:rPr lang="en-US" dirty="0">
                 <a:solidFill>
-                  <a:srgbClr val="404040"/>
+                  <a:srgbClr val="1FC967"/>
                 </a:solidFill>
                 <a:latin typeface="Lucida Console" panose="020B0609040504020204" pitchFamily="49" charset="0"/>
               </a:rPr>
@@ -8379,6 +8405,24 @@
                 </a:solidFill>
                 <a:latin typeface="Lucida Console" panose="020B0609040504020204" pitchFamily="49" charset="0"/>
               </a:rPr>
+              <a:t>lmtest</a:t>
+            </a:r>
+            <a:r>
+              <a:rPr lang="en-US" dirty="0">
+                <a:solidFill>
+                  <a:srgbClr val="404040"/>
+                </a:solidFill>
+                <a:latin typeface="Lucida Console" panose="020B0609040504020204" pitchFamily="49" charset="0"/>
+              </a:rPr>
+              <a:t>::</a:t>
+            </a:r>
+            <a:r>
+              <a:rPr lang="en-US" dirty="0" err="1">
+                <a:solidFill>
+                  <a:srgbClr val="404040"/>
+                </a:solidFill>
+                <a:latin typeface="Lucida Console" panose="020B0609040504020204" pitchFamily="49" charset="0"/>
+              </a:rPr>
               <a:t>coeftest</a:t>
             </a:r>
             <a:r>
@@ -8397,7 +8441,7 @@
             <a:r>
               <a:rPr lang="en-US" dirty="0" err="1">
                 <a:solidFill>
-                  <a:srgbClr val="404040"/>
+                  <a:srgbClr val="1FC967"/>
                 </a:solidFill>
                 <a:latin typeface="Lucida Console" panose="020B0609040504020204" pitchFamily="49" charset="0"/>
               </a:rPr>
@@ -8406,7 +8450,7 @@
             <a:r>
               <a:rPr lang="en-US" dirty="0">
                 <a:solidFill>
-                  <a:srgbClr val="404040"/>
+                  <a:srgbClr val="1FC967"/>
                 </a:solidFill>
                 <a:latin typeface="Lucida Console" panose="020B0609040504020204" pitchFamily="49" charset="0"/>
               </a:rPr>
@@ -8432,9 +8476,22 @@
                 </a:solidFill>
                 <a:latin typeface="Lucida Console" panose="020B0609040504020204" pitchFamily="49" charset="0"/>
               </a:rPr>
+              <a:t>​</a:t>
+            </a:r>
+            <a:r>
+              <a:rPr lang="en-US" dirty="0">
+                <a:solidFill>
+                  <a:srgbClr val="1FC967"/>
+                </a:solidFill>
+                <a:latin typeface="Lucida Console" panose="020B0609040504020204" pitchFamily="49" charset="0"/>
+              </a:rPr>
               <a:t>forecast()</a:t>
             </a:r>
-            <a:endParaRPr lang="en-US" dirty="0"/>
+            <a:endParaRPr lang="en-US" dirty="0">
+              <a:solidFill>
+                <a:srgbClr val="1FC967"/>
+              </a:solidFill>
+            </a:endParaRPr>
           </a:p>
         </p:txBody>
       </p:sp>
@@ -9148,8 +9205,8 @@
         </p:nvSpPr>
         <p:spPr>
           <a:xfrm>
-            <a:off x="7237185" y="1288829"/>
-            <a:ext cx="4717080" cy="4039567"/>
+            <a:off x="7237185" y="1137754"/>
+            <a:ext cx="4717080" cy="4185761"/>
           </a:xfrm>
           <a:prstGeom prst="rect">
             <a:avLst/>
@@ -9164,7 +9221,7 @@
           </a:ln>
         </p:spPr>
         <p:txBody>
-          <a:bodyPr wrap="square" rtlCol="0">
+          <a:bodyPr wrap="square" rtlCol="0" anchor="ctr" anchorCtr="0">
             <a:spAutoFit/>
           </a:bodyPr>
           <a:lstStyle/>
@@ -9326,17 +9383,6 @@
             </a:endParaRPr>
           </a:p>
           <a:p>
-            <a:r>
-              <a:rPr lang="en-US" sz="950" dirty="0">
-                <a:solidFill>
-                  <a:schemeClr val="bg1"/>
-                </a:solidFill>
-                <a:latin typeface="Lucida Console" panose="020B0609040504020204" pitchFamily="49" charset="0"/>
-              </a:rPr>
-              <a:t>z test of coefficients:</a:t>
-            </a:r>
-          </a:p>
-          <a:p>
             <a:endParaRPr lang="en-US" sz="950" dirty="0">
               <a:solidFill>
                 <a:schemeClr val="bg1"/>
@@ -9352,78 +9398,7 @@
                 </a:solidFill>
                 <a:latin typeface="Lucida Console" panose="020B0609040504020204" pitchFamily="49" charset="0"/>
               </a:rPr>
-              <a:t>        Estimate Std. Error z value  </a:t>
-            </a:r>
-            <a:r>
-              <a:rPr lang="en-US" sz="950" dirty="0" err="1">
-                <a:solidFill>
-                  <a:schemeClr val="bg1"/>
-                </a:solidFill>
-                <a:latin typeface="Lucida Console" panose="020B0609040504020204" pitchFamily="49" charset="0"/>
-              </a:rPr>
-              <a:t>Pr</a:t>
-            </a:r>
-            <a:r>
-              <a:rPr lang="en-US" sz="950" dirty="0">
-                <a:solidFill>
-                  <a:schemeClr val="bg1"/>
-                </a:solidFill>
-                <a:latin typeface="Lucida Console" panose="020B0609040504020204" pitchFamily="49" charset="0"/>
-              </a:rPr>
-              <a:t>(&gt;|z|)    </a:t>
-            </a:r>
-          </a:p>
-          <a:p>
-            <a:r>
-              <a:rPr lang="en-US" sz="950" dirty="0">
-                <a:solidFill>
-                  <a:schemeClr val="bg1"/>
-                </a:solidFill>
-                <a:latin typeface="Lucida Console" panose="020B0609040504020204" pitchFamily="49" charset="0"/>
-              </a:rPr>
-              <a:t>ar1    -0.248912   0.079026 -3.1497  0.001634 ** </a:t>
-            </a:r>
-          </a:p>
-          <a:p>
-            <a:r>
-              <a:rPr lang="en-US" sz="950" dirty="0">
-                <a:solidFill>
-                  <a:schemeClr val="bg1"/>
-                </a:solidFill>
-                <a:latin typeface="Lucida Console" panose="020B0609040504020204" pitchFamily="49" charset="0"/>
-              </a:rPr>
-              <a:t>drift 142.533522  18.232105  7.8177 5.379e-15 ***</a:t>
-            </a:r>
-          </a:p>
-          <a:p>
-            <a:r>
-              <a:rPr lang="en-US" sz="950" dirty="0">
-                <a:solidFill>
-                  <a:schemeClr val="bg1"/>
-                </a:solidFill>
-                <a:latin typeface="Lucida Console" panose="020B0609040504020204" pitchFamily="49" charset="0"/>
-              </a:rPr>
-              <a:t>---</a:t>
-            </a:r>
-          </a:p>
-          <a:p>
-            <a:r>
-              <a:rPr lang="en-US" sz="950" dirty="0" err="1">
-                <a:solidFill>
-                  <a:schemeClr val="bg1"/>
-                </a:solidFill>
-                <a:latin typeface="Lucida Console" panose="020B0609040504020204" pitchFamily="49" charset="0"/>
-              </a:rPr>
-              <a:t>Signif</a:t>
-            </a:r>
-            <a:r>
-              <a:rPr lang="en-US" sz="950" dirty="0">
-                <a:solidFill>
-                  <a:schemeClr val="bg1"/>
-                </a:solidFill>
-                <a:latin typeface="Lucida Console" panose="020B0609040504020204" pitchFamily="49" charset="0"/>
-              </a:rPr>
-              <a:t>. codes:  0 ‘***’ 0.001 ‘**’ 0.01 ‘*’ 0.05 ‘.’ 0.1 ‘ ’ 1</a:t>
+              <a:t>z test of coefficients:</a:t>
             </a:r>
           </a:p>
           <a:p>
@@ -9433,6 +9408,88 @@
               </a:solidFill>
               <a:latin typeface="Lucida Console" panose="020B0609040504020204" pitchFamily="49" charset="0"/>
             </a:endParaRPr>
+          </a:p>
+          <a:p>
+            <a:r>
+              <a:rPr lang="en-US" sz="950" dirty="0">
+                <a:solidFill>
+                  <a:schemeClr val="bg1"/>
+                </a:solidFill>
+                <a:latin typeface="Lucida Console" panose="020B0609040504020204" pitchFamily="49" charset="0"/>
+              </a:rPr>
+              <a:t>        Estimate Std. Error z value  </a:t>
+            </a:r>
+            <a:r>
+              <a:rPr lang="en-US" sz="950" dirty="0" err="1">
+                <a:solidFill>
+                  <a:schemeClr val="bg1"/>
+                </a:solidFill>
+                <a:latin typeface="Lucida Console" panose="020B0609040504020204" pitchFamily="49" charset="0"/>
+              </a:rPr>
+              <a:t>Pr</a:t>
+            </a:r>
+            <a:r>
+              <a:rPr lang="en-US" sz="950" dirty="0">
+                <a:solidFill>
+                  <a:schemeClr val="bg1"/>
+                </a:solidFill>
+                <a:latin typeface="Lucida Console" panose="020B0609040504020204" pitchFamily="49" charset="0"/>
+              </a:rPr>
+              <a:t>(&gt;|z|)    </a:t>
+            </a:r>
+          </a:p>
+          <a:p>
+            <a:r>
+              <a:rPr lang="en-US" sz="950" dirty="0">
+                <a:solidFill>
+                  <a:schemeClr val="bg1"/>
+                </a:solidFill>
+                <a:latin typeface="Lucida Console" panose="020B0609040504020204" pitchFamily="49" charset="0"/>
+              </a:rPr>
+              <a:t>ar1    -0.248912   0.079026 -3.1497  0.001634 ** </a:t>
+            </a:r>
+          </a:p>
+          <a:p>
+            <a:r>
+              <a:rPr lang="en-US" sz="950" dirty="0">
+                <a:solidFill>
+                  <a:schemeClr val="bg1"/>
+                </a:solidFill>
+                <a:latin typeface="Lucida Console" panose="020B0609040504020204" pitchFamily="49" charset="0"/>
+              </a:rPr>
+              <a:t>drift 142.533522  18.232105  7.8177 5.379e-15 ***</a:t>
+            </a:r>
+          </a:p>
+          <a:p>
+            <a:r>
+              <a:rPr lang="en-US" sz="950" dirty="0">
+                <a:solidFill>
+                  <a:schemeClr val="bg1"/>
+                </a:solidFill>
+                <a:latin typeface="Lucida Console" panose="020B0609040504020204" pitchFamily="49" charset="0"/>
+              </a:rPr>
+              <a:t>---</a:t>
+            </a:r>
+          </a:p>
+          <a:p>
+            <a:r>
+              <a:rPr lang="en-US" sz="950" dirty="0" err="1">
+                <a:solidFill>
+                  <a:schemeClr val="bg1"/>
+                </a:solidFill>
+                <a:latin typeface="Lucida Console" panose="020B0609040504020204" pitchFamily="49" charset="0"/>
+              </a:rPr>
+              <a:t>Signif</a:t>
+            </a:r>
+            <a:r>
+              <a:rPr lang="en-US" sz="950" dirty="0">
+                <a:solidFill>
+                  <a:schemeClr val="bg1"/>
+                </a:solidFill>
+                <a:latin typeface="Lucida Console" panose="020B0609040504020204" pitchFamily="49" charset="0"/>
+              </a:rPr>
+              <a:t>. codes:  0 ‘***’ 0.001 ‘**’ 0.01 ‘*’ 0.05 ‘.’ 0.1 ‘ ’ 1</a:t>
+            </a:r>
           </a:p>
           <a:p>
             <a:endParaRPr lang="en-US" sz="950" dirty="0">
@@ -10065,7 +10122,7 @@
           </a:ln>
         </p:spPr>
         <p:txBody>
-          <a:bodyPr wrap="square" rtlCol="0">
+          <a:bodyPr wrap="square" rtlCol="0" anchor="ctr" anchorCtr="0">
             <a:spAutoFit/>
           </a:bodyPr>
           <a:lstStyle/>

</xml_diff>